<commit_message>
Began work on presentation
</commit_message>
<xml_diff>
--- a/deliverables/final/Final Presentation.pptx
+++ b/deliverables/final/Final Presentation.pptx
@@ -6,16 +6,21 @@
   </p:sldMasterIdLst>
   <p:sldIdLst>
     <p:sldId id="256" r:id="rId2"/>
-    <p:sldId id="259" r:id="rId3"/>
-    <p:sldId id="257" r:id="rId4"/>
-    <p:sldId id="258" r:id="rId5"/>
-    <p:sldId id="260" r:id="rId6"/>
-    <p:sldId id="261" r:id="rId7"/>
-    <p:sldId id="262" r:id="rId8"/>
-    <p:sldId id="263" r:id="rId9"/>
-    <p:sldId id="264" r:id="rId10"/>
-    <p:sldId id="265" r:id="rId11"/>
-    <p:sldId id="266" r:id="rId12"/>
+    <p:sldId id="267" r:id="rId3"/>
+    <p:sldId id="268" r:id="rId4"/>
+    <p:sldId id="269" r:id="rId5"/>
+    <p:sldId id="270" r:id="rId6"/>
+    <p:sldId id="271" r:id="rId7"/>
+    <p:sldId id="259" r:id="rId8"/>
+    <p:sldId id="257" r:id="rId9"/>
+    <p:sldId id="258" r:id="rId10"/>
+    <p:sldId id="260" r:id="rId11"/>
+    <p:sldId id="261" r:id="rId12"/>
+    <p:sldId id="262" r:id="rId13"/>
+    <p:sldId id="263" r:id="rId14"/>
+    <p:sldId id="264" r:id="rId15"/>
+    <p:sldId id="265" r:id="rId16"/>
+    <p:sldId id="266" r:id="rId17"/>
   </p:sldIdLst>
   <p:sldSz cx="9144000" cy="6858000" type="screen4x3"/>
   <p:notesSz cx="6858000" cy="9144000"/>
@@ -2875,7 +2880,7 @@
             <a:fld id="{0A98AF03-7270-45C2-A683-C5E353EF01A5}" type="datetime4">
               <a:rPr lang="en-US" smtClean="0"/>
               <a:pPr/>
-              <a:t>April 6, 2012</a:t>
+              <a:t>April 22, 2012</a:t>
             </a:fld>
             <a:endParaRPr lang="en-US" dirty="0"/>
           </a:p>
@@ -3162,7 +3167,7 @@
             <a:fld id="{A2FB5AFD-D735-4504-A039-ADEBB6448D55}" type="datetime4">
               <a:rPr lang="en-US" smtClean="0"/>
               <a:pPr/>
-              <a:t>April 6, 2012</a:t>
+              <a:t>April 22, 2012</a:t>
             </a:fld>
             <a:endParaRPr lang="en-US" dirty="0"/>
           </a:p>
@@ -3339,7 +3344,7 @@
             <a:fld id="{AB5C8118-FB93-4E87-B380-0175F2FE2167}" type="datetime4">
               <a:rPr lang="en-US" smtClean="0"/>
               <a:pPr/>
-              <a:t>April 6, 2012</a:t>
+              <a:t>April 22, 2012</a:t>
             </a:fld>
             <a:endParaRPr lang="en-US" dirty="0"/>
           </a:p>
@@ -3506,7 +3511,7 @@
             <a:fld id="{05A93482-8E69-40F7-BCAD-5662A6CADB27}" type="datetime4">
               <a:rPr lang="en-US" smtClean="0"/>
               <a:pPr/>
-              <a:t>April 6, 2012</a:t>
+              <a:t>April 22, 2012</a:t>
             </a:fld>
             <a:endParaRPr lang="en-US" dirty="0"/>
           </a:p>
@@ -3749,7 +3754,7 @@
             <a:fld id="{FBB7EAE1-CAAC-4AEF-919E-158692B1E55E}" type="datetime4">
               <a:rPr lang="en-US" smtClean="0"/>
               <a:pPr/>
-              <a:t>April 6, 2012</a:t>
+              <a:t>April 22, 2012</a:t>
             </a:fld>
             <a:endParaRPr lang="en-US" dirty="0"/>
           </a:p>
@@ -3864,7 +3869,7 @@
             <a:fld id="{9525A706-D8F2-4D1A-855A-CADC92600C26}" type="datetime4">
               <a:rPr lang="en-US" smtClean="0"/>
               <a:pPr/>
-              <a:t>April 6, 2012</a:t>
+              <a:t>April 22, 2012</a:t>
             </a:fld>
             <a:endParaRPr lang="en-US" dirty="0"/>
           </a:p>
@@ -4405,7 +4410,7 @@
             <a:fld id="{99B4F123-1704-49AC-9D15-C4B1462B8014}" type="datetime4">
               <a:rPr lang="en-US" smtClean="0"/>
               <a:pPr/>
-              <a:t>April 6, 2012</a:t>
+              <a:t>April 22, 2012</a:t>
             </a:fld>
             <a:endParaRPr lang="en-US" dirty="0"/>
           </a:p>
@@ -4520,7 +4525,7 @@
             <a:fld id="{E3127EC2-47FB-48A1-8644-C8A81DDAA119}" type="datetime4">
               <a:rPr lang="en-US" smtClean="0"/>
               <a:pPr/>
-              <a:t>April 6, 2012</a:t>
+              <a:t>April 22, 2012</a:t>
             </a:fld>
             <a:endParaRPr lang="en-US" dirty="0"/>
           </a:p>
@@ -4612,7 +4617,7 @@
             <a:fld id="{AE3EC3ED-7435-49F9-84C8-03CCA2F8DEDB}" type="datetime4">
               <a:rPr lang="en-US" smtClean="0"/>
               <a:pPr/>
-              <a:t>April 6, 2012</a:t>
+              <a:t>April 22, 2012</a:t>
             </a:fld>
             <a:endParaRPr lang="en-US" dirty="0"/>
           </a:p>
@@ -7265,7 +7270,7 @@
             <a:fld id="{3FC49BF1-FCD3-4395-8FF6-0047AF66228E}" type="datetime4">
               <a:rPr lang="en-US" smtClean="0"/>
               <a:pPr/>
-              <a:t>April 6, 2012</a:t>
+              <a:t>April 22, 2012</a:t>
             </a:fld>
             <a:endParaRPr lang="en-US" dirty="0"/>
           </a:p>
@@ -10479,7 +10484,7 @@
             <a:fld id="{CA861222-2C8B-4501-BE87-6797EC025925}" type="datetime4">
               <a:rPr lang="en-US" smtClean="0"/>
               <a:pPr/>
-              <a:t>April 6, 2012</a:t>
+              <a:t>April 22, 2012</a:t>
             </a:fld>
             <a:endParaRPr lang="en-US" dirty="0"/>
           </a:p>
@@ -13303,7 +13308,7 @@
             <a:fld id="{16C01193-8287-4834-A286-6B880643E934}" type="datetime4">
               <a:rPr lang="en-US" smtClean="0"/>
               <a:pPr/>
-              <a:t>April 6, 2012</a:t>
+              <a:t>April 22, 2012</a:t>
             </a:fld>
             <a:endParaRPr lang="en-US" dirty="0"/>
           </a:p>
@@ -13898,7 +13903,7 @@
     </p:spTree>
     <p:extLst>
       <p:ext uri="{BB962C8B-B14F-4D97-AF65-F5344CB8AC3E}">
-        <p14:creationId xmlns:p14="http://schemas.microsoft.com/office/powerpoint/2010/main" val="1809248185"/>
+        <p14:creationId xmlns:p14="http://schemas.microsoft.com/office/powerpoint/2010/main" xmlns="" val="1809248185"/>
       </p:ext>
     </p:extLst>
   </p:cSld>
@@ -13944,225 +13949,28 @@
         </p:nvSpPr>
         <p:spPr>
           <a:xfrm>
-            <a:off x="1043490" y="641291"/>
-            <a:ext cx="7024744" cy="638582"/>
+            <a:off x="1043490" y="402565"/>
+            <a:ext cx="7024744" cy="1143000"/>
           </a:xfrm>
         </p:spPr>
         <p:txBody>
           <a:bodyPr>
-            <a:normAutofit fontScale="90000"/>
+            <a:normAutofit/>
           </a:bodyPr>
           <a:lstStyle/>
           <a:p>
             <a:r>
               <a:rPr lang="en-US" dirty="0" smtClean="0"/>
-              <a:t>System </a:t>
-            </a:r>
-            <a:r>
-              <a:rPr lang="en-US" dirty="0"/>
-              <a:t>M</a:t>
-            </a:r>
-            <a:r>
-              <a:rPr lang="en-US" dirty="0" smtClean="0"/>
-              <a:t>anual</a:t>
+              <a:t>STD</a:t>
             </a:r>
             <a:endParaRPr lang="en-US" dirty="0"/>
-          </a:p>
-        </p:txBody>
-      </p:sp>
-      <p:sp>
-        <p:nvSpPr>
-          <p:cNvPr id="3" name="Rectangle 2"/>
-          <p:cNvSpPr>
-            <a:spLocks noChangeArrowheads="1"/>
-          </p:cNvSpPr>
-          <p:nvPr/>
-        </p:nvSpPr>
-        <p:spPr bwMode="auto">
-          <a:xfrm>
-            <a:off x="0" y="0"/>
-            <a:ext cx="9144000" cy="0"/>
-          </a:xfrm>
-          <a:prstGeom prst="rect">
-            <a:avLst/>
-          </a:prstGeom>
-          <a:noFill/>
-          <a:ln>
-            <a:noFill/>
-          </a:ln>
-          <a:effectLst/>
-          <a:extLst>
-            <a:ext uri="{909E8E84-426E-40DD-AFC4-6F175D3DCCD1}">
-              <a14:hiddenFill xmlns:a14="http://schemas.microsoft.com/office/drawing/2010/main">
-                <a:solidFill>
-                  <a:schemeClr val="accent1"/>
-                </a:solidFill>
-              </a14:hiddenFill>
-            </a:ext>
-            <a:ext uri="{91240B29-F687-4F45-9708-019B960494DF}">
-              <a14:hiddenLine xmlns:a14="http://schemas.microsoft.com/office/drawing/2010/main" w="9525">
-                <a:solidFill>
-                  <a:schemeClr val="tx1"/>
-                </a:solidFill>
-                <a:miter lim="800000"/>
-                <a:headEnd/>
-                <a:tailEnd/>
-              </a14:hiddenLine>
-            </a:ext>
-            <a:ext uri="{AF507438-7753-43E0-B8FC-AC1667EBCBE1}">
-              <a14:hiddenEffects xmlns:a14="http://schemas.microsoft.com/office/drawing/2010/main">
-                <a:effectLst>
-                  <a:outerShdw dist="35921" dir="2700000" algn="ctr" rotWithShape="0">
-                    <a:schemeClr val="bg2"/>
-                  </a:outerShdw>
-                </a:effectLst>
-              </a14:hiddenEffects>
-            </a:ext>
-          </a:extLst>
-        </p:spPr>
-        <p:txBody>
-          <a:bodyPr vert="horz" wrap="none" lIns="91440" tIns="45720" rIns="91440" bIns="45720" numCol="1" anchor="ctr" anchorCtr="0" compatLnSpc="1">
-            <a:prstTxWarp prst="textNoShape">
-              <a:avLst/>
-            </a:prstTxWarp>
-            <a:spAutoFit/>
-          </a:bodyPr>
-          <a:lstStyle/>
-          <a:p>
-            <a:endParaRPr lang="en-US"/>
-          </a:p>
-        </p:txBody>
-      </p:sp>
-      <p:sp>
-        <p:nvSpPr>
-          <p:cNvPr id="5" name="Rectangle 2"/>
-          <p:cNvSpPr>
-            <a:spLocks noChangeArrowheads="1"/>
-          </p:cNvSpPr>
-          <p:nvPr/>
-        </p:nvSpPr>
-        <p:spPr bwMode="auto">
-          <a:xfrm>
-            <a:off x="0" y="0"/>
-            <a:ext cx="9144000" cy="0"/>
-          </a:xfrm>
-          <a:prstGeom prst="rect">
-            <a:avLst/>
-          </a:prstGeom>
-          <a:noFill/>
-          <a:ln>
-            <a:noFill/>
-          </a:ln>
-          <a:effectLst/>
-          <a:extLst>
-            <a:ext uri="{909E8E84-426E-40DD-AFC4-6F175D3DCCD1}">
-              <a14:hiddenFill xmlns:a14="http://schemas.microsoft.com/office/drawing/2010/main">
-                <a:solidFill>
-                  <a:schemeClr val="accent1"/>
-                </a:solidFill>
-              </a14:hiddenFill>
-            </a:ext>
-            <a:ext uri="{91240B29-F687-4F45-9708-019B960494DF}">
-              <a14:hiddenLine xmlns:a14="http://schemas.microsoft.com/office/drawing/2010/main" w="9525">
-                <a:solidFill>
-                  <a:schemeClr val="tx1"/>
-                </a:solidFill>
-                <a:miter lim="800000"/>
-                <a:headEnd/>
-                <a:tailEnd/>
-              </a14:hiddenLine>
-            </a:ext>
-            <a:ext uri="{AF507438-7753-43E0-B8FC-AC1667EBCBE1}">
-              <a14:hiddenEffects xmlns:a14="http://schemas.microsoft.com/office/drawing/2010/main">
-                <a:effectLst>
-                  <a:outerShdw dist="35921" dir="2700000" algn="ctr" rotWithShape="0">
-                    <a:schemeClr val="bg2"/>
-                  </a:outerShdw>
-                </a:effectLst>
-              </a14:hiddenEffects>
-            </a:ext>
-          </a:extLst>
-        </p:spPr>
-        <p:txBody>
-          <a:bodyPr vert="horz" wrap="none" lIns="91440" tIns="45720" rIns="91440" bIns="45720" numCol="1" anchor="ctr" anchorCtr="0" compatLnSpc="1">
-            <a:prstTxWarp prst="textNoShape">
-              <a:avLst/>
-            </a:prstTxWarp>
-            <a:spAutoFit/>
-          </a:bodyPr>
-          <a:lstStyle/>
-          <a:p>
-            <a:endParaRPr lang="en-US"/>
-          </a:p>
-        </p:txBody>
-      </p:sp>
-      <p:sp>
-        <p:nvSpPr>
-          <p:cNvPr id="4" name="Rectangle 2"/>
-          <p:cNvSpPr>
-            <a:spLocks noChangeArrowheads="1"/>
-          </p:cNvSpPr>
-          <p:nvPr/>
-        </p:nvSpPr>
-        <p:spPr bwMode="auto">
-          <a:xfrm>
-            <a:off x="0" y="0"/>
-            <a:ext cx="9144000" cy="0"/>
-          </a:xfrm>
-          <a:prstGeom prst="rect">
-            <a:avLst/>
-          </a:prstGeom>
-          <a:noFill/>
-          <a:ln>
-            <a:noFill/>
-          </a:ln>
-          <a:effectLst/>
-          <a:extLst>
-            <a:ext uri="{909E8E84-426E-40DD-AFC4-6F175D3DCCD1}">
-              <a14:hiddenFill xmlns:a14="http://schemas.microsoft.com/office/drawing/2010/main">
-                <a:solidFill>
-                  <a:schemeClr val="accent1"/>
-                </a:solidFill>
-              </a14:hiddenFill>
-            </a:ext>
-            <a:ext uri="{91240B29-F687-4F45-9708-019B960494DF}">
-              <a14:hiddenLine xmlns:a14="http://schemas.microsoft.com/office/drawing/2010/main" w="9525">
-                <a:solidFill>
-                  <a:schemeClr val="tx1"/>
-                </a:solidFill>
-                <a:miter lim="800000"/>
-                <a:headEnd/>
-                <a:tailEnd/>
-              </a14:hiddenLine>
-            </a:ext>
-            <a:ext uri="{AF507438-7753-43E0-B8FC-AC1667EBCBE1}">
-              <a14:hiddenEffects xmlns:a14="http://schemas.microsoft.com/office/drawing/2010/main">
-                <a:effectLst>
-                  <a:outerShdw dist="35921" dir="2700000" algn="ctr" rotWithShape="0">
-                    <a:schemeClr val="bg2"/>
-                  </a:outerShdw>
-                </a:effectLst>
-              </a14:hiddenEffects>
-            </a:ext>
-          </a:extLst>
-        </p:spPr>
-        <p:txBody>
-          <a:bodyPr vert="horz" wrap="none" lIns="91440" tIns="45720" rIns="91440" bIns="45720" numCol="1" anchor="ctr" anchorCtr="0" compatLnSpc="1">
-            <a:prstTxWarp prst="textNoShape">
-              <a:avLst/>
-            </a:prstTxWarp>
-            <a:spAutoFit/>
-          </a:bodyPr>
-          <a:lstStyle/>
-          <a:p>
-            <a:endParaRPr lang="en-US"/>
           </a:p>
         </p:txBody>
       </p:sp>
     </p:spTree>
     <p:extLst>
       <p:ext uri="{BB962C8B-B14F-4D97-AF65-F5344CB8AC3E}">
-        <p14:creationId xmlns:p14="http://schemas.microsoft.com/office/powerpoint/2010/main" val="273623958"/>
+        <p14:creationId xmlns:p14="http://schemas.microsoft.com/office/powerpoint/2010/main" xmlns="" val="1459248129"/>
       </p:ext>
     </p:extLst>
   </p:cSld>
@@ -14208,22 +14016,21 @@
         </p:nvSpPr>
         <p:spPr>
           <a:xfrm>
-            <a:off x="840509" y="3079691"/>
-            <a:ext cx="7430925" cy="638582"/>
+            <a:off x="1043490" y="641291"/>
+            <a:ext cx="7024744" cy="638582"/>
           </a:xfrm>
         </p:spPr>
         <p:txBody>
           <a:bodyPr>
-            <a:noAutofit/>
+            <a:normAutofit fontScale="90000"/>
           </a:bodyPr>
           <a:lstStyle/>
           <a:p>
-            <a:pPr algn="ctr"/>
             <a:r>
-              <a:rPr lang="en-US" sz="7200" dirty="0" smtClean="0"/>
-              <a:t>Q &amp; A</a:t>
+              <a:rPr lang="en-US" dirty="0" smtClean="0"/>
+              <a:t>SRS</a:t>
             </a:r>
-            <a:endParaRPr lang="en-US" sz="7200" dirty="0"/>
+            <a:endParaRPr lang="en-US" dirty="0"/>
           </a:p>
         </p:txBody>
       </p:sp>
@@ -14250,14 +14057,14 @@
           <a:effectLst/>
           <a:extLst>
             <a:ext uri="{909E8E84-426E-40DD-AFC4-6F175D3DCCD1}">
-              <a14:hiddenFill xmlns:a14="http://schemas.microsoft.com/office/drawing/2010/main">
+              <a14:hiddenFill xmlns:a14="http://schemas.microsoft.com/office/drawing/2010/main" xmlns="">
                 <a:solidFill>
                   <a:schemeClr val="accent1"/>
                 </a:solidFill>
               </a14:hiddenFill>
             </a:ext>
             <a:ext uri="{91240B29-F687-4F45-9708-019B960494DF}">
-              <a14:hiddenLine xmlns:a14="http://schemas.microsoft.com/office/drawing/2010/main" w="9525">
+              <a14:hiddenLine xmlns:a14="http://schemas.microsoft.com/office/drawing/2010/main" xmlns="" w="9525">
                 <a:solidFill>
                   <a:schemeClr val="tx1"/>
                 </a:solidFill>
@@ -14267,7 +14074,137 @@
               </a14:hiddenLine>
             </a:ext>
             <a:ext uri="{AF507438-7753-43E0-B8FC-AC1667EBCBE1}">
-              <a14:hiddenEffects xmlns:a14="http://schemas.microsoft.com/office/drawing/2010/main">
+              <a14:hiddenEffects xmlns:a14="http://schemas.microsoft.com/office/drawing/2010/main" xmlns="">
+                <a:effectLst>
+                  <a:outerShdw dist="35921" dir="2700000" algn="ctr" rotWithShape="0">
+                    <a:schemeClr val="bg2"/>
+                  </a:outerShdw>
+                </a:effectLst>
+              </a14:hiddenEffects>
+            </a:ext>
+          </a:extLst>
+        </p:spPr>
+        <p:txBody>
+          <a:bodyPr vert="horz" wrap="none" lIns="91440" tIns="45720" rIns="91440" bIns="45720" numCol="1" anchor="ctr" anchorCtr="0" compatLnSpc="1">
+            <a:prstTxWarp prst="textNoShape">
+              <a:avLst/>
+            </a:prstTxWarp>
+            <a:spAutoFit/>
+          </a:bodyPr>
+          <a:lstStyle/>
+          <a:p>
+            <a:endParaRPr lang="en-US"/>
+          </a:p>
+        </p:txBody>
+      </p:sp>
+    </p:spTree>
+    <p:extLst>
+      <p:ext uri="{BB962C8B-B14F-4D97-AF65-F5344CB8AC3E}">
+        <p14:creationId xmlns:p14="http://schemas.microsoft.com/office/powerpoint/2010/main" xmlns="" val="224431329"/>
+      </p:ext>
+    </p:extLst>
+  </p:cSld>
+  <p:clrMapOvr>
+    <a:masterClrMapping/>
+  </p:clrMapOvr>
+  <p:timing>
+    <p:tnLst>
+      <p:par>
+        <p:cTn id="1" dur="indefinite" restart="never" nodeType="tmRoot"/>
+      </p:par>
+    </p:tnLst>
+  </p:timing>
+</p:sld>
+</file>
+
+<file path=ppt/slides/slide12.xml><?xml version="1.0" encoding="utf-8"?>
+<p:sld xmlns:a="http://schemas.openxmlformats.org/drawingml/2006/main" xmlns:r="http://schemas.openxmlformats.org/officeDocument/2006/relationships" xmlns:p="http://schemas.openxmlformats.org/presentationml/2006/main">
+  <p:cSld>
+    <p:spTree>
+      <p:nvGrpSpPr>
+        <p:cNvPr id="1" name=""/>
+        <p:cNvGrpSpPr/>
+        <p:nvPr/>
+      </p:nvGrpSpPr>
+      <p:grpSpPr>
+        <a:xfrm>
+          <a:off x="0" y="0"/>
+          <a:ext cx="0" cy="0"/>
+          <a:chOff x="0" y="0"/>
+          <a:chExt cx="0" cy="0"/>
+        </a:xfrm>
+      </p:grpSpPr>
+      <p:sp>
+        <p:nvSpPr>
+          <p:cNvPr id="2" name="Title 1"/>
+          <p:cNvSpPr>
+            <a:spLocks noGrp="1"/>
+          </p:cNvSpPr>
+          <p:nvPr>
+            <p:ph type="title"/>
+          </p:nvPr>
+        </p:nvSpPr>
+        <p:spPr>
+          <a:xfrm>
+            <a:off x="1043490" y="641291"/>
+            <a:ext cx="7024744" cy="638582"/>
+          </a:xfrm>
+        </p:spPr>
+        <p:txBody>
+          <a:bodyPr>
+            <a:normAutofit fontScale="90000"/>
+          </a:bodyPr>
+          <a:lstStyle/>
+          <a:p>
+            <a:r>
+              <a:rPr lang="en-US" dirty="0" smtClean="0"/>
+              <a:t>SDD</a:t>
+            </a:r>
+            <a:endParaRPr lang="en-US" dirty="0"/>
+          </a:p>
+        </p:txBody>
+      </p:sp>
+      <p:sp>
+        <p:nvSpPr>
+          <p:cNvPr id="3" name="Rectangle 2"/>
+          <p:cNvSpPr>
+            <a:spLocks noChangeArrowheads="1"/>
+          </p:cNvSpPr>
+          <p:nvPr/>
+        </p:nvSpPr>
+        <p:spPr bwMode="auto">
+          <a:xfrm>
+            <a:off x="0" y="0"/>
+            <a:ext cx="9144000" cy="0"/>
+          </a:xfrm>
+          <a:prstGeom prst="rect">
+            <a:avLst/>
+          </a:prstGeom>
+          <a:noFill/>
+          <a:ln>
+            <a:noFill/>
+          </a:ln>
+          <a:effectLst/>
+          <a:extLst>
+            <a:ext uri="{909E8E84-426E-40DD-AFC4-6F175D3DCCD1}">
+              <a14:hiddenFill xmlns:a14="http://schemas.microsoft.com/office/drawing/2010/main" xmlns="">
+                <a:solidFill>
+                  <a:schemeClr val="accent1"/>
+                </a:solidFill>
+              </a14:hiddenFill>
+            </a:ext>
+            <a:ext uri="{91240B29-F687-4F45-9708-019B960494DF}">
+              <a14:hiddenLine xmlns:a14="http://schemas.microsoft.com/office/drawing/2010/main" xmlns="" w="9525">
+                <a:solidFill>
+                  <a:schemeClr val="tx1"/>
+                </a:solidFill>
+                <a:miter lim="800000"/>
+                <a:headEnd/>
+                <a:tailEnd/>
+              </a14:hiddenLine>
+            </a:ext>
+            <a:ext uri="{AF507438-7753-43E0-B8FC-AC1667EBCBE1}">
+              <a14:hiddenEffects xmlns:a14="http://schemas.microsoft.com/office/drawing/2010/main" xmlns="">
                 <a:effectLst>
                   <a:outerShdw dist="35921" dir="2700000" algn="ctr" rotWithShape="0">
                     <a:schemeClr val="bg2"/>
@@ -14313,14 +14250,14 @@
           <a:effectLst/>
           <a:extLst>
             <a:ext uri="{909E8E84-426E-40DD-AFC4-6F175D3DCCD1}">
-              <a14:hiddenFill xmlns:a14="http://schemas.microsoft.com/office/drawing/2010/main">
+              <a14:hiddenFill xmlns:a14="http://schemas.microsoft.com/office/drawing/2010/main" xmlns="">
                 <a:solidFill>
                   <a:schemeClr val="accent1"/>
                 </a:solidFill>
               </a14:hiddenFill>
             </a:ext>
             <a:ext uri="{91240B29-F687-4F45-9708-019B960494DF}">
-              <a14:hiddenLine xmlns:a14="http://schemas.microsoft.com/office/drawing/2010/main" w="9525">
+              <a14:hiddenLine xmlns:a14="http://schemas.microsoft.com/office/drawing/2010/main" xmlns="" w="9525">
                 <a:solidFill>
                   <a:schemeClr val="tx1"/>
                 </a:solidFill>
@@ -14330,7 +14267,393 @@
               </a14:hiddenLine>
             </a:ext>
             <a:ext uri="{AF507438-7753-43E0-B8FC-AC1667EBCBE1}">
-              <a14:hiddenEffects xmlns:a14="http://schemas.microsoft.com/office/drawing/2010/main">
+              <a14:hiddenEffects xmlns:a14="http://schemas.microsoft.com/office/drawing/2010/main" xmlns="">
+                <a:effectLst>
+                  <a:outerShdw dist="35921" dir="2700000" algn="ctr" rotWithShape="0">
+                    <a:schemeClr val="bg2"/>
+                  </a:outerShdw>
+                </a:effectLst>
+              </a14:hiddenEffects>
+            </a:ext>
+          </a:extLst>
+        </p:spPr>
+        <p:txBody>
+          <a:bodyPr vert="horz" wrap="none" lIns="91440" tIns="45720" rIns="91440" bIns="45720" numCol="1" anchor="ctr" anchorCtr="0" compatLnSpc="1">
+            <a:prstTxWarp prst="textNoShape">
+              <a:avLst/>
+            </a:prstTxWarp>
+            <a:spAutoFit/>
+          </a:bodyPr>
+          <a:lstStyle/>
+          <a:p>
+            <a:endParaRPr lang="en-US"/>
+          </a:p>
+        </p:txBody>
+      </p:sp>
+    </p:spTree>
+    <p:extLst>
+      <p:ext uri="{BB962C8B-B14F-4D97-AF65-F5344CB8AC3E}">
+        <p14:creationId xmlns:p14="http://schemas.microsoft.com/office/powerpoint/2010/main" xmlns="" val="2798939284"/>
+      </p:ext>
+    </p:extLst>
+  </p:cSld>
+  <p:clrMapOvr>
+    <a:masterClrMapping/>
+  </p:clrMapOvr>
+  <p:timing>
+    <p:tnLst>
+      <p:par>
+        <p:cTn id="1" dur="indefinite" restart="never" nodeType="tmRoot"/>
+      </p:par>
+    </p:tnLst>
+  </p:timing>
+</p:sld>
+</file>
+
+<file path=ppt/slides/slide13.xml><?xml version="1.0" encoding="utf-8"?>
+<p:sld xmlns:a="http://schemas.openxmlformats.org/drawingml/2006/main" xmlns:r="http://schemas.openxmlformats.org/officeDocument/2006/relationships" xmlns:p="http://schemas.openxmlformats.org/presentationml/2006/main">
+  <p:cSld>
+    <p:spTree>
+      <p:nvGrpSpPr>
+        <p:cNvPr id="1" name=""/>
+        <p:cNvGrpSpPr/>
+        <p:nvPr/>
+      </p:nvGrpSpPr>
+      <p:grpSpPr>
+        <a:xfrm>
+          <a:off x="0" y="0"/>
+          <a:ext cx="0" cy="0"/>
+          <a:chOff x="0" y="0"/>
+          <a:chExt cx="0" cy="0"/>
+        </a:xfrm>
+      </p:grpSpPr>
+      <p:sp>
+        <p:nvSpPr>
+          <p:cNvPr id="2" name="Title 1"/>
+          <p:cNvSpPr>
+            <a:spLocks noGrp="1"/>
+          </p:cNvSpPr>
+          <p:nvPr>
+            <p:ph type="title"/>
+          </p:nvPr>
+        </p:nvSpPr>
+        <p:spPr>
+          <a:xfrm>
+            <a:off x="1043490" y="641291"/>
+            <a:ext cx="7024744" cy="638582"/>
+          </a:xfrm>
+        </p:spPr>
+        <p:txBody>
+          <a:bodyPr>
+            <a:normAutofit fontScale="90000"/>
+          </a:bodyPr>
+          <a:lstStyle/>
+          <a:p>
+            <a:r>
+              <a:rPr lang="en-US" dirty="0" smtClean="0"/>
+              <a:t>SPMP</a:t>
+            </a:r>
+            <a:endParaRPr lang="en-US" dirty="0"/>
+          </a:p>
+        </p:txBody>
+      </p:sp>
+      <p:sp>
+        <p:nvSpPr>
+          <p:cNvPr id="3" name="Rectangle 2"/>
+          <p:cNvSpPr>
+            <a:spLocks noChangeArrowheads="1"/>
+          </p:cNvSpPr>
+          <p:nvPr/>
+        </p:nvSpPr>
+        <p:spPr bwMode="auto">
+          <a:xfrm>
+            <a:off x="0" y="0"/>
+            <a:ext cx="9144000" cy="0"/>
+          </a:xfrm>
+          <a:prstGeom prst="rect">
+            <a:avLst/>
+          </a:prstGeom>
+          <a:noFill/>
+          <a:ln>
+            <a:noFill/>
+          </a:ln>
+          <a:effectLst/>
+          <a:extLst>
+            <a:ext uri="{909E8E84-426E-40DD-AFC4-6F175D3DCCD1}">
+              <a14:hiddenFill xmlns:a14="http://schemas.microsoft.com/office/drawing/2010/main" xmlns="">
+                <a:solidFill>
+                  <a:schemeClr val="accent1"/>
+                </a:solidFill>
+              </a14:hiddenFill>
+            </a:ext>
+            <a:ext uri="{91240B29-F687-4F45-9708-019B960494DF}">
+              <a14:hiddenLine xmlns:a14="http://schemas.microsoft.com/office/drawing/2010/main" xmlns="" w="9525">
+                <a:solidFill>
+                  <a:schemeClr val="tx1"/>
+                </a:solidFill>
+                <a:miter lim="800000"/>
+                <a:headEnd/>
+                <a:tailEnd/>
+              </a14:hiddenLine>
+            </a:ext>
+            <a:ext uri="{AF507438-7753-43E0-B8FC-AC1667EBCBE1}">
+              <a14:hiddenEffects xmlns:a14="http://schemas.microsoft.com/office/drawing/2010/main" xmlns="">
+                <a:effectLst>
+                  <a:outerShdw dist="35921" dir="2700000" algn="ctr" rotWithShape="0">
+                    <a:schemeClr val="bg2"/>
+                  </a:outerShdw>
+                </a:effectLst>
+              </a14:hiddenEffects>
+            </a:ext>
+          </a:extLst>
+        </p:spPr>
+        <p:txBody>
+          <a:bodyPr vert="horz" wrap="none" lIns="91440" tIns="45720" rIns="91440" bIns="45720" numCol="1" anchor="ctr" anchorCtr="0" compatLnSpc="1">
+            <a:prstTxWarp prst="textNoShape">
+              <a:avLst/>
+            </a:prstTxWarp>
+            <a:spAutoFit/>
+          </a:bodyPr>
+          <a:lstStyle/>
+          <a:p>
+            <a:endParaRPr lang="en-US"/>
+          </a:p>
+        </p:txBody>
+      </p:sp>
+      <p:sp>
+        <p:nvSpPr>
+          <p:cNvPr id="5" name="Rectangle 2"/>
+          <p:cNvSpPr>
+            <a:spLocks noChangeArrowheads="1"/>
+          </p:cNvSpPr>
+          <p:nvPr/>
+        </p:nvSpPr>
+        <p:spPr bwMode="auto">
+          <a:xfrm>
+            <a:off x="0" y="0"/>
+            <a:ext cx="9144000" cy="0"/>
+          </a:xfrm>
+          <a:prstGeom prst="rect">
+            <a:avLst/>
+          </a:prstGeom>
+          <a:noFill/>
+          <a:ln>
+            <a:noFill/>
+          </a:ln>
+          <a:effectLst/>
+          <a:extLst>
+            <a:ext uri="{909E8E84-426E-40DD-AFC4-6F175D3DCCD1}">
+              <a14:hiddenFill xmlns:a14="http://schemas.microsoft.com/office/drawing/2010/main" xmlns="">
+                <a:solidFill>
+                  <a:schemeClr val="accent1"/>
+                </a:solidFill>
+              </a14:hiddenFill>
+            </a:ext>
+            <a:ext uri="{91240B29-F687-4F45-9708-019B960494DF}">
+              <a14:hiddenLine xmlns:a14="http://schemas.microsoft.com/office/drawing/2010/main" xmlns="" w="9525">
+                <a:solidFill>
+                  <a:schemeClr val="tx1"/>
+                </a:solidFill>
+                <a:miter lim="800000"/>
+                <a:headEnd/>
+                <a:tailEnd/>
+              </a14:hiddenLine>
+            </a:ext>
+            <a:ext uri="{AF507438-7753-43E0-B8FC-AC1667EBCBE1}">
+              <a14:hiddenEffects xmlns:a14="http://schemas.microsoft.com/office/drawing/2010/main" xmlns="">
+                <a:effectLst>
+                  <a:outerShdw dist="35921" dir="2700000" algn="ctr" rotWithShape="0">
+                    <a:schemeClr val="bg2"/>
+                  </a:outerShdw>
+                </a:effectLst>
+              </a14:hiddenEffects>
+            </a:ext>
+          </a:extLst>
+        </p:spPr>
+        <p:txBody>
+          <a:bodyPr vert="horz" wrap="none" lIns="91440" tIns="45720" rIns="91440" bIns="45720" numCol="1" anchor="ctr" anchorCtr="0" compatLnSpc="1">
+            <a:prstTxWarp prst="textNoShape">
+              <a:avLst/>
+            </a:prstTxWarp>
+            <a:spAutoFit/>
+          </a:bodyPr>
+          <a:lstStyle/>
+          <a:p>
+            <a:endParaRPr lang="en-US"/>
+          </a:p>
+        </p:txBody>
+      </p:sp>
+    </p:spTree>
+    <p:extLst>
+      <p:ext uri="{BB962C8B-B14F-4D97-AF65-F5344CB8AC3E}">
+        <p14:creationId xmlns:p14="http://schemas.microsoft.com/office/powerpoint/2010/main" xmlns="" val="792481554"/>
+      </p:ext>
+    </p:extLst>
+  </p:cSld>
+  <p:clrMapOvr>
+    <a:masterClrMapping/>
+  </p:clrMapOvr>
+  <p:timing>
+    <p:tnLst>
+      <p:par>
+        <p:cTn id="1" dur="indefinite" restart="never" nodeType="tmRoot"/>
+      </p:par>
+    </p:tnLst>
+  </p:timing>
+</p:sld>
+</file>
+
+<file path=ppt/slides/slide14.xml><?xml version="1.0" encoding="utf-8"?>
+<p:sld xmlns:a="http://schemas.openxmlformats.org/drawingml/2006/main" xmlns:r="http://schemas.openxmlformats.org/officeDocument/2006/relationships" xmlns:p="http://schemas.openxmlformats.org/presentationml/2006/main">
+  <p:cSld>
+    <p:spTree>
+      <p:nvGrpSpPr>
+        <p:cNvPr id="1" name=""/>
+        <p:cNvGrpSpPr/>
+        <p:nvPr/>
+      </p:nvGrpSpPr>
+      <p:grpSpPr>
+        <a:xfrm>
+          <a:off x="0" y="0"/>
+          <a:ext cx="0" cy="0"/>
+          <a:chOff x="0" y="0"/>
+          <a:chExt cx="0" cy="0"/>
+        </a:xfrm>
+      </p:grpSpPr>
+      <p:sp>
+        <p:nvSpPr>
+          <p:cNvPr id="2" name="Title 1"/>
+          <p:cNvSpPr>
+            <a:spLocks noGrp="1"/>
+          </p:cNvSpPr>
+          <p:nvPr>
+            <p:ph type="title"/>
+          </p:nvPr>
+        </p:nvSpPr>
+        <p:spPr>
+          <a:xfrm>
+            <a:off x="1043490" y="641291"/>
+            <a:ext cx="7024744" cy="638582"/>
+          </a:xfrm>
+        </p:spPr>
+        <p:txBody>
+          <a:bodyPr>
+            <a:normAutofit fontScale="90000"/>
+          </a:bodyPr>
+          <a:lstStyle/>
+          <a:p>
+            <a:r>
+              <a:rPr lang="en-US" dirty="0" smtClean="0"/>
+              <a:t>User Manual</a:t>
+            </a:r>
+            <a:endParaRPr lang="en-US" dirty="0"/>
+          </a:p>
+        </p:txBody>
+      </p:sp>
+      <p:sp>
+        <p:nvSpPr>
+          <p:cNvPr id="3" name="Rectangle 2"/>
+          <p:cNvSpPr>
+            <a:spLocks noChangeArrowheads="1"/>
+          </p:cNvSpPr>
+          <p:nvPr/>
+        </p:nvSpPr>
+        <p:spPr bwMode="auto">
+          <a:xfrm>
+            <a:off x="0" y="0"/>
+            <a:ext cx="9144000" cy="0"/>
+          </a:xfrm>
+          <a:prstGeom prst="rect">
+            <a:avLst/>
+          </a:prstGeom>
+          <a:noFill/>
+          <a:ln>
+            <a:noFill/>
+          </a:ln>
+          <a:effectLst/>
+          <a:extLst>
+            <a:ext uri="{909E8E84-426E-40DD-AFC4-6F175D3DCCD1}">
+              <a14:hiddenFill xmlns:a14="http://schemas.microsoft.com/office/drawing/2010/main" xmlns="">
+                <a:solidFill>
+                  <a:schemeClr val="accent1"/>
+                </a:solidFill>
+              </a14:hiddenFill>
+            </a:ext>
+            <a:ext uri="{91240B29-F687-4F45-9708-019B960494DF}">
+              <a14:hiddenLine xmlns:a14="http://schemas.microsoft.com/office/drawing/2010/main" xmlns="" w="9525">
+                <a:solidFill>
+                  <a:schemeClr val="tx1"/>
+                </a:solidFill>
+                <a:miter lim="800000"/>
+                <a:headEnd/>
+                <a:tailEnd/>
+              </a14:hiddenLine>
+            </a:ext>
+            <a:ext uri="{AF507438-7753-43E0-B8FC-AC1667EBCBE1}">
+              <a14:hiddenEffects xmlns:a14="http://schemas.microsoft.com/office/drawing/2010/main" xmlns="">
+                <a:effectLst>
+                  <a:outerShdw dist="35921" dir="2700000" algn="ctr" rotWithShape="0">
+                    <a:schemeClr val="bg2"/>
+                  </a:outerShdw>
+                </a:effectLst>
+              </a14:hiddenEffects>
+            </a:ext>
+          </a:extLst>
+        </p:spPr>
+        <p:txBody>
+          <a:bodyPr vert="horz" wrap="none" lIns="91440" tIns="45720" rIns="91440" bIns="45720" numCol="1" anchor="ctr" anchorCtr="0" compatLnSpc="1">
+            <a:prstTxWarp prst="textNoShape">
+              <a:avLst/>
+            </a:prstTxWarp>
+            <a:spAutoFit/>
+          </a:bodyPr>
+          <a:lstStyle/>
+          <a:p>
+            <a:endParaRPr lang="en-US"/>
+          </a:p>
+        </p:txBody>
+      </p:sp>
+      <p:sp>
+        <p:nvSpPr>
+          <p:cNvPr id="5" name="Rectangle 2"/>
+          <p:cNvSpPr>
+            <a:spLocks noChangeArrowheads="1"/>
+          </p:cNvSpPr>
+          <p:nvPr/>
+        </p:nvSpPr>
+        <p:spPr bwMode="auto">
+          <a:xfrm>
+            <a:off x="0" y="0"/>
+            <a:ext cx="9144000" cy="0"/>
+          </a:xfrm>
+          <a:prstGeom prst="rect">
+            <a:avLst/>
+          </a:prstGeom>
+          <a:noFill/>
+          <a:ln>
+            <a:noFill/>
+          </a:ln>
+          <a:effectLst/>
+          <a:extLst>
+            <a:ext uri="{909E8E84-426E-40DD-AFC4-6F175D3DCCD1}">
+              <a14:hiddenFill xmlns:a14="http://schemas.microsoft.com/office/drawing/2010/main" xmlns="">
+                <a:solidFill>
+                  <a:schemeClr val="accent1"/>
+                </a:solidFill>
+              </a14:hiddenFill>
+            </a:ext>
+            <a:ext uri="{91240B29-F687-4F45-9708-019B960494DF}">
+              <a14:hiddenLine xmlns:a14="http://schemas.microsoft.com/office/drawing/2010/main" xmlns="" w="9525">
+                <a:solidFill>
+                  <a:schemeClr val="tx1"/>
+                </a:solidFill>
+                <a:miter lim="800000"/>
+                <a:headEnd/>
+                <a:tailEnd/>
+              </a14:hiddenLine>
+            </a:ext>
+            <a:ext uri="{AF507438-7753-43E0-B8FC-AC1667EBCBE1}">
+              <a14:hiddenEffects xmlns:a14="http://schemas.microsoft.com/office/drawing/2010/main" xmlns="">
                 <a:effectLst>
                   <a:outerShdw dist="35921" dir="2700000" algn="ctr" rotWithShape="0">
                     <a:schemeClr val="bg2"/>
@@ -14376,14 +14699,14 @@
           <a:effectLst/>
           <a:extLst>
             <a:ext uri="{909E8E84-426E-40DD-AFC4-6F175D3DCCD1}">
-              <a14:hiddenFill xmlns:a14="http://schemas.microsoft.com/office/drawing/2010/main">
+              <a14:hiddenFill xmlns:a14="http://schemas.microsoft.com/office/drawing/2010/main" xmlns="">
                 <a:solidFill>
                   <a:schemeClr val="accent1"/>
                 </a:solidFill>
               </a14:hiddenFill>
             </a:ext>
             <a:ext uri="{91240B29-F687-4F45-9708-019B960494DF}">
-              <a14:hiddenLine xmlns:a14="http://schemas.microsoft.com/office/drawing/2010/main" w="9525">
+              <a14:hiddenLine xmlns:a14="http://schemas.microsoft.com/office/drawing/2010/main" xmlns="" w="9525">
                 <a:solidFill>
                   <a:schemeClr val="tx1"/>
                 </a:solidFill>
@@ -14393,7 +14716,7 @@
               </a14:hiddenLine>
             </a:ext>
             <a:ext uri="{AF507438-7753-43E0-B8FC-AC1667EBCBE1}">
-              <a14:hiddenEffects xmlns:a14="http://schemas.microsoft.com/office/drawing/2010/main">
+              <a14:hiddenEffects xmlns:a14="http://schemas.microsoft.com/office/drawing/2010/main" xmlns="">
                 <a:effectLst>
                   <a:outerShdw dist="35921" dir="2700000" algn="ctr" rotWithShape="0">
                     <a:schemeClr val="bg2"/>
@@ -14419,7 +14742,528 @@
     </p:spTree>
     <p:extLst>
       <p:ext uri="{BB962C8B-B14F-4D97-AF65-F5344CB8AC3E}">
-        <p14:creationId xmlns:p14="http://schemas.microsoft.com/office/powerpoint/2010/main" val="336984967"/>
+        <p14:creationId xmlns:p14="http://schemas.microsoft.com/office/powerpoint/2010/main" xmlns="" val="2227559208"/>
+      </p:ext>
+    </p:extLst>
+  </p:cSld>
+  <p:clrMapOvr>
+    <a:masterClrMapping/>
+  </p:clrMapOvr>
+  <p:timing>
+    <p:tnLst>
+      <p:par>
+        <p:cTn id="1" dur="indefinite" restart="never" nodeType="tmRoot"/>
+      </p:par>
+    </p:tnLst>
+  </p:timing>
+</p:sld>
+</file>
+
+<file path=ppt/slides/slide15.xml><?xml version="1.0" encoding="utf-8"?>
+<p:sld xmlns:a="http://schemas.openxmlformats.org/drawingml/2006/main" xmlns:r="http://schemas.openxmlformats.org/officeDocument/2006/relationships" xmlns:p="http://schemas.openxmlformats.org/presentationml/2006/main">
+  <p:cSld>
+    <p:spTree>
+      <p:nvGrpSpPr>
+        <p:cNvPr id="1" name=""/>
+        <p:cNvGrpSpPr/>
+        <p:nvPr/>
+      </p:nvGrpSpPr>
+      <p:grpSpPr>
+        <a:xfrm>
+          <a:off x="0" y="0"/>
+          <a:ext cx="0" cy="0"/>
+          <a:chOff x="0" y="0"/>
+          <a:chExt cx="0" cy="0"/>
+        </a:xfrm>
+      </p:grpSpPr>
+      <p:sp>
+        <p:nvSpPr>
+          <p:cNvPr id="2" name="Title 1"/>
+          <p:cNvSpPr>
+            <a:spLocks noGrp="1"/>
+          </p:cNvSpPr>
+          <p:nvPr>
+            <p:ph type="title"/>
+          </p:nvPr>
+        </p:nvSpPr>
+        <p:spPr>
+          <a:xfrm>
+            <a:off x="1043490" y="641291"/>
+            <a:ext cx="7024744" cy="638582"/>
+          </a:xfrm>
+        </p:spPr>
+        <p:txBody>
+          <a:bodyPr>
+            <a:normAutofit fontScale="90000"/>
+          </a:bodyPr>
+          <a:lstStyle/>
+          <a:p>
+            <a:r>
+              <a:rPr lang="en-US" dirty="0" smtClean="0"/>
+              <a:t>System </a:t>
+            </a:r>
+            <a:r>
+              <a:rPr lang="en-US" dirty="0"/>
+              <a:t>M</a:t>
+            </a:r>
+            <a:r>
+              <a:rPr lang="en-US" dirty="0" smtClean="0"/>
+              <a:t>anual</a:t>
+            </a:r>
+            <a:endParaRPr lang="en-US" dirty="0"/>
+          </a:p>
+        </p:txBody>
+      </p:sp>
+      <p:sp>
+        <p:nvSpPr>
+          <p:cNvPr id="3" name="Rectangle 2"/>
+          <p:cNvSpPr>
+            <a:spLocks noChangeArrowheads="1"/>
+          </p:cNvSpPr>
+          <p:nvPr/>
+        </p:nvSpPr>
+        <p:spPr bwMode="auto">
+          <a:xfrm>
+            <a:off x="0" y="0"/>
+            <a:ext cx="9144000" cy="0"/>
+          </a:xfrm>
+          <a:prstGeom prst="rect">
+            <a:avLst/>
+          </a:prstGeom>
+          <a:noFill/>
+          <a:ln>
+            <a:noFill/>
+          </a:ln>
+          <a:effectLst/>
+          <a:extLst>
+            <a:ext uri="{909E8E84-426E-40DD-AFC4-6F175D3DCCD1}">
+              <a14:hiddenFill xmlns:a14="http://schemas.microsoft.com/office/drawing/2010/main" xmlns="">
+                <a:solidFill>
+                  <a:schemeClr val="accent1"/>
+                </a:solidFill>
+              </a14:hiddenFill>
+            </a:ext>
+            <a:ext uri="{91240B29-F687-4F45-9708-019B960494DF}">
+              <a14:hiddenLine xmlns:a14="http://schemas.microsoft.com/office/drawing/2010/main" xmlns="" w="9525">
+                <a:solidFill>
+                  <a:schemeClr val="tx1"/>
+                </a:solidFill>
+                <a:miter lim="800000"/>
+                <a:headEnd/>
+                <a:tailEnd/>
+              </a14:hiddenLine>
+            </a:ext>
+            <a:ext uri="{AF507438-7753-43E0-B8FC-AC1667EBCBE1}">
+              <a14:hiddenEffects xmlns:a14="http://schemas.microsoft.com/office/drawing/2010/main" xmlns="">
+                <a:effectLst>
+                  <a:outerShdw dist="35921" dir="2700000" algn="ctr" rotWithShape="0">
+                    <a:schemeClr val="bg2"/>
+                  </a:outerShdw>
+                </a:effectLst>
+              </a14:hiddenEffects>
+            </a:ext>
+          </a:extLst>
+        </p:spPr>
+        <p:txBody>
+          <a:bodyPr vert="horz" wrap="none" lIns="91440" tIns="45720" rIns="91440" bIns="45720" numCol="1" anchor="ctr" anchorCtr="0" compatLnSpc="1">
+            <a:prstTxWarp prst="textNoShape">
+              <a:avLst/>
+            </a:prstTxWarp>
+            <a:spAutoFit/>
+          </a:bodyPr>
+          <a:lstStyle/>
+          <a:p>
+            <a:endParaRPr lang="en-US"/>
+          </a:p>
+        </p:txBody>
+      </p:sp>
+      <p:sp>
+        <p:nvSpPr>
+          <p:cNvPr id="5" name="Rectangle 2"/>
+          <p:cNvSpPr>
+            <a:spLocks noChangeArrowheads="1"/>
+          </p:cNvSpPr>
+          <p:nvPr/>
+        </p:nvSpPr>
+        <p:spPr bwMode="auto">
+          <a:xfrm>
+            <a:off x="0" y="0"/>
+            <a:ext cx="9144000" cy="0"/>
+          </a:xfrm>
+          <a:prstGeom prst="rect">
+            <a:avLst/>
+          </a:prstGeom>
+          <a:noFill/>
+          <a:ln>
+            <a:noFill/>
+          </a:ln>
+          <a:effectLst/>
+          <a:extLst>
+            <a:ext uri="{909E8E84-426E-40DD-AFC4-6F175D3DCCD1}">
+              <a14:hiddenFill xmlns:a14="http://schemas.microsoft.com/office/drawing/2010/main" xmlns="">
+                <a:solidFill>
+                  <a:schemeClr val="accent1"/>
+                </a:solidFill>
+              </a14:hiddenFill>
+            </a:ext>
+            <a:ext uri="{91240B29-F687-4F45-9708-019B960494DF}">
+              <a14:hiddenLine xmlns:a14="http://schemas.microsoft.com/office/drawing/2010/main" xmlns="" w="9525">
+                <a:solidFill>
+                  <a:schemeClr val="tx1"/>
+                </a:solidFill>
+                <a:miter lim="800000"/>
+                <a:headEnd/>
+                <a:tailEnd/>
+              </a14:hiddenLine>
+            </a:ext>
+            <a:ext uri="{AF507438-7753-43E0-B8FC-AC1667EBCBE1}">
+              <a14:hiddenEffects xmlns:a14="http://schemas.microsoft.com/office/drawing/2010/main" xmlns="">
+                <a:effectLst>
+                  <a:outerShdw dist="35921" dir="2700000" algn="ctr" rotWithShape="0">
+                    <a:schemeClr val="bg2"/>
+                  </a:outerShdw>
+                </a:effectLst>
+              </a14:hiddenEffects>
+            </a:ext>
+          </a:extLst>
+        </p:spPr>
+        <p:txBody>
+          <a:bodyPr vert="horz" wrap="none" lIns="91440" tIns="45720" rIns="91440" bIns="45720" numCol="1" anchor="ctr" anchorCtr="0" compatLnSpc="1">
+            <a:prstTxWarp prst="textNoShape">
+              <a:avLst/>
+            </a:prstTxWarp>
+            <a:spAutoFit/>
+          </a:bodyPr>
+          <a:lstStyle/>
+          <a:p>
+            <a:endParaRPr lang="en-US"/>
+          </a:p>
+        </p:txBody>
+      </p:sp>
+      <p:sp>
+        <p:nvSpPr>
+          <p:cNvPr id="4" name="Rectangle 2"/>
+          <p:cNvSpPr>
+            <a:spLocks noChangeArrowheads="1"/>
+          </p:cNvSpPr>
+          <p:nvPr/>
+        </p:nvSpPr>
+        <p:spPr bwMode="auto">
+          <a:xfrm>
+            <a:off x="0" y="0"/>
+            <a:ext cx="9144000" cy="0"/>
+          </a:xfrm>
+          <a:prstGeom prst="rect">
+            <a:avLst/>
+          </a:prstGeom>
+          <a:noFill/>
+          <a:ln>
+            <a:noFill/>
+          </a:ln>
+          <a:effectLst/>
+          <a:extLst>
+            <a:ext uri="{909E8E84-426E-40DD-AFC4-6F175D3DCCD1}">
+              <a14:hiddenFill xmlns:a14="http://schemas.microsoft.com/office/drawing/2010/main" xmlns="">
+                <a:solidFill>
+                  <a:schemeClr val="accent1"/>
+                </a:solidFill>
+              </a14:hiddenFill>
+            </a:ext>
+            <a:ext uri="{91240B29-F687-4F45-9708-019B960494DF}">
+              <a14:hiddenLine xmlns:a14="http://schemas.microsoft.com/office/drawing/2010/main" xmlns="" w="9525">
+                <a:solidFill>
+                  <a:schemeClr val="tx1"/>
+                </a:solidFill>
+                <a:miter lim="800000"/>
+                <a:headEnd/>
+                <a:tailEnd/>
+              </a14:hiddenLine>
+            </a:ext>
+            <a:ext uri="{AF507438-7753-43E0-B8FC-AC1667EBCBE1}">
+              <a14:hiddenEffects xmlns:a14="http://schemas.microsoft.com/office/drawing/2010/main" xmlns="">
+                <a:effectLst>
+                  <a:outerShdw dist="35921" dir="2700000" algn="ctr" rotWithShape="0">
+                    <a:schemeClr val="bg2"/>
+                  </a:outerShdw>
+                </a:effectLst>
+              </a14:hiddenEffects>
+            </a:ext>
+          </a:extLst>
+        </p:spPr>
+        <p:txBody>
+          <a:bodyPr vert="horz" wrap="none" lIns="91440" tIns="45720" rIns="91440" bIns="45720" numCol="1" anchor="ctr" anchorCtr="0" compatLnSpc="1">
+            <a:prstTxWarp prst="textNoShape">
+              <a:avLst/>
+            </a:prstTxWarp>
+            <a:spAutoFit/>
+          </a:bodyPr>
+          <a:lstStyle/>
+          <a:p>
+            <a:endParaRPr lang="en-US"/>
+          </a:p>
+        </p:txBody>
+      </p:sp>
+    </p:spTree>
+    <p:extLst>
+      <p:ext uri="{BB962C8B-B14F-4D97-AF65-F5344CB8AC3E}">
+        <p14:creationId xmlns:p14="http://schemas.microsoft.com/office/powerpoint/2010/main" xmlns="" val="273623958"/>
+      </p:ext>
+    </p:extLst>
+  </p:cSld>
+  <p:clrMapOvr>
+    <a:masterClrMapping/>
+  </p:clrMapOvr>
+  <p:timing>
+    <p:tnLst>
+      <p:par>
+        <p:cTn id="1" dur="indefinite" restart="never" nodeType="tmRoot"/>
+      </p:par>
+    </p:tnLst>
+  </p:timing>
+</p:sld>
+</file>
+
+<file path=ppt/slides/slide16.xml><?xml version="1.0" encoding="utf-8"?>
+<p:sld xmlns:a="http://schemas.openxmlformats.org/drawingml/2006/main" xmlns:r="http://schemas.openxmlformats.org/officeDocument/2006/relationships" xmlns:p="http://schemas.openxmlformats.org/presentationml/2006/main">
+  <p:cSld>
+    <p:spTree>
+      <p:nvGrpSpPr>
+        <p:cNvPr id="1" name=""/>
+        <p:cNvGrpSpPr/>
+        <p:nvPr/>
+      </p:nvGrpSpPr>
+      <p:grpSpPr>
+        <a:xfrm>
+          <a:off x="0" y="0"/>
+          <a:ext cx="0" cy="0"/>
+          <a:chOff x="0" y="0"/>
+          <a:chExt cx="0" cy="0"/>
+        </a:xfrm>
+      </p:grpSpPr>
+      <p:sp>
+        <p:nvSpPr>
+          <p:cNvPr id="2" name="Title 1"/>
+          <p:cNvSpPr>
+            <a:spLocks noGrp="1"/>
+          </p:cNvSpPr>
+          <p:nvPr>
+            <p:ph type="title"/>
+          </p:nvPr>
+        </p:nvSpPr>
+        <p:spPr>
+          <a:xfrm>
+            <a:off x="840509" y="3079691"/>
+            <a:ext cx="7430925" cy="638582"/>
+          </a:xfrm>
+        </p:spPr>
+        <p:txBody>
+          <a:bodyPr>
+            <a:noAutofit/>
+          </a:bodyPr>
+          <a:lstStyle/>
+          <a:p>
+            <a:pPr algn="ctr"/>
+            <a:r>
+              <a:rPr lang="en-US" sz="7200" dirty="0" smtClean="0"/>
+              <a:t>Q &amp; A</a:t>
+            </a:r>
+            <a:endParaRPr lang="en-US" sz="7200" dirty="0"/>
+          </a:p>
+        </p:txBody>
+      </p:sp>
+      <p:sp>
+        <p:nvSpPr>
+          <p:cNvPr id="3" name="Rectangle 2"/>
+          <p:cNvSpPr>
+            <a:spLocks noChangeArrowheads="1"/>
+          </p:cNvSpPr>
+          <p:nvPr/>
+        </p:nvSpPr>
+        <p:spPr bwMode="auto">
+          <a:xfrm>
+            <a:off x="0" y="0"/>
+            <a:ext cx="9144000" cy="0"/>
+          </a:xfrm>
+          <a:prstGeom prst="rect">
+            <a:avLst/>
+          </a:prstGeom>
+          <a:noFill/>
+          <a:ln>
+            <a:noFill/>
+          </a:ln>
+          <a:effectLst/>
+          <a:extLst>
+            <a:ext uri="{909E8E84-426E-40DD-AFC4-6F175D3DCCD1}">
+              <a14:hiddenFill xmlns:a14="http://schemas.microsoft.com/office/drawing/2010/main" xmlns="">
+                <a:solidFill>
+                  <a:schemeClr val="accent1"/>
+                </a:solidFill>
+              </a14:hiddenFill>
+            </a:ext>
+            <a:ext uri="{91240B29-F687-4F45-9708-019B960494DF}">
+              <a14:hiddenLine xmlns:a14="http://schemas.microsoft.com/office/drawing/2010/main" xmlns="" w="9525">
+                <a:solidFill>
+                  <a:schemeClr val="tx1"/>
+                </a:solidFill>
+                <a:miter lim="800000"/>
+                <a:headEnd/>
+                <a:tailEnd/>
+              </a14:hiddenLine>
+            </a:ext>
+            <a:ext uri="{AF507438-7753-43E0-B8FC-AC1667EBCBE1}">
+              <a14:hiddenEffects xmlns:a14="http://schemas.microsoft.com/office/drawing/2010/main" xmlns="">
+                <a:effectLst>
+                  <a:outerShdw dist="35921" dir="2700000" algn="ctr" rotWithShape="0">
+                    <a:schemeClr val="bg2"/>
+                  </a:outerShdw>
+                </a:effectLst>
+              </a14:hiddenEffects>
+            </a:ext>
+          </a:extLst>
+        </p:spPr>
+        <p:txBody>
+          <a:bodyPr vert="horz" wrap="none" lIns="91440" tIns="45720" rIns="91440" bIns="45720" numCol="1" anchor="ctr" anchorCtr="0" compatLnSpc="1">
+            <a:prstTxWarp prst="textNoShape">
+              <a:avLst/>
+            </a:prstTxWarp>
+            <a:spAutoFit/>
+          </a:bodyPr>
+          <a:lstStyle/>
+          <a:p>
+            <a:endParaRPr lang="en-US"/>
+          </a:p>
+        </p:txBody>
+      </p:sp>
+      <p:sp>
+        <p:nvSpPr>
+          <p:cNvPr id="5" name="Rectangle 2"/>
+          <p:cNvSpPr>
+            <a:spLocks noChangeArrowheads="1"/>
+          </p:cNvSpPr>
+          <p:nvPr/>
+        </p:nvSpPr>
+        <p:spPr bwMode="auto">
+          <a:xfrm>
+            <a:off x="0" y="0"/>
+            <a:ext cx="9144000" cy="0"/>
+          </a:xfrm>
+          <a:prstGeom prst="rect">
+            <a:avLst/>
+          </a:prstGeom>
+          <a:noFill/>
+          <a:ln>
+            <a:noFill/>
+          </a:ln>
+          <a:effectLst/>
+          <a:extLst>
+            <a:ext uri="{909E8E84-426E-40DD-AFC4-6F175D3DCCD1}">
+              <a14:hiddenFill xmlns:a14="http://schemas.microsoft.com/office/drawing/2010/main" xmlns="">
+                <a:solidFill>
+                  <a:schemeClr val="accent1"/>
+                </a:solidFill>
+              </a14:hiddenFill>
+            </a:ext>
+            <a:ext uri="{91240B29-F687-4F45-9708-019B960494DF}">
+              <a14:hiddenLine xmlns:a14="http://schemas.microsoft.com/office/drawing/2010/main" xmlns="" w="9525">
+                <a:solidFill>
+                  <a:schemeClr val="tx1"/>
+                </a:solidFill>
+                <a:miter lim="800000"/>
+                <a:headEnd/>
+                <a:tailEnd/>
+              </a14:hiddenLine>
+            </a:ext>
+            <a:ext uri="{AF507438-7753-43E0-B8FC-AC1667EBCBE1}">
+              <a14:hiddenEffects xmlns:a14="http://schemas.microsoft.com/office/drawing/2010/main" xmlns="">
+                <a:effectLst>
+                  <a:outerShdw dist="35921" dir="2700000" algn="ctr" rotWithShape="0">
+                    <a:schemeClr val="bg2"/>
+                  </a:outerShdw>
+                </a:effectLst>
+              </a14:hiddenEffects>
+            </a:ext>
+          </a:extLst>
+        </p:spPr>
+        <p:txBody>
+          <a:bodyPr vert="horz" wrap="none" lIns="91440" tIns="45720" rIns="91440" bIns="45720" numCol="1" anchor="ctr" anchorCtr="0" compatLnSpc="1">
+            <a:prstTxWarp prst="textNoShape">
+              <a:avLst/>
+            </a:prstTxWarp>
+            <a:spAutoFit/>
+          </a:bodyPr>
+          <a:lstStyle/>
+          <a:p>
+            <a:endParaRPr lang="en-US"/>
+          </a:p>
+        </p:txBody>
+      </p:sp>
+      <p:sp>
+        <p:nvSpPr>
+          <p:cNvPr id="4" name="Rectangle 2"/>
+          <p:cNvSpPr>
+            <a:spLocks noChangeArrowheads="1"/>
+          </p:cNvSpPr>
+          <p:nvPr/>
+        </p:nvSpPr>
+        <p:spPr bwMode="auto">
+          <a:xfrm>
+            <a:off x="0" y="0"/>
+            <a:ext cx="9144000" cy="0"/>
+          </a:xfrm>
+          <a:prstGeom prst="rect">
+            <a:avLst/>
+          </a:prstGeom>
+          <a:noFill/>
+          <a:ln>
+            <a:noFill/>
+          </a:ln>
+          <a:effectLst/>
+          <a:extLst>
+            <a:ext uri="{909E8E84-426E-40DD-AFC4-6F175D3DCCD1}">
+              <a14:hiddenFill xmlns:a14="http://schemas.microsoft.com/office/drawing/2010/main" xmlns="">
+                <a:solidFill>
+                  <a:schemeClr val="accent1"/>
+                </a:solidFill>
+              </a14:hiddenFill>
+            </a:ext>
+            <a:ext uri="{91240B29-F687-4F45-9708-019B960494DF}">
+              <a14:hiddenLine xmlns:a14="http://schemas.microsoft.com/office/drawing/2010/main" xmlns="" w="9525">
+                <a:solidFill>
+                  <a:schemeClr val="tx1"/>
+                </a:solidFill>
+                <a:miter lim="800000"/>
+                <a:headEnd/>
+                <a:tailEnd/>
+              </a14:hiddenLine>
+            </a:ext>
+            <a:ext uri="{AF507438-7753-43E0-B8FC-AC1667EBCBE1}">
+              <a14:hiddenEffects xmlns:a14="http://schemas.microsoft.com/office/drawing/2010/main" xmlns="">
+                <a:effectLst>
+                  <a:outerShdw dist="35921" dir="2700000" algn="ctr" rotWithShape="0">
+                    <a:schemeClr val="bg2"/>
+                  </a:outerShdw>
+                </a:effectLst>
+              </a14:hiddenEffects>
+            </a:ext>
+          </a:extLst>
+        </p:spPr>
+        <p:txBody>
+          <a:bodyPr vert="horz" wrap="none" lIns="91440" tIns="45720" rIns="91440" bIns="45720" numCol="1" anchor="ctr" anchorCtr="0" compatLnSpc="1">
+            <a:prstTxWarp prst="textNoShape">
+              <a:avLst/>
+            </a:prstTxWarp>
+            <a:spAutoFit/>
+          </a:bodyPr>
+          <a:lstStyle/>
+          <a:p>
+            <a:endParaRPr lang="en-US"/>
+          </a:p>
+        </p:txBody>
+      </p:sp>
+    </p:spTree>
+    <p:extLst>
+      <p:ext uri="{BB962C8B-B14F-4D97-AF65-F5344CB8AC3E}">
+        <p14:creationId xmlns:p14="http://schemas.microsoft.com/office/powerpoint/2010/main" xmlns="" val="336984967"/>
       </p:ext>
     </p:extLst>
   </p:cSld>
@@ -14465,16 +15309,14 @@
         </p:nvSpPr>
         <p:spPr/>
         <p:txBody>
-          <a:bodyPr/>
+          <a:bodyPr>
+            <a:normAutofit/>
+          </a:bodyPr>
           <a:lstStyle/>
           <a:p>
             <a:r>
               <a:rPr lang="en-US" dirty="0" smtClean="0"/>
-              <a:t>Online </a:t>
-            </a:r>
-            <a:r>
-              <a:rPr lang="en-US" dirty="0" err="1" smtClean="0"/>
-              <a:t>Demonstation</a:t>
+              <a:t>Project Overview</a:t>
             </a:r>
             <a:endParaRPr lang="en-US" dirty="0"/>
           </a:p>
@@ -14495,89 +15337,45 @@
           <a:bodyPr/>
           <a:lstStyle/>
           <a:p>
-            <a:endParaRPr lang="en-US" dirty="0" smtClean="0">
-              <a:hlinkClick r:id="rId2"/>
-            </a:endParaRPr>
-          </a:p>
-          <a:p>
-            <a:r>
-              <a:rPr lang="en-US" dirty="0" smtClean="0">
-                <a:hlinkClick r:id="rId2"/>
-              </a:rPr>
-              <a:t>http://ibudget.simplefunctions.com</a:t>
-            </a:r>
-            <a:endParaRPr lang="en-US" dirty="0" smtClean="0"/>
-          </a:p>
-          <a:p>
-            <a:endParaRPr lang="en-US" dirty="0" smtClean="0"/>
-          </a:p>
-          <a:p>
             <a:r>
               <a:rPr lang="en-US" dirty="0" smtClean="0"/>
-              <a:t>We each take turn to show the pages or functionalities that we worked on.</a:t>
+              <a:t>What is </a:t>
+            </a:r>
+            <a:r>
+              <a:rPr lang="en-US" dirty="0" err="1" smtClean="0"/>
+              <a:t>iBudget</a:t>
+            </a:r>
+            <a:r>
+              <a:rPr lang="en-US" dirty="0" smtClean="0"/>
+              <a:t>? -1 slide</a:t>
+            </a:r>
+          </a:p>
+          <a:p>
+            <a:r>
+              <a:rPr lang="en-US" dirty="0" smtClean="0"/>
+              <a:t>Example of competition – Mint 1 slide</a:t>
+            </a:r>
+          </a:p>
+          <a:p>
+            <a:r>
+              <a:rPr lang="en-US" dirty="0" smtClean="0"/>
+              <a:t>Competitive advantage – 1 slide</a:t>
+            </a:r>
+          </a:p>
+          <a:p>
+            <a:r>
+              <a:rPr lang="en-US" dirty="0" smtClean="0"/>
+              <a:t>What is the expected outcome of the project – 1 slide</a:t>
             </a:r>
             <a:endParaRPr lang="en-US" dirty="0"/>
           </a:p>
         </p:txBody>
       </p:sp>
-      <p:pic>
-        <p:nvPicPr>
-          <p:cNvPr id="1026" name="Picture 2" descr="HTML5-logo.svg"/>
-          <p:cNvPicPr>
-            <a:picLocks noChangeAspect="1" noChangeArrowheads="1"/>
-          </p:cNvPicPr>
-          <p:nvPr/>
-        </p:nvPicPr>
-        <p:blipFill>
-          <a:blip r:embed="rId3">
-            <a:extLst>
-              <a:ext uri="{28A0092B-C50C-407E-A947-70E740481C1C}">
-                <a14:useLocalDpi xmlns:a14="http://schemas.microsoft.com/office/drawing/2010/main" val="0"/>
-              </a:ext>
-            </a:extLst>
-          </a:blip>
-          <a:srcRect/>
-          <a:stretch>
-            <a:fillRect/>
-          </a:stretch>
-        </p:blipFill>
-        <p:spPr bwMode="auto">
-          <a:xfrm>
-            <a:off x="3862602" y="4856334"/>
-            <a:ext cx="1143000" cy="1143001"/>
-          </a:xfrm>
-          <a:prstGeom prst="rect">
-            <a:avLst/>
-          </a:prstGeom>
-          <a:noFill/>
-          <a:extLst>
-            <a:ext uri="{909E8E84-426E-40DD-AFC4-6F175D3DCCD1}">
-              <a14:hiddenFill xmlns:a14="http://schemas.microsoft.com/office/drawing/2010/main">
-                <a:solidFill>
-                  <a:srgbClr val="FFFFFF"/>
-                </a:solidFill>
-              </a14:hiddenFill>
-            </a:ext>
-          </a:extLst>
-        </p:spPr>
-      </p:pic>
     </p:spTree>
-    <p:extLst>
-      <p:ext uri="{BB962C8B-B14F-4D97-AF65-F5344CB8AC3E}">
-        <p14:creationId xmlns:p14="http://schemas.microsoft.com/office/powerpoint/2010/main" val="3832736806"/>
-      </p:ext>
-    </p:extLst>
   </p:cSld>
   <p:clrMapOvr>
     <a:masterClrMapping/>
   </p:clrMapOvr>
-  <p:timing>
-    <p:tnLst>
-      <p:par>
-        <p:cTn id="1" dur="indefinite" restart="never" nodeType="tmRoot"/>
-      </p:par>
-    </p:tnLst>
-  </p:timing>
 </p:sld>
 </file>
 
@@ -14610,12 +15408,14 @@
         </p:nvSpPr>
         <p:spPr/>
         <p:txBody>
-          <a:bodyPr/>
+          <a:bodyPr>
+            <a:normAutofit/>
+          </a:bodyPr>
           <a:lstStyle/>
           <a:p>
             <a:r>
               <a:rPr lang="en-US" dirty="0" smtClean="0"/>
-              <a:t>Source Code</a:t>
+              <a:t>Project Organization</a:t>
             </a:r>
             <a:endParaRPr lang="en-US" dirty="0"/>
           </a:p>
@@ -14631,41 +15431,39 @@
             <p:ph idx="1"/>
           </p:nvPr>
         </p:nvSpPr>
-        <p:spPr>
-          <a:xfrm>
-            <a:off x="1043492" y="2817091"/>
-            <a:ext cx="6777317" cy="3015538"/>
-          </a:xfrm>
-        </p:spPr>
+        <p:spPr/>
         <p:txBody>
           <a:bodyPr/>
           <a:lstStyle/>
           <a:p>
             <a:r>
               <a:rPr lang="en-US" dirty="0" smtClean="0"/>
-              <a:t>We can pick out section of source code that we want to show</a:t>
+              <a:t>Process Model – Unified Process</a:t>
+            </a:r>
+          </a:p>
+          <a:p>
+            <a:r>
+              <a:rPr lang="en-US" dirty="0" smtClean="0"/>
+              <a:t>Organizational Structure</a:t>
+            </a:r>
+          </a:p>
+          <a:p>
+            <a:pPr>
+              <a:buNone/>
+            </a:pPr>
+            <a:r>
+              <a:rPr lang="en-US" dirty="0" smtClean="0"/>
+              <a:t> </a:t>
             </a:r>
             <a:endParaRPr lang="en-US" dirty="0"/>
           </a:p>
         </p:txBody>
       </p:sp>
     </p:spTree>
-    <p:extLst>
-      <p:ext uri="{BB962C8B-B14F-4D97-AF65-F5344CB8AC3E}">
-        <p14:creationId xmlns:p14="http://schemas.microsoft.com/office/powerpoint/2010/main" val="1092677546"/>
-      </p:ext>
-    </p:extLst>
   </p:cSld>
   <p:clrMapOvr>
     <a:masterClrMapping/>
   </p:clrMapOvr>
-  <p:timing>
-    <p:tnLst>
-      <p:par>
-        <p:cTn id="1" dur="indefinite" restart="never" nodeType="tmRoot"/>
-      </p:par>
-    </p:tnLst>
-  </p:timing>
 </p:sld>
 </file>
 
@@ -14696,43 +15494,69 @@
             <p:ph type="title"/>
           </p:nvPr>
         </p:nvSpPr>
-        <p:spPr>
-          <a:xfrm>
-            <a:off x="1043490" y="1037291"/>
-            <a:ext cx="7024744" cy="638582"/>
-          </a:xfrm>
-        </p:spPr>
+        <p:spPr/>
         <p:txBody>
-          <a:bodyPr>
-            <a:normAutofit fontScale="90000"/>
-          </a:bodyPr>
+          <a:bodyPr/>
           <a:lstStyle/>
           <a:p>
             <a:r>
               <a:rPr lang="en-US" dirty="0" smtClean="0"/>
-              <a:t>API Document</a:t>
+              <a:t>M</a:t>
+            </a:r>
+            <a:r>
+              <a:rPr lang="en-US" dirty="0" smtClean="0"/>
+              <a:t>anagement Process</a:t>
+            </a:r>
+            <a:endParaRPr lang="en-US" dirty="0"/>
+          </a:p>
+        </p:txBody>
+      </p:sp>
+      <p:sp>
+        <p:nvSpPr>
+          <p:cNvPr id="3" name="Content Placeholder 2"/>
+          <p:cNvSpPr>
+            <a:spLocks noGrp="1"/>
+          </p:cNvSpPr>
+          <p:nvPr>
+            <p:ph idx="1"/>
+          </p:nvPr>
+        </p:nvSpPr>
+        <p:spPr/>
+        <p:txBody>
+          <a:bodyPr/>
+          <a:lstStyle/>
+          <a:p>
+            <a:r>
+              <a:rPr lang="en-US" dirty="0" smtClean="0"/>
+              <a:t>Management Objectives and Priorities</a:t>
+            </a:r>
+          </a:p>
+          <a:p>
+            <a:r>
+              <a:rPr lang="en-US" dirty="0" smtClean="0"/>
+              <a:t>Risk management</a:t>
+            </a:r>
+          </a:p>
+          <a:p>
+            <a:r>
+              <a:rPr lang="en-US" dirty="0" smtClean="0"/>
+              <a:t>Monitoring and controlling mechanism</a:t>
+            </a:r>
+          </a:p>
+          <a:p>
+            <a:r>
+              <a:rPr lang="en-US" dirty="0" smtClean="0"/>
+              <a:t>Staffing Plan</a:t>
             </a:r>
             <a:endParaRPr lang="en-US" dirty="0"/>
           </a:p>
         </p:txBody>
       </p:sp>
     </p:spTree>
-    <p:extLst>
-      <p:ext uri="{BB962C8B-B14F-4D97-AF65-F5344CB8AC3E}">
-        <p14:creationId xmlns:p14="http://schemas.microsoft.com/office/powerpoint/2010/main" val="3037995522"/>
-      </p:ext>
-    </p:extLst>
   </p:cSld>
   <p:clrMapOvr>
     <a:masterClrMapping/>
   </p:clrMapOvr>
-  <p:timing>
-    <p:tnLst>
-      <p:par>
-        <p:cTn id="1" dur="indefinite" restart="never" nodeType="tmRoot"/>
-      </p:par>
-    </p:tnLst>
-  </p:timing>
 </p:sld>
 </file>
 
@@ -14763,12 +15587,7 @@
             <p:ph type="title"/>
           </p:nvPr>
         </p:nvSpPr>
-        <p:spPr>
-          <a:xfrm>
-            <a:off x="1043490" y="402565"/>
-            <a:ext cx="7024744" cy="1143000"/>
-          </a:xfrm>
-        </p:spPr>
+        <p:spPr/>
         <p:txBody>
           <a:bodyPr>
             <a:normAutofit/>
@@ -14777,29 +15596,51 @@
           <a:p>
             <a:r>
               <a:rPr lang="en-US" dirty="0" smtClean="0"/>
-              <a:t>STD</a:t>
+              <a:t>Resources and Schedule</a:t>
             </a:r>
+            <a:endParaRPr lang="en-US" dirty="0"/>
+          </a:p>
+        </p:txBody>
+      </p:sp>
+      <p:sp>
+        <p:nvSpPr>
+          <p:cNvPr id="3" name="Content Placeholder 2"/>
+          <p:cNvSpPr>
+            <a:spLocks noGrp="1"/>
+          </p:cNvSpPr>
+          <p:nvPr>
+            <p:ph idx="1"/>
+          </p:nvPr>
+        </p:nvSpPr>
+        <p:spPr/>
+        <p:txBody>
+          <a:bodyPr/>
+          <a:lstStyle/>
+          <a:p>
+            <a:r>
+              <a:rPr lang="en-US" dirty="0" smtClean="0"/>
+              <a:t>Budget and resource allocation</a:t>
+            </a:r>
+          </a:p>
+          <a:p>
+            <a:r>
+              <a:rPr lang="en-US" dirty="0" smtClean="0"/>
+              <a:t>Schedule</a:t>
+            </a:r>
+          </a:p>
+          <a:p>
+            <a:pPr>
+              <a:buNone/>
+            </a:pPr>
             <a:endParaRPr lang="en-US" dirty="0"/>
           </a:p>
         </p:txBody>
       </p:sp>
     </p:spTree>
-    <p:extLst>
-      <p:ext uri="{BB962C8B-B14F-4D97-AF65-F5344CB8AC3E}">
-        <p14:creationId xmlns:p14="http://schemas.microsoft.com/office/powerpoint/2010/main" val="1459248129"/>
-      </p:ext>
-    </p:extLst>
   </p:cSld>
   <p:clrMapOvr>
     <a:masterClrMapping/>
   </p:clrMapOvr>
-  <p:timing>
-    <p:tnLst>
-      <p:par>
-        <p:cTn id="1" dur="indefinite" restart="never" nodeType="tmRoot"/>
-      </p:par>
-    </p:tnLst>
-  </p:timing>
 </p:sld>
 </file>
 
@@ -14830,83 +15671,28 @@
             <p:ph type="title"/>
           </p:nvPr>
         </p:nvSpPr>
-        <p:spPr>
-          <a:xfrm>
-            <a:off x="1043490" y="641291"/>
-            <a:ext cx="7024744" cy="638582"/>
-          </a:xfrm>
-        </p:spPr>
+        <p:spPr/>
         <p:txBody>
-          <a:bodyPr>
-            <a:normAutofit fontScale="90000"/>
-          </a:bodyPr>
+          <a:bodyPr/>
           <a:lstStyle/>
           <a:p>
-            <a:r>
-              <a:rPr lang="en-US" dirty="0" smtClean="0"/>
-              <a:t>SRS</a:t>
-            </a:r>
-            <a:endParaRPr lang="en-US" dirty="0"/>
+            <a:endParaRPr lang="en-US"/>
           </a:p>
         </p:txBody>
       </p:sp>
       <p:sp>
         <p:nvSpPr>
-          <p:cNvPr id="3" name="Rectangle 2"/>
+          <p:cNvPr id="3" name="Content Placeholder 2"/>
           <p:cNvSpPr>
-            <a:spLocks noChangeArrowheads="1"/>
+            <a:spLocks noGrp="1"/>
           </p:cNvSpPr>
-          <p:nvPr/>
+          <p:nvPr>
+            <p:ph idx="1"/>
+          </p:nvPr>
         </p:nvSpPr>
-        <p:spPr bwMode="auto">
-          <a:xfrm>
-            <a:off x="0" y="0"/>
-            <a:ext cx="9144000" cy="0"/>
-          </a:xfrm>
-          <a:prstGeom prst="rect">
-            <a:avLst/>
-          </a:prstGeom>
-          <a:noFill/>
-          <a:ln>
-            <a:noFill/>
-          </a:ln>
-          <a:effectLst/>
-          <a:extLst>
-            <a:ext uri="{909E8E84-426E-40DD-AFC4-6F175D3DCCD1}">
-              <a14:hiddenFill xmlns:a14="http://schemas.microsoft.com/office/drawing/2010/main">
-                <a:solidFill>
-                  <a:schemeClr val="accent1"/>
-                </a:solidFill>
-              </a14:hiddenFill>
-            </a:ext>
-            <a:ext uri="{91240B29-F687-4F45-9708-019B960494DF}">
-              <a14:hiddenLine xmlns:a14="http://schemas.microsoft.com/office/drawing/2010/main" w="9525">
-                <a:solidFill>
-                  <a:schemeClr val="tx1"/>
-                </a:solidFill>
-                <a:miter lim="800000"/>
-                <a:headEnd/>
-                <a:tailEnd/>
-              </a14:hiddenLine>
-            </a:ext>
-            <a:ext uri="{AF507438-7753-43E0-B8FC-AC1667EBCBE1}">
-              <a14:hiddenEffects xmlns:a14="http://schemas.microsoft.com/office/drawing/2010/main">
-                <a:effectLst>
-                  <a:outerShdw dist="35921" dir="2700000" algn="ctr" rotWithShape="0">
-                    <a:schemeClr val="bg2"/>
-                  </a:outerShdw>
-                </a:effectLst>
-              </a14:hiddenEffects>
-            </a:ext>
-          </a:extLst>
-        </p:spPr>
+        <p:spPr/>
         <p:txBody>
-          <a:bodyPr vert="horz" wrap="none" lIns="91440" tIns="45720" rIns="91440" bIns="45720" numCol="1" anchor="ctr" anchorCtr="0" compatLnSpc="1">
-            <a:prstTxWarp prst="textNoShape">
-              <a:avLst/>
-            </a:prstTxWarp>
-            <a:spAutoFit/>
-          </a:bodyPr>
+          <a:bodyPr/>
           <a:lstStyle/>
           <a:p>
             <a:endParaRPr lang="en-US"/>
@@ -14914,22 +15700,10 @@
         </p:txBody>
       </p:sp>
     </p:spTree>
-    <p:extLst>
-      <p:ext uri="{BB962C8B-B14F-4D97-AF65-F5344CB8AC3E}">
-        <p14:creationId xmlns:p14="http://schemas.microsoft.com/office/powerpoint/2010/main" val="224431329"/>
-      </p:ext>
-    </p:extLst>
   </p:cSld>
   <p:clrMapOvr>
     <a:masterClrMapping/>
   </p:clrMapOvr>
-  <p:timing>
-    <p:tnLst>
-      <p:par>
-        <p:cTn id="1" dur="indefinite" restart="never" nodeType="tmRoot"/>
-      </p:par>
-    </p:tnLst>
-  </p:timing>
 </p:sld>
 </file>
 
@@ -14960,21 +15734,18 @@
             <p:ph type="title"/>
           </p:nvPr>
         </p:nvSpPr>
-        <p:spPr>
-          <a:xfrm>
-            <a:off x="1043490" y="641291"/>
-            <a:ext cx="7024744" cy="638582"/>
-          </a:xfrm>
-        </p:spPr>
+        <p:spPr/>
         <p:txBody>
-          <a:bodyPr>
-            <a:normAutofit fontScale="90000"/>
-          </a:bodyPr>
+          <a:bodyPr/>
           <a:lstStyle/>
           <a:p>
             <a:r>
               <a:rPr lang="en-US" dirty="0" smtClean="0"/>
-              <a:t>SDD</a:t>
+              <a:t>Online </a:t>
+            </a:r>
+            <a:r>
+              <a:rPr lang="en-US" dirty="0" err="1" smtClean="0"/>
+              <a:t>Demonstation</a:t>
             </a:r>
             <a:endParaRPr lang="en-US" dirty="0"/>
           </a:p>
@@ -14982,134 +15753,89 @@
       </p:sp>
       <p:sp>
         <p:nvSpPr>
-          <p:cNvPr id="3" name="Rectangle 2"/>
+          <p:cNvPr id="3" name="Content Placeholder 2"/>
           <p:cNvSpPr>
-            <a:spLocks noChangeArrowheads="1"/>
+            <a:spLocks noGrp="1"/>
           </p:cNvSpPr>
+          <p:nvPr>
+            <p:ph idx="1"/>
+          </p:nvPr>
+        </p:nvSpPr>
+        <p:spPr/>
+        <p:txBody>
+          <a:bodyPr/>
+          <a:lstStyle/>
+          <a:p>
+            <a:endParaRPr lang="en-US" dirty="0" smtClean="0">
+              <a:hlinkClick r:id="rId2"/>
+            </a:endParaRPr>
+          </a:p>
+          <a:p>
+            <a:r>
+              <a:rPr lang="en-US" dirty="0" smtClean="0">
+                <a:hlinkClick r:id="rId2"/>
+              </a:rPr>
+              <a:t>http://ibudget.simplefunctions.com</a:t>
+            </a:r>
+            <a:endParaRPr lang="en-US" dirty="0" smtClean="0"/>
+          </a:p>
+          <a:p>
+            <a:endParaRPr lang="en-US" dirty="0" smtClean="0"/>
+          </a:p>
+          <a:p>
+            <a:r>
+              <a:rPr lang="en-US" dirty="0" smtClean="0"/>
+              <a:t>We each take turn to show the pages or functionalities that we worked on.</a:t>
+            </a:r>
+            <a:endParaRPr lang="en-US" dirty="0"/>
+          </a:p>
+        </p:txBody>
+      </p:sp>
+      <p:pic>
+        <p:nvPicPr>
+          <p:cNvPr id="1026" name="Picture 2" descr="HTML5-logo.svg"/>
+          <p:cNvPicPr>
+            <a:picLocks noChangeAspect="1" noChangeArrowheads="1"/>
+          </p:cNvPicPr>
           <p:nvPr/>
-        </p:nvSpPr>
+        </p:nvPicPr>
+        <p:blipFill>
+          <a:blip r:embed="rId3" cstate="print">
+            <a:extLst>
+              <a:ext uri="{28A0092B-C50C-407E-A947-70E740481C1C}">
+                <a14:useLocalDpi xmlns:a14="http://schemas.microsoft.com/office/drawing/2010/main" xmlns="" val="0"/>
+              </a:ext>
+            </a:extLst>
+          </a:blip>
+          <a:srcRect/>
+          <a:stretch>
+            <a:fillRect/>
+          </a:stretch>
+        </p:blipFill>
         <p:spPr bwMode="auto">
           <a:xfrm>
-            <a:off x="0" y="0"/>
-            <a:ext cx="9144000" cy="0"/>
+            <a:off x="3862602" y="4856334"/>
+            <a:ext cx="1143000" cy="1143001"/>
           </a:xfrm>
           <a:prstGeom prst="rect">
             <a:avLst/>
           </a:prstGeom>
           <a:noFill/>
-          <a:ln>
-            <a:noFill/>
-          </a:ln>
-          <a:effectLst/>
           <a:extLst>
             <a:ext uri="{909E8E84-426E-40DD-AFC4-6F175D3DCCD1}">
-              <a14:hiddenFill xmlns:a14="http://schemas.microsoft.com/office/drawing/2010/main">
+              <a14:hiddenFill xmlns:a14="http://schemas.microsoft.com/office/drawing/2010/main" xmlns="">
                 <a:solidFill>
-                  <a:schemeClr val="accent1"/>
+                  <a:srgbClr val="FFFFFF"/>
                 </a:solidFill>
               </a14:hiddenFill>
             </a:ext>
-            <a:ext uri="{91240B29-F687-4F45-9708-019B960494DF}">
-              <a14:hiddenLine xmlns:a14="http://schemas.microsoft.com/office/drawing/2010/main" w="9525">
-                <a:solidFill>
-                  <a:schemeClr val="tx1"/>
-                </a:solidFill>
-                <a:miter lim="800000"/>
-                <a:headEnd/>
-                <a:tailEnd/>
-              </a14:hiddenLine>
-            </a:ext>
-            <a:ext uri="{AF507438-7753-43E0-B8FC-AC1667EBCBE1}">
-              <a14:hiddenEffects xmlns:a14="http://schemas.microsoft.com/office/drawing/2010/main">
-                <a:effectLst>
-                  <a:outerShdw dist="35921" dir="2700000" algn="ctr" rotWithShape="0">
-                    <a:schemeClr val="bg2"/>
-                  </a:outerShdw>
-                </a:effectLst>
-              </a14:hiddenEffects>
-            </a:ext>
           </a:extLst>
         </p:spPr>
-        <p:txBody>
-          <a:bodyPr vert="horz" wrap="none" lIns="91440" tIns="45720" rIns="91440" bIns="45720" numCol="1" anchor="ctr" anchorCtr="0" compatLnSpc="1">
-            <a:prstTxWarp prst="textNoShape">
-              <a:avLst/>
-            </a:prstTxWarp>
-            <a:spAutoFit/>
-          </a:bodyPr>
-          <a:lstStyle/>
-          <a:p>
-            <a:endParaRPr lang="en-US"/>
-          </a:p>
-        </p:txBody>
-      </p:sp>
-      <p:sp>
-        <p:nvSpPr>
-          <p:cNvPr id="5" name="Rectangle 2"/>
-          <p:cNvSpPr>
-            <a:spLocks noChangeArrowheads="1"/>
-          </p:cNvSpPr>
-          <p:nvPr/>
-        </p:nvSpPr>
-        <p:spPr bwMode="auto">
-          <a:xfrm>
-            <a:off x="0" y="0"/>
-            <a:ext cx="9144000" cy="0"/>
-          </a:xfrm>
-          <a:prstGeom prst="rect">
-            <a:avLst/>
-          </a:prstGeom>
-          <a:noFill/>
-          <a:ln>
-            <a:noFill/>
-          </a:ln>
-          <a:effectLst/>
-          <a:extLst>
-            <a:ext uri="{909E8E84-426E-40DD-AFC4-6F175D3DCCD1}">
-              <a14:hiddenFill xmlns:a14="http://schemas.microsoft.com/office/drawing/2010/main">
-                <a:solidFill>
-                  <a:schemeClr val="accent1"/>
-                </a:solidFill>
-              </a14:hiddenFill>
-            </a:ext>
-            <a:ext uri="{91240B29-F687-4F45-9708-019B960494DF}">
-              <a14:hiddenLine xmlns:a14="http://schemas.microsoft.com/office/drawing/2010/main" w="9525">
-                <a:solidFill>
-                  <a:schemeClr val="tx1"/>
-                </a:solidFill>
-                <a:miter lim="800000"/>
-                <a:headEnd/>
-                <a:tailEnd/>
-              </a14:hiddenLine>
-            </a:ext>
-            <a:ext uri="{AF507438-7753-43E0-B8FC-AC1667EBCBE1}">
-              <a14:hiddenEffects xmlns:a14="http://schemas.microsoft.com/office/drawing/2010/main">
-                <a:effectLst>
-                  <a:outerShdw dist="35921" dir="2700000" algn="ctr" rotWithShape="0">
-                    <a:schemeClr val="bg2"/>
-                  </a:outerShdw>
-                </a:effectLst>
-              </a14:hiddenEffects>
-            </a:ext>
-          </a:extLst>
-        </p:spPr>
-        <p:txBody>
-          <a:bodyPr vert="horz" wrap="none" lIns="91440" tIns="45720" rIns="91440" bIns="45720" numCol="1" anchor="ctr" anchorCtr="0" compatLnSpc="1">
-            <a:prstTxWarp prst="textNoShape">
-              <a:avLst/>
-            </a:prstTxWarp>
-            <a:spAutoFit/>
-          </a:bodyPr>
-          <a:lstStyle/>
-          <a:p>
-            <a:endParaRPr lang="en-US"/>
-          </a:p>
-        </p:txBody>
-      </p:sp>
+      </p:pic>
     </p:spTree>
     <p:extLst>
       <p:ext uri="{BB962C8B-B14F-4D97-AF65-F5344CB8AC3E}">
-        <p14:creationId xmlns:p14="http://schemas.microsoft.com/office/powerpoint/2010/main" val="2798939284"/>
+        <p14:creationId xmlns:p14="http://schemas.microsoft.com/office/powerpoint/2010/main" xmlns="" val="3832736806"/>
       </p:ext>
     </p:extLst>
   </p:cSld>
@@ -15153,21 +15879,14 @@
             <p:ph type="title"/>
           </p:nvPr>
         </p:nvSpPr>
-        <p:spPr>
-          <a:xfrm>
-            <a:off x="1043490" y="641291"/>
-            <a:ext cx="7024744" cy="638582"/>
-          </a:xfrm>
-        </p:spPr>
+        <p:spPr/>
         <p:txBody>
-          <a:bodyPr>
-            <a:normAutofit fontScale="90000"/>
-          </a:bodyPr>
+          <a:bodyPr/>
           <a:lstStyle/>
           <a:p>
             <a:r>
               <a:rPr lang="en-US" dirty="0" smtClean="0"/>
-              <a:t>SPMP</a:t>
+              <a:t>Source Code</a:t>
             </a:r>
             <a:endParaRPr lang="en-US" dirty="0"/>
           </a:p>
@@ -15175,134 +15894,36 @@
       </p:sp>
       <p:sp>
         <p:nvSpPr>
-          <p:cNvPr id="3" name="Rectangle 2"/>
+          <p:cNvPr id="3" name="Content Placeholder 2"/>
           <p:cNvSpPr>
-            <a:spLocks noChangeArrowheads="1"/>
+            <a:spLocks noGrp="1"/>
           </p:cNvSpPr>
-          <p:nvPr/>
+          <p:nvPr>
+            <p:ph idx="1"/>
+          </p:nvPr>
         </p:nvSpPr>
-        <p:spPr bwMode="auto">
+        <p:spPr>
           <a:xfrm>
-            <a:off x="0" y="0"/>
-            <a:ext cx="9144000" cy="0"/>
+            <a:off x="1043492" y="2817091"/>
+            <a:ext cx="6777317" cy="3015538"/>
           </a:xfrm>
-          <a:prstGeom prst="rect">
-            <a:avLst/>
-          </a:prstGeom>
-          <a:noFill/>
-          <a:ln>
-            <a:noFill/>
-          </a:ln>
-          <a:effectLst/>
-          <a:extLst>
-            <a:ext uri="{909E8E84-426E-40DD-AFC4-6F175D3DCCD1}">
-              <a14:hiddenFill xmlns:a14="http://schemas.microsoft.com/office/drawing/2010/main">
-                <a:solidFill>
-                  <a:schemeClr val="accent1"/>
-                </a:solidFill>
-              </a14:hiddenFill>
-            </a:ext>
-            <a:ext uri="{91240B29-F687-4F45-9708-019B960494DF}">
-              <a14:hiddenLine xmlns:a14="http://schemas.microsoft.com/office/drawing/2010/main" w="9525">
-                <a:solidFill>
-                  <a:schemeClr val="tx1"/>
-                </a:solidFill>
-                <a:miter lim="800000"/>
-                <a:headEnd/>
-                <a:tailEnd/>
-              </a14:hiddenLine>
-            </a:ext>
-            <a:ext uri="{AF507438-7753-43E0-B8FC-AC1667EBCBE1}">
-              <a14:hiddenEffects xmlns:a14="http://schemas.microsoft.com/office/drawing/2010/main">
-                <a:effectLst>
-                  <a:outerShdw dist="35921" dir="2700000" algn="ctr" rotWithShape="0">
-                    <a:schemeClr val="bg2"/>
-                  </a:outerShdw>
-                </a:effectLst>
-              </a14:hiddenEffects>
-            </a:ext>
-          </a:extLst>
         </p:spPr>
         <p:txBody>
-          <a:bodyPr vert="horz" wrap="none" lIns="91440" tIns="45720" rIns="91440" bIns="45720" numCol="1" anchor="ctr" anchorCtr="0" compatLnSpc="1">
-            <a:prstTxWarp prst="textNoShape">
-              <a:avLst/>
-            </a:prstTxWarp>
-            <a:spAutoFit/>
-          </a:bodyPr>
+          <a:bodyPr/>
           <a:lstStyle/>
           <a:p>
-            <a:endParaRPr lang="en-US"/>
-          </a:p>
-        </p:txBody>
-      </p:sp>
-      <p:sp>
-        <p:nvSpPr>
-          <p:cNvPr id="5" name="Rectangle 2"/>
-          <p:cNvSpPr>
-            <a:spLocks noChangeArrowheads="1"/>
-          </p:cNvSpPr>
-          <p:nvPr/>
-        </p:nvSpPr>
-        <p:spPr bwMode="auto">
-          <a:xfrm>
-            <a:off x="0" y="0"/>
-            <a:ext cx="9144000" cy="0"/>
-          </a:xfrm>
-          <a:prstGeom prst="rect">
-            <a:avLst/>
-          </a:prstGeom>
-          <a:noFill/>
-          <a:ln>
-            <a:noFill/>
-          </a:ln>
-          <a:effectLst/>
-          <a:extLst>
-            <a:ext uri="{909E8E84-426E-40DD-AFC4-6F175D3DCCD1}">
-              <a14:hiddenFill xmlns:a14="http://schemas.microsoft.com/office/drawing/2010/main">
-                <a:solidFill>
-                  <a:schemeClr val="accent1"/>
-                </a:solidFill>
-              </a14:hiddenFill>
-            </a:ext>
-            <a:ext uri="{91240B29-F687-4F45-9708-019B960494DF}">
-              <a14:hiddenLine xmlns:a14="http://schemas.microsoft.com/office/drawing/2010/main" w="9525">
-                <a:solidFill>
-                  <a:schemeClr val="tx1"/>
-                </a:solidFill>
-                <a:miter lim="800000"/>
-                <a:headEnd/>
-                <a:tailEnd/>
-              </a14:hiddenLine>
-            </a:ext>
-            <a:ext uri="{AF507438-7753-43E0-B8FC-AC1667EBCBE1}">
-              <a14:hiddenEffects xmlns:a14="http://schemas.microsoft.com/office/drawing/2010/main">
-                <a:effectLst>
-                  <a:outerShdw dist="35921" dir="2700000" algn="ctr" rotWithShape="0">
-                    <a:schemeClr val="bg2"/>
-                  </a:outerShdw>
-                </a:effectLst>
-              </a14:hiddenEffects>
-            </a:ext>
-          </a:extLst>
-        </p:spPr>
-        <p:txBody>
-          <a:bodyPr vert="horz" wrap="none" lIns="91440" tIns="45720" rIns="91440" bIns="45720" numCol="1" anchor="ctr" anchorCtr="0" compatLnSpc="1">
-            <a:prstTxWarp prst="textNoShape">
-              <a:avLst/>
-            </a:prstTxWarp>
-            <a:spAutoFit/>
-          </a:bodyPr>
-          <a:lstStyle/>
-          <a:p>
-            <a:endParaRPr lang="en-US"/>
+            <a:r>
+              <a:rPr lang="en-US" dirty="0" smtClean="0"/>
+              <a:t>We can pick out section of source code that we want to show</a:t>
+            </a:r>
+            <a:endParaRPr lang="en-US" dirty="0"/>
           </a:p>
         </p:txBody>
       </p:sp>
     </p:spTree>
     <p:extLst>
       <p:ext uri="{BB962C8B-B14F-4D97-AF65-F5344CB8AC3E}">
-        <p14:creationId xmlns:p14="http://schemas.microsoft.com/office/powerpoint/2010/main" val="792481554"/>
+        <p14:creationId xmlns:p14="http://schemas.microsoft.com/office/powerpoint/2010/main" xmlns="" val="1092677546"/>
       </p:ext>
     </p:extLst>
   </p:cSld>
@@ -15348,7 +15969,7 @@
         </p:nvSpPr>
         <p:spPr>
           <a:xfrm>
-            <a:off x="1043490" y="641291"/>
+            <a:off x="1043490" y="1037291"/>
             <a:ext cx="7024744" cy="638582"/>
           </a:xfrm>
         </p:spPr>
@@ -15360,205 +15981,16 @@
           <a:p>
             <a:r>
               <a:rPr lang="en-US" dirty="0" smtClean="0"/>
-              <a:t>User Manual</a:t>
+              <a:t>API Document</a:t>
             </a:r>
             <a:endParaRPr lang="en-US" dirty="0"/>
-          </a:p>
-        </p:txBody>
-      </p:sp>
-      <p:sp>
-        <p:nvSpPr>
-          <p:cNvPr id="3" name="Rectangle 2"/>
-          <p:cNvSpPr>
-            <a:spLocks noChangeArrowheads="1"/>
-          </p:cNvSpPr>
-          <p:nvPr/>
-        </p:nvSpPr>
-        <p:spPr bwMode="auto">
-          <a:xfrm>
-            <a:off x="0" y="0"/>
-            <a:ext cx="9144000" cy="0"/>
-          </a:xfrm>
-          <a:prstGeom prst="rect">
-            <a:avLst/>
-          </a:prstGeom>
-          <a:noFill/>
-          <a:ln>
-            <a:noFill/>
-          </a:ln>
-          <a:effectLst/>
-          <a:extLst>
-            <a:ext uri="{909E8E84-426E-40DD-AFC4-6F175D3DCCD1}">
-              <a14:hiddenFill xmlns:a14="http://schemas.microsoft.com/office/drawing/2010/main">
-                <a:solidFill>
-                  <a:schemeClr val="accent1"/>
-                </a:solidFill>
-              </a14:hiddenFill>
-            </a:ext>
-            <a:ext uri="{91240B29-F687-4F45-9708-019B960494DF}">
-              <a14:hiddenLine xmlns:a14="http://schemas.microsoft.com/office/drawing/2010/main" w="9525">
-                <a:solidFill>
-                  <a:schemeClr val="tx1"/>
-                </a:solidFill>
-                <a:miter lim="800000"/>
-                <a:headEnd/>
-                <a:tailEnd/>
-              </a14:hiddenLine>
-            </a:ext>
-            <a:ext uri="{AF507438-7753-43E0-B8FC-AC1667EBCBE1}">
-              <a14:hiddenEffects xmlns:a14="http://schemas.microsoft.com/office/drawing/2010/main">
-                <a:effectLst>
-                  <a:outerShdw dist="35921" dir="2700000" algn="ctr" rotWithShape="0">
-                    <a:schemeClr val="bg2"/>
-                  </a:outerShdw>
-                </a:effectLst>
-              </a14:hiddenEffects>
-            </a:ext>
-          </a:extLst>
-        </p:spPr>
-        <p:txBody>
-          <a:bodyPr vert="horz" wrap="none" lIns="91440" tIns="45720" rIns="91440" bIns="45720" numCol="1" anchor="ctr" anchorCtr="0" compatLnSpc="1">
-            <a:prstTxWarp prst="textNoShape">
-              <a:avLst/>
-            </a:prstTxWarp>
-            <a:spAutoFit/>
-          </a:bodyPr>
-          <a:lstStyle/>
-          <a:p>
-            <a:endParaRPr lang="en-US"/>
-          </a:p>
-        </p:txBody>
-      </p:sp>
-      <p:sp>
-        <p:nvSpPr>
-          <p:cNvPr id="5" name="Rectangle 2"/>
-          <p:cNvSpPr>
-            <a:spLocks noChangeArrowheads="1"/>
-          </p:cNvSpPr>
-          <p:nvPr/>
-        </p:nvSpPr>
-        <p:spPr bwMode="auto">
-          <a:xfrm>
-            <a:off x="0" y="0"/>
-            <a:ext cx="9144000" cy="0"/>
-          </a:xfrm>
-          <a:prstGeom prst="rect">
-            <a:avLst/>
-          </a:prstGeom>
-          <a:noFill/>
-          <a:ln>
-            <a:noFill/>
-          </a:ln>
-          <a:effectLst/>
-          <a:extLst>
-            <a:ext uri="{909E8E84-426E-40DD-AFC4-6F175D3DCCD1}">
-              <a14:hiddenFill xmlns:a14="http://schemas.microsoft.com/office/drawing/2010/main">
-                <a:solidFill>
-                  <a:schemeClr val="accent1"/>
-                </a:solidFill>
-              </a14:hiddenFill>
-            </a:ext>
-            <a:ext uri="{91240B29-F687-4F45-9708-019B960494DF}">
-              <a14:hiddenLine xmlns:a14="http://schemas.microsoft.com/office/drawing/2010/main" w="9525">
-                <a:solidFill>
-                  <a:schemeClr val="tx1"/>
-                </a:solidFill>
-                <a:miter lim="800000"/>
-                <a:headEnd/>
-                <a:tailEnd/>
-              </a14:hiddenLine>
-            </a:ext>
-            <a:ext uri="{AF507438-7753-43E0-B8FC-AC1667EBCBE1}">
-              <a14:hiddenEffects xmlns:a14="http://schemas.microsoft.com/office/drawing/2010/main">
-                <a:effectLst>
-                  <a:outerShdw dist="35921" dir="2700000" algn="ctr" rotWithShape="0">
-                    <a:schemeClr val="bg2"/>
-                  </a:outerShdw>
-                </a:effectLst>
-              </a14:hiddenEffects>
-            </a:ext>
-          </a:extLst>
-        </p:spPr>
-        <p:txBody>
-          <a:bodyPr vert="horz" wrap="none" lIns="91440" tIns="45720" rIns="91440" bIns="45720" numCol="1" anchor="ctr" anchorCtr="0" compatLnSpc="1">
-            <a:prstTxWarp prst="textNoShape">
-              <a:avLst/>
-            </a:prstTxWarp>
-            <a:spAutoFit/>
-          </a:bodyPr>
-          <a:lstStyle/>
-          <a:p>
-            <a:endParaRPr lang="en-US"/>
-          </a:p>
-        </p:txBody>
-      </p:sp>
-      <p:sp>
-        <p:nvSpPr>
-          <p:cNvPr id="4" name="Rectangle 2"/>
-          <p:cNvSpPr>
-            <a:spLocks noChangeArrowheads="1"/>
-          </p:cNvSpPr>
-          <p:nvPr/>
-        </p:nvSpPr>
-        <p:spPr bwMode="auto">
-          <a:xfrm>
-            <a:off x="0" y="0"/>
-            <a:ext cx="9144000" cy="0"/>
-          </a:xfrm>
-          <a:prstGeom prst="rect">
-            <a:avLst/>
-          </a:prstGeom>
-          <a:noFill/>
-          <a:ln>
-            <a:noFill/>
-          </a:ln>
-          <a:effectLst/>
-          <a:extLst>
-            <a:ext uri="{909E8E84-426E-40DD-AFC4-6F175D3DCCD1}">
-              <a14:hiddenFill xmlns:a14="http://schemas.microsoft.com/office/drawing/2010/main">
-                <a:solidFill>
-                  <a:schemeClr val="accent1"/>
-                </a:solidFill>
-              </a14:hiddenFill>
-            </a:ext>
-            <a:ext uri="{91240B29-F687-4F45-9708-019B960494DF}">
-              <a14:hiddenLine xmlns:a14="http://schemas.microsoft.com/office/drawing/2010/main" w="9525">
-                <a:solidFill>
-                  <a:schemeClr val="tx1"/>
-                </a:solidFill>
-                <a:miter lim="800000"/>
-                <a:headEnd/>
-                <a:tailEnd/>
-              </a14:hiddenLine>
-            </a:ext>
-            <a:ext uri="{AF507438-7753-43E0-B8FC-AC1667EBCBE1}">
-              <a14:hiddenEffects xmlns:a14="http://schemas.microsoft.com/office/drawing/2010/main">
-                <a:effectLst>
-                  <a:outerShdw dist="35921" dir="2700000" algn="ctr" rotWithShape="0">
-                    <a:schemeClr val="bg2"/>
-                  </a:outerShdw>
-                </a:effectLst>
-              </a14:hiddenEffects>
-            </a:ext>
-          </a:extLst>
-        </p:spPr>
-        <p:txBody>
-          <a:bodyPr vert="horz" wrap="none" lIns="91440" tIns="45720" rIns="91440" bIns="45720" numCol="1" anchor="ctr" anchorCtr="0" compatLnSpc="1">
-            <a:prstTxWarp prst="textNoShape">
-              <a:avLst/>
-            </a:prstTxWarp>
-            <a:spAutoFit/>
-          </a:bodyPr>
-          <a:lstStyle/>
-          <a:p>
-            <a:endParaRPr lang="en-US"/>
           </a:p>
         </p:txBody>
       </p:sp>
     </p:spTree>
     <p:extLst>
       <p:ext uri="{BB962C8B-B14F-4D97-AF65-F5344CB8AC3E}">
-        <p14:creationId xmlns:p14="http://schemas.microsoft.com/office/powerpoint/2010/main" val="2227559208"/>
+        <p14:creationId xmlns:p14="http://schemas.microsoft.com/office/powerpoint/2010/main" xmlns="" val="3037995522"/>
       </p:ext>
     </p:extLst>
   </p:cSld>

</xml_diff>

<commit_message>
work on Final Presentation.pptx
</commit_message>
<xml_diff>
--- a/deliverables/final/Final Presentation.pptx
+++ b/deliverables/final/Final Presentation.pptx
@@ -6,21 +6,23 @@
   </p:sldMasterIdLst>
   <p:sldIdLst>
     <p:sldId id="256" r:id="rId2"/>
-    <p:sldId id="267" r:id="rId3"/>
-    <p:sldId id="268" r:id="rId4"/>
-    <p:sldId id="269" r:id="rId5"/>
-    <p:sldId id="270" r:id="rId6"/>
-    <p:sldId id="271" r:id="rId7"/>
-    <p:sldId id="259" r:id="rId8"/>
-    <p:sldId id="257" r:id="rId9"/>
-    <p:sldId id="258" r:id="rId10"/>
-    <p:sldId id="260" r:id="rId11"/>
-    <p:sldId id="261" r:id="rId12"/>
-    <p:sldId id="262" r:id="rId13"/>
-    <p:sldId id="263" r:id="rId14"/>
-    <p:sldId id="264" r:id="rId15"/>
-    <p:sldId id="265" r:id="rId16"/>
-    <p:sldId id="266" r:id="rId17"/>
+    <p:sldId id="272" r:id="rId3"/>
+    <p:sldId id="267" r:id="rId4"/>
+    <p:sldId id="274" r:id="rId5"/>
+    <p:sldId id="268" r:id="rId6"/>
+    <p:sldId id="269" r:id="rId7"/>
+    <p:sldId id="270" r:id="rId8"/>
+    <p:sldId id="271" r:id="rId9"/>
+    <p:sldId id="259" r:id="rId10"/>
+    <p:sldId id="257" r:id="rId11"/>
+    <p:sldId id="258" r:id="rId12"/>
+    <p:sldId id="260" r:id="rId13"/>
+    <p:sldId id="261" r:id="rId14"/>
+    <p:sldId id="262" r:id="rId15"/>
+    <p:sldId id="263" r:id="rId16"/>
+    <p:sldId id="264" r:id="rId17"/>
+    <p:sldId id="265" r:id="rId18"/>
+    <p:sldId id="266" r:id="rId19"/>
   </p:sldIdLst>
   <p:sldSz cx="9144000" cy="6858000" type="screen4x3"/>
   <p:notesSz cx="6858000" cy="9144000"/>
@@ -2880,7 +2882,7 @@
             <a:fld id="{0A98AF03-7270-45C2-A683-C5E353EF01A5}" type="datetime4">
               <a:rPr lang="en-US" smtClean="0"/>
               <a:pPr/>
-              <a:t>April 22, 2012</a:t>
+              <a:t>April 26, 2012</a:t>
             </a:fld>
             <a:endParaRPr lang="en-US" dirty="0"/>
           </a:p>
@@ -3167,7 +3169,7 @@
             <a:fld id="{A2FB5AFD-D735-4504-A039-ADEBB6448D55}" type="datetime4">
               <a:rPr lang="en-US" smtClean="0"/>
               <a:pPr/>
-              <a:t>April 22, 2012</a:t>
+              <a:t>April 26, 2012</a:t>
             </a:fld>
             <a:endParaRPr lang="en-US" dirty="0"/>
           </a:p>
@@ -3344,7 +3346,7 @@
             <a:fld id="{AB5C8118-FB93-4E87-B380-0175F2FE2167}" type="datetime4">
               <a:rPr lang="en-US" smtClean="0"/>
               <a:pPr/>
-              <a:t>April 22, 2012</a:t>
+              <a:t>April 26, 2012</a:t>
             </a:fld>
             <a:endParaRPr lang="en-US" dirty="0"/>
           </a:p>
@@ -3511,7 +3513,7 @@
             <a:fld id="{05A93482-8E69-40F7-BCAD-5662A6CADB27}" type="datetime4">
               <a:rPr lang="en-US" smtClean="0"/>
               <a:pPr/>
-              <a:t>April 22, 2012</a:t>
+              <a:t>April 26, 2012</a:t>
             </a:fld>
             <a:endParaRPr lang="en-US" dirty="0"/>
           </a:p>
@@ -3754,7 +3756,7 @@
             <a:fld id="{FBB7EAE1-CAAC-4AEF-919E-158692B1E55E}" type="datetime4">
               <a:rPr lang="en-US" smtClean="0"/>
               <a:pPr/>
-              <a:t>April 22, 2012</a:t>
+              <a:t>April 26, 2012</a:t>
             </a:fld>
             <a:endParaRPr lang="en-US" dirty="0"/>
           </a:p>
@@ -3869,7 +3871,7 @@
             <a:fld id="{9525A706-D8F2-4D1A-855A-CADC92600C26}" type="datetime4">
               <a:rPr lang="en-US" smtClean="0"/>
               <a:pPr/>
-              <a:t>April 22, 2012</a:t>
+              <a:t>April 26, 2012</a:t>
             </a:fld>
             <a:endParaRPr lang="en-US" dirty="0"/>
           </a:p>
@@ -4410,7 +4412,7 @@
             <a:fld id="{99B4F123-1704-49AC-9D15-C4B1462B8014}" type="datetime4">
               <a:rPr lang="en-US" smtClean="0"/>
               <a:pPr/>
-              <a:t>April 22, 2012</a:t>
+              <a:t>April 26, 2012</a:t>
             </a:fld>
             <a:endParaRPr lang="en-US" dirty="0"/>
           </a:p>
@@ -4525,7 +4527,7 @@
             <a:fld id="{E3127EC2-47FB-48A1-8644-C8A81DDAA119}" type="datetime4">
               <a:rPr lang="en-US" smtClean="0"/>
               <a:pPr/>
-              <a:t>April 22, 2012</a:t>
+              <a:t>April 26, 2012</a:t>
             </a:fld>
             <a:endParaRPr lang="en-US" dirty="0"/>
           </a:p>
@@ -4617,7 +4619,7 @@
             <a:fld id="{AE3EC3ED-7435-49F9-84C8-03CCA2F8DEDB}" type="datetime4">
               <a:rPr lang="en-US" smtClean="0"/>
               <a:pPr/>
-              <a:t>April 22, 2012</a:t>
+              <a:t>April 26, 2012</a:t>
             </a:fld>
             <a:endParaRPr lang="en-US" dirty="0"/>
           </a:p>
@@ -7270,7 +7272,7 @@
             <a:fld id="{3FC49BF1-FCD3-4395-8FF6-0047AF66228E}" type="datetime4">
               <a:rPr lang="en-US" smtClean="0"/>
               <a:pPr/>
-              <a:t>April 22, 2012</a:t>
+              <a:t>April 26, 2012</a:t>
             </a:fld>
             <a:endParaRPr lang="en-US" dirty="0"/>
           </a:p>
@@ -10484,7 +10486,7 @@
             <a:fld id="{CA861222-2C8B-4501-BE87-6797EC025925}" type="datetime4">
               <a:rPr lang="en-US" smtClean="0"/>
               <a:pPr/>
-              <a:t>April 22, 2012</a:t>
+              <a:t>April 26, 2012</a:t>
             </a:fld>
             <a:endParaRPr lang="en-US" dirty="0"/>
           </a:p>
@@ -13308,7 +13310,7 @@
             <a:fld id="{16C01193-8287-4834-A286-6B880643E934}" type="datetime4">
               <a:rPr lang="en-US" smtClean="0"/>
               <a:pPr/>
-              <a:t>April 22, 2012</a:t>
+              <a:t>April 26, 2012</a:t>
             </a:fld>
             <a:endParaRPr lang="en-US" dirty="0"/>
           </a:p>
@@ -13903,7 +13905,7 @@
     </p:spTree>
     <p:extLst>
       <p:ext uri="{BB962C8B-B14F-4D97-AF65-F5344CB8AC3E}">
-        <p14:creationId xmlns:p14="http://schemas.microsoft.com/office/powerpoint/2010/main" xmlns="" val="1809248185"/>
+        <p14:creationId xmlns="" xmlns:p14="http://schemas.microsoft.com/office/powerpoint/2010/main" val="1809248185"/>
       </p:ext>
     </p:extLst>
   </p:cSld>
@@ -13947,21 +13949,42 @@
             <p:ph type="title"/>
           </p:nvPr>
         </p:nvSpPr>
+        <p:spPr/>
+        <p:txBody>
+          <a:bodyPr/>
+          <a:lstStyle/>
+          <a:p>
+            <a:r>
+              <a:rPr lang="en-US" dirty="0" smtClean="0"/>
+              <a:t>Source Code</a:t>
+            </a:r>
+            <a:endParaRPr lang="en-US" dirty="0"/>
+          </a:p>
+        </p:txBody>
+      </p:sp>
+      <p:sp>
+        <p:nvSpPr>
+          <p:cNvPr id="3" name="Content Placeholder 2"/>
+          <p:cNvSpPr>
+            <a:spLocks noGrp="1"/>
+          </p:cNvSpPr>
+          <p:nvPr>
+            <p:ph idx="1"/>
+          </p:nvPr>
+        </p:nvSpPr>
         <p:spPr>
           <a:xfrm>
-            <a:off x="1043490" y="402565"/>
-            <a:ext cx="7024744" cy="1143000"/>
+            <a:off x="1043492" y="2817091"/>
+            <a:ext cx="6777317" cy="3015538"/>
           </a:xfrm>
         </p:spPr>
         <p:txBody>
-          <a:bodyPr>
-            <a:normAutofit/>
-          </a:bodyPr>
+          <a:bodyPr/>
           <a:lstStyle/>
           <a:p>
             <a:r>
               <a:rPr lang="en-US" dirty="0" smtClean="0"/>
-              <a:t>STD</a:t>
+              <a:t>We can pick out section of source code that we want to show</a:t>
             </a:r>
             <a:endParaRPr lang="en-US" dirty="0"/>
           </a:p>
@@ -13970,7 +13993,7 @@
     </p:spTree>
     <p:extLst>
       <p:ext uri="{BB962C8B-B14F-4D97-AF65-F5344CB8AC3E}">
-        <p14:creationId xmlns:p14="http://schemas.microsoft.com/office/powerpoint/2010/main" xmlns="" val="1459248129"/>
+        <p14:creationId xmlns="" xmlns:p14="http://schemas.microsoft.com/office/powerpoint/2010/main" val="1092677546"/>
       </p:ext>
     </p:extLst>
   </p:cSld>
@@ -14016,7 +14039,7 @@
         </p:nvSpPr>
         <p:spPr>
           <a:xfrm>
-            <a:off x="1043490" y="641291"/>
+            <a:off x="1043490" y="1037291"/>
             <a:ext cx="7024744" cy="638582"/>
           </a:xfrm>
         </p:spPr>
@@ -14028,79 +14051,16 @@
           <a:p>
             <a:r>
               <a:rPr lang="en-US" dirty="0" smtClean="0"/>
-              <a:t>SRS</a:t>
+              <a:t>API Document</a:t>
             </a:r>
             <a:endParaRPr lang="en-US" dirty="0"/>
-          </a:p>
-        </p:txBody>
-      </p:sp>
-      <p:sp>
-        <p:nvSpPr>
-          <p:cNvPr id="3" name="Rectangle 2"/>
-          <p:cNvSpPr>
-            <a:spLocks noChangeArrowheads="1"/>
-          </p:cNvSpPr>
-          <p:nvPr/>
-        </p:nvSpPr>
-        <p:spPr bwMode="auto">
-          <a:xfrm>
-            <a:off x="0" y="0"/>
-            <a:ext cx="9144000" cy="0"/>
-          </a:xfrm>
-          <a:prstGeom prst="rect">
-            <a:avLst/>
-          </a:prstGeom>
-          <a:noFill/>
-          <a:ln>
-            <a:noFill/>
-          </a:ln>
-          <a:effectLst/>
-          <a:extLst>
-            <a:ext uri="{909E8E84-426E-40DD-AFC4-6F175D3DCCD1}">
-              <a14:hiddenFill xmlns:a14="http://schemas.microsoft.com/office/drawing/2010/main" xmlns="">
-                <a:solidFill>
-                  <a:schemeClr val="accent1"/>
-                </a:solidFill>
-              </a14:hiddenFill>
-            </a:ext>
-            <a:ext uri="{91240B29-F687-4F45-9708-019B960494DF}">
-              <a14:hiddenLine xmlns:a14="http://schemas.microsoft.com/office/drawing/2010/main" xmlns="" w="9525">
-                <a:solidFill>
-                  <a:schemeClr val="tx1"/>
-                </a:solidFill>
-                <a:miter lim="800000"/>
-                <a:headEnd/>
-                <a:tailEnd/>
-              </a14:hiddenLine>
-            </a:ext>
-            <a:ext uri="{AF507438-7753-43E0-B8FC-AC1667EBCBE1}">
-              <a14:hiddenEffects xmlns:a14="http://schemas.microsoft.com/office/drawing/2010/main" xmlns="">
-                <a:effectLst>
-                  <a:outerShdw dist="35921" dir="2700000" algn="ctr" rotWithShape="0">
-                    <a:schemeClr val="bg2"/>
-                  </a:outerShdw>
-                </a:effectLst>
-              </a14:hiddenEffects>
-            </a:ext>
-          </a:extLst>
-        </p:spPr>
-        <p:txBody>
-          <a:bodyPr vert="horz" wrap="none" lIns="91440" tIns="45720" rIns="91440" bIns="45720" numCol="1" anchor="ctr" anchorCtr="0" compatLnSpc="1">
-            <a:prstTxWarp prst="textNoShape">
-              <a:avLst/>
-            </a:prstTxWarp>
-            <a:spAutoFit/>
-          </a:bodyPr>
-          <a:lstStyle/>
-          <a:p>
-            <a:endParaRPr lang="en-US"/>
           </a:p>
         </p:txBody>
       </p:sp>
     </p:spTree>
     <p:extLst>
       <p:ext uri="{BB962C8B-B14F-4D97-AF65-F5344CB8AC3E}">
-        <p14:creationId xmlns:p14="http://schemas.microsoft.com/office/powerpoint/2010/main" xmlns="" val="224431329"/>
+        <p14:creationId xmlns="" xmlns:p14="http://schemas.microsoft.com/office/powerpoint/2010/main" val="3037995522"/>
       </p:ext>
     </p:extLst>
   </p:cSld>
@@ -14146,154 +14106,28 @@
         </p:nvSpPr>
         <p:spPr>
           <a:xfrm>
-            <a:off x="1043490" y="641291"/>
-            <a:ext cx="7024744" cy="638582"/>
+            <a:off x="1043490" y="402565"/>
+            <a:ext cx="7024744" cy="1143000"/>
           </a:xfrm>
         </p:spPr>
         <p:txBody>
           <a:bodyPr>
-            <a:normAutofit fontScale="90000"/>
+            <a:normAutofit/>
           </a:bodyPr>
           <a:lstStyle/>
           <a:p>
             <a:r>
               <a:rPr lang="en-US" dirty="0" smtClean="0"/>
-              <a:t>SDD</a:t>
+              <a:t>STD</a:t>
             </a:r>
             <a:endParaRPr lang="en-US" dirty="0"/>
-          </a:p>
-        </p:txBody>
-      </p:sp>
-      <p:sp>
-        <p:nvSpPr>
-          <p:cNvPr id="3" name="Rectangle 2"/>
-          <p:cNvSpPr>
-            <a:spLocks noChangeArrowheads="1"/>
-          </p:cNvSpPr>
-          <p:nvPr/>
-        </p:nvSpPr>
-        <p:spPr bwMode="auto">
-          <a:xfrm>
-            <a:off x="0" y="0"/>
-            <a:ext cx="9144000" cy="0"/>
-          </a:xfrm>
-          <a:prstGeom prst="rect">
-            <a:avLst/>
-          </a:prstGeom>
-          <a:noFill/>
-          <a:ln>
-            <a:noFill/>
-          </a:ln>
-          <a:effectLst/>
-          <a:extLst>
-            <a:ext uri="{909E8E84-426E-40DD-AFC4-6F175D3DCCD1}">
-              <a14:hiddenFill xmlns:a14="http://schemas.microsoft.com/office/drawing/2010/main" xmlns="">
-                <a:solidFill>
-                  <a:schemeClr val="accent1"/>
-                </a:solidFill>
-              </a14:hiddenFill>
-            </a:ext>
-            <a:ext uri="{91240B29-F687-4F45-9708-019B960494DF}">
-              <a14:hiddenLine xmlns:a14="http://schemas.microsoft.com/office/drawing/2010/main" xmlns="" w="9525">
-                <a:solidFill>
-                  <a:schemeClr val="tx1"/>
-                </a:solidFill>
-                <a:miter lim="800000"/>
-                <a:headEnd/>
-                <a:tailEnd/>
-              </a14:hiddenLine>
-            </a:ext>
-            <a:ext uri="{AF507438-7753-43E0-B8FC-AC1667EBCBE1}">
-              <a14:hiddenEffects xmlns:a14="http://schemas.microsoft.com/office/drawing/2010/main" xmlns="">
-                <a:effectLst>
-                  <a:outerShdw dist="35921" dir="2700000" algn="ctr" rotWithShape="0">
-                    <a:schemeClr val="bg2"/>
-                  </a:outerShdw>
-                </a:effectLst>
-              </a14:hiddenEffects>
-            </a:ext>
-          </a:extLst>
-        </p:spPr>
-        <p:txBody>
-          <a:bodyPr vert="horz" wrap="none" lIns="91440" tIns="45720" rIns="91440" bIns="45720" numCol="1" anchor="ctr" anchorCtr="0" compatLnSpc="1">
-            <a:prstTxWarp prst="textNoShape">
-              <a:avLst/>
-            </a:prstTxWarp>
-            <a:spAutoFit/>
-          </a:bodyPr>
-          <a:lstStyle/>
-          <a:p>
-            <a:endParaRPr lang="en-US"/>
-          </a:p>
-        </p:txBody>
-      </p:sp>
-      <p:sp>
-        <p:nvSpPr>
-          <p:cNvPr id="5" name="Rectangle 2"/>
-          <p:cNvSpPr>
-            <a:spLocks noChangeArrowheads="1"/>
-          </p:cNvSpPr>
-          <p:nvPr/>
-        </p:nvSpPr>
-        <p:spPr bwMode="auto">
-          <a:xfrm>
-            <a:off x="0" y="0"/>
-            <a:ext cx="9144000" cy="0"/>
-          </a:xfrm>
-          <a:prstGeom prst="rect">
-            <a:avLst/>
-          </a:prstGeom>
-          <a:noFill/>
-          <a:ln>
-            <a:noFill/>
-          </a:ln>
-          <a:effectLst/>
-          <a:extLst>
-            <a:ext uri="{909E8E84-426E-40DD-AFC4-6F175D3DCCD1}">
-              <a14:hiddenFill xmlns:a14="http://schemas.microsoft.com/office/drawing/2010/main" xmlns="">
-                <a:solidFill>
-                  <a:schemeClr val="accent1"/>
-                </a:solidFill>
-              </a14:hiddenFill>
-            </a:ext>
-            <a:ext uri="{91240B29-F687-4F45-9708-019B960494DF}">
-              <a14:hiddenLine xmlns:a14="http://schemas.microsoft.com/office/drawing/2010/main" xmlns="" w="9525">
-                <a:solidFill>
-                  <a:schemeClr val="tx1"/>
-                </a:solidFill>
-                <a:miter lim="800000"/>
-                <a:headEnd/>
-                <a:tailEnd/>
-              </a14:hiddenLine>
-            </a:ext>
-            <a:ext uri="{AF507438-7753-43E0-B8FC-AC1667EBCBE1}">
-              <a14:hiddenEffects xmlns:a14="http://schemas.microsoft.com/office/drawing/2010/main" xmlns="">
-                <a:effectLst>
-                  <a:outerShdw dist="35921" dir="2700000" algn="ctr" rotWithShape="0">
-                    <a:schemeClr val="bg2"/>
-                  </a:outerShdw>
-                </a:effectLst>
-              </a14:hiddenEffects>
-            </a:ext>
-          </a:extLst>
-        </p:spPr>
-        <p:txBody>
-          <a:bodyPr vert="horz" wrap="none" lIns="91440" tIns="45720" rIns="91440" bIns="45720" numCol="1" anchor="ctr" anchorCtr="0" compatLnSpc="1">
-            <a:prstTxWarp prst="textNoShape">
-              <a:avLst/>
-            </a:prstTxWarp>
-            <a:spAutoFit/>
-          </a:bodyPr>
-          <a:lstStyle/>
-          <a:p>
-            <a:endParaRPr lang="en-US"/>
           </a:p>
         </p:txBody>
       </p:sp>
     </p:spTree>
     <p:extLst>
       <p:ext uri="{BB962C8B-B14F-4D97-AF65-F5344CB8AC3E}">
-        <p14:creationId xmlns:p14="http://schemas.microsoft.com/office/powerpoint/2010/main" xmlns="" val="2798939284"/>
+        <p14:creationId xmlns="" xmlns:p14="http://schemas.microsoft.com/office/powerpoint/2010/main" val="1459248129"/>
       </p:ext>
     </p:extLst>
   </p:cSld>
@@ -14351,7 +14185,7 @@
           <a:p>
             <a:r>
               <a:rPr lang="en-US" dirty="0" smtClean="0"/>
-              <a:t>SPMP</a:t>
+              <a:t>SRS</a:t>
             </a:r>
             <a:endParaRPr lang="en-US" dirty="0"/>
           </a:p>
@@ -14380,14 +14214,14 @@
           <a:effectLst/>
           <a:extLst>
             <a:ext uri="{909E8E84-426E-40DD-AFC4-6F175D3DCCD1}">
-              <a14:hiddenFill xmlns:a14="http://schemas.microsoft.com/office/drawing/2010/main" xmlns="">
+              <a14:hiddenFill xmlns="" xmlns:a14="http://schemas.microsoft.com/office/drawing/2010/main">
                 <a:solidFill>
                   <a:schemeClr val="accent1"/>
                 </a:solidFill>
               </a14:hiddenFill>
             </a:ext>
             <a:ext uri="{91240B29-F687-4F45-9708-019B960494DF}">
-              <a14:hiddenLine xmlns:a14="http://schemas.microsoft.com/office/drawing/2010/main" xmlns="" w="9525">
+              <a14:hiddenLine xmlns="" xmlns:a14="http://schemas.microsoft.com/office/drawing/2010/main" w="9525">
                 <a:solidFill>
                   <a:schemeClr val="tx1"/>
                 </a:solidFill>
@@ -14397,7 +14231,7 @@
               </a14:hiddenLine>
             </a:ext>
             <a:ext uri="{AF507438-7753-43E0-B8FC-AC1667EBCBE1}">
-              <a14:hiddenEffects xmlns:a14="http://schemas.microsoft.com/office/drawing/2010/main" xmlns="">
+              <a14:hiddenEffects xmlns="" xmlns:a14="http://schemas.microsoft.com/office/drawing/2010/main">
                 <a:effectLst>
                   <a:outerShdw dist="35921" dir="2700000" algn="ctr" rotWithShape="0">
                     <a:schemeClr val="bg2"/>
@@ -14420,73 +14254,10 @@
           </a:p>
         </p:txBody>
       </p:sp>
-      <p:sp>
-        <p:nvSpPr>
-          <p:cNvPr id="5" name="Rectangle 2"/>
-          <p:cNvSpPr>
-            <a:spLocks noChangeArrowheads="1"/>
-          </p:cNvSpPr>
-          <p:nvPr/>
-        </p:nvSpPr>
-        <p:spPr bwMode="auto">
-          <a:xfrm>
-            <a:off x="0" y="0"/>
-            <a:ext cx="9144000" cy="0"/>
-          </a:xfrm>
-          <a:prstGeom prst="rect">
-            <a:avLst/>
-          </a:prstGeom>
-          <a:noFill/>
-          <a:ln>
-            <a:noFill/>
-          </a:ln>
-          <a:effectLst/>
-          <a:extLst>
-            <a:ext uri="{909E8E84-426E-40DD-AFC4-6F175D3DCCD1}">
-              <a14:hiddenFill xmlns:a14="http://schemas.microsoft.com/office/drawing/2010/main" xmlns="">
-                <a:solidFill>
-                  <a:schemeClr val="accent1"/>
-                </a:solidFill>
-              </a14:hiddenFill>
-            </a:ext>
-            <a:ext uri="{91240B29-F687-4F45-9708-019B960494DF}">
-              <a14:hiddenLine xmlns:a14="http://schemas.microsoft.com/office/drawing/2010/main" xmlns="" w="9525">
-                <a:solidFill>
-                  <a:schemeClr val="tx1"/>
-                </a:solidFill>
-                <a:miter lim="800000"/>
-                <a:headEnd/>
-                <a:tailEnd/>
-              </a14:hiddenLine>
-            </a:ext>
-            <a:ext uri="{AF507438-7753-43E0-B8FC-AC1667EBCBE1}">
-              <a14:hiddenEffects xmlns:a14="http://schemas.microsoft.com/office/drawing/2010/main" xmlns="">
-                <a:effectLst>
-                  <a:outerShdw dist="35921" dir="2700000" algn="ctr" rotWithShape="0">
-                    <a:schemeClr val="bg2"/>
-                  </a:outerShdw>
-                </a:effectLst>
-              </a14:hiddenEffects>
-            </a:ext>
-          </a:extLst>
-        </p:spPr>
-        <p:txBody>
-          <a:bodyPr vert="horz" wrap="none" lIns="91440" tIns="45720" rIns="91440" bIns="45720" numCol="1" anchor="ctr" anchorCtr="0" compatLnSpc="1">
-            <a:prstTxWarp prst="textNoShape">
-              <a:avLst/>
-            </a:prstTxWarp>
-            <a:spAutoFit/>
-          </a:bodyPr>
-          <a:lstStyle/>
-          <a:p>
-            <a:endParaRPr lang="en-US"/>
-          </a:p>
-        </p:txBody>
-      </p:sp>
     </p:spTree>
     <p:extLst>
       <p:ext uri="{BB962C8B-B14F-4D97-AF65-F5344CB8AC3E}">
-        <p14:creationId xmlns:p14="http://schemas.microsoft.com/office/powerpoint/2010/main" xmlns="" val="792481554"/>
+        <p14:creationId xmlns="" xmlns:p14="http://schemas.microsoft.com/office/powerpoint/2010/main" val="224431329"/>
       </p:ext>
     </p:extLst>
   </p:cSld>
@@ -14544,7 +14315,7 @@
           <a:p>
             <a:r>
               <a:rPr lang="en-US" dirty="0" smtClean="0"/>
-              <a:t>User Manual</a:t>
+              <a:t>SDD</a:t>
             </a:r>
             <a:endParaRPr lang="en-US" dirty="0"/>
           </a:p>
@@ -14573,14 +14344,14 @@
           <a:effectLst/>
           <a:extLst>
             <a:ext uri="{909E8E84-426E-40DD-AFC4-6F175D3DCCD1}">
-              <a14:hiddenFill xmlns:a14="http://schemas.microsoft.com/office/drawing/2010/main" xmlns="">
+              <a14:hiddenFill xmlns="" xmlns:a14="http://schemas.microsoft.com/office/drawing/2010/main">
                 <a:solidFill>
                   <a:schemeClr val="accent1"/>
                 </a:solidFill>
               </a14:hiddenFill>
             </a:ext>
             <a:ext uri="{91240B29-F687-4F45-9708-019B960494DF}">
-              <a14:hiddenLine xmlns:a14="http://schemas.microsoft.com/office/drawing/2010/main" xmlns="" w="9525">
+              <a14:hiddenLine xmlns="" xmlns:a14="http://schemas.microsoft.com/office/drawing/2010/main" w="9525">
                 <a:solidFill>
                   <a:schemeClr val="tx1"/>
                 </a:solidFill>
@@ -14590,7 +14361,7 @@
               </a14:hiddenLine>
             </a:ext>
             <a:ext uri="{AF507438-7753-43E0-B8FC-AC1667EBCBE1}">
-              <a14:hiddenEffects xmlns:a14="http://schemas.microsoft.com/office/drawing/2010/main" xmlns="">
+              <a14:hiddenEffects xmlns="" xmlns:a14="http://schemas.microsoft.com/office/drawing/2010/main">
                 <a:effectLst>
                   <a:outerShdw dist="35921" dir="2700000" algn="ctr" rotWithShape="0">
                     <a:schemeClr val="bg2"/>
@@ -14636,14 +14407,14 @@
           <a:effectLst/>
           <a:extLst>
             <a:ext uri="{909E8E84-426E-40DD-AFC4-6F175D3DCCD1}">
-              <a14:hiddenFill xmlns:a14="http://schemas.microsoft.com/office/drawing/2010/main" xmlns="">
+              <a14:hiddenFill xmlns="" xmlns:a14="http://schemas.microsoft.com/office/drawing/2010/main">
                 <a:solidFill>
                   <a:schemeClr val="accent1"/>
                 </a:solidFill>
               </a14:hiddenFill>
             </a:ext>
             <a:ext uri="{91240B29-F687-4F45-9708-019B960494DF}">
-              <a14:hiddenLine xmlns:a14="http://schemas.microsoft.com/office/drawing/2010/main" xmlns="" w="9525">
+              <a14:hiddenLine xmlns="" xmlns:a14="http://schemas.microsoft.com/office/drawing/2010/main" w="9525">
                 <a:solidFill>
                   <a:schemeClr val="tx1"/>
                 </a:solidFill>
@@ -14653,7 +14424,7 @@
               </a14:hiddenLine>
             </a:ext>
             <a:ext uri="{AF507438-7753-43E0-B8FC-AC1667EBCBE1}">
-              <a14:hiddenEffects xmlns:a14="http://schemas.microsoft.com/office/drawing/2010/main" xmlns="">
+              <a14:hiddenEffects xmlns="" xmlns:a14="http://schemas.microsoft.com/office/drawing/2010/main">
                 <a:effectLst>
                   <a:outerShdw dist="35921" dir="2700000" algn="ctr" rotWithShape="0">
                     <a:schemeClr val="bg2"/>
@@ -14676,73 +14447,10 @@
           </a:p>
         </p:txBody>
       </p:sp>
-      <p:sp>
-        <p:nvSpPr>
-          <p:cNvPr id="4" name="Rectangle 2"/>
-          <p:cNvSpPr>
-            <a:spLocks noChangeArrowheads="1"/>
-          </p:cNvSpPr>
-          <p:nvPr/>
-        </p:nvSpPr>
-        <p:spPr bwMode="auto">
-          <a:xfrm>
-            <a:off x="0" y="0"/>
-            <a:ext cx="9144000" cy="0"/>
-          </a:xfrm>
-          <a:prstGeom prst="rect">
-            <a:avLst/>
-          </a:prstGeom>
-          <a:noFill/>
-          <a:ln>
-            <a:noFill/>
-          </a:ln>
-          <a:effectLst/>
-          <a:extLst>
-            <a:ext uri="{909E8E84-426E-40DD-AFC4-6F175D3DCCD1}">
-              <a14:hiddenFill xmlns:a14="http://schemas.microsoft.com/office/drawing/2010/main" xmlns="">
-                <a:solidFill>
-                  <a:schemeClr val="accent1"/>
-                </a:solidFill>
-              </a14:hiddenFill>
-            </a:ext>
-            <a:ext uri="{91240B29-F687-4F45-9708-019B960494DF}">
-              <a14:hiddenLine xmlns:a14="http://schemas.microsoft.com/office/drawing/2010/main" xmlns="" w="9525">
-                <a:solidFill>
-                  <a:schemeClr val="tx1"/>
-                </a:solidFill>
-                <a:miter lim="800000"/>
-                <a:headEnd/>
-                <a:tailEnd/>
-              </a14:hiddenLine>
-            </a:ext>
-            <a:ext uri="{AF507438-7753-43E0-B8FC-AC1667EBCBE1}">
-              <a14:hiddenEffects xmlns:a14="http://schemas.microsoft.com/office/drawing/2010/main" xmlns="">
-                <a:effectLst>
-                  <a:outerShdw dist="35921" dir="2700000" algn="ctr" rotWithShape="0">
-                    <a:schemeClr val="bg2"/>
-                  </a:outerShdw>
-                </a:effectLst>
-              </a14:hiddenEffects>
-            </a:ext>
-          </a:extLst>
-        </p:spPr>
-        <p:txBody>
-          <a:bodyPr vert="horz" wrap="none" lIns="91440" tIns="45720" rIns="91440" bIns="45720" numCol="1" anchor="ctr" anchorCtr="0" compatLnSpc="1">
-            <a:prstTxWarp prst="textNoShape">
-              <a:avLst/>
-            </a:prstTxWarp>
-            <a:spAutoFit/>
-          </a:bodyPr>
-          <a:lstStyle/>
-          <a:p>
-            <a:endParaRPr lang="en-US"/>
-          </a:p>
-        </p:txBody>
-      </p:sp>
     </p:spTree>
     <p:extLst>
       <p:ext uri="{BB962C8B-B14F-4D97-AF65-F5344CB8AC3E}">
-        <p14:creationId xmlns:p14="http://schemas.microsoft.com/office/powerpoint/2010/main" xmlns="" val="2227559208"/>
+        <p14:creationId xmlns="" xmlns:p14="http://schemas.microsoft.com/office/powerpoint/2010/main" val="2798939284"/>
       </p:ext>
     </p:extLst>
   </p:cSld>
@@ -14800,15 +14508,7 @@
           <a:p>
             <a:r>
               <a:rPr lang="en-US" dirty="0" smtClean="0"/>
-              <a:t>System </a:t>
-            </a:r>
-            <a:r>
-              <a:rPr lang="en-US" dirty="0"/>
-              <a:t>M</a:t>
-            </a:r>
-            <a:r>
-              <a:rPr lang="en-US" dirty="0" smtClean="0"/>
-              <a:t>anual</a:t>
+              <a:t>SPMP</a:t>
             </a:r>
             <a:endParaRPr lang="en-US" dirty="0"/>
           </a:p>
@@ -14837,14 +14537,14 @@
           <a:effectLst/>
           <a:extLst>
             <a:ext uri="{909E8E84-426E-40DD-AFC4-6F175D3DCCD1}">
-              <a14:hiddenFill xmlns:a14="http://schemas.microsoft.com/office/drawing/2010/main" xmlns="">
+              <a14:hiddenFill xmlns="" xmlns:a14="http://schemas.microsoft.com/office/drawing/2010/main">
                 <a:solidFill>
                   <a:schemeClr val="accent1"/>
                 </a:solidFill>
               </a14:hiddenFill>
             </a:ext>
             <a:ext uri="{91240B29-F687-4F45-9708-019B960494DF}">
-              <a14:hiddenLine xmlns:a14="http://schemas.microsoft.com/office/drawing/2010/main" xmlns="" w="9525">
+              <a14:hiddenLine xmlns="" xmlns:a14="http://schemas.microsoft.com/office/drawing/2010/main" w="9525">
                 <a:solidFill>
                   <a:schemeClr val="tx1"/>
                 </a:solidFill>
@@ -14854,7 +14554,7 @@
               </a14:hiddenLine>
             </a:ext>
             <a:ext uri="{AF507438-7753-43E0-B8FC-AC1667EBCBE1}">
-              <a14:hiddenEffects xmlns:a14="http://schemas.microsoft.com/office/drawing/2010/main" xmlns="">
+              <a14:hiddenEffects xmlns="" xmlns:a14="http://schemas.microsoft.com/office/drawing/2010/main">
                 <a:effectLst>
                   <a:outerShdw dist="35921" dir="2700000" algn="ctr" rotWithShape="0">
                     <a:schemeClr val="bg2"/>
@@ -14900,14 +14600,14 @@
           <a:effectLst/>
           <a:extLst>
             <a:ext uri="{909E8E84-426E-40DD-AFC4-6F175D3DCCD1}">
-              <a14:hiddenFill xmlns:a14="http://schemas.microsoft.com/office/drawing/2010/main" xmlns="">
+              <a14:hiddenFill xmlns="" xmlns:a14="http://schemas.microsoft.com/office/drawing/2010/main">
                 <a:solidFill>
                   <a:schemeClr val="accent1"/>
                 </a:solidFill>
               </a14:hiddenFill>
             </a:ext>
             <a:ext uri="{91240B29-F687-4F45-9708-019B960494DF}">
-              <a14:hiddenLine xmlns:a14="http://schemas.microsoft.com/office/drawing/2010/main" xmlns="" w="9525">
+              <a14:hiddenLine xmlns="" xmlns:a14="http://schemas.microsoft.com/office/drawing/2010/main" w="9525">
                 <a:solidFill>
                   <a:schemeClr val="tx1"/>
                 </a:solidFill>
@@ -14917,7 +14617,7 @@
               </a14:hiddenLine>
             </a:ext>
             <a:ext uri="{AF507438-7753-43E0-B8FC-AC1667EBCBE1}">
-              <a14:hiddenEffects xmlns:a14="http://schemas.microsoft.com/office/drawing/2010/main" xmlns="">
+              <a14:hiddenEffects xmlns="" xmlns:a14="http://schemas.microsoft.com/office/drawing/2010/main">
                 <a:effectLst>
                   <a:outerShdw dist="35921" dir="2700000" algn="ctr" rotWithShape="0">
                     <a:schemeClr val="bg2"/>
@@ -14940,73 +14640,10 @@
           </a:p>
         </p:txBody>
       </p:sp>
-      <p:sp>
-        <p:nvSpPr>
-          <p:cNvPr id="4" name="Rectangle 2"/>
-          <p:cNvSpPr>
-            <a:spLocks noChangeArrowheads="1"/>
-          </p:cNvSpPr>
-          <p:nvPr/>
-        </p:nvSpPr>
-        <p:spPr bwMode="auto">
-          <a:xfrm>
-            <a:off x="0" y="0"/>
-            <a:ext cx="9144000" cy="0"/>
-          </a:xfrm>
-          <a:prstGeom prst="rect">
-            <a:avLst/>
-          </a:prstGeom>
-          <a:noFill/>
-          <a:ln>
-            <a:noFill/>
-          </a:ln>
-          <a:effectLst/>
-          <a:extLst>
-            <a:ext uri="{909E8E84-426E-40DD-AFC4-6F175D3DCCD1}">
-              <a14:hiddenFill xmlns:a14="http://schemas.microsoft.com/office/drawing/2010/main" xmlns="">
-                <a:solidFill>
-                  <a:schemeClr val="accent1"/>
-                </a:solidFill>
-              </a14:hiddenFill>
-            </a:ext>
-            <a:ext uri="{91240B29-F687-4F45-9708-019B960494DF}">
-              <a14:hiddenLine xmlns:a14="http://schemas.microsoft.com/office/drawing/2010/main" xmlns="" w="9525">
-                <a:solidFill>
-                  <a:schemeClr val="tx1"/>
-                </a:solidFill>
-                <a:miter lim="800000"/>
-                <a:headEnd/>
-                <a:tailEnd/>
-              </a14:hiddenLine>
-            </a:ext>
-            <a:ext uri="{AF507438-7753-43E0-B8FC-AC1667EBCBE1}">
-              <a14:hiddenEffects xmlns:a14="http://schemas.microsoft.com/office/drawing/2010/main" xmlns="">
-                <a:effectLst>
-                  <a:outerShdw dist="35921" dir="2700000" algn="ctr" rotWithShape="0">
-                    <a:schemeClr val="bg2"/>
-                  </a:outerShdw>
-                </a:effectLst>
-              </a14:hiddenEffects>
-            </a:ext>
-          </a:extLst>
-        </p:spPr>
-        <p:txBody>
-          <a:bodyPr vert="horz" wrap="none" lIns="91440" tIns="45720" rIns="91440" bIns="45720" numCol="1" anchor="ctr" anchorCtr="0" compatLnSpc="1">
-            <a:prstTxWarp prst="textNoShape">
-              <a:avLst/>
-            </a:prstTxWarp>
-            <a:spAutoFit/>
-          </a:bodyPr>
-          <a:lstStyle/>
-          <a:p>
-            <a:endParaRPr lang="en-US"/>
-          </a:p>
-        </p:txBody>
-      </p:sp>
     </p:spTree>
     <p:extLst>
       <p:ext uri="{BB962C8B-B14F-4D97-AF65-F5344CB8AC3E}">
-        <p14:creationId xmlns:p14="http://schemas.microsoft.com/office/powerpoint/2010/main" xmlns="" val="273623958"/>
+        <p14:creationId xmlns="" xmlns:p14="http://schemas.microsoft.com/office/powerpoint/2010/main" val="792481554"/>
       </p:ext>
     </p:extLst>
   </p:cSld>
@@ -15052,22 +14689,21 @@
         </p:nvSpPr>
         <p:spPr>
           <a:xfrm>
-            <a:off x="840509" y="3079691"/>
-            <a:ext cx="7430925" cy="638582"/>
+            <a:off x="1043490" y="641291"/>
+            <a:ext cx="7024744" cy="638582"/>
           </a:xfrm>
         </p:spPr>
         <p:txBody>
           <a:bodyPr>
-            <a:noAutofit/>
+            <a:normAutofit fontScale="90000"/>
           </a:bodyPr>
           <a:lstStyle/>
           <a:p>
-            <a:pPr algn="ctr"/>
             <a:r>
-              <a:rPr lang="en-US" sz="7200" dirty="0" smtClean="0"/>
-              <a:t>Q &amp; A</a:t>
+              <a:rPr lang="en-US" dirty="0" smtClean="0"/>
+              <a:t>User Manual</a:t>
             </a:r>
-            <a:endParaRPr lang="en-US" sz="7200" dirty="0"/>
+            <a:endParaRPr lang="en-US" dirty="0"/>
           </a:p>
         </p:txBody>
       </p:sp>
@@ -15094,14 +14730,14 @@
           <a:effectLst/>
           <a:extLst>
             <a:ext uri="{909E8E84-426E-40DD-AFC4-6F175D3DCCD1}">
-              <a14:hiddenFill xmlns:a14="http://schemas.microsoft.com/office/drawing/2010/main" xmlns="">
+              <a14:hiddenFill xmlns="" xmlns:a14="http://schemas.microsoft.com/office/drawing/2010/main">
                 <a:solidFill>
                   <a:schemeClr val="accent1"/>
                 </a:solidFill>
               </a14:hiddenFill>
             </a:ext>
             <a:ext uri="{91240B29-F687-4F45-9708-019B960494DF}">
-              <a14:hiddenLine xmlns:a14="http://schemas.microsoft.com/office/drawing/2010/main" xmlns="" w="9525">
+              <a14:hiddenLine xmlns="" xmlns:a14="http://schemas.microsoft.com/office/drawing/2010/main" w="9525">
                 <a:solidFill>
                   <a:schemeClr val="tx1"/>
                 </a:solidFill>
@@ -15111,7 +14747,7 @@
               </a14:hiddenLine>
             </a:ext>
             <a:ext uri="{AF507438-7753-43E0-B8FC-AC1667EBCBE1}">
-              <a14:hiddenEffects xmlns:a14="http://schemas.microsoft.com/office/drawing/2010/main" xmlns="">
+              <a14:hiddenEffects xmlns="" xmlns:a14="http://schemas.microsoft.com/office/drawing/2010/main">
                 <a:effectLst>
                   <a:outerShdw dist="35921" dir="2700000" algn="ctr" rotWithShape="0">
                     <a:schemeClr val="bg2"/>
@@ -15157,14 +14793,14 @@
           <a:effectLst/>
           <a:extLst>
             <a:ext uri="{909E8E84-426E-40DD-AFC4-6F175D3DCCD1}">
-              <a14:hiddenFill xmlns:a14="http://schemas.microsoft.com/office/drawing/2010/main" xmlns="">
+              <a14:hiddenFill xmlns="" xmlns:a14="http://schemas.microsoft.com/office/drawing/2010/main">
                 <a:solidFill>
                   <a:schemeClr val="accent1"/>
                 </a:solidFill>
               </a14:hiddenFill>
             </a:ext>
             <a:ext uri="{91240B29-F687-4F45-9708-019B960494DF}">
-              <a14:hiddenLine xmlns:a14="http://schemas.microsoft.com/office/drawing/2010/main" xmlns="" w="9525">
+              <a14:hiddenLine xmlns="" xmlns:a14="http://schemas.microsoft.com/office/drawing/2010/main" w="9525">
                 <a:solidFill>
                   <a:schemeClr val="tx1"/>
                 </a:solidFill>
@@ -15174,7 +14810,7 @@
               </a14:hiddenLine>
             </a:ext>
             <a:ext uri="{AF507438-7753-43E0-B8FC-AC1667EBCBE1}">
-              <a14:hiddenEffects xmlns:a14="http://schemas.microsoft.com/office/drawing/2010/main" xmlns="">
+              <a14:hiddenEffects xmlns="" xmlns:a14="http://schemas.microsoft.com/office/drawing/2010/main">
                 <a:effectLst>
                   <a:outerShdw dist="35921" dir="2700000" algn="ctr" rotWithShape="0">
                     <a:schemeClr val="bg2"/>
@@ -15220,14 +14856,14 @@
           <a:effectLst/>
           <a:extLst>
             <a:ext uri="{909E8E84-426E-40DD-AFC4-6F175D3DCCD1}">
-              <a14:hiddenFill xmlns:a14="http://schemas.microsoft.com/office/drawing/2010/main" xmlns="">
+              <a14:hiddenFill xmlns="" xmlns:a14="http://schemas.microsoft.com/office/drawing/2010/main">
                 <a:solidFill>
                   <a:schemeClr val="accent1"/>
                 </a:solidFill>
               </a14:hiddenFill>
             </a:ext>
             <a:ext uri="{91240B29-F687-4F45-9708-019B960494DF}">
-              <a14:hiddenLine xmlns:a14="http://schemas.microsoft.com/office/drawing/2010/main" xmlns="" w="9525">
+              <a14:hiddenLine xmlns="" xmlns:a14="http://schemas.microsoft.com/office/drawing/2010/main" w="9525">
                 <a:solidFill>
                   <a:schemeClr val="tx1"/>
                 </a:solidFill>
@@ -15237,7 +14873,7 @@
               </a14:hiddenLine>
             </a:ext>
             <a:ext uri="{AF507438-7753-43E0-B8FC-AC1667EBCBE1}">
-              <a14:hiddenEffects xmlns:a14="http://schemas.microsoft.com/office/drawing/2010/main" xmlns="">
+              <a14:hiddenEffects xmlns="" xmlns:a14="http://schemas.microsoft.com/office/drawing/2010/main">
                 <a:effectLst>
                   <a:outerShdw dist="35921" dir="2700000" algn="ctr" rotWithShape="0">
                     <a:schemeClr val="bg2"/>
@@ -15263,7 +14899,528 @@
     </p:spTree>
     <p:extLst>
       <p:ext uri="{BB962C8B-B14F-4D97-AF65-F5344CB8AC3E}">
-        <p14:creationId xmlns:p14="http://schemas.microsoft.com/office/powerpoint/2010/main" xmlns="" val="336984967"/>
+        <p14:creationId xmlns="" xmlns:p14="http://schemas.microsoft.com/office/powerpoint/2010/main" val="2227559208"/>
+      </p:ext>
+    </p:extLst>
+  </p:cSld>
+  <p:clrMapOvr>
+    <a:masterClrMapping/>
+  </p:clrMapOvr>
+  <p:timing>
+    <p:tnLst>
+      <p:par>
+        <p:cTn id="1" dur="indefinite" restart="never" nodeType="tmRoot"/>
+      </p:par>
+    </p:tnLst>
+  </p:timing>
+</p:sld>
+</file>
+
+<file path=ppt/slides/slide17.xml><?xml version="1.0" encoding="utf-8"?>
+<p:sld xmlns:a="http://schemas.openxmlformats.org/drawingml/2006/main" xmlns:r="http://schemas.openxmlformats.org/officeDocument/2006/relationships" xmlns:p="http://schemas.openxmlformats.org/presentationml/2006/main">
+  <p:cSld>
+    <p:spTree>
+      <p:nvGrpSpPr>
+        <p:cNvPr id="1" name=""/>
+        <p:cNvGrpSpPr/>
+        <p:nvPr/>
+      </p:nvGrpSpPr>
+      <p:grpSpPr>
+        <a:xfrm>
+          <a:off x="0" y="0"/>
+          <a:ext cx="0" cy="0"/>
+          <a:chOff x="0" y="0"/>
+          <a:chExt cx="0" cy="0"/>
+        </a:xfrm>
+      </p:grpSpPr>
+      <p:sp>
+        <p:nvSpPr>
+          <p:cNvPr id="2" name="Title 1"/>
+          <p:cNvSpPr>
+            <a:spLocks noGrp="1"/>
+          </p:cNvSpPr>
+          <p:nvPr>
+            <p:ph type="title"/>
+          </p:nvPr>
+        </p:nvSpPr>
+        <p:spPr>
+          <a:xfrm>
+            <a:off x="1043490" y="641291"/>
+            <a:ext cx="7024744" cy="638582"/>
+          </a:xfrm>
+        </p:spPr>
+        <p:txBody>
+          <a:bodyPr>
+            <a:normAutofit fontScale="90000"/>
+          </a:bodyPr>
+          <a:lstStyle/>
+          <a:p>
+            <a:r>
+              <a:rPr lang="en-US" dirty="0" smtClean="0"/>
+              <a:t>System </a:t>
+            </a:r>
+            <a:r>
+              <a:rPr lang="en-US" dirty="0"/>
+              <a:t>M</a:t>
+            </a:r>
+            <a:r>
+              <a:rPr lang="en-US" dirty="0" smtClean="0"/>
+              <a:t>anual</a:t>
+            </a:r>
+            <a:endParaRPr lang="en-US" dirty="0"/>
+          </a:p>
+        </p:txBody>
+      </p:sp>
+      <p:sp>
+        <p:nvSpPr>
+          <p:cNvPr id="3" name="Rectangle 2"/>
+          <p:cNvSpPr>
+            <a:spLocks noChangeArrowheads="1"/>
+          </p:cNvSpPr>
+          <p:nvPr/>
+        </p:nvSpPr>
+        <p:spPr bwMode="auto">
+          <a:xfrm>
+            <a:off x="0" y="0"/>
+            <a:ext cx="9144000" cy="0"/>
+          </a:xfrm>
+          <a:prstGeom prst="rect">
+            <a:avLst/>
+          </a:prstGeom>
+          <a:noFill/>
+          <a:ln>
+            <a:noFill/>
+          </a:ln>
+          <a:effectLst/>
+          <a:extLst>
+            <a:ext uri="{909E8E84-426E-40DD-AFC4-6F175D3DCCD1}">
+              <a14:hiddenFill xmlns="" xmlns:a14="http://schemas.microsoft.com/office/drawing/2010/main">
+                <a:solidFill>
+                  <a:schemeClr val="accent1"/>
+                </a:solidFill>
+              </a14:hiddenFill>
+            </a:ext>
+            <a:ext uri="{91240B29-F687-4F45-9708-019B960494DF}">
+              <a14:hiddenLine xmlns="" xmlns:a14="http://schemas.microsoft.com/office/drawing/2010/main" w="9525">
+                <a:solidFill>
+                  <a:schemeClr val="tx1"/>
+                </a:solidFill>
+                <a:miter lim="800000"/>
+                <a:headEnd/>
+                <a:tailEnd/>
+              </a14:hiddenLine>
+            </a:ext>
+            <a:ext uri="{AF507438-7753-43E0-B8FC-AC1667EBCBE1}">
+              <a14:hiddenEffects xmlns="" xmlns:a14="http://schemas.microsoft.com/office/drawing/2010/main">
+                <a:effectLst>
+                  <a:outerShdw dist="35921" dir="2700000" algn="ctr" rotWithShape="0">
+                    <a:schemeClr val="bg2"/>
+                  </a:outerShdw>
+                </a:effectLst>
+              </a14:hiddenEffects>
+            </a:ext>
+          </a:extLst>
+        </p:spPr>
+        <p:txBody>
+          <a:bodyPr vert="horz" wrap="none" lIns="91440" tIns="45720" rIns="91440" bIns="45720" numCol="1" anchor="ctr" anchorCtr="0" compatLnSpc="1">
+            <a:prstTxWarp prst="textNoShape">
+              <a:avLst/>
+            </a:prstTxWarp>
+            <a:spAutoFit/>
+          </a:bodyPr>
+          <a:lstStyle/>
+          <a:p>
+            <a:endParaRPr lang="en-US"/>
+          </a:p>
+        </p:txBody>
+      </p:sp>
+      <p:sp>
+        <p:nvSpPr>
+          <p:cNvPr id="5" name="Rectangle 2"/>
+          <p:cNvSpPr>
+            <a:spLocks noChangeArrowheads="1"/>
+          </p:cNvSpPr>
+          <p:nvPr/>
+        </p:nvSpPr>
+        <p:spPr bwMode="auto">
+          <a:xfrm>
+            <a:off x="0" y="0"/>
+            <a:ext cx="9144000" cy="0"/>
+          </a:xfrm>
+          <a:prstGeom prst="rect">
+            <a:avLst/>
+          </a:prstGeom>
+          <a:noFill/>
+          <a:ln>
+            <a:noFill/>
+          </a:ln>
+          <a:effectLst/>
+          <a:extLst>
+            <a:ext uri="{909E8E84-426E-40DD-AFC4-6F175D3DCCD1}">
+              <a14:hiddenFill xmlns="" xmlns:a14="http://schemas.microsoft.com/office/drawing/2010/main">
+                <a:solidFill>
+                  <a:schemeClr val="accent1"/>
+                </a:solidFill>
+              </a14:hiddenFill>
+            </a:ext>
+            <a:ext uri="{91240B29-F687-4F45-9708-019B960494DF}">
+              <a14:hiddenLine xmlns="" xmlns:a14="http://schemas.microsoft.com/office/drawing/2010/main" w="9525">
+                <a:solidFill>
+                  <a:schemeClr val="tx1"/>
+                </a:solidFill>
+                <a:miter lim="800000"/>
+                <a:headEnd/>
+                <a:tailEnd/>
+              </a14:hiddenLine>
+            </a:ext>
+            <a:ext uri="{AF507438-7753-43E0-B8FC-AC1667EBCBE1}">
+              <a14:hiddenEffects xmlns="" xmlns:a14="http://schemas.microsoft.com/office/drawing/2010/main">
+                <a:effectLst>
+                  <a:outerShdw dist="35921" dir="2700000" algn="ctr" rotWithShape="0">
+                    <a:schemeClr val="bg2"/>
+                  </a:outerShdw>
+                </a:effectLst>
+              </a14:hiddenEffects>
+            </a:ext>
+          </a:extLst>
+        </p:spPr>
+        <p:txBody>
+          <a:bodyPr vert="horz" wrap="none" lIns="91440" tIns="45720" rIns="91440" bIns="45720" numCol="1" anchor="ctr" anchorCtr="0" compatLnSpc="1">
+            <a:prstTxWarp prst="textNoShape">
+              <a:avLst/>
+            </a:prstTxWarp>
+            <a:spAutoFit/>
+          </a:bodyPr>
+          <a:lstStyle/>
+          <a:p>
+            <a:endParaRPr lang="en-US"/>
+          </a:p>
+        </p:txBody>
+      </p:sp>
+      <p:sp>
+        <p:nvSpPr>
+          <p:cNvPr id="4" name="Rectangle 2"/>
+          <p:cNvSpPr>
+            <a:spLocks noChangeArrowheads="1"/>
+          </p:cNvSpPr>
+          <p:nvPr/>
+        </p:nvSpPr>
+        <p:spPr bwMode="auto">
+          <a:xfrm>
+            <a:off x="0" y="0"/>
+            <a:ext cx="9144000" cy="0"/>
+          </a:xfrm>
+          <a:prstGeom prst="rect">
+            <a:avLst/>
+          </a:prstGeom>
+          <a:noFill/>
+          <a:ln>
+            <a:noFill/>
+          </a:ln>
+          <a:effectLst/>
+          <a:extLst>
+            <a:ext uri="{909E8E84-426E-40DD-AFC4-6F175D3DCCD1}">
+              <a14:hiddenFill xmlns="" xmlns:a14="http://schemas.microsoft.com/office/drawing/2010/main">
+                <a:solidFill>
+                  <a:schemeClr val="accent1"/>
+                </a:solidFill>
+              </a14:hiddenFill>
+            </a:ext>
+            <a:ext uri="{91240B29-F687-4F45-9708-019B960494DF}">
+              <a14:hiddenLine xmlns="" xmlns:a14="http://schemas.microsoft.com/office/drawing/2010/main" w="9525">
+                <a:solidFill>
+                  <a:schemeClr val="tx1"/>
+                </a:solidFill>
+                <a:miter lim="800000"/>
+                <a:headEnd/>
+                <a:tailEnd/>
+              </a14:hiddenLine>
+            </a:ext>
+            <a:ext uri="{AF507438-7753-43E0-B8FC-AC1667EBCBE1}">
+              <a14:hiddenEffects xmlns="" xmlns:a14="http://schemas.microsoft.com/office/drawing/2010/main">
+                <a:effectLst>
+                  <a:outerShdw dist="35921" dir="2700000" algn="ctr" rotWithShape="0">
+                    <a:schemeClr val="bg2"/>
+                  </a:outerShdw>
+                </a:effectLst>
+              </a14:hiddenEffects>
+            </a:ext>
+          </a:extLst>
+        </p:spPr>
+        <p:txBody>
+          <a:bodyPr vert="horz" wrap="none" lIns="91440" tIns="45720" rIns="91440" bIns="45720" numCol="1" anchor="ctr" anchorCtr="0" compatLnSpc="1">
+            <a:prstTxWarp prst="textNoShape">
+              <a:avLst/>
+            </a:prstTxWarp>
+            <a:spAutoFit/>
+          </a:bodyPr>
+          <a:lstStyle/>
+          <a:p>
+            <a:endParaRPr lang="en-US"/>
+          </a:p>
+        </p:txBody>
+      </p:sp>
+    </p:spTree>
+    <p:extLst>
+      <p:ext uri="{BB962C8B-B14F-4D97-AF65-F5344CB8AC3E}">
+        <p14:creationId xmlns="" xmlns:p14="http://schemas.microsoft.com/office/powerpoint/2010/main" val="273623958"/>
+      </p:ext>
+    </p:extLst>
+  </p:cSld>
+  <p:clrMapOvr>
+    <a:masterClrMapping/>
+  </p:clrMapOvr>
+  <p:timing>
+    <p:tnLst>
+      <p:par>
+        <p:cTn id="1" dur="indefinite" restart="never" nodeType="tmRoot"/>
+      </p:par>
+    </p:tnLst>
+  </p:timing>
+</p:sld>
+</file>
+
+<file path=ppt/slides/slide18.xml><?xml version="1.0" encoding="utf-8"?>
+<p:sld xmlns:a="http://schemas.openxmlformats.org/drawingml/2006/main" xmlns:r="http://schemas.openxmlformats.org/officeDocument/2006/relationships" xmlns:p="http://schemas.openxmlformats.org/presentationml/2006/main">
+  <p:cSld>
+    <p:spTree>
+      <p:nvGrpSpPr>
+        <p:cNvPr id="1" name=""/>
+        <p:cNvGrpSpPr/>
+        <p:nvPr/>
+      </p:nvGrpSpPr>
+      <p:grpSpPr>
+        <a:xfrm>
+          <a:off x="0" y="0"/>
+          <a:ext cx="0" cy="0"/>
+          <a:chOff x="0" y="0"/>
+          <a:chExt cx="0" cy="0"/>
+        </a:xfrm>
+      </p:grpSpPr>
+      <p:sp>
+        <p:nvSpPr>
+          <p:cNvPr id="2" name="Title 1"/>
+          <p:cNvSpPr>
+            <a:spLocks noGrp="1"/>
+          </p:cNvSpPr>
+          <p:nvPr>
+            <p:ph type="title"/>
+          </p:nvPr>
+        </p:nvSpPr>
+        <p:spPr>
+          <a:xfrm>
+            <a:off x="840509" y="3079691"/>
+            <a:ext cx="7430925" cy="638582"/>
+          </a:xfrm>
+        </p:spPr>
+        <p:txBody>
+          <a:bodyPr>
+            <a:noAutofit/>
+          </a:bodyPr>
+          <a:lstStyle/>
+          <a:p>
+            <a:pPr algn="ctr"/>
+            <a:r>
+              <a:rPr lang="en-US" sz="7200" dirty="0" smtClean="0"/>
+              <a:t>Q &amp; A</a:t>
+            </a:r>
+            <a:endParaRPr lang="en-US" sz="7200" dirty="0"/>
+          </a:p>
+        </p:txBody>
+      </p:sp>
+      <p:sp>
+        <p:nvSpPr>
+          <p:cNvPr id="3" name="Rectangle 2"/>
+          <p:cNvSpPr>
+            <a:spLocks noChangeArrowheads="1"/>
+          </p:cNvSpPr>
+          <p:nvPr/>
+        </p:nvSpPr>
+        <p:spPr bwMode="auto">
+          <a:xfrm>
+            <a:off x="0" y="0"/>
+            <a:ext cx="9144000" cy="0"/>
+          </a:xfrm>
+          <a:prstGeom prst="rect">
+            <a:avLst/>
+          </a:prstGeom>
+          <a:noFill/>
+          <a:ln>
+            <a:noFill/>
+          </a:ln>
+          <a:effectLst/>
+          <a:extLst>
+            <a:ext uri="{909E8E84-426E-40DD-AFC4-6F175D3DCCD1}">
+              <a14:hiddenFill xmlns="" xmlns:a14="http://schemas.microsoft.com/office/drawing/2010/main">
+                <a:solidFill>
+                  <a:schemeClr val="accent1"/>
+                </a:solidFill>
+              </a14:hiddenFill>
+            </a:ext>
+            <a:ext uri="{91240B29-F687-4F45-9708-019B960494DF}">
+              <a14:hiddenLine xmlns="" xmlns:a14="http://schemas.microsoft.com/office/drawing/2010/main" w="9525">
+                <a:solidFill>
+                  <a:schemeClr val="tx1"/>
+                </a:solidFill>
+                <a:miter lim="800000"/>
+                <a:headEnd/>
+                <a:tailEnd/>
+              </a14:hiddenLine>
+            </a:ext>
+            <a:ext uri="{AF507438-7753-43E0-B8FC-AC1667EBCBE1}">
+              <a14:hiddenEffects xmlns="" xmlns:a14="http://schemas.microsoft.com/office/drawing/2010/main">
+                <a:effectLst>
+                  <a:outerShdw dist="35921" dir="2700000" algn="ctr" rotWithShape="0">
+                    <a:schemeClr val="bg2"/>
+                  </a:outerShdw>
+                </a:effectLst>
+              </a14:hiddenEffects>
+            </a:ext>
+          </a:extLst>
+        </p:spPr>
+        <p:txBody>
+          <a:bodyPr vert="horz" wrap="none" lIns="91440" tIns="45720" rIns="91440" bIns="45720" numCol="1" anchor="ctr" anchorCtr="0" compatLnSpc="1">
+            <a:prstTxWarp prst="textNoShape">
+              <a:avLst/>
+            </a:prstTxWarp>
+            <a:spAutoFit/>
+          </a:bodyPr>
+          <a:lstStyle/>
+          <a:p>
+            <a:endParaRPr lang="en-US"/>
+          </a:p>
+        </p:txBody>
+      </p:sp>
+      <p:sp>
+        <p:nvSpPr>
+          <p:cNvPr id="5" name="Rectangle 2"/>
+          <p:cNvSpPr>
+            <a:spLocks noChangeArrowheads="1"/>
+          </p:cNvSpPr>
+          <p:nvPr/>
+        </p:nvSpPr>
+        <p:spPr bwMode="auto">
+          <a:xfrm>
+            <a:off x="0" y="0"/>
+            <a:ext cx="9144000" cy="0"/>
+          </a:xfrm>
+          <a:prstGeom prst="rect">
+            <a:avLst/>
+          </a:prstGeom>
+          <a:noFill/>
+          <a:ln>
+            <a:noFill/>
+          </a:ln>
+          <a:effectLst/>
+          <a:extLst>
+            <a:ext uri="{909E8E84-426E-40DD-AFC4-6F175D3DCCD1}">
+              <a14:hiddenFill xmlns="" xmlns:a14="http://schemas.microsoft.com/office/drawing/2010/main">
+                <a:solidFill>
+                  <a:schemeClr val="accent1"/>
+                </a:solidFill>
+              </a14:hiddenFill>
+            </a:ext>
+            <a:ext uri="{91240B29-F687-4F45-9708-019B960494DF}">
+              <a14:hiddenLine xmlns="" xmlns:a14="http://schemas.microsoft.com/office/drawing/2010/main" w="9525">
+                <a:solidFill>
+                  <a:schemeClr val="tx1"/>
+                </a:solidFill>
+                <a:miter lim="800000"/>
+                <a:headEnd/>
+                <a:tailEnd/>
+              </a14:hiddenLine>
+            </a:ext>
+            <a:ext uri="{AF507438-7753-43E0-B8FC-AC1667EBCBE1}">
+              <a14:hiddenEffects xmlns="" xmlns:a14="http://schemas.microsoft.com/office/drawing/2010/main">
+                <a:effectLst>
+                  <a:outerShdw dist="35921" dir="2700000" algn="ctr" rotWithShape="0">
+                    <a:schemeClr val="bg2"/>
+                  </a:outerShdw>
+                </a:effectLst>
+              </a14:hiddenEffects>
+            </a:ext>
+          </a:extLst>
+        </p:spPr>
+        <p:txBody>
+          <a:bodyPr vert="horz" wrap="none" lIns="91440" tIns="45720" rIns="91440" bIns="45720" numCol="1" anchor="ctr" anchorCtr="0" compatLnSpc="1">
+            <a:prstTxWarp prst="textNoShape">
+              <a:avLst/>
+            </a:prstTxWarp>
+            <a:spAutoFit/>
+          </a:bodyPr>
+          <a:lstStyle/>
+          <a:p>
+            <a:endParaRPr lang="en-US"/>
+          </a:p>
+        </p:txBody>
+      </p:sp>
+      <p:sp>
+        <p:nvSpPr>
+          <p:cNvPr id="4" name="Rectangle 2"/>
+          <p:cNvSpPr>
+            <a:spLocks noChangeArrowheads="1"/>
+          </p:cNvSpPr>
+          <p:nvPr/>
+        </p:nvSpPr>
+        <p:spPr bwMode="auto">
+          <a:xfrm>
+            <a:off x="0" y="0"/>
+            <a:ext cx="9144000" cy="0"/>
+          </a:xfrm>
+          <a:prstGeom prst="rect">
+            <a:avLst/>
+          </a:prstGeom>
+          <a:noFill/>
+          <a:ln>
+            <a:noFill/>
+          </a:ln>
+          <a:effectLst/>
+          <a:extLst>
+            <a:ext uri="{909E8E84-426E-40DD-AFC4-6F175D3DCCD1}">
+              <a14:hiddenFill xmlns="" xmlns:a14="http://schemas.microsoft.com/office/drawing/2010/main">
+                <a:solidFill>
+                  <a:schemeClr val="accent1"/>
+                </a:solidFill>
+              </a14:hiddenFill>
+            </a:ext>
+            <a:ext uri="{91240B29-F687-4F45-9708-019B960494DF}">
+              <a14:hiddenLine xmlns="" xmlns:a14="http://schemas.microsoft.com/office/drawing/2010/main" w="9525">
+                <a:solidFill>
+                  <a:schemeClr val="tx1"/>
+                </a:solidFill>
+                <a:miter lim="800000"/>
+                <a:headEnd/>
+                <a:tailEnd/>
+              </a14:hiddenLine>
+            </a:ext>
+            <a:ext uri="{AF507438-7753-43E0-B8FC-AC1667EBCBE1}">
+              <a14:hiddenEffects xmlns="" xmlns:a14="http://schemas.microsoft.com/office/drawing/2010/main">
+                <a:effectLst>
+                  <a:outerShdw dist="35921" dir="2700000" algn="ctr" rotWithShape="0">
+                    <a:schemeClr val="bg2"/>
+                  </a:outerShdw>
+                </a:effectLst>
+              </a14:hiddenEffects>
+            </a:ext>
+          </a:extLst>
+        </p:spPr>
+        <p:txBody>
+          <a:bodyPr vert="horz" wrap="none" lIns="91440" tIns="45720" rIns="91440" bIns="45720" numCol="1" anchor="ctr" anchorCtr="0" compatLnSpc="1">
+            <a:prstTxWarp prst="textNoShape">
+              <a:avLst/>
+            </a:prstTxWarp>
+            <a:spAutoFit/>
+          </a:bodyPr>
+          <a:lstStyle/>
+          <a:p>
+            <a:endParaRPr lang="en-US"/>
+          </a:p>
+        </p:txBody>
+      </p:sp>
+    </p:spTree>
+    <p:extLst>
+      <p:ext uri="{BB962C8B-B14F-4D97-AF65-F5344CB8AC3E}">
+        <p14:creationId xmlns="" xmlns:p14="http://schemas.microsoft.com/office/powerpoint/2010/main" val="336984967"/>
       </p:ext>
     </p:extLst>
   </p:cSld>
@@ -15307,7 +15464,12 @@
             <p:ph type="title"/>
           </p:nvPr>
         </p:nvSpPr>
-        <p:spPr/>
+        <p:spPr>
+          <a:xfrm>
+            <a:off x="796065" y="286439"/>
+            <a:ext cx="7024744" cy="1143000"/>
+          </a:xfrm>
+        </p:spPr>
         <p:txBody>
           <a:bodyPr>
             <a:normAutofit/>
@@ -15316,7 +15478,7 @@
           <a:p>
             <a:r>
               <a:rPr lang="en-US" dirty="0" smtClean="0"/>
-              <a:t>Project Overview</a:t>
+              <a:t>What is iBudget?</a:t>
             </a:r>
             <a:endParaRPr lang="en-US" dirty="0"/>
           </a:p>
@@ -15332,42 +15494,74 @@
             <p:ph idx="1"/>
           </p:nvPr>
         </p:nvSpPr>
-        <p:spPr/>
+        <p:spPr>
+          <a:xfrm>
+            <a:off x="796065" y="1726841"/>
+            <a:ext cx="6777317" cy="4376504"/>
+          </a:xfrm>
+        </p:spPr>
         <p:txBody>
-          <a:bodyPr/>
+          <a:bodyPr>
+            <a:normAutofit/>
+          </a:bodyPr>
           <a:lstStyle/>
           <a:p>
+            <a:pPr>
+              <a:buNone/>
+            </a:pPr>
+            <a:endParaRPr lang="en-US" dirty="0" smtClean="0"/>
+          </a:p>
+          <a:p>
+            <a:pPr>
+              <a:buNone/>
+            </a:pPr>
             <a:r>
               <a:rPr lang="en-US" dirty="0" smtClean="0"/>
-              <a:t>What is </a:t>
+              <a:t>A web-based personal financial management service designed to:</a:t>
             </a:r>
-            <a:r>
-              <a:rPr lang="en-US" dirty="0" err="1" smtClean="0"/>
-              <a:t>iBudget</a:t>
-            </a:r>
+          </a:p>
+          <a:p>
+            <a:pPr>
+              <a:buNone/>
+            </a:pPr>
+            <a:endParaRPr lang="en-US" dirty="0" smtClean="0"/>
+          </a:p>
+          <a:p>
+            <a:pPr marL="525780" indent="-457200">
+              <a:buFont typeface="Wingdings" pitchFamily="2" charset="2"/>
+              <a:buChar char="Ø"/>
+            </a:pPr>
             <a:r>
               <a:rPr lang="en-US" dirty="0" smtClean="0"/>
-              <a:t>? -1 slide</a:t>
+              <a:t>Keep track of all your financial accounts into one place</a:t>
             </a:r>
           </a:p>
           <a:p>
+            <a:pPr marL="525780" indent="-457200">
+              <a:buFont typeface="Wingdings" pitchFamily="2" charset="2"/>
+              <a:buChar char="Ø"/>
+            </a:pPr>
             <a:r>
               <a:rPr lang="en-US" dirty="0" smtClean="0"/>
-              <a:t>Example of competition – Mint 1 slide</a:t>
+              <a:t>Allow you to set a budget</a:t>
             </a:r>
           </a:p>
           <a:p>
+            <a:pPr marL="525780" indent="-457200">
+              <a:buFont typeface="Wingdings" pitchFamily="2" charset="2"/>
+              <a:buChar char="Ø"/>
+            </a:pPr>
             <a:r>
               <a:rPr lang="en-US" dirty="0" smtClean="0"/>
-              <a:t>Competitive advantage – 1 slide</a:t>
+              <a:t>Manage individual transactions</a:t>
             </a:r>
           </a:p>
           <a:p>
-            <a:r>
-              <a:rPr lang="en-US" dirty="0" smtClean="0"/>
-              <a:t>What is the expected outcome of the project – 1 slide</a:t>
-            </a:r>
-            <a:endParaRPr lang="en-US" dirty="0"/>
+            <a:pPr marL="525780" indent="-457200">
+              <a:buFont typeface="+mj-lt"/>
+              <a:buAutoNum type="alphaUcPeriod"/>
+            </a:pPr>
+            <a:endParaRPr lang="en-US" dirty="0" smtClean="0"/>
           </a:p>
         </p:txBody>
       </p:sp>
@@ -15406,7 +15600,12 @@
             <p:ph type="title"/>
           </p:nvPr>
         </p:nvSpPr>
-        <p:spPr/>
+        <p:spPr>
+          <a:xfrm>
+            <a:off x="796065" y="286439"/>
+            <a:ext cx="7024744" cy="1143000"/>
+          </a:xfrm>
+        </p:spPr>
         <p:txBody>
           <a:bodyPr>
             <a:normAutofit/>
@@ -15415,7 +15614,7 @@
           <a:p>
             <a:r>
               <a:rPr lang="en-US" dirty="0" smtClean="0"/>
-              <a:t>Project Organization</a:t>
+              <a:t>Competition: Mint.com</a:t>
             </a:r>
             <a:endParaRPr lang="en-US" dirty="0"/>
           </a:p>
@@ -15431,34 +15630,72 @@
             <p:ph idx="1"/>
           </p:nvPr>
         </p:nvSpPr>
-        <p:spPr/>
+        <p:spPr>
+          <a:xfrm>
+            <a:off x="3007605" y="1795749"/>
+            <a:ext cx="5640636" cy="2448552"/>
+          </a:xfrm>
+        </p:spPr>
         <p:txBody>
-          <a:bodyPr/>
+          <a:bodyPr>
+            <a:normAutofit/>
+          </a:bodyPr>
           <a:lstStyle/>
           <a:p>
             <a:r>
               <a:rPr lang="en-US" dirty="0" smtClean="0"/>
-              <a:t>Process Model – Unified Process</a:t>
+              <a:t>See all accounts</a:t>
             </a:r>
+            <a:endParaRPr lang="en-US" dirty="0" smtClean="0"/>
           </a:p>
           <a:p>
             <a:r>
               <a:rPr lang="en-US" dirty="0" smtClean="0"/>
-              <a:t>Organizational Structure</a:t>
+              <a:t>Auto categorization</a:t>
             </a:r>
-          </a:p>
-          <a:p>
-            <a:pPr>
-              <a:buNone/>
-            </a:pPr>
+            <a:endParaRPr lang="en-US" dirty="0" smtClean="0"/>
+          </a:p>
+          <a:p>
             <a:r>
               <a:rPr lang="en-US" dirty="0" smtClean="0"/>
-              <a:t> </a:t>
+              <a:t>Timely alerts to email and phone</a:t>
+            </a:r>
+          </a:p>
+          <a:p>
+            <a:r>
+              <a:rPr lang="en-US" dirty="0" smtClean="0"/>
+              <a:t>Helpful graphs</a:t>
             </a:r>
             <a:endParaRPr lang="en-US" dirty="0"/>
           </a:p>
         </p:txBody>
       </p:sp>
+      <p:pic>
+        <p:nvPicPr>
+          <p:cNvPr id="16386" name="Picture 2" descr="File:Mintcom.png"/>
+          <p:cNvPicPr>
+            <a:picLocks noChangeAspect="1" noChangeArrowheads="1"/>
+          </p:cNvPicPr>
+          <p:nvPr/>
+        </p:nvPicPr>
+        <p:blipFill>
+          <a:blip r:embed="rId2" cstate="print"/>
+          <a:srcRect/>
+          <a:stretch>
+            <a:fillRect/>
+          </a:stretch>
+        </p:blipFill>
+        <p:spPr bwMode="auto">
+          <a:xfrm>
+            <a:off x="-283322" y="2310735"/>
+            <a:ext cx="7620000" cy="5715000"/>
+          </a:xfrm>
+          <a:prstGeom prst="rect">
+            <a:avLst/>
+          </a:prstGeom>
+          <a:noFill/>
+        </p:spPr>
+      </p:pic>
     </p:spTree>
   </p:cSld>
   <p:clrMapOvr>
@@ -15494,61 +15731,219 @@
             <p:ph type="title"/>
           </p:nvPr>
         </p:nvSpPr>
-        <p:spPr/>
+        <p:spPr>
+          <a:xfrm>
+            <a:off x="796065" y="286439"/>
+            <a:ext cx="7024744" cy="1143000"/>
+          </a:xfrm>
+        </p:spPr>
         <p:txBody>
-          <a:bodyPr/>
+          <a:bodyPr>
+            <a:normAutofit/>
+          </a:bodyPr>
           <a:lstStyle/>
           <a:p>
             <a:r>
               <a:rPr lang="en-US" dirty="0" smtClean="0"/>
-              <a:t>M</a:t>
-            </a:r>
-            <a:r>
-              <a:rPr lang="en-US" dirty="0" smtClean="0"/>
-              <a:t>anagement Process</a:t>
+              <a:t>Competitive Advantage</a:t>
             </a:r>
             <a:endParaRPr lang="en-US" dirty="0"/>
+          </a:p>
+        </p:txBody>
+      </p:sp>
+      <p:pic>
+        <p:nvPicPr>
+          <p:cNvPr id="16386" name="Picture 2" descr="File:Mintcom.png"/>
+          <p:cNvPicPr>
+            <a:picLocks noChangeAspect="1" noChangeArrowheads="1"/>
+          </p:cNvPicPr>
+          <p:nvPr/>
+        </p:nvPicPr>
+        <p:blipFill>
+          <a:blip r:embed="rId2" cstate="print"/>
+          <a:srcRect/>
+          <a:stretch>
+            <a:fillRect/>
+          </a:stretch>
+        </p:blipFill>
+        <p:spPr bwMode="auto">
+          <a:xfrm>
+            <a:off x="5073789" y="1293519"/>
+            <a:ext cx="2747020" cy="2060265"/>
+          </a:xfrm>
+          <a:prstGeom prst="rect">
+            <a:avLst/>
+          </a:prstGeom>
+          <a:noFill/>
+        </p:spPr>
+      </p:pic>
+      <p:cxnSp>
+        <p:nvCxnSpPr>
+          <p:cNvPr id="7" name="Straight Connector 6"/>
+          <p:cNvCxnSpPr/>
+          <p:nvPr/>
+        </p:nvCxnSpPr>
+        <p:spPr>
+          <a:xfrm>
+            <a:off x="4639733" y="1738489"/>
+            <a:ext cx="0" cy="4312355"/>
+          </a:xfrm>
+          <a:prstGeom prst="line">
+            <a:avLst/>
+          </a:prstGeom>
+        </p:spPr>
+        <p:style>
+          <a:lnRef idx="3">
+            <a:schemeClr val="accent1"/>
+          </a:lnRef>
+          <a:fillRef idx="0">
+            <a:schemeClr val="accent1"/>
+          </a:fillRef>
+          <a:effectRef idx="2">
+            <a:schemeClr val="accent1"/>
+          </a:effectRef>
+          <a:fontRef idx="minor">
+            <a:schemeClr val="tx1"/>
+          </a:fontRef>
+        </p:style>
+      </p:cxnSp>
+      <p:sp>
+        <p:nvSpPr>
+          <p:cNvPr id="8" name="Rectangle 7"/>
+          <p:cNvSpPr/>
+          <p:nvPr/>
+        </p:nvSpPr>
+        <p:spPr>
+          <a:xfrm>
+            <a:off x="1546829" y="1894901"/>
+            <a:ext cx="2097049" cy="707886"/>
+          </a:xfrm>
+          <a:prstGeom prst="rect">
+            <a:avLst/>
+          </a:prstGeom>
+        </p:spPr>
+        <p:txBody>
+          <a:bodyPr wrap="none">
+            <a:spAutoFit/>
+          </a:bodyPr>
+          <a:lstStyle/>
+          <a:p>
+            <a:r>
+              <a:rPr lang="en-US" sz="4000" b="1" dirty="0" smtClean="0">
+                <a:solidFill>
+                  <a:schemeClr val="accent1"/>
+                </a:solidFill>
+                <a:latin typeface="+mj-lt"/>
+                <a:ea typeface="+mj-ea"/>
+                <a:cs typeface="+mj-cs"/>
+              </a:rPr>
+              <a:t>iBudget</a:t>
+            </a:r>
           </a:p>
         </p:txBody>
       </p:sp>
       <p:sp>
         <p:nvSpPr>
-          <p:cNvPr id="3" name="Content Placeholder 2"/>
-          <p:cNvSpPr>
-            <a:spLocks noGrp="1"/>
-          </p:cNvSpPr>
-          <p:nvPr>
-            <p:ph idx="1"/>
-          </p:nvPr>
+          <p:cNvPr id="9" name="TextBox 8"/>
+          <p:cNvSpPr txBox="1"/>
+          <p:nvPr/>
         </p:nvSpPr>
-        <p:spPr/>
+        <p:spPr>
+          <a:xfrm>
+            <a:off x="796065" y="2984452"/>
+            <a:ext cx="3434412" cy="2031325"/>
+          </a:xfrm>
+          <a:prstGeom prst="rect">
+            <a:avLst/>
+          </a:prstGeom>
+          <a:noFill/>
+        </p:spPr>
         <p:txBody>
-          <a:bodyPr/>
+          <a:bodyPr wrap="square" rtlCol="0">
+            <a:spAutoFit/>
+          </a:bodyPr>
           <a:lstStyle/>
           <a:p>
             <a:r>
               <a:rPr lang="en-US" dirty="0" smtClean="0"/>
-              <a:t>Management Objectives and Priorities</a:t>
+              <a:t>Does NOT require:</a:t>
             </a:r>
           </a:p>
           <a:p>
+            <a:endParaRPr lang="en-US" dirty="0" smtClean="0"/>
+          </a:p>
+          <a:p>
+            <a:pPr marL="342900" indent="-342900">
+              <a:buFont typeface="+mj-lt"/>
+              <a:buAutoNum type="alphaLcParenR"/>
+            </a:pPr>
             <a:r>
               <a:rPr lang="en-US" dirty="0" smtClean="0"/>
-              <a:t>Risk management</a:t>
+              <a:t>A secure connection to a financial institution</a:t>
             </a:r>
           </a:p>
           <a:p>
+            <a:pPr marL="342900" indent="-342900">
+              <a:buFont typeface="+mj-lt"/>
+              <a:buAutoNum type="alphaLcParenR"/>
+            </a:pPr>
+            <a:endParaRPr lang="en-US" dirty="0" smtClean="0"/>
+          </a:p>
+          <a:p>
+            <a:pPr marL="342900" indent="-342900">
+              <a:buFont typeface="+mj-lt"/>
+              <a:buAutoNum type="alphaLcParenR"/>
+            </a:pPr>
             <a:r>
               <a:rPr lang="en-US" dirty="0" smtClean="0"/>
-              <a:t>Monitoring and controlling mechanism</a:t>
+              <a:t>Login credentials to a financial institution</a:t>
             </a:r>
           </a:p>
+        </p:txBody>
+      </p:sp>
+      <p:sp>
+        <p:nvSpPr>
+          <p:cNvPr id="10" name="TextBox 9"/>
+          <p:cNvSpPr txBox="1"/>
+          <p:nvPr/>
+        </p:nvSpPr>
+        <p:spPr>
+          <a:xfrm>
+            <a:off x="5073789" y="2984451"/>
+            <a:ext cx="3012592" cy="1200329"/>
+          </a:xfrm>
+          <a:prstGeom prst="rect">
+            <a:avLst/>
+          </a:prstGeom>
+          <a:noFill/>
+        </p:spPr>
+        <p:txBody>
+          <a:bodyPr wrap="square" rtlCol="0">
+            <a:spAutoFit/>
+          </a:bodyPr>
+          <a:lstStyle/>
           <a:p>
             <a:r>
               <a:rPr lang="en-US" dirty="0" smtClean="0"/>
-              <a:t>Staffing Plan</a:t>
+              <a:t>Requires:</a:t>
             </a:r>
-            <a:endParaRPr lang="en-US" dirty="0"/>
+          </a:p>
+          <a:p>
+            <a:endParaRPr lang="en-US" dirty="0" smtClean="0"/>
+          </a:p>
+          <a:p>
+            <a:r>
+              <a:rPr lang="en-US" dirty="0" smtClean="0"/>
+              <a:t>Account credentials to</a:t>
+            </a:r>
+            <a:r>
+              <a:rPr lang="en-US" dirty="0" smtClean="0"/>
+              <a:t> </a:t>
+            </a:r>
+            <a:r>
+              <a:rPr lang="en-US" dirty="0" smtClean="0"/>
+              <a:t>financial institutions</a:t>
+            </a:r>
           </a:p>
         </p:txBody>
       </p:sp>
@@ -15596,7 +15991,7 @@
           <a:p>
             <a:r>
               <a:rPr lang="en-US" dirty="0" smtClean="0"/>
-              <a:t>Resources and Schedule</a:t>
+              <a:t>Project Organization</a:t>
             </a:r>
             <a:endParaRPr lang="en-US" dirty="0"/>
           </a:p>
@@ -15619,19 +16014,23 @@
           <a:p>
             <a:r>
               <a:rPr lang="en-US" dirty="0" smtClean="0"/>
-              <a:t>Budget and resource allocation</a:t>
+              <a:t>Process Model – Unified Process</a:t>
             </a:r>
           </a:p>
           <a:p>
             <a:r>
               <a:rPr lang="en-US" dirty="0" smtClean="0"/>
-              <a:t>Schedule</a:t>
+              <a:t>Organizational Structure</a:t>
             </a:r>
           </a:p>
           <a:p>
             <a:pPr>
               <a:buNone/>
             </a:pPr>
+            <a:r>
+              <a:rPr lang="en-US" dirty="0" smtClean="0"/>
+              <a:t> </a:t>
+            </a:r>
             <a:endParaRPr lang="en-US" dirty="0"/>
           </a:p>
         </p:txBody>
@@ -15676,7 +16075,11 @@
           <a:bodyPr/>
           <a:lstStyle/>
           <a:p>
-            <a:endParaRPr lang="en-US"/>
+            <a:r>
+              <a:rPr lang="en-US" dirty="0" smtClean="0"/>
+              <a:t>Management Process</a:t>
+            </a:r>
+            <a:endParaRPr lang="en-US" dirty="0"/>
           </a:p>
         </p:txBody>
       </p:sp>
@@ -15695,7 +16098,29 @@
           <a:bodyPr/>
           <a:lstStyle/>
           <a:p>
-            <a:endParaRPr lang="en-US"/>
+            <a:r>
+              <a:rPr lang="en-US" dirty="0" smtClean="0"/>
+              <a:t>Management Objectives and Priorities</a:t>
+            </a:r>
+          </a:p>
+          <a:p>
+            <a:r>
+              <a:rPr lang="en-US" dirty="0" smtClean="0"/>
+              <a:t>Risk management</a:t>
+            </a:r>
+          </a:p>
+          <a:p>
+            <a:r>
+              <a:rPr lang="en-US" dirty="0" smtClean="0"/>
+              <a:t>Monitoring and controlling mechanism</a:t>
+            </a:r>
+          </a:p>
+          <a:p>
+            <a:r>
+              <a:rPr lang="en-US" dirty="0" smtClean="0"/>
+              <a:t>Staffing Plan</a:t>
+            </a:r>
+            <a:endParaRPr lang="en-US" dirty="0"/>
           </a:p>
         </p:txBody>
       </p:sp>
@@ -15736,16 +16161,14 @@
         </p:nvSpPr>
         <p:spPr/>
         <p:txBody>
-          <a:bodyPr/>
+          <a:bodyPr>
+            <a:normAutofit/>
+          </a:bodyPr>
           <a:lstStyle/>
           <a:p>
             <a:r>
               <a:rPr lang="en-US" dirty="0" smtClean="0"/>
-              <a:t>Online </a:t>
-            </a:r>
-            <a:r>
-              <a:rPr lang="en-US" dirty="0" err="1" smtClean="0"/>
-              <a:t>Demonstation</a:t>
+              <a:t>Resources and Schedule</a:t>
             </a:r>
             <a:endParaRPr lang="en-US" dirty="0"/>
           </a:p>
@@ -15766,89 +16189,30 @@
           <a:bodyPr/>
           <a:lstStyle/>
           <a:p>
-            <a:endParaRPr lang="en-US" dirty="0" smtClean="0">
-              <a:hlinkClick r:id="rId2"/>
-            </a:endParaRPr>
-          </a:p>
-          <a:p>
-            <a:r>
-              <a:rPr lang="en-US" dirty="0" smtClean="0">
-                <a:hlinkClick r:id="rId2"/>
-              </a:rPr>
-              <a:t>http://ibudget.simplefunctions.com</a:t>
-            </a:r>
-            <a:endParaRPr lang="en-US" dirty="0" smtClean="0"/>
-          </a:p>
-          <a:p>
-            <a:endParaRPr lang="en-US" dirty="0" smtClean="0"/>
-          </a:p>
-          <a:p>
             <a:r>
               <a:rPr lang="en-US" dirty="0" smtClean="0"/>
-              <a:t>We each take turn to show the pages or functionalities that we worked on.</a:t>
+              <a:t>Budget and resource allocation</a:t>
             </a:r>
+          </a:p>
+          <a:p>
+            <a:r>
+              <a:rPr lang="en-US" dirty="0" smtClean="0"/>
+              <a:t>Schedule</a:t>
+            </a:r>
+          </a:p>
+          <a:p>
+            <a:pPr>
+              <a:buNone/>
+            </a:pPr>
             <a:endParaRPr lang="en-US" dirty="0"/>
           </a:p>
         </p:txBody>
       </p:sp>
-      <p:pic>
-        <p:nvPicPr>
-          <p:cNvPr id="1026" name="Picture 2" descr="HTML5-logo.svg"/>
-          <p:cNvPicPr>
-            <a:picLocks noChangeAspect="1" noChangeArrowheads="1"/>
-          </p:cNvPicPr>
-          <p:nvPr/>
-        </p:nvPicPr>
-        <p:blipFill>
-          <a:blip r:embed="rId3" cstate="print">
-            <a:extLst>
-              <a:ext uri="{28A0092B-C50C-407E-A947-70E740481C1C}">
-                <a14:useLocalDpi xmlns:a14="http://schemas.microsoft.com/office/drawing/2010/main" xmlns="" val="0"/>
-              </a:ext>
-            </a:extLst>
-          </a:blip>
-          <a:srcRect/>
-          <a:stretch>
-            <a:fillRect/>
-          </a:stretch>
-        </p:blipFill>
-        <p:spPr bwMode="auto">
-          <a:xfrm>
-            <a:off x="3862602" y="4856334"/>
-            <a:ext cx="1143000" cy="1143001"/>
-          </a:xfrm>
-          <a:prstGeom prst="rect">
-            <a:avLst/>
-          </a:prstGeom>
-          <a:noFill/>
-          <a:extLst>
-            <a:ext uri="{909E8E84-426E-40DD-AFC4-6F175D3DCCD1}">
-              <a14:hiddenFill xmlns:a14="http://schemas.microsoft.com/office/drawing/2010/main" xmlns="">
-                <a:solidFill>
-                  <a:srgbClr val="FFFFFF"/>
-                </a:solidFill>
-              </a14:hiddenFill>
-            </a:ext>
-          </a:extLst>
-        </p:spPr>
-      </p:pic>
     </p:spTree>
-    <p:extLst>
-      <p:ext uri="{BB962C8B-B14F-4D97-AF65-F5344CB8AC3E}">
-        <p14:creationId xmlns:p14="http://schemas.microsoft.com/office/powerpoint/2010/main" xmlns="" val="3832736806"/>
-      </p:ext>
-    </p:extLst>
   </p:cSld>
   <p:clrMapOvr>
     <a:masterClrMapping/>
   </p:clrMapOvr>
-  <p:timing>
-    <p:tnLst>
-      <p:par>
-        <p:cTn id="1" dur="indefinite" restart="never" nodeType="tmRoot"/>
-      </p:par>
-    </p:tnLst>
-  </p:timing>
 </p:sld>
 </file>
 
@@ -15884,11 +16248,7 @@
           <a:bodyPr/>
           <a:lstStyle/>
           <a:p>
-            <a:r>
-              <a:rPr lang="en-US" dirty="0" smtClean="0"/>
-              <a:t>Source Code</a:t>
-            </a:r>
-            <a:endParaRPr lang="en-US" dirty="0"/>
+            <a:endParaRPr lang="en-US"/>
           </a:p>
         </p:txBody>
       </p:sp>
@@ -15902,41 +16262,20 @@
             <p:ph idx="1"/>
           </p:nvPr>
         </p:nvSpPr>
-        <p:spPr>
-          <a:xfrm>
-            <a:off x="1043492" y="2817091"/>
-            <a:ext cx="6777317" cy="3015538"/>
-          </a:xfrm>
-        </p:spPr>
+        <p:spPr/>
         <p:txBody>
           <a:bodyPr/>
           <a:lstStyle/>
           <a:p>
-            <a:r>
-              <a:rPr lang="en-US" dirty="0" smtClean="0"/>
-              <a:t>We can pick out section of source code that we want to show</a:t>
-            </a:r>
-            <a:endParaRPr lang="en-US" dirty="0"/>
+            <a:endParaRPr lang="en-US"/>
           </a:p>
         </p:txBody>
       </p:sp>
     </p:spTree>
-    <p:extLst>
-      <p:ext uri="{BB962C8B-B14F-4D97-AF65-F5344CB8AC3E}">
-        <p14:creationId xmlns:p14="http://schemas.microsoft.com/office/powerpoint/2010/main" xmlns="" val="1092677546"/>
-      </p:ext>
-    </p:extLst>
   </p:cSld>
   <p:clrMapOvr>
     <a:masterClrMapping/>
   </p:clrMapOvr>
-  <p:timing>
-    <p:tnLst>
-      <p:par>
-        <p:cTn id="1" dur="indefinite" restart="never" nodeType="tmRoot"/>
-      </p:par>
-    </p:tnLst>
-  </p:timing>
 </p:sld>
 </file>
 
@@ -15967,30 +16306,108 @@
             <p:ph type="title"/>
           </p:nvPr>
         </p:nvSpPr>
-        <p:spPr>
-          <a:xfrm>
-            <a:off x="1043490" y="1037291"/>
-            <a:ext cx="7024744" cy="638582"/>
-          </a:xfrm>
-        </p:spPr>
+        <p:spPr/>
         <p:txBody>
-          <a:bodyPr>
-            <a:normAutofit fontScale="90000"/>
-          </a:bodyPr>
+          <a:bodyPr/>
           <a:lstStyle/>
           <a:p>
             <a:r>
               <a:rPr lang="en-US" dirty="0" smtClean="0"/>
-              <a:t>API Document</a:t>
+              <a:t>Online </a:t>
+            </a:r>
+            <a:r>
+              <a:rPr lang="en-US" dirty="0" err="1" smtClean="0"/>
+              <a:t>Demonstation</a:t>
             </a:r>
             <a:endParaRPr lang="en-US" dirty="0"/>
           </a:p>
         </p:txBody>
       </p:sp>
+      <p:sp>
+        <p:nvSpPr>
+          <p:cNvPr id="3" name="Content Placeholder 2"/>
+          <p:cNvSpPr>
+            <a:spLocks noGrp="1"/>
+          </p:cNvSpPr>
+          <p:nvPr>
+            <p:ph idx="1"/>
+          </p:nvPr>
+        </p:nvSpPr>
+        <p:spPr/>
+        <p:txBody>
+          <a:bodyPr/>
+          <a:lstStyle/>
+          <a:p>
+            <a:endParaRPr lang="en-US" dirty="0" smtClean="0">
+              <a:hlinkClick r:id="rId2"/>
+            </a:endParaRPr>
+          </a:p>
+          <a:p>
+            <a:r>
+              <a:rPr lang="en-US" dirty="0" smtClean="0">
+                <a:hlinkClick r:id="rId2"/>
+              </a:rPr>
+              <a:t>http://ibudget.simplefunctions.com</a:t>
+            </a:r>
+            <a:endParaRPr lang="en-US" dirty="0" smtClean="0"/>
+          </a:p>
+          <a:p>
+            <a:endParaRPr lang="en-US" dirty="0" smtClean="0"/>
+          </a:p>
+          <a:p>
+            <a:r>
+              <a:rPr lang="en-US" dirty="0" smtClean="0"/>
+              <a:t>We each take turn to show the pages or functionalities that we worked on.</a:t>
+            </a:r>
+            <a:endParaRPr lang="en-US" dirty="0"/>
+          </a:p>
+        </p:txBody>
+      </p:sp>
+      <p:pic>
+        <p:nvPicPr>
+          <p:cNvPr id="1026" name="Picture 2" descr="HTML5-logo.svg"/>
+          <p:cNvPicPr>
+            <a:picLocks noChangeAspect="1" noChangeArrowheads="1"/>
+          </p:cNvPicPr>
+          <p:nvPr/>
+        </p:nvPicPr>
+        <p:blipFill>
+          <a:blip r:embed="rId3" cstate="print">
+            <a:extLst>
+              <a:ext uri="{28A0092B-C50C-407E-A947-70E740481C1C}">
+                <a14:useLocalDpi xmlns="" xmlns:a14="http://schemas.microsoft.com/office/drawing/2010/main" val="0"/>
+              </a:ext>
+            </a:extLst>
+          </a:blip>
+          <a:srcRect/>
+          <a:stretch>
+            <a:fillRect/>
+          </a:stretch>
+        </p:blipFill>
+        <p:spPr bwMode="auto">
+          <a:xfrm>
+            <a:off x="3862602" y="4856334"/>
+            <a:ext cx="1143000" cy="1143001"/>
+          </a:xfrm>
+          <a:prstGeom prst="rect">
+            <a:avLst/>
+          </a:prstGeom>
+          <a:noFill/>
+          <a:extLst>
+            <a:ext uri="{909E8E84-426E-40DD-AFC4-6F175D3DCCD1}">
+              <a14:hiddenFill xmlns="" xmlns:a14="http://schemas.microsoft.com/office/drawing/2010/main">
+                <a:solidFill>
+                  <a:srgbClr val="FFFFFF"/>
+                </a:solidFill>
+              </a14:hiddenFill>
+            </a:ext>
+          </a:extLst>
+        </p:spPr>
+      </p:pic>
     </p:spTree>
     <p:extLst>
       <p:ext uri="{BB962C8B-B14F-4D97-AF65-F5344CB8AC3E}">
-        <p14:creationId xmlns:p14="http://schemas.microsoft.com/office/powerpoint/2010/main" xmlns="" val="3037995522"/>
+        <p14:creationId xmlns="" xmlns:p14="http://schemas.microsoft.com/office/powerpoint/2010/main" val="3832736806"/>
       </p:ext>
     </p:extLst>
   </p:cSld>

</xml_diff>

<commit_message>
Work in Final Presentation.pptx
</commit_message>
<xml_diff>
--- a/deliverables/final/Final Presentation.pptx
+++ b/deliverables/final/Final Presentation.pptx
@@ -18,16 +18,19 @@
     <p:sldId id="270" r:id="rId12"/>
     <p:sldId id="279" r:id="rId13"/>
     <p:sldId id="271" r:id="rId14"/>
-    <p:sldId id="259" r:id="rId15"/>
-    <p:sldId id="257" r:id="rId16"/>
-    <p:sldId id="258" r:id="rId17"/>
-    <p:sldId id="260" r:id="rId18"/>
-    <p:sldId id="261" r:id="rId19"/>
-    <p:sldId id="262" r:id="rId20"/>
-    <p:sldId id="263" r:id="rId21"/>
-    <p:sldId id="264" r:id="rId22"/>
-    <p:sldId id="265" r:id="rId23"/>
-    <p:sldId id="266" r:id="rId24"/>
+    <p:sldId id="280" r:id="rId15"/>
+    <p:sldId id="281" r:id="rId16"/>
+    <p:sldId id="283" r:id="rId17"/>
+    <p:sldId id="284" r:id="rId18"/>
+    <p:sldId id="285" r:id="rId19"/>
+    <p:sldId id="286" r:id="rId20"/>
+    <p:sldId id="287" r:id="rId21"/>
+    <p:sldId id="288" r:id="rId22"/>
+    <p:sldId id="289" r:id="rId23"/>
+    <p:sldId id="282" r:id="rId24"/>
+    <p:sldId id="259" r:id="rId25"/>
+    <p:sldId id="257" r:id="rId26"/>
+    <p:sldId id="266" r:id="rId27"/>
   </p:sldIdLst>
   <p:sldSz cx="9144000" cy="6858000" type="screen4x3"/>
   <p:notesSz cx="6858000" cy="9144000"/>
@@ -22186,10 +22189,16 @@
         </p:nvSpPr>
         <p:spPr/>
         <p:txBody>
-          <a:bodyPr/>
+          <a:bodyPr>
+            <a:normAutofit fontScale="90000"/>
+          </a:bodyPr>
           <a:lstStyle/>
           <a:p>
-            <a:endParaRPr lang="en-US"/>
+            <a:r>
+              <a:rPr lang="en-US" dirty="0" smtClean="0"/>
+              <a:t>Configuration Management and Version Control</a:t>
+            </a:r>
+            <a:endParaRPr lang="en-US" dirty="0"/>
           </a:p>
         </p:txBody>
       </p:sp>
@@ -22205,10 +22214,67 @@
         </p:nvSpPr>
         <p:spPr/>
         <p:txBody>
-          <a:bodyPr/>
+          <a:bodyPr>
+            <a:normAutofit lnSpcReduction="10000"/>
+          </a:bodyPr>
           <a:lstStyle/>
           <a:p>
-            <a:endParaRPr lang="en-US"/>
+            <a:r>
+              <a:rPr lang="en-US" dirty="0" smtClean="0"/>
+              <a:t>Google Project Hosting</a:t>
+            </a:r>
+          </a:p>
+          <a:p>
+            <a:pPr lvl="1">
+              <a:buFont typeface="Wingdings" pitchFamily="2" charset="2"/>
+              <a:buChar char="§"/>
+            </a:pPr>
+            <a:r>
+              <a:rPr lang="en-US" dirty="0" smtClean="0"/>
+              <a:t>Contain all project documents</a:t>
+            </a:r>
+          </a:p>
+          <a:p>
+            <a:r>
+              <a:rPr lang="en-US" dirty="0" smtClean="0"/>
+              <a:t>Configuration summary will be managed in the project wiki </a:t>
+            </a:r>
+          </a:p>
+          <a:p>
+            <a:pPr lvl="1">
+              <a:buFont typeface="Wingdings" pitchFamily="2" charset="2"/>
+              <a:buChar char="§"/>
+            </a:pPr>
+            <a:r>
+              <a:rPr lang="en-US" u="sng" dirty="0" smtClean="0">
+                <a:hlinkClick r:id="rId2"/>
+              </a:rPr>
+              <a:t>http://code.google.com/p/cs679-b1-class-project/w/list</a:t>
+            </a:r>
+            <a:endParaRPr lang="en-US" dirty="0" smtClean="0"/>
+          </a:p>
+          <a:p>
+            <a:r>
+              <a:rPr lang="en-US" dirty="0" err="1" smtClean="0"/>
+              <a:t>svn</a:t>
+            </a:r>
+            <a:r>
+              <a:rPr lang="en-US" dirty="0" smtClean="0"/>
+              <a:t> (from Google Project Hosting)</a:t>
+            </a:r>
+          </a:p>
+          <a:p>
+            <a:pPr lvl="1">
+              <a:buFont typeface="Wingdings" pitchFamily="2" charset="2"/>
+              <a:buChar char="§"/>
+            </a:pPr>
+            <a:r>
+              <a:rPr lang="en-US" dirty="0" smtClean="0"/>
+              <a:t>Used to control versions of all project documents</a:t>
+            </a:r>
+          </a:p>
+          <a:p>
+            <a:endParaRPr lang="en-US" dirty="0"/>
           </a:p>
         </p:txBody>
       </p:sp>
@@ -22249,16 +22315,30 @@
         </p:nvSpPr>
         <p:spPr/>
         <p:txBody>
-          <a:bodyPr/>
+          <a:bodyPr>
+            <a:normAutofit/>
+          </a:bodyPr>
           <a:lstStyle/>
           <a:p>
             <a:r>
-              <a:rPr lang="en-US" dirty="0" smtClean="0"/>
-              <a:t>Online </a:t>
+              <a:rPr lang="en-US" dirty="0" smtClean="0">
+                <a:solidFill>
+                  <a:schemeClr val="bg2">
+                    <a:lumMod val="75000"/>
+                  </a:schemeClr>
+                </a:solidFill>
+              </a:rPr>
+              <a:t>Software </a:t>
             </a:r>
             <a:r>
-              <a:rPr lang="en-US" dirty="0" err="1" smtClean="0"/>
-              <a:t>Demonstation</a:t>
+              <a:rPr lang="en-US" dirty="0" smtClean="0">
+                <a:solidFill>
+                  <a:schemeClr val="bg2">
+                    <a:lumMod val="75000"/>
+                  </a:schemeClr>
+                </a:solidFill>
+              </a:rPr>
+              <a:t>Quality</a:t>
             </a:r>
             <a:endParaRPr lang="en-US" dirty="0"/>
           </a:p>
@@ -22279,89 +22359,15 @@
           <a:bodyPr/>
           <a:lstStyle/>
           <a:p>
-            <a:endParaRPr lang="en-US" dirty="0" smtClean="0">
-              <a:hlinkClick r:id="rId2"/>
-            </a:endParaRPr>
-          </a:p>
-          <a:p>
-            <a:r>
-              <a:rPr lang="en-US" dirty="0" smtClean="0">
-                <a:hlinkClick r:id="rId2"/>
-              </a:rPr>
-              <a:t>http://ibudget.simplefunctions.com</a:t>
-            </a:r>
-            <a:endParaRPr lang="en-US" dirty="0" smtClean="0"/>
-          </a:p>
-          <a:p>
-            <a:endParaRPr lang="en-US" dirty="0" smtClean="0"/>
-          </a:p>
-          <a:p>
-            <a:r>
-              <a:rPr lang="en-US" dirty="0" smtClean="0"/>
-              <a:t>We each take turn to show the pages or functionalities that we worked on.</a:t>
-            </a:r>
-            <a:endParaRPr lang="en-US" dirty="0"/>
+            <a:endParaRPr lang="en-US"/>
           </a:p>
         </p:txBody>
       </p:sp>
-      <p:pic>
-        <p:nvPicPr>
-          <p:cNvPr id="1026" name="Picture 2" descr="HTML5-logo.svg"/>
-          <p:cNvPicPr>
-            <a:picLocks noChangeAspect="1" noChangeArrowheads="1"/>
-          </p:cNvPicPr>
-          <p:nvPr/>
-        </p:nvPicPr>
-        <p:blipFill>
-          <a:blip r:embed="rId3" cstate="print">
-            <a:extLst>
-              <a:ext uri="{28A0092B-C50C-407E-A947-70E740481C1C}">
-                <a14:useLocalDpi xmlns:a14="http://schemas.microsoft.com/office/drawing/2010/main" xmlns="" val="0"/>
-              </a:ext>
-            </a:extLst>
-          </a:blip>
-          <a:srcRect/>
-          <a:stretch>
-            <a:fillRect/>
-          </a:stretch>
-        </p:blipFill>
-        <p:spPr bwMode="auto">
-          <a:xfrm>
-            <a:off x="3862602" y="4856334"/>
-            <a:ext cx="1143000" cy="1143001"/>
-          </a:xfrm>
-          <a:prstGeom prst="rect">
-            <a:avLst/>
-          </a:prstGeom>
-          <a:noFill/>
-          <a:extLst>
-            <a:ext uri="{909E8E84-426E-40DD-AFC4-6F175D3DCCD1}">
-              <a14:hiddenFill xmlns:a14="http://schemas.microsoft.com/office/drawing/2010/main" xmlns="">
-                <a:solidFill>
-                  <a:srgbClr val="FFFFFF"/>
-                </a:solidFill>
-              </a14:hiddenFill>
-            </a:ext>
-          </a:extLst>
-        </p:spPr>
-      </p:pic>
     </p:spTree>
-    <p:extLst>
-      <p:ext uri="{BB962C8B-B14F-4D97-AF65-F5344CB8AC3E}">
-        <p14:creationId xmlns:p14="http://schemas.microsoft.com/office/powerpoint/2010/main" xmlns="" val="3832736806"/>
-      </p:ext>
-    </p:extLst>
   </p:cSld>
   <p:clrMapOvr>
     <a:masterClrMapping/>
   </p:clrMapOvr>
-  <p:timing>
-    <p:tnLst>
-      <p:par>
-        <p:cTn id="1" dur="indefinite" restart="never" nodeType="tmRoot"/>
-      </p:par>
-    </p:tnLst>
-  </p:timing>
 </p:sld>
 </file>
 
@@ -22397,11 +22403,7 @@
           <a:bodyPr/>
           <a:lstStyle/>
           <a:p>
-            <a:r>
-              <a:rPr lang="en-US" dirty="0" smtClean="0"/>
-              <a:t>Source Code</a:t>
-            </a:r>
-            <a:endParaRPr lang="en-US" dirty="0"/>
+            <a:endParaRPr lang="en-US"/>
           </a:p>
         </p:txBody>
       </p:sp>
@@ -22415,41 +22417,20 @@
             <p:ph idx="1"/>
           </p:nvPr>
         </p:nvSpPr>
-        <p:spPr>
-          <a:xfrm>
-            <a:off x="1043492" y="2817091"/>
-            <a:ext cx="6777317" cy="3015538"/>
-          </a:xfrm>
-        </p:spPr>
+        <p:spPr/>
         <p:txBody>
           <a:bodyPr/>
           <a:lstStyle/>
           <a:p>
-            <a:r>
-              <a:rPr lang="en-US" dirty="0" smtClean="0"/>
-              <a:t>We can pick out section of source code that we want to show</a:t>
-            </a:r>
-            <a:endParaRPr lang="en-US" dirty="0"/>
+            <a:endParaRPr lang="en-US"/>
           </a:p>
         </p:txBody>
       </p:sp>
     </p:spTree>
-    <p:extLst>
-      <p:ext uri="{BB962C8B-B14F-4D97-AF65-F5344CB8AC3E}">
-        <p14:creationId xmlns:p14="http://schemas.microsoft.com/office/powerpoint/2010/main" xmlns="" val="1092677546"/>
-      </p:ext>
-    </p:extLst>
   </p:cSld>
   <p:clrMapOvr>
     <a:masterClrMapping/>
   </p:clrMapOvr>
-  <p:timing>
-    <p:tnLst>
-      <p:par>
-        <p:cTn id="1" dur="indefinite" restart="never" nodeType="tmRoot"/>
-      </p:par>
-    </p:tnLst>
-  </p:timing>
 </p:sld>
 </file>
 
@@ -22480,30 +22461,57 @@
             <p:ph type="title"/>
           </p:nvPr>
         </p:nvSpPr>
-        <p:spPr>
-          <a:xfrm>
-            <a:off x="1043490" y="1037291"/>
-            <a:ext cx="7024744" cy="638582"/>
-          </a:xfrm>
-        </p:spPr>
+        <p:spPr/>
         <p:txBody>
-          <a:bodyPr>
-            <a:normAutofit fontScale="90000"/>
-          </a:bodyPr>
+          <a:bodyPr/>
           <a:lstStyle/>
           <a:p>
             <a:r>
               <a:rPr lang="en-US" dirty="0" smtClean="0"/>
-              <a:t>API Document</a:t>
+              <a:t>System Architecture</a:t>
             </a:r>
             <a:endParaRPr lang="en-US" dirty="0"/>
           </a:p>
         </p:txBody>
       </p:sp>
+      <p:pic>
+        <p:nvPicPr>
+          <p:cNvPr id="4" name="Picture" descr="A description..."/>
+          <p:cNvPicPr>
+            <a:picLocks noGrp="1"/>
+          </p:cNvPicPr>
+          <p:nvPr>
+            <p:ph idx="1"/>
+          </p:nvPr>
+        </p:nvPicPr>
+        <p:blipFill>
+          <a:blip r:embed="rId2" cstate="print"/>
+          <a:srcRect/>
+          <a:stretch>
+            <a:fillRect/>
+          </a:stretch>
+        </p:blipFill>
+        <p:spPr bwMode="auto">
+          <a:xfrm>
+            <a:off x="2764631" y="3316287"/>
+            <a:ext cx="3333750" cy="1524000"/>
+          </a:xfrm>
+          <a:prstGeom prst="rect">
+            <a:avLst/>
+          </a:prstGeom>
+          <a:noFill/>
+          <a:ln w="9525">
+            <a:noFill/>
+            <a:miter lim="800000"/>
+            <a:headEnd/>
+            <a:tailEnd/>
+          </a:ln>
+        </p:spPr>
+      </p:pic>
     </p:spTree>
     <p:extLst>
       <p:ext uri="{BB962C8B-B14F-4D97-AF65-F5344CB8AC3E}">
-        <p14:creationId xmlns:p14="http://schemas.microsoft.com/office/powerpoint/2010/main" xmlns="" val="3037995522"/>
+        <p14:creationId xmlns:p14="http://schemas.microsoft.com/office/powerpoint/2010/main" xmlns="" val="3832736806"/>
       </p:ext>
     </p:extLst>
   </p:cSld>
@@ -22547,21 +22555,57 @@
             <p:ph type="title"/>
           </p:nvPr>
         </p:nvSpPr>
-        <p:spPr>
-          <a:xfrm>
-            <a:off x="1043490" y="402565"/>
-            <a:ext cx="7024744" cy="1143000"/>
-          </a:xfrm>
-        </p:spPr>
+        <p:spPr/>
         <p:txBody>
-          <a:bodyPr>
-            <a:normAutofit/>
-          </a:bodyPr>
+          <a:bodyPr/>
           <a:lstStyle/>
           <a:p>
             <a:r>
               <a:rPr lang="en-US" dirty="0" smtClean="0"/>
-              <a:t>STD</a:t>
+              <a:t>Design Patterns</a:t>
+            </a:r>
+            <a:endParaRPr lang="en-US" dirty="0"/>
+          </a:p>
+        </p:txBody>
+      </p:sp>
+      <p:sp>
+        <p:nvSpPr>
+          <p:cNvPr id="3" name="Content Placeholder 2"/>
+          <p:cNvSpPr>
+            <a:spLocks noGrp="1"/>
+          </p:cNvSpPr>
+          <p:nvPr>
+            <p:ph idx="1"/>
+          </p:nvPr>
+        </p:nvSpPr>
+        <p:spPr>
+          <a:xfrm>
+            <a:off x="1043492" y="2817091"/>
+            <a:ext cx="6777317" cy="3015538"/>
+          </a:xfrm>
+        </p:spPr>
+        <p:txBody>
+          <a:bodyPr/>
+          <a:lstStyle/>
+          <a:p>
+            <a:r>
+              <a:rPr lang="en-US" dirty="0" smtClean="0"/>
+              <a:t>Factory</a:t>
+            </a:r>
+          </a:p>
+          <a:p>
+            <a:endParaRPr lang="en-US" dirty="0"/>
+          </a:p>
+          <a:p>
+            <a:endParaRPr lang="en-US" dirty="0" smtClean="0"/>
+          </a:p>
+          <a:p>
+            <a:endParaRPr lang="en-US" dirty="0" smtClean="0"/>
+          </a:p>
+          <a:p>
+            <a:r>
+              <a:rPr lang="en-US" dirty="0" smtClean="0"/>
+              <a:t>Singleton</a:t>
             </a:r>
             <a:endParaRPr lang="en-US" dirty="0"/>
           </a:p>
@@ -22570,7 +22614,7 @@
     </p:spTree>
     <p:extLst>
       <p:ext uri="{BB962C8B-B14F-4D97-AF65-F5344CB8AC3E}">
-        <p14:creationId xmlns:p14="http://schemas.microsoft.com/office/powerpoint/2010/main" xmlns="" val="1459248129"/>
+        <p14:creationId xmlns:p14="http://schemas.microsoft.com/office/powerpoint/2010/main" xmlns="" val="1092677546"/>
       </p:ext>
     </p:extLst>
   </p:cSld>
@@ -22628,12 +22672,225 @@
           <a:p>
             <a:r>
               <a:rPr lang="en-US" dirty="0" smtClean="0"/>
-              <a:t>SRS</a:t>
+              <a:t>Data Description</a:t>
             </a:r>
             <a:endParaRPr lang="en-US" dirty="0"/>
           </a:p>
         </p:txBody>
       </p:sp>
+      <p:pic>
+        <p:nvPicPr>
+          <p:cNvPr id="5" name="Picture" descr="A description..."/>
+          <p:cNvPicPr/>
+          <p:nvPr/>
+        </p:nvPicPr>
+        <p:blipFill>
+          <a:blip r:embed="rId2" cstate="print"/>
+          <a:srcRect/>
+          <a:stretch>
+            <a:fillRect/>
+          </a:stretch>
+        </p:blipFill>
+        <p:spPr bwMode="auto">
+          <a:xfrm>
+            <a:off x="1126617" y="1439603"/>
+            <a:ext cx="6705600" cy="5031740"/>
+          </a:xfrm>
+          <a:prstGeom prst="rect">
+            <a:avLst/>
+          </a:prstGeom>
+          <a:noFill/>
+          <a:ln w="9525">
+            <a:noFill/>
+            <a:miter lim="800000"/>
+            <a:headEnd/>
+            <a:tailEnd/>
+          </a:ln>
+        </p:spPr>
+      </p:pic>
+      <p:sp>
+        <p:nvSpPr>
+          <p:cNvPr id="6" name="Rectangle 5"/>
+          <p:cNvSpPr/>
+          <p:nvPr/>
+        </p:nvSpPr>
+        <p:spPr>
+          <a:xfrm>
+            <a:off x="1251527" y="5747666"/>
+            <a:ext cx="4572000" cy="646331"/>
+          </a:xfrm>
+          <a:prstGeom prst="rect">
+            <a:avLst/>
+          </a:prstGeom>
+        </p:spPr>
+        <p:style>
+          <a:lnRef idx="1">
+            <a:schemeClr val="accent1"/>
+          </a:lnRef>
+          <a:fillRef idx="2">
+            <a:schemeClr val="accent1"/>
+          </a:fillRef>
+          <a:effectRef idx="1">
+            <a:schemeClr val="accent1"/>
+          </a:effectRef>
+          <a:fontRef idx="minor">
+            <a:schemeClr val="dk1"/>
+          </a:fontRef>
+        </p:style>
+        <p:txBody>
+          <a:bodyPr>
+            <a:spAutoFit/>
+          </a:bodyPr>
+          <a:lstStyle/>
+          <a:p>
+            <a:r>
+              <a:rPr lang="en-US" sz="1200" b="1" dirty="0"/>
+              <a:t>A = Auto </a:t>
+            </a:r>
+            <a:r>
+              <a:rPr lang="en-US" sz="1200" b="1" dirty="0" smtClean="0"/>
+              <a:t>Increment;  N </a:t>
+            </a:r>
+            <a:r>
+              <a:rPr lang="en-US" sz="1200" b="1" dirty="0"/>
+              <a:t>= NOT </a:t>
+            </a:r>
+            <a:r>
+              <a:rPr lang="en-US" sz="1200" b="1" dirty="0" smtClean="0"/>
+              <a:t>NULL;  P </a:t>
+            </a:r>
+            <a:r>
+              <a:rPr lang="en-US" sz="1200" b="1" dirty="0"/>
+              <a:t>= Primary Key</a:t>
+            </a:r>
+          </a:p>
+          <a:p>
+            <a:r>
+              <a:rPr lang="en-US" sz="1200" b="1" dirty="0"/>
+              <a:t>U = </a:t>
+            </a:r>
+            <a:r>
+              <a:rPr lang="en-US" sz="1200" b="1" dirty="0" smtClean="0"/>
+              <a:t>Unique;  I  </a:t>
+            </a:r>
+            <a:r>
+              <a:rPr lang="en-US" sz="1200" b="1" dirty="0"/>
+              <a:t>= </a:t>
+            </a:r>
+            <a:r>
+              <a:rPr lang="en-US" sz="1200" b="1" dirty="0" smtClean="0"/>
+              <a:t>Indexed;  D </a:t>
+            </a:r>
+            <a:r>
+              <a:rPr lang="en-US" sz="1200" b="1" dirty="0"/>
+              <a:t>= Has default value assigned</a:t>
+            </a:r>
+          </a:p>
+          <a:p>
+            <a:r>
+              <a:rPr lang="en-US" sz="1200" b="1" dirty="0"/>
+              <a:t>F = Foreign Key</a:t>
+            </a:r>
+          </a:p>
+        </p:txBody>
+      </p:sp>
+    </p:spTree>
+    <p:extLst>
+      <p:ext uri="{BB962C8B-B14F-4D97-AF65-F5344CB8AC3E}">
+        <p14:creationId xmlns:p14="http://schemas.microsoft.com/office/powerpoint/2010/main" xmlns="" val="3037995522"/>
+      </p:ext>
+    </p:extLst>
+  </p:cSld>
+  <p:clrMapOvr>
+    <a:masterClrMapping/>
+  </p:clrMapOvr>
+  <p:timing>
+    <p:tnLst>
+      <p:par>
+        <p:cTn id="1" dur="indefinite" restart="never" nodeType="tmRoot"/>
+      </p:par>
+    </p:tnLst>
+  </p:timing>
+</p:sld>
+</file>
+
+<file path=ppt/slides/slide19.xml><?xml version="1.0" encoding="utf-8"?>
+<p:sld xmlns:a="http://schemas.openxmlformats.org/drawingml/2006/main" xmlns:r="http://schemas.openxmlformats.org/officeDocument/2006/relationships" xmlns:p="http://schemas.openxmlformats.org/presentationml/2006/main">
+  <p:cSld>
+    <p:spTree>
+      <p:nvGrpSpPr>
+        <p:cNvPr id="1" name=""/>
+        <p:cNvGrpSpPr/>
+        <p:nvPr/>
+      </p:nvGrpSpPr>
+      <p:grpSpPr>
+        <a:xfrm>
+          <a:off x="0" y="0"/>
+          <a:ext cx="0" cy="0"/>
+          <a:chOff x="0" y="0"/>
+          <a:chExt cx="0" cy="0"/>
+        </a:xfrm>
+      </p:grpSpPr>
+      <p:sp>
+        <p:nvSpPr>
+          <p:cNvPr id="2" name="Title 1"/>
+          <p:cNvSpPr>
+            <a:spLocks noGrp="1"/>
+          </p:cNvSpPr>
+          <p:nvPr>
+            <p:ph type="title"/>
+          </p:nvPr>
+        </p:nvSpPr>
+        <p:spPr>
+          <a:xfrm>
+            <a:off x="1043490" y="641291"/>
+            <a:ext cx="7024744" cy="638582"/>
+          </a:xfrm>
+        </p:spPr>
+        <p:txBody>
+          <a:bodyPr>
+            <a:normAutofit fontScale="90000"/>
+          </a:bodyPr>
+          <a:lstStyle/>
+          <a:p>
+            <a:r>
+              <a:rPr lang="en-US" dirty="0" smtClean="0"/>
+              <a:t>Human Interface Design</a:t>
+            </a:r>
+            <a:endParaRPr lang="en-US" dirty="0"/>
+          </a:p>
+        </p:txBody>
+      </p:sp>
+      <p:pic>
+        <p:nvPicPr>
+          <p:cNvPr id="7" name="Picture" descr="A description..."/>
+          <p:cNvPicPr/>
+          <p:nvPr/>
+        </p:nvPicPr>
+        <p:blipFill>
+          <a:blip r:embed="rId3" cstate="print"/>
+          <a:srcRect/>
+          <a:stretch>
+            <a:fillRect/>
+          </a:stretch>
+        </p:blipFill>
+        <p:spPr bwMode="auto">
+          <a:xfrm>
+            <a:off x="517236" y="1708727"/>
+            <a:ext cx="4054765" cy="4036291"/>
+          </a:xfrm>
+          <a:prstGeom prst="rect">
+            <a:avLst/>
+          </a:prstGeom>
+          <a:noFill/>
+          <a:ln w="9525">
+            <a:noFill/>
+            <a:miter lim="800000"/>
+            <a:headEnd/>
+            <a:tailEnd/>
+          </a:ln>
+        </p:spPr>
+      </p:pic>
       <p:sp>
         <p:nvSpPr>
           <p:cNvPr id="3" name="Rectangle 2"/>
@@ -22697,203 +22954,36 @@
           </a:p>
         </p:txBody>
       </p:sp>
+      <p:graphicFrame>
+        <p:nvGraphicFramePr>
+          <p:cNvPr id="4" name="Object 3"/>
+          <p:cNvGraphicFramePr>
+            <a:graphicFrameLocks noChangeAspect="1"/>
+          </p:cNvGraphicFramePr>
+          <p:nvPr>
+            <p:extLst>
+              <p:ext uri="{D42A27DB-BD31-4B8C-83A1-F6EECF244321}">
+                <p14:modId xmlns:p14="http://schemas.microsoft.com/office/powerpoint/2010/main" xmlns="" val="99859930"/>
+              </p:ext>
+            </p:extLst>
+          </p:nvPr>
+        </p:nvGraphicFramePr>
+        <p:xfrm>
+          <a:off x="4399912" y="1279872"/>
+          <a:ext cx="4282558" cy="5235227"/>
+        </p:xfrm>
+        <a:graphic>
+          <a:graphicData uri="http://schemas.openxmlformats.org/presentationml/2006/ole">
+            <p:oleObj spid="_x0000_s36866" name="Visio" r:id="rId4" imgW="4580844" imgH="5596830" progId="">
+              <p:embed/>
+            </p:oleObj>
+          </a:graphicData>
+        </a:graphic>
+      </p:graphicFrame>
     </p:spTree>
     <p:extLst>
       <p:ext uri="{BB962C8B-B14F-4D97-AF65-F5344CB8AC3E}">
         <p14:creationId xmlns:p14="http://schemas.microsoft.com/office/powerpoint/2010/main" xmlns="" val="224431329"/>
-      </p:ext>
-    </p:extLst>
-  </p:cSld>
-  <p:clrMapOvr>
-    <a:masterClrMapping/>
-  </p:clrMapOvr>
-  <p:timing>
-    <p:tnLst>
-      <p:par>
-        <p:cTn id="1" dur="indefinite" restart="never" nodeType="tmRoot"/>
-      </p:par>
-    </p:tnLst>
-  </p:timing>
-</p:sld>
-</file>
-
-<file path=ppt/slides/slide19.xml><?xml version="1.0" encoding="utf-8"?>
-<p:sld xmlns:a="http://schemas.openxmlformats.org/drawingml/2006/main" xmlns:r="http://schemas.openxmlformats.org/officeDocument/2006/relationships" xmlns:p="http://schemas.openxmlformats.org/presentationml/2006/main">
-  <p:cSld>
-    <p:spTree>
-      <p:nvGrpSpPr>
-        <p:cNvPr id="1" name=""/>
-        <p:cNvGrpSpPr/>
-        <p:nvPr/>
-      </p:nvGrpSpPr>
-      <p:grpSpPr>
-        <a:xfrm>
-          <a:off x="0" y="0"/>
-          <a:ext cx="0" cy="0"/>
-          <a:chOff x="0" y="0"/>
-          <a:chExt cx="0" cy="0"/>
-        </a:xfrm>
-      </p:grpSpPr>
-      <p:sp>
-        <p:nvSpPr>
-          <p:cNvPr id="2" name="Title 1"/>
-          <p:cNvSpPr>
-            <a:spLocks noGrp="1"/>
-          </p:cNvSpPr>
-          <p:nvPr>
-            <p:ph type="title"/>
-          </p:nvPr>
-        </p:nvSpPr>
-        <p:spPr>
-          <a:xfrm>
-            <a:off x="1043490" y="641291"/>
-            <a:ext cx="7024744" cy="638582"/>
-          </a:xfrm>
-        </p:spPr>
-        <p:txBody>
-          <a:bodyPr>
-            <a:normAutofit fontScale="90000"/>
-          </a:bodyPr>
-          <a:lstStyle/>
-          <a:p>
-            <a:r>
-              <a:rPr lang="en-US" dirty="0" smtClean="0"/>
-              <a:t>SDD</a:t>
-            </a:r>
-            <a:endParaRPr lang="en-US" dirty="0"/>
-          </a:p>
-        </p:txBody>
-      </p:sp>
-      <p:sp>
-        <p:nvSpPr>
-          <p:cNvPr id="3" name="Rectangle 2"/>
-          <p:cNvSpPr>
-            <a:spLocks noChangeArrowheads="1"/>
-          </p:cNvSpPr>
-          <p:nvPr/>
-        </p:nvSpPr>
-        <p:spPr bwMode="auto">
-          <a:xfrm>
-            <a:off x="0" y="0"/>
-            <a:ext cx="9144000" cy="0"/>
-          </a:xfrm>
-          <a:prstGeom prst="rect">
-            <a:avLst/>
-          </a:prstGeom>
-          <a:noFill/>
-          <a:ln>
-            <a:noFill/>
-          </a:ln>
-          <a:effectLst/>
-          <a:extLst>
-            <a:ext uri="{909E8E84-426E-40DD-AFC4-6F175D3DCCD1}">
-              <a14:hiddenFill xmlns:a14="http://schemas.microsoft.com/office/drawing/2010/main" xmlns="">
-                <a:solidFill>
-                  <a:schemeClr val="accent1"/>
-                </a:solidFill>
-              </a14:hiddenFill>
-            </a:ext>
-            <a:ext uri="{91240B29-F687-4F45-9708-019B960494DF}">
-              <a14:hiddenLine xmlns:a14="http://schemas.microsoft.com/office/drawing/2010/main" xmlns="" w="9525">
-                <a:solidFill>
-                  <a:schemeClr val="tx1"/>
-                </a:solidFill>
-                <a:miter lim="800000"/>
-                <a:headEnd/>
-                <a:tailEnd/>
-              </a14:hiddenLine>
-            </a:ext>
-            <a:ext uri="{AF507438-7753-43E0-B8FC-AC1667EBCBE1}">
-              <a14:hiddenEffects xmlns:a14="http://schemas.microsoft.com/office/drawing/2010/main" xmlns="">
-                <a:effectLst>
-                  <a:outerShdw dist="35921" dir="2700000" algn="ctr" rotWithShape="0">
-                    <a:schemeClr val="bg2"/>
-                  </a:outerShdw>
-                </a:effectLst>
-              </a14:hiddenEffects>
-            </a:ext>
-          </a:extLst>
-        </p:spPr>
-        <p:txBody>
-          <a:bodyPr vert="horz" wrap="none" lIns="91440" tIns="45720" rIns="91440" bIns="45720" numCol="1" anchor="ctr" anchorCtr="0" compatLnSpc="1">
-            <a:prstTxWarp prst="textNoShape">
-              <a:avLst/>
-            </a:prstTxWarp>
-            <a:spAutoFit/>
-          </a:bodyPr>
-          <a:lstStyle/>
-          <a:p>
-            <a:endParaRPr lang="en-US"/>
-          </a:p>
-        </p:txBody>
-      </p:sp>
-      <p:sp>
-        <p:nvSpPr>
-          <p:cNvPr id="5" name="Rectangle 2"/>
-          <p:cNvSpPr>
-            <a:spLocks noChangeArrowheads="1"/>
-          </p:cNvSpPr>
-          <p:nvPr/>
-        </p:nvSpPr>
-        <p:spPr bwMode="auto">
-          <a:xfrm>
-            <a:off x="0" y="0"/>
-            <a:ext cx="9144000" cy="0"/>
-          </a:xfrm>
-          <a:prstGeom prst="rect">
-            <a:avLst/>
-          </a:prstGeom>
-          <a:noFill/>
-          <a:ln>
-            <a:noFill/>
-          </a:ln>
-          <a:effectLst/>
-          <a:extLst>
-            <a:ext uri="{909E8E84-426E-40DD-AFC4-6F175D3DCCD1}">
-              <a14:hiddenFill xmlns:a14="http://schemas.microsoft.com/office/drawing/2010/main" xmlns="">
-                <a:solidFill>
-                  <a:schemeClr val="accent1"/>
-                </a:solidFill>
-              </a14:hiddenFill>
-            </a:ext>
-            <a:ext uri="{91240B29-F687-4F45-9708-019B960494DF}">
-              <a14:hiddenLine xmlns:a14="http://schemas.microsoft.com/office/drawing/2010/main" xmlns="" w="9525">
-                <a:solidFill>
-                  <a:schemeClr val="tx1"/>
-                </a:solidFill>
-                <a:miter lim="800000"/>
-                <a:headEnd/>
-                <a:tailEnd/>
-              </a14:hiddenLine>
-            </a:ext>
-            <a:ext uri="{AF507438-7753-43E0-B8FC-AC1667EBCBE1}">
-              <a14:hiddenEffects xmlns:a14="http://schemas.microsoft.com/office/drawing/2010/main" xmlns="">
-                <a:effectLst>
-                  <a:outerShdw dist="35921" dir="2700000" algn="ctr" rotWithShape="0">
-                    <a:schemeClr val="bg2"/>
-                  </a:outerShdw>
-                </a:effectLst>
-              </a14:hiddenEffects>
-            </a:ext>
-          </a:extLst>
-        </p:spPr>
-        <p:txBody>
-          <a:bodyPr vert="horz" wrap="none" lIns="91440" tIns="45720" rIns="91440" bIns="45720" numCol="1" anchor="ctr" anchorCtr="0" compatLnSpc="1">
-            <a:prstTxWarp prst="textNoShape">
-              <a:avLst/>
-            </a:prstTxWarp>
-            <a:spAutoFit/>
-          </a:bodyPr>
-          <a:lstStyle/>
-          <a:p>
-            <a:endParaRPr lang="en-US"/>
-          </a:p>
-        </p:txBody>
-      </p:sp>
-    </p:spTree>
-    <p:extLst>
-      <p:ext uri="{BB962C8B-B14F-4D97-AF65-F5344CB8AC3E}">
-        <p14:creationId xmlns:p14="http://schemas.microsoft.com/office/powerpoint/2010/main" xmlns="" val="2798939284"/>
       </p:ext>
     </p:extLst>
   </p:cSld>
@@ -23087,7 +23177,256 @@
           <a:p>
             <a:r>
               <a:rPr lang="en-US" dirty="0" smtClean="0"/>
-              <a:t>SPMP</a:t>
+              <a:t>Human Interface Design</a:t>
+            </a:r>
+            <a:endParaRPr lang="en-US" dirty="0"/>
+          </a:p>
+        </p:txBody>
+      </p:sp>
+      <p:sp>
+        <p:nvSpPr>
+          <p:cNvPr id="3" name="Rectangle 2"/>
+          <p:cNvSpPr>
+            <a:spLocks noChangeArrowheads="1"/>
+          </p:cNvSpPr>
+          <p:nvPr/>
+        </p:nvSpPr>
+        <p:spPr bwMode="auto">
+          <a:xfrm>
+            <a:off x="0" y="0"/>
+            <a:ext cx="9144000" cy="0"/>
+          </a:xfrm>
+          <a:prstGeom prst="rect">
+            <a:avLst/>
+          </a:prstGeom>
+          <a:noFill/>
+          <a:ln>
+            <a:noFill/>
+          </a:ln>
+          <a:effectLst/>
+          <a:extLst>
+            <a:ext uri="{909E8E84-426E-40DD-AFC4-6F175D3DCCD1}">
+              <a14:hiddenFill xmlns:a14="http://schemas.microsoft.com/office/drawing/2010/main" xmlns="">
+                <a:solidFill>
+                  <a:schemeClr val="accent1"/>
+                </a:solidFill>
+              </a14:hiddenFill>
+            </a:ext>
+            <a:ext uri="{91240B29-F687-4F45-9708-019B960494DF}">
+              <a14:hiddenLine xmlns:a14="http://schemas.microsoft.com/office/drawing/2010/main" xmlns="" w="9525">
+                <a:solidFill>
+                  <a:schemeClr val="tx1"/>
+                </a:solidFill>
+                <a:miter lim="800000"/>
+                <a:headEnd/>
+                <a:tailEnd/>
+              </a14:hiddenLine>
+            </a:ext>
+            <a:ext uri="{AF507438-7753-43E0-B8FC-AC1667EBCBE1}">
+              <a14:hiddenEffects xmlns:a14="http://schemas.microsoft.com/office/drawing/2010/main" xmlns="">
+                <a:effectLst>
+                  <a:outerShdw dist="35921" dir="2700000" algn="ctr" rotWithShape="0">
+                    <a:schemeClr val="bg2"/>
+                  </a:outerShdw>
+                </a:effectLst>
+              </a14:hiddenEffects>
+            </a:ext>
+          </a:extLst>
+        </p:spPr>
+        <p:txBody>
+          <a:bodyPr vert="horz" wrap="none" lIns="91440" tIns="45720" rIns="91440" bIns="45720" numCol="1" anchor="ctr" anchorCtr="0" compatLnSpc="1">
+            <a:prstTxWarp prst="textNoShape">
+              <a:avLst/>
+            </a:prstTxWarp>
+            <a:spAutoFit/>
+          </a:bodyPr>
+          <a:lstStyle/>
+          <a:p>
+            <a:endParaRPr lang="en-US"/>
+          </a:p>
+        </p:txBody>
+      </p:sp>
+      <p:pic>
+        <p:nvPicPr>
+          <p:cNvPr id="6" name="Picture" descr="A description..."/>
+          <p:cNvPicPr/>
+          <p:nvPr/>
+        </p:nvPicPr>
+        <p:blipFill>
+          <a:blip r:embed="rId3" cstate="print"/>
+          <a:srcRect/>
+          <a:stretch>
+            <a:fillRect/>
+          </a:stretch>
+        </p:blipFill>
+        <p:spPr bwMode="auto">
+          <a:xfrm>
+            <a:off x="482600" y="1551710"/>
+            <a:ext cx="6851073" cy="4626436"/>
+          </a:xfrm>
+          <a:prstGeom prst="rect">
+            <a:avLst/>
+          </a:prstGeom>
+          <a:noFill/>
+          <a:ln w="9525">
+            <a:noFill/>
+            <a:miter lim="800000"/>
+            <a:headEnd/>
+            <a:tailEnd/>
+          </a:ln>
+        </p:spPr>
+      </p:pic>
+      <p:sp>
+        <p:nvSpPr>
+          <p:cNvPr id="5" name="Rectangle 2"/>
+          <p:cNvSpPr>
+            <a:spLocks noChangeArrowheads="1"/>
+          </p:cNvSpPr>
+          <p:nvPr/>
+        </p:nvSpPr>
+        <p:spPr bwMode="auto">
+          <a:xfrm>
+            <a:off x="0" y="0"/>
+            <a:ext cx="9144000" cy="0"/>
+          </a:xfrm>
+          <a:prstGeom prst="rect">
+            <a:avLst/>
+          </a:prstGeom>
+          <a:noFill/>
+          <a:ln>
+            <a:noFill/>
+          </a:ln>
+          <a:effectLst/>
+          <a:extLst>
+            <a:ext uri="{909E8E84-426E-40DD-AFC4-6F175D3DCCD1}">
+              <a14:hiddenFill xmlns:a14="http://schemas.microsoft.com/office/drawing/2010/main" xmlns="">
+                <a:solidFill>
+                  <a:schemeClr val="accent1"/>
+                </a:solidFill>
+              </a14:hiddenFill>
+            </a:ext>
+            <a:ext uri="{91240B29-F687-4F45-9708-019B960494DF}">
+              <a14:hiddenLine xmlns:a14="http://schemas.microsoft.com/office/drawing/2010/main" xmlns="" w="9525">
+                <a:solidFill>
+                  <a:schemeClr val="tx1"/>
+                </a:solidFill>
+                <a:miter lim="800000"/>
+                <a:headEnd/>
+                <a:tailEnd/>
+              </a14:hiddenLine>
+            </a:ext>
+            <a:ext uri="{AF507438-7753-43E0-B8FC-AC1667EBCBE1}">
+              <a14:hiddenEffects xmlns:a14="http://schemas.microsoft.com/office/drawing/2010/main" xmlns="">
+                <a:effectLst>
+                  <a:outerShdw dist="35921" dir="2700000" algn="ctr" rotWithShape="0">
+                    <a:schemeClr val="bg2"/>
+                  </a:outerShdw>
+                </a:effectLst>
+              </a14:hiddenEffects>
+            </a:ext>
+          </a:extLst>
+        </p:spPr>
+        <p:txBody>
+          <a:bodyPr vert="horz" wrap="none" lIns="91440" tIns="45720" rIns="91440" bIns="45720" numCol="1" anchor="ctr" anchorCtr="0" compatLnSpc="1">
+            <a:prstTxWarp prst="textNoShape">
+              <a:avLst/>
+            </a:prstTxWarp>
+            <a:spAutoFit/>
+          </a:bodyPr>
+          <a:lstStyle/>
+          <a:p>
+            <a:endParaRPr lang="en-US"/>
+          </a:p>
+        </p:txBody>
+      </p:sp>
+      <p:graphicFrame>
+        <p:nvGraphicFramePr>
+          <p:cNvPr id="8" name="Object 7"/>
+          <p:cNvGraphicFramePr>
+            <a:graphicFrameLocks noChangeAspect="1"/>
+          </p:cNvGraphicFramePr>
+          <p:nvPr>
+            <p:extLst>
+              <p:ext uri="{D42A27DB-BD31-4B8C-83A1-F6EECF244321}">
+                <p14:modId xmlns:p14="http://schemas.microsoft.com/office/powerpoint/2010/main" xmlns="" val="1552680796"/>
+              </p:ext>
+            </p:extLst>
+          </p:nvPr>
+        </p:nvGraphicFramePr>
+        <p:xfrm>
+          <a:off x="7213600" y="933016"/>
+          <a:ext cx="1447800" cy="5324475"/>
+        </p:xfrm>
+        <a:graphic>
+          <a:graphicData uri="http://schemas.openxmlformats.org/presentationml/2006/ole">
+            <p:oleObj spid="_x0000_s37890" name="Visio" r:id="rId4" imgW="1447108" imgH="5311032" progId="">
+              <p:embed/>
+            </p:oleObj>
+          </a:graphicData>
+        </a:graphic>
+      </p:graphicFrame>
+    </p:spTree>
+    <p:extLst>
+      <p:ext uri="{BB962C8B-B14F-4D97-AF65-F5344CB8AC3E}">
+        <p14:creationId xmlns:p14="http://schemas.microsoft.com/office/powerpoint/2010/main" xmlns="" val="2798939284"/>
+      </p:ext>
+    </p:extLst>
+  </p:cSld>
+  <p:clrMapOvr>
+    <a:masterClrMapping/>
+  </p:clrMapOvr>
+  <p:timing>
+    <p:tnLst>
+      <p:par>
+        <p:cTn id="1" dur="indefinite" restart="never" nodeType="tmRoot"/>
+      </p:par>
+    </p:tnLst>
+  </p:timing>
+</p:sld>
+</file>
+
+<file path=ppt/slides/slide21.xml><?xml version="1.0" encoding="utf-8"?>
+<p:sld xmlns:a="http://schemas.openxmlformats.org/drawingml/2006/main" xmlns:r="http://schemas.openxmlformats.org/officeDocument/2006/relationships" xmlns:p="http://schemas.openxmlformats.org/presentationml/2006/main">
+  <p:cSld>
+    <p:spTree>
+      <p:nvGrpSpPr>
+        <p:cNvPr id="1" name=""/>
+        <p:cNvGrpSpPr/>
+        <p:nvPr/>
+      </p:nvGrpSpPr>
+      <p:grpSpPr>
+        <a:xfrm>
+          <a:off x="0" y="0"/>
+          <a:ext cx="0" cy="0"/>
+          <a:chOff x="0" y="0"/>
+          <a:chExt cx="0" cy="0"/>
+        </a:xfrm>
+      </p:grpSpPr>
+      <p:sp>
+        <p:nvSpPr>
+          <p:cNvPr id="2" name="Title 1"/>
+          <p:cNvSpPr>
+            <a:spLocks noGrp="1"/>
+          </p:cNvSpPr>
+          <p:nvPr>
+            <p:ph type="title"/>
+          </p:nvPr>
+        </p:nvSpPr>
+        <p:spPr>
+          <a:xfrm>
+            <a:off x="1043490" y="641291"/>
+            <a:ext cx="7024744" cy="638582"/>
+          </a:xfrm>
+        </p:spPr>
+        <p:txBody>
+          <a:bodyPr>
+            <a:normAutofit fontScale="90000"/>
+          </a:bodyPr>
+          <a:lstStyle/>
+          <a:p>
+            <a:r>
+              <a:rPr lang="en-US" dirty="0" smtClean="0"/>
+              <a:t>Human Interface Design</a:t>
             </a:r>
             <a:endParaRPr lang="en-US" dirty="0"/>
           </a:p>
@@ -23219,6 +23558,66 @@
           </a:p>
         </p:txBody>
       </p:sp>
+      <p:pic>
+        <p:nvPicPr>
+          <p:cNvPr id="7" name="Picture" descr="A description..."/>
+          <p:cNvPicPr/>
+          <p:nvPr/>
+        </p:nvPicPr>
+        <p:blipFill>
+          <a:blip r:embed="rId2" cstate="print"/>
+          <a:srcRect/>
+          <a:stretch>
+            <a:fillRect/>
+          </a:stretch>
+        </p:blipFill>
+        <p:spPr bwMode="auto">
+          <a:xfrm>
+            <a:off x="602990" y="1175904"/>
+            <a:ext cx="5942965" cy="1790700"/>
+          </a:xfrm>
+          <a:prstGeom prst="rect">
+            <a:avLst/>
+          </a:prstGeom>
+          <a:noFill/>
+          <a:ln w="9525">
+            <a:noFill/>
+            <a:miter lim="800000"/>
+            <a:headEnd/>
+            <a:tailEnd/>
+          </a:ln>
+        </p:spPr>
+      </p:pic>
+      <p:pic>
+        <p:nvPicPr>
+          <p:cNvPr id="9" name="Picture" descr="A description..."/>
+          <p:cNvPicPr/>
+          <p:nvPr/>
+        </p:nvPicPr>
+        <p:blipFill>
+          <a:blip r:embed="rId3" cstate="print"/>
+          <a:srcRect/>
+          <a:stretch>
+            <a:fillRect/>
+          </a:stretch>
+        </p:blipFill>
+        <p:spPr bwMode="auto">
+          <a:xfrm>
+            <a:off x="2680854" y="2434012"/>
+            <a:ext cx="5943600" cy="4058920"/>
+          </a:xfrm>
+          <a:prstGeom prst="rect">
+            <a:avLst/>
+          </a:prstGeom>
+          <a:noFill/>
+          <a:ln w="9525">
+            <a:noFill/>
+            <a:miter lim="800000"/>
+            <a:headEnd/>
+            <a:tailEnd/>
+          </a:ln>
+        </p:spPr>
+      </p:pic>
     </p:spTree>
     <p:extLst>
       <p:ext uri="{BB962C8B-B14F-4D97-AF65-F5344CB8AC3E}">
@@ -23239,7 +23638,7 @@
 </p:sld>
 </file>
 
-<file path=ppt/slides/slide21.xml><?xml version="1.0" encoding="utf-8"?>
+<file path=ppt/slides/slide22.xml><?xml version="1.0" encoding="utf-8"?>
 <p:sld xmlns:a="http://schemas.openxmlformats.org/drawingml/2006/main" xmlns:r="http://schemas.openxmlformats.org/officeDocument/2006/relationships" xmlns:p="http://schemas.openxmlformats.org/presentationml/2006/main">
   <p:cSld>
     <p:spTree>
@@ -23280,7 +23679,322 @@
           <a:p>
             <a:r>
               <a:rPr lang="en-US" dirty="0" smtClean="0"/>
-              <a:t>User Manual</a:t>
+              <a:t>Human Interface Design</a:t>
+            </a:r>
+            <a:endParaRPr lang="en-US" dirty="0"/>
+          </a:p>
+        </p:txBody>
+      </p:sp>
+      <p:sp>
+        <p:nvSpPr>
+          <p:cNvPr id="3" name="Rectangle 2"/>
+          <p:cNvSpPr>
+            <a:spLocks noChangeArrowheads="1"/>
+          </p:cNvSpPr>
+          <p:nvPr/>
+        </p:nvSpPr>
+        <p:spPr bwMode="auto">
+          <a:xfrm>
+            <a:off x="0" y="0"/>
+            <a:ext cx="9144000" cy="0"/>
+          </a:xfrm>
+          <a:prstGeom prst="rect">
+            <a:avLst/>
+          </a:prstGeom>
+          <a:noFill/>
+          <a:ln>
+            <a:noFill/>
+          </a:ln>
+          <a:effectLst/>
+          <a:extLst>
+            <a:ext uri="{909E8E84-426E-40DD-AFC4-6F175D3DCCD1}">
+              <a14:hiddenFill xmlns:a14="http://schemas.microsoft.com/office/drawing/2010/main" xmlns="">
+                <a:solidFill>
+                  <a:schemeClr val="accent1"/>
+                </a:solidFill>
+              </a14:hiddenFill>
+            </a:ext>
+            <a:ext uri="{91240B29-F687-4F45-9708-019B960494DF}">
+              <a14:hiddenLine xmlns:a14="http://schemas.microsoft.com/office/drawing/2010/main" xmlns="" w="9525">
+                <a:solidFill>
+                  <a:schemeClr val="tx1"/>
+                </a:solidFill>
+                <a:miter lim="800000"/>
+                <a:headEnd/>
+                <a:tailEnd/>
+              </a14:hiddenLine>
+            </a:ext>
+            <a:ext uri="{AF507438-7753-43E0-B8FC-AC1667EBCBE1}">
+              <a14:hiddenEffects xmlns:a14="http://schemas.microsoft.com/office/drawing/2010/main" xmlns="">
+                <a:effectLst>
+                  <a:outerShdw dist="35921" dir="2700000" algn="ctr" rotWithShape="0">
+                    <a:schemeClr val="bg2"/>
+                  </a:outerShdw>
+                </a:effectLst>
+              </a14:hiddenEffects>
+            </a:ext>
+          </a:extLst>
+        </p:spPr>
+        <p:txBody>
+          <a:bodyPr vert="horz" wrap="none" lIns="91440" tIns="45720" rIns="91440" bIns="45720" numCol="1" anchor="ctr" anchorCtr="0" compatLnSpc="1">
+            <a:prstTxWarp prst="textNoShape">
+              <a:avLst/>
+            </a:prstTxWarp>
+            <a:spAutoFit/>
+          </a:bodyPr>
+          <a:lstStyle/>
+          <a:p>
+            <a:endParaRPr lang="en-US"/>
+          </a:p>
+        </p:txBody>
+      </p:sp>
+      <p:sp>
+        <p:nvSpPr>
+          <p:cNvPr id="5" name="Rectangle 2"/>
+          <p:cNvSpPr>
+            <a:spLocks noChangeArrowheads="1"/>
+          </p:cNvSpPr>
+          <p:nvPr/>
+        </p:nvSpPr>
+        <p:spPr bwMode="auto">
+          <a:xfrm>
+            <a:off x="0" y="0"/>
+            <a:ext cx="9144000" cy="0"/>
+          </a:xfrm>
+          <a:prstGeom prst="rect">
+            <a:avLst/>
+          </a:prstGeom>
+          <a:noFill/>
+          <a:ln>
+            <a:noFill/>
+          </a:ln>
+          <a:effectLst/>
+          <a:extLst>
+            <a:ext uri="{909E8E84-426E-40DD-AFC4-6F175D3DCCD1}">
+              <a14:hiddenFill xmlns:a14="http://schemas.microsoft.com/office/drawing/2010/main" xmlns="">
+                <a:solidFill>
+                  <a:schemeClr val="accent1"/>
+                </a:solidFill>
+              </a14:hiddenFill>
+            </a:ext>
+            <a:ext uri="{91240B29-F687-4F45-9708-019B960494DF}">
+              <a14:hiddenLine xmlns:a14="http://schemas.microsoft.com/office/drawing/2010/main" xmlns="" w="9525">
+                <a:solidFill>
+                  <a:schemeClr val="tx1"/>
+                </a:solidFill>
+                <a:miter lim="800000"/>
+                <a:headEnd/>
+                <a:tailEnd/>
+              </a14:hiddenLine>
+            </a:ext>
+            <a:ext uri="{AF507438-7753-43E0-B8FC-AC1667EBCBE1}">
+              <a14:hiddenEffects xmlns:a14="http://schemas.microsoft.com/office/drawing/2010/main" xmlns="">
+                <a:effectLst>
+                  <a:outerShdw dist="35921" dir="2700000" algn="ctr" rotWithShape="0">
+                    <a:schemeClr val="bg2"/>
+                  </a:outerShdw>
+                </a:effectLst>
+              </a14:hiddenEffects>
+            </a:ext>
+          </a:extLst>
+        </p:spPr>
+        <p:txBody>
+          <a:bodyPr vert="horz" wrap="none" lIns="91440" tIns="45720" rIns="91440" bIns="45720" numCol="1" anchor="ctr" anchorCtr="0" compatLnSpc="1">
+            <a:prstTxWarp prst="textNoShape">
+              <a:avLst/>
+            </a:prstTxWarp>
+            <a:spAutoFit/>
+          </a:bodyPr>
+          <a:lstStyle/>
+          <a:p>
+            <a:endParaRPr lang="en-US"/>
+          </a:p>
+        </p:txBody>
+      </p:sp>
+      <p:pic>
+        <p:nvPicPr>
+          <p:cNvPr id="8" name="Picture 7"/>
+          <p:cNvPicPr/>
+          <p:nvPr/>
+        </p:nvPicPr>
+        <p:blipFill>
+          <a:blip r:embed="rId3" cstate="email">
+            <a:extLst>
+              <a:ext uri="{28A0092B-C50C-407E-A947-70E740481C1C}">
+                <a14:useLocalDpi xmlns:a14="http://schemas.microsoft.com/office/drawing/2010/main" xmlns="" val="0"/>
+              </a:ext>
+            </a:extLst>
+          </a:blip>
+          <a:srcRect/>
+          <a:stretch>
+            <a:fillRect/>
+          </a:stretch>
+        </p:blipFill>
+        <p:spPr bwMode="auto">
+          <a:xfrm>
+            <a:off x="477173" y="2419927"/>
+            <a:ext cx="4981518" cy="2767560"/>
+          </a:xfrm>
+          <a:prstGeom prst="rect">
+            <a:avLst/>
+          </a:prstGeom>
+          <a:noFill/>
+          <a:ln>
+            <a:noFill/>
+          </a:ln>
+        </p:spPr>
+      </p:pic>
+      <p:sp>
+        <p:nvSpPr>
+          <p:cNvPr id="4" name="Rectangle 2"/>
+          <p:cNvSpPr>
+            <a:spLocks noChangeArrowheads="1"/>
+          </p:cNvSpPr>
+          <p:nvPr/>
+        </p:nvSpPr>
+        <p:spPr bwMode="auto">
+          <a:xfrm>
+            <a:off x="0" y="0"/>
+            <a:ext cx="9144000" cy="0"/>
+          </a:xfrm>
+          <a:prstGeom prst="rect">
+            <a:avLst/>
+          </a:prstGeom>
+          <a:noFill/>
+          <a:ln>
+            <a:noFill/>
+          </a:ln>
+          <a:effectLst/>
+          <a:extLst>
+            <a:ext uri="{909E8E84-426E-40DD-AFC4-6F175D3DCCD1}">
+              <a14:hiddenFill xmlns:a14="http://schemas.microsoft.com/office/drawing/2010/main" xmlns="">
+                <a:solidFill>
+                  <a:schemeClr val="accent1"/>
+                </a:solidFill>
+              </a14:hiddenFill>
+            </a:ext>
+            <a:ext uri="{91240B29-F687-4F45-9708-019B960494DF}">
+              <a14:hiddenLine xmlns:a14="http://schemas.microsoft.com/office/drawing/2010/main" xmlns="" w="9525">
+                <a:solidFill>
+                  <a:schemeClr val="tx1"/>
+                </a:solidFill>
+                <a:miter lim="800000"/>
+                <a:headEnd/>
+                <a:tailEnd/>
+              </a14:hiddenLine>
+            </a:ext>
+            <a:ext uri="{AF507438-7753-43E0-B8FC-AC1667EBCBE1}">
+              <a14:hiddenEffects xmlns:a14="http://schemas.microsoft.com/office/drawing/2010/main" xmlns="">
+                <a:effectLst>
+                  <a:outerShdw dist="35921" dir="2700000" algn="ctr" rotWithShape="0">
+                    <a:schemeClr val="bg2"/>
+                  </a:outerShdw>
+                </a:effectLst>
+              </a14:hiddenEffects>
+            </a:ext>
+          </a:extLst>
+        </p:spPr>
+        <p:txBody>
+          <a:bodyPr vert="horz" wrap="none" lIns="91440" tIns="45720" rIns="91440" bIns="45720" numCol="1" anchor="ctr" anchorCtr="0" compatLnSpc="1">
+            <a:prstTxWarp prst="textNoShape">
+              <a:avLst/>
+            </a:prstTxWarp>
+            <a:spAutoFit/>
+          </a:bodyPr>
+          <a:lstStyle/>
+          <a:p>
+            <a:endParaRPr lang="en-US"/>
+          </a:p>
+        </p:txBody>
+      </p:sp>
+      <p:graphicFrame>
+        <p:nvGraphicFramePr>
+          <p:cNvPr id="6" name="Object 5"/>
+          <p:cNvGraphicFramePr>
+            <a:graphicFrameLocks noChangeAspect="1"/>
+          </p:cNvGraphicFramePr>
+          <p:nvPr>
+            <p:extLst>
+              <p:ext uri="{D42A27DB-BD31-4B8C-83A1-F6EECF244321}">
+                <p14:modId xmlns:p14="http://schemas.microsoft.com/office/powerpoint/2010/main" xmlns="" val="3607041668"/>
+              </p:ext>
+            </p:extLst>
+          </p:nvPr>
+        </p:nvGraphicFramePr>
+        <p:xfrm>
+          <a:off x="5458691" y="1279873"/>
+          <a:ext cx="3209925" cy="5086350"/>
+        </p:xfrm>
+        <a:graphic>
+          <a:graphicData uri="http://schemas.openxmlformats.org/presentationml/2006/ole">
+            <p:oleObj spid="_x0000_s38914" name="Visio" r:id="rId4" imgW="3204214" imgH="5082432" progId="">
+              <p:embed/>
+            </p:oleObj>
+          </a:graphicData>
+        </a:graphic>
+      </p:graphicFrame>
+    </p:spTree>
+    <p:extLst>
+      <p:ext uri="{BB962C8B-B14F-4D97-AF65-F5344CB8AC3E}">
+        <p14:creationId xmlns:p14="http://schemas.microsoft.com/office/powerpoint/2010/main" xmlns="" val="2227559208"/>
+      </p:ext>
+    </p:extLst>
+  </p:cSld>
+  <p:clrMapOvr>
+    <a:masterClrMapping/>
+  </p:clrMapOvr>
+  <p:timing>
+    <p:tnLst>
+      <p:par>
+        <p:cTn id="1" dur="indefinite" restart="never" nodeType="tmRoot"/>
+      </p:par>
+    </p:tnLst>
+  </p:timing>
+</p:sld>
+</file>
+
+<file path=ppt/slides/slide23.xml><?xml version="1.0" encoding="utf-8"?>
+<p:sld xmlns:a="http://schemas.openxmlformats.org/drawingml/2006/main" xmlns:r="http://schemas.openxmlformats.org/officeDocument/2006/relationships" xmlns:p="http://schemas.openxmlformats.org/presentationml/2006/main">
+  <p:cSld>
+    <p:spTree>
+      <p:nvGrpSpPr>
+        <p:cNvPr id="1" name=""/>
+        <p:cNvGrpSpPr/>
+        <p:nvPr/>
+      </p:nvGrpSpPr>
+      <p:grpSpPr>
+        <a:xfrm>
+          <a:off x="0" y="0"/>
+          <a:ext cx="0" cy="0"/>
+          <a:chOff x="0" y="0"/>
+          <a:chExt cx="0" cy="0"/>
+        </a:xfrm>
+      </p:grpSpPr>
+      <p:sp>
+        <p:nvSpPr>
+          <p:cNvPr id="2" name="Title 1"/>
+          <p:cNvSpPr>
+            <a:spLocks noGrp="1"/>
+          </p:cNvSpPr>
+          <p:nvPr>
+            <p:ph type="title"/>
+          </p:nvPr>
+        </p:nvSpPr>
+        <p:spPr>
+          <a:xfrm>
+            <a:off x="1043490" y="641291"/>
+            <a:ext cx="7024744" cy="638582"/>
+          </a:xfrm>
+        </p:spPr>
+        <p:txBody>
+          <a:bodyPr>
+            <a:normAutofit fontScale="90000"/>
+          </a:bodyPr>
+          <a:lstStyle/>
+          <a:p>
+            <a:r>
+              <a:rPr lang="en-US" dirty="0" smtClean="0"/>
+              <a:t>Human Interface Design</a:t>
             </a:r>
             <a:endParaRPr lang="en-US" dirty="0"/>
           </a:p>
@@ -23475,10 +24189,70 @@
           </a:p>
         </p:txBody>
       </p:sp>
+      <p:pic>
+        <p:nvPicPr>
+          <p:cNvPr id="9" name="Picture" descr="A description..."/>
+          <p:cNvPicPr/>
+          <p:nvPr/>
+        </p:nvPicPr>
+        <p:blipFill>
+          <a:blip r:embed="rId2" cstate="print"/>
+          <a:srcRect/>
+          <a:stretch>
+            <a:fillRect/>
+          </a:stretch>
+        </p:blipFill>
+        <p:spPr bwMode="auto">
+          <a:xfrm>
+            <a:off x="593436" y="1749483"/>
+            <a:ext cx="5943600" cy="3802380"/>
+          </a:xfrm>
+          <a:prstGeom prst="rect">
+            <a:avLst/>
+          </a:prstGeom>
+          <a:noFill/>
+          <a:ln w="9525">
+            <a:noFill/>
+            <a:miter lim="800000"/>
+            <a:headEnd/>
+            <a:tailEnd/>
+          </a:ln>
+        </p:spPr>
+      </p:pic>
+      <p:pic>
+        <p:nvPicPr>
+          <p:cNvPr id="10" name="Picture" descr="A description..."/>
+          <p:cNvPicPr/>
+          <p:nvPr/>
+        </p:nvPicPr>
+        <p:blipFill>
+          <a:blip r:embed="rId3" cstate="print"/>
+          <a:srcRect/>
+          <a:stretch>
+            <a:fillRect/>
+          </a:stretch>
+        </p:blipFill>
+        <p:spPr bwMode="auto">
+          <a:xfrm>
+            <a:off x="6059055" y="1279873"/>
+            <a:ext cx="2586182" cy="5182998"/>
+          </a:xfrm>
+          <a:prstGeom prst="rect">
+            <a:avLst/>
+          </a:prstGeom>
+          <a:noFill/>
+          <a:ln w="9525">
+            <a:noFill/>
+            <a:miter lim="800000"/>
+            <a:headEnd/>
+            <a:tailEnd/>
+          </a:ln>
+        </p:spPr>
+      </p:pic>
     </p:spTree>
     <p:extLst>
       <p:ext uri="{BB962C8B-B14F-4D97-AF65-F5344CB8AC3E}">
-        <p14:creationId xmlns:p14="http://schemas.microsoft.com/office/powerpoint/2010/main" xmlns="" val="2227559208"/>
+        <p14:creationId xmlns:p14="http://schemas.microsoft.com/office/powerpoint/2010/main" xmlns="" val="273623958"/>
       </p:ext>
     </p:extLst>
   </p:cSld>
@@ -23495,7 +24269,7 @@
 </p:sld>
 </file>
 
-<file path=ppt/slides/slide22.xml><?xml version="1.0" encoding="utf-8"?>
+<file path=ppt/slides/slide24.xml><?xml version="1.0" encoding="utf-8"?>
 <p:sld xmlns:a="http://schemas.openxmlformats.org/drawingml/2006/main" xmlns:r="http://schemas.openxmlformats.org/officeDocument/2006/relationships" xmlns:p="http://schemas.openxmlformats.org/presentationml/2006/main">
   <p:cSld>
     <p:spTree>
@@ -23522,29 +24296,18 @@
             <p:ph type="title"/>
           </p:nvPr>
         </p:nvSpPr>
-        <p:spPr>
-          <a:xfrm>
-            <a:off x="1043490" y="641291"/>
-            <a:ext cx="7024744" cy="638582"/>
-          </a:xfrm>
-        </p:spPr>
+        <p:spPr/>
         <p:txBody>
-          <a:bodyPr>
-            <a:normAutofit fontScale="90000"/>
-          </a:bodyPr>
+          <a:bodyPr/>
           <a:lstStyle/>
           <a:p>
             <a:r>
               <a:rPr lang="en-US" dirty="0" smtClean="0"/>
-              <a:t>System </a:t>
+              <a:t>Online </a:t>
             </a:r>
             <a:r>
-              <a:rPr lang="en-US" dirty="0"/>
-              <a:t>M</a:t>
-            </a:r>
-            <a:r>
-              <a:rPr lang="en-US" dirty="0" smtClean="0"/>
-              <a:t>anual</a:t>
+              <a:rPr lang="en-US" dirty="0" err="1" smtClean="0"/>
+              <a:t>Demonstation</a:t>
             </a:r>
             <a:endParaRPr lang="en-US" dirty="0"/>
           </a:p>
@@ -23552,197 +24315,89 @@
       </p:sp>
       <p:sp>
         <p:nvSpPr>
-          <p:cNvPr id="3" name="Rectangle 2"/>
+          <p:cNvPr id="3" name="Content Placeholder 2"/>
           <p:cNvSpPr>
-            <a:spLocks noChangeArrowheads="1"/>
+            <a:spLocks noGrp="1"/>
           </p:cNvSpPr>
+          <p:nvPr>
+            <p:ph idx="1"/>
+          </p:nvPr>
+        </p:nvSpPr>
+        <p:spPr/>
+        <p:txBody>
+          <a:bodyPr/>
+          <a:lstStyle/>
+          <a:p>
+            <a:endParaRPr lang="en-US" dirty="0" smtClean="0">
+              <a:hlinkClick r:id="rId2"/>
+            </a:endParaRPr>
+          </a:p>
+          <a:p>
+            <a:r>
+              <a:rPr lang="en-US" dirty="0" smtClean="0">
+                <a:hlinkClick r:id="rId2"/>
+              </a:rPr>
+              <a:t>http://ibudget.simplefunctions.com</a:t>
+            </a:r>
+            <a:endParaRPr lang="en-US" dirty="0" smtClean="0"/>
+          </a:p>
+          <a:p>
+            <a:endParaRPr lang="en-US" dirty="0" smtClean="0"/>
+          </a:p>
+          <a:p>
+            <a:r>
+              <a:rPr lang="en-US" dirty="0" smtClean="0"/>
+              <a:t>We each take turn to show the pages or functionalities that we worked on.</a:t>
+            </a:r>
+            <a:endParaRPr lang="en-US" dirty="0"/>
+          </a:p>
+        </p:txBody>
+      </p:sp>
+      <p:pic>
+        <p:nvPicPr>
+          <p:cNvPr id="1026" name="Picture 2" descr="HTML5-logo.svg"/>
+          <p:cNvPicPr>
+            <a:picLocks noChangeAspect="1" noChangeArrowheads="1"/>
+          </p:cNvPicPr>
           <p:nvPr/>
-        </p:nvSpPr>
+        </p:nvPicPr>
+        <p:blipFill>
+          <a:blip r:embed="rId3" cstate="print">
+            <a:extLst>
+              <a:ext uri="{28A0092B-C50C-407E-A947-70E740481C1C}">
+                <a14:useLocalDpi xmlns:a14="http://schemas.microsoft.com/office/drawing/2010/main" xmlns="" val="0"/>
+              </a:ext>
+            </a:extLst>
+          </a:blip>
+          <a:srcRect/>
+          <a:stretch>
+            <a:fillRect/>
+          </a:stretch>
+        </p:blipFill>
         <p:spPr bwMode="auto">
           <a:xfrm>
-            <a:off x="0" y="0"/>
-            <a:ext cx="9144000" cy="0"/>
+            <a:off x="3862602" y="4856334"/>
+            <a:ext cx="1143000" cy="1143001"/>
           </a:xfrm>
           <a:prstGeom prst="rect">
             <a:avLst/>
           </a:prstGeom>
           <a:noFill/>
-          <a:ln>
-            <a:noFill/>
-          </a:ln>
-          <a:effectLst/>
           <a:extLst>
             <a:ext uri="{909E8E84-426E-40DD-AFC4-6F175D3DCCD1}">
               <a14:hiddenFill xmlns:a14="http://schemas.microsoft.com/office/drawing/2010/main" xmlns="">
                 <a:solidFill>
-                  <a:schemeClr val="accent1"/>
+                  <a:srgbClr val="FFFFFF"/>
                 </a:solidFill>
               </a14:hiddenFill>
             </a:ext>
-            <a:ext uri="{91240B29-F687-4F45-9708-019B960494DF}">
-              <a14:hiddenLine xmlns:a14="http://schemas.microsoft.com/office/drawing/2010/main" xmlns="" w="9525">
-                <a:solidFill>
-                  <a:schemeClr val="tx1"/>
-                </a:solidFill>
-                <a:miter lim="800000"/>
-                <a:headEnd/>
-                <a:tailEnd/>
-              </a14:hiddenLine>
-            </a:ext>
-            <a:ext uri="{AF507438-7753-43E0-B8FC-AC1667EBCBE1}">
-              <a14:hiddenEffects xmlns:a14="http://schemas.microsoft.com/office/drawing/2010/main" xmlns="">
-                <a:effectLst>
-                  <a:outerShdw dist="35921" dir="2700000" algn="ctr" rotWithShape="0">
-                    <a:schemeClr val="bg2"/>
-                  </a:outerShdw>
-                </a:effectLst>
-              </a14:hiddenEffects>
-            </a:ext>
           </a:extLst>
         </p:spPr>
-        <p:txBody>
-          <a:bodyPr vert="horz" wrap="none" lIns="91440" tIns="45720" rIns="91440" bIns="45720" numCol="1" anchor="ctr" anchorCtr="0" compatLnSpc="1">
-            <a:prstTxWarp prst="textNoShape">
-              <a:avLst/>
-            </a:prstTxWarp>
-            <a:spAutoFit/>
-          </a:bodyPr>
-          <a:lstStyle/>
-          <a:p>
-            <a:endParaRPr lang="en-US"/>
-          </a:p>
-        </p:txBody>
-      </p:sp>
-      <p:sp>
-        <p:nvSpPr>
-          <p:cNvPr id="5" name="Rectangle 2"/>
-          <p:cNvSpPr>
-            <a:spLocks noChangeArrowheads="1"/>
-          </p:cNvSpPr>
-          <p:nvPr/>
-        </p:nvSpPr>
-        <p:spPr bwMode="auto">
-          <a:xfrm>
-            <a:off x="0" y="0"/>
-            <a:ext cx="9144000" cy="0"/>
-          </a:xfrm>
-          <a:prstGeom prst="rect">
-            <a:avLst/>
-          </a:prstGeom>
-          <a:noFill/>
-          <a:ln>
-            <a:noFill/>
-          </a:ln>
-          <a:effectLst/>
-          <a:extLst>
-            <a:ext uri="{909E8E84-426E-40DD-AFC4-6F175D3DCCD1}">
-              <a14:hiddenFill xmlns:a14="http://schemas.microsoft.com/office/drawing/2010/main" xmlns="">
-                <a:solidFill>
-                  <a:schemeClr val="accent1"/>
-                </a:solidFill>
-              </a14:hiddenFill>
-            </a:ext>
-            <a:ext uri="{91240B29-F687-4F45-9708-019B960494DF}">
-              <a14:hiddenLine xmlns:a14="http://schemas.microsoft.com/office/drawing/2010/main" xmlns="" w="9525">
-                <a:solidFill>
-                  <a:schemeClr val="tx1"/>
-                </a:solidFill>
-                <a:miter lim="800000"/>
-                <a:headEnd/>
-                <a:tailEnd/>
-              </a14:hiddenLine>
-            </a:ext>
-            <a:ext uri="{AF507438-7753-43E0-B8FC-AC1667EBCBE1}">
-              <a14:hiddenEffects xmlns:a14="http://schemas.microsoft.com/office/drawing/2010/main" xmlns="">
-                <a:effectLst>
-                  <a:outerShdw dist="35921" dir="2700000" algn="ctr" rotWithShape="0">
-                    <a:schemeClr val="bg2"/>
-                  </a:outerShdw>
-                </a:effectLst>
-              </a14:hiddenEffects>
-            </a:ext>
-          </a:extLst>
-        </p:spPr>
-        <p:txBody>
-          <a:bodyPr vert="horz" wrap="none" lIns="91440" tIns="45720" rIns="91440" bIns="45720" numCol="1" anchor="ctr" anchorCtr="0" compatLnSpc="1">
-            <a:prstTxWarp prst="textNoShape">
-              <a:avLst/>
-            </a:prstTxWarp>
-            <a:spAutoFit/>
-          </a:bodyPr>
-          <a:lstStyle/>
-          <a:p>
-            <a:endParaRPr lang="en-US"/>
-          </a:p>
-        </p:txBody>
-      </p:sp>
-      <p:sp>
-        <p:nvSpPr>
-          <p:cNvPr id="4" name="Rectangle 2"/>
-          <p:cNvSpPr>
-            <a:spLocks noChangeArrowheads="1"/>
-          </p:cNvSpPr>
-          <p:nvPr/>
-        </p:nvSpPr>
-        <p:spPr bwMode="auto">
-          <a:xfrm>
-            <a:off x="0" y="0"/>
-            <a:ext cx="9144000" cy="0"/>
-          </a:xfrm>
-          <a:prstGeom prst="rect">
-            <a:avLst/>
-          </a:prstGeom>
-          <a:noFill/>
-          <a:ln>
-            <a:noFill/>
-          </a:ln>
-          <a:effectLst/>
-          <a:extLst>
-            <a:ext uri="{909E8E84-426E-40DD-AFC4-6F175D3DCCD1}">
-              <a14:hiddenFill xmlns:a14="http://schemas.microsoft.com/office/drawing/2010/main" xmlns="">
-                <a:solidFill>
-                  <a:schemeClr val="accent1"/>
-                </a:solidFill>
-              </a14:hiddenFill>
-            </a:ext>
-            <a:ext uri="{91240B29-F687-4F45-9708-019B960494DF}">
-              <a14:hiddenLine xmlns:a14="http://schemas.microsoft.com/office/drawing/2010/main" xmlns="" w="9525">
-                <a:solidFill>
-                  <a:schemeClr val="tx1"/>
-                </a:solidFill>
-                <a:miter lim="800000"/>
-                <a:headEnd/>
-                <a:tailEnd/>
-              </a14:hiddenLine>
-            </a:ext>
-            <a:ext uri="{AF507438-7753-43E0-B8FC-AC1667EBCBE1}">
-              <a14:hiddenEffects xmlns:a14="http://schemas.microsoft.com/office/drawing/2010/main" xmlns="">
-                <a:effectLst>
-                  <a:outerShdw dist="35921" dir="2700000" algn="ctr" rotWithShape="0">
-                    <a:schemeClr val="bg2"/>
-                  </a:outerShdw>
-                </a:effectLst>
-              </a14:hiddenEffects>
-            </a:ext>
-          </a:extLst>
-        </p:spPr>
-        <p:txBody>
-          <a:bodyPr vert="horz" wrap="none" lIns="91440" tIns="45720" rIns="91440" bIns="45720" numCol="1" anchor="ctr" anchorCtr="0" compatLnSpc="1">
-            <a:prstTxWarp prst="textNoShape">
-              <a:avLst/>
-            </a:prstTxWarp>
-            <a:spAutoFit/>
-          </a:bodyPr>
-          <a:lstStyle/>
-          <a:p>
-            <a:endParaRPr lang="en-US"/>
-          </a:p>
-        </p:txBody>
-      </p:sp>
+      </p:pic>
     </p:spTree>
     <p:extLst>
       <p:ext uri="{BB962C8B-B14F-4D97-AF65-F5344CB8AC3E}">
-        <p14:creationId xmlns:p14="http://schemas.microsoft.com/office/powerpoint/2010/main" xmlns="" val="273623958"/>
+        <p14:creationId xmlns:p14="http://schemas.microsoft.com/office/powerpoint/2010/main" xmlns="" val="3832736806"/>
       </p:ext>
     </p:extLst>
   </p:cSld>
@@ -23759,7 +24414,95 @@
 </p:sld>
 </file>
 
-<file path=ppt/slides/slide23.xml><?xml version="1.0" encoding="utf-8"?>
+<file path=ppt/slides/slide25.xml><?xml version="1.0" encoding="utf-8"?>
+<p:sld xmlns:a="http://schemas.openxmlformats.org/drawingml/2006/main" xmlns:r="http://schemas.openxmlformats.org/officeDocument/2006/relationships" xmlns:p="http://schemas.openxmlformats.org/presentationml/2006/main">
+  <p:cSld>
+    <p:spTree>
+      <p:nvGrpSpPr>
+        <p:cNvPr id="1" name=""/>
+        <p:cNvGrpSpPr/>
+        <p:nvPr/>
+      </p:nvGrpSpPr>
+      <p:grpSpPr>
+        <a:xfrm>
+          <a:off x="0" y="0"/>
+          <a:ext cx="0" cy="0"/>
+          <a:chOff x="0" y="0"/>
+          <a:chExt cx="0" cy="0"/>
+        </a:xfrm>
+      </p:grpSpPr>
+      <p:sp>
+        <p:nvSpPr>
+          <p:cNvPr id="2" name="Title 1"/>
+          <p:cNvSpPr>
+            <a:spLocks noGrp="1"/>
+          </p:cNvSpPr>
+          <p:nvPr>
+            <p:ph type="title"/>
+          </p:nvPr>
+        </p:nvSpPr>
+        <p:spPr/>
+        <p:txBody>
+          <a:bodyPr/>
+          <a:lstStyle/>
+          <a:p>
+            <a:r>
+              <a:rPr lang="en-US" dirty="0" smtClean="0"/>
+              <a:t>Source Code</a:t>
+            </a:r>
+            <a:endParaRPr lang="en-US" dirty="0"/>
+          </a:p>
+        </p:txBody>
+      </p:sp>
+      <p:sp>
+        <p:nvSpPr>
+          <p:cNvPr id="3" name="Content Placeholder 2"/>
+          <p:cNvSpPr>
+            <a:spLocks noGrp="1"/>
+          </p:cNvSpPr>
+          <p:nvPr>
+            <p:ph idx="1"/>
+          </p:nvPr>
+        </p:nvSpPr>
+        <p:spPr>
+          <a:xfrm>
+            <a:off x="1043492" y="2817091"/>
+            <a:ext cx="6777317" cy="3015538"/>
+          </a:xfrm>
+        </p:spPr>
+        <p:txBody>
+          <a:bodyPr/>
+          <a:lstStyle/>
+          <a:p>
+            <a:r>
+              <a:rPr lang="en-US" dirty="0" smtClean="0"/>
+              <a:t>We can pick out section of source code that we want to show</a:t>
+            </a:r>
+            <a:endParaRPr lang="en-US" dirty="0"/>
+          </a:p>
+        </p:txBody>
+      </p:sp>
+    </p:spTree>
+    <p:extLst>
+      <p:ext uri="{BB962C8B-B14F-4D97-AF65-F5344CB8AC3E}">
+        <p14:creationId xmlns:p14="http://schemas.microsoft.com/office/powerpoint/2010/main" xmlns="" val="1092677546"/>
+      </p:ext>
+    </p:extLst>
+  </p:cSld>
+  <p:clrMapOvr>
+    <a:masterClrMapping/>
+  </p:clrMapOvr>
+  <p:timing>
+    <p:tnLst>
+      <p:par>
+        <p:cTn id="1" dur="indefinite" restart="never" nodeType="tmRoot"/>
+      </p:par>
+    </p:tnLst>
+  </p:timing>
+</p:sld>
+</file>
+
+<file path=ppt/slides/slide26.xml><?xml version="1.0" encoding="utf-8"?>
 <p:sld xmlns:a="http://schemas.openxmlformats.org/drawingml/2006/main" xmlns:r="http://schemas.openxmlformats.org/officeDocument/2006/relationships" xmlns:p="http://schemas.openxmlformats.org/presentationml/2006/main">
   <p:cSld>
     <p:spTree>

</xml_diff>

<commit_message>
added screen shots of google hosting page
</commit_message>
<xml_diff>
--- a/deliverables/final/Final Presentation.pptx
+++ b/deliverables/final/Final Presentation.pptx
@@ -5,7 +5,7 @@
     <p:sldMasterId id="2147483792" r:id="rId1"/>
   </p:sldMasterIdLst>
   <p:notesMasterIdLst>
-    <p:notesMasterId r:id="rId33"/>
+    <p:notesMasterId r:id="rId35"/>
   </p:notesMasterIdLst>
   <p:sldIdLst>
     <p:sldId id="256" r:id="rId2"/>
@@ -23,22 +23,24 @@
     <p:sldId id="291" r:id="rId14"/>
     <p:sldId id="279" r:id="rId15"/>
     <p:sldId id="271" r:id="rId16"/>
-    <p:sldId id="292" r:id="rId17"/>
-    <p:sldId id="293" r:id="rId18"/>
-    <p:sldId id="296" r:id="rId19"/>
-    <p:sldId id="280" r:id="rId20"/>
-    <p:sldId id="295" r:id="rId21"/>
-    <p:sldId id="281" r:id="rId22"/>
-    <p:sldId id="283" r:id="rId23"/>
-    <p:sldId id="294" r:id="rId24"/>
-    <p:sldId id="285" r:id="rId25"/>
-    <p:sldId id="286" r:id="rId26"/>
-    <p:sldId id="287" r:id="rId27"/>
-    <p:sldId id="288" r:id="rId28"/>
-    <p:sldId id="289" r:id="rId29"/>
-    <p:sldId id="282" r:id="rId30"/>
-    <p:sldId id="266" r:id="rId31"/>
-    <p:sldId id="259" r:id="rId32"/>
+    <p:sldId id="298" r:id="rId17"/>
+    <p:sldId id="292" r:id="rId18"/>
+    <p:sldId id="293" r:id="rId19"/>
+    <p:sldId id="296" r:id="rId20"/>
+    <p:sldId id="280" r:id="rId21"/>
+    <p:sldId id="295" r:id="rId22"/>
+    <p:sldId id="297" r:id="rId23"/>
+    <p:sldId id="281" r:id="rId24"/>
+    <p:sldId id="283" r:id="rId25"/>
+    <p:sldId id="294" r:id="rId26"/>
+    <p:sldId id="285" r:id="rId27"/>
+    <p:sldId id="286" r:id="rId28"/>
+    <p:sldId id="287" r:id="rId29"/>
+    <p:sldId id="288" r:id="rId30"/>
+    <p:sldId id="289" r:id="rId31"/>
+    <p:sldId id="282" r:id="rId32"/>
+    <p:sldId id="266" r:id="rId33"/>
+    <p:sldId id="259" r:id="rId34"/>
   </p:sldIdLst>
   <p:sldSz cx="9144000" cy="6858000" type="screen4x3"/>
   <p:notesSz cx="6858000" cy="9144000"/>
@@ -142,13 +144,25 @@
 
 <file path=ppt/charts/chart1.xml><?xml version="1.0" encoding="utf-8"?>
 <c:chartSpace xmlns:c="http://schemas.openxmlformats.org/drawingml/2006/chart" xmlns:a="http://schemas.openxmlformats.org/drawingml/2006/main" xmlns:r="http://schemas.openxmlformats.org/officeDocument/2006/relationships">
+  <c:date1904 val="0"/>
   <c:lang val="en-US"/>
+  <c:roundedCorners val="0"/>
+  <mc:AlternateContent xmlns:mc="http://schemas.openxmlformats.org/markup-compatibility/2006">
+    <mc:Choice xmlns:c14="http://schemas.microsoft.com/office/drawing/2007/8/2/chart" Requires="c14">
+      <c14:style val="102"/>
+    </mc:Choice>
+    <mc:Fallback>
+      <c:style val="2"/>
+    </mc:Fallback>
+  </mc:AlternateContent>
   <c:chart>
+    <c:autoTitleDeleted val="0"/>
     <c:plotArea>
       <c:layout/>
       <c:barChart>
         <c:barDir val="col"/>
         <c:grouping val="clustered"/>
+        <c:varyColors val="0"/>
         <c:ser>
           <c:idx val="0"/>
           <c:order val="0"/>
@@ -168,6 +182,7 @@
               <a:srgbClr val="004586"/>
             </a:solidFill>
           </c:spPr>
+          <c:invertIfNegative val="0"/>
           <c:cat>
             <c:strRef>
               <c:f>Sheet1!$A$3:$A$6</c:f>
@@ -229,6 +244,7 @@
               <a:srgbClr val="FF420E"/>
             </a:solidFill>
           </c:spPr>
+          <c:invertIfNegative val="0"/>
           <c:cat>
             <c:strRef>
               <c:f>Sheet1!$A$3:$A$6</c:f>
@@ -271,16 +287,27 @@
             </c:numRef>
           </c:val>
         </c:ser>
+        <c:dLbls>
+          <c:showLegendKey val="0"/>
+          <c:showVal val="0"/>
+          <c:showCatName val="0"/>
+          <c:showSerName val="0"/>
+          <c:showPercent val="0"/>
+          <c:showBubbleSize val="0"/>
+        </c:dLbls>
         <c:gapWidth val="100"/>
-        <c:axId val="82621952"/>
-        <c:axId val="82623488"/>
+        <c:axId val="127267200"/>
+        <c:axId val="127268736"/>
       </c:barChart>
       <c:catAx>
-        <c:axId val="82621952"/>
+        <c:axId val="127267200"/>
         <c:scaling>
           <c:orientation val="minMax"/>
         </c:scaling>
+        <c:delete val="0"/>
         <c:axPos val="b"/>
+        <c:majorTickMark val="out"/>
+        <c:minorTickMark val="none"/>
         <c:tickLblPos val="nextTo"/>
         <c:spPr>
           <a:ln>
@@ -289,17 +316,19 @@
             </a:solidFill>
           </a:ln>
         </c:spPr>
-        <c:crossAx val="82623488"/>
+        <c:crossAx val="127268736"/>
         <c:crossesAt val="0"/>
         <c:auto val="1"/>
         <c:lblAlgn val="ctr"/>
         <c:lblOffset val="100"/>
+        <c:noMultiLvlLbl val="0"/>
       </c:catAx>
       <c:valAx>
-        <c:axId val="82623488"/>
+        <c:axId val="127268736"/>
         <c:scaling>
           <c:orientation val="minMax"/>
         </c:scaling>
+        <c:delete val="0"/>
         <c:axPos val="l"/>
         <c:majorGridlines>
           <c:spPr>
@@ -311,6 +340,8 @@
           </c:spPr>
         </c:majorGridlines>
         <c:numFmt formatCode="[hh]:mm:ss" sourceLinked="1"/>
+        <c:majorTickMark val="out"/>
+        <c:minorTickMark val="none"/>
         <c:tickLblPos val="nextTo"/>
         <c:spPr>
           <a:ln>
@@ -319,7 +350,7 @@
             </a:solidFill>
           </a:ln>
         </c:spPr>
-        <c:crossAx val="82621952"/>
+        <c:crossAx val="127267200"/>
         <c:crossesAt val="0"/>
         <c:crossBetween val="between"/>
       </c:valAx>
@@ -334,22 +365,36 @@
     <c:legend>
       <c:legendPos val="r"/>
       <c:layout/>
+      <c:overlay val="0"/>
     </c:legend>
     <c:plotVisOnly val="1"/>
+    <c:dispBlanksAs val="gap"/>
+    <c:showDLblsOverMax val="0"/>
   </c:chart>
   <c:spPr>
     <a:solidFill>
       <a:srgbClr val="FFFFFF"/>
     </a:solidFill>
   </c:spPr>
-  <c:externalData r:id="rId1"/>
+  <c:externalData r:id="rId1">
+    <c:autoUpdate val="0"/>
+  </c:externalData>
 </c:chartSpace>
 </file>
 
 <file path=ppt/charts/chart2.xml><?xml version="1.0" encoding="utf-8"?>
 <c:chartSpace xmlns:c="http://schemas.openxmlformats.org/drawingml/2006/chart" xmlns:a="http://schemas.openxmlformats.org/drawingml/2006/main" xmlns:r="http://schemas.openxmlformats.org/officeDocument/2006/relationships">
+  <c:date1904 val="0"/>
   <c:lang val="en-US"/>
   <c:roundedCorners val="1"/>
+  <mc:AlternateContent xmlns:mc="http://schemas.openxmlformats.org/markup-compatibility/2006">
+    <mc:Choice xmlns:c14="http://schemas.microsoft.com/office/drawing/2007/8/2/chart" Requires="c14">
+      <c14:style val="102"/>
+    </mc:Choice>
+    <mc:Fallback>
+      <c:style val="2"/>
+    </mc:Fallback>
+  </mc:AlternateContent>
   <c:chart>
     <c:autoTitleDeleted val="1"/>
     <c:plotArea>
@@ -376,10 +421,8 @@
             </a:solidFill>
           </c:spPr>
           <c:dPt>
-            <c:idx val="0"/>
-          </c:dPt>
-          <c:dPt>
             <c:idx val="1"/>
+            <c:bubble3D val="0"/>
             <c:spPr>
               <a:solidFill>
                 <a:srgbClr val="FF420E"/>
@@ -416,7 +459,15 @@
             </c:numRef>
           </c:val>
         </c:ser>
-        <c:dLbls/>
+        <c:dLbls>
+          <c:showLegendKey val="0"/>
+          <c:showVal val="0"/>
+          <c:showCatName val="0"/>
+          <c:showSerName val="0"/>
+          <c:showPercent val="0"/>
+          <c:showBubbleSize val="0"/>
+          <c:showLeaderLines val="0"/>
+        </c:dLbls>
         <c:firstSliceAng val="0"/>
       </c:pieChart>
       <c:spPr>
@@ -694,6 +745,11 @@
         </p:txBody>
       </p:sp>
     </p:spTree>
+    <p:extLst>
+      <p:ext uri="{BB962C8B-B14F-4D97-AF65-F5344CB8AC3E}">
+        <p14:creationId xmlns:p14="http://schemas.microsoft.com/office/powerpoint/2010/main" val="2012456123"/>
+      </p:ext>
+    </p:extLst>
   </p:cSld>
   <p:clrMap bg1="lt1" tx1="dk1" bg2="lt2" tx2="dk2" accent1="accent1" accent2="accent2" accent3="accent3" accent4="accent4" accent5="accent5" accent6="accent6" hlink="hlink" folHlink="folHlink"/>
   <p:notesStyle>
@@ -895,7 +951,7 @@
           <a:p>
             <a:fld id="{571BB694-2EE6-4BEE-8AE8-20A8D9DB53E6}" type="slidenum">
               <a:rPr lang="en-US" smtClean="0"/>
-              <a:t>22</a:t>
+              <a:t>24</a:t>
             </a:fld>
             <a:endParaRPr lang="en-US"/>
           </a:p>
@@ -14690,7 +14746,7 @@
     </p:spTree>
     <p:extLst>
       <p:ext uri="{BB962C8B-B14F-4D97-AF65-F5344CB8AC3E}">
-        <p14:creationId xmlns:p14="http://schemas.microsoft.com/office/powerpoint/2010/main" xmlns="" val="1809248185"/>
+        <p14:creationId xmlns:p14="http://schemas.microsoft.com/office/powerpoint/2010/main" val="1809248185"/>
       </p:ext>
     </p:extLst>
   </p:cSld>
@@ -18232,7 +18288,7 @@
     </p:spTree>
     <p:extLst>
       <p:ext uri="{BB962C8B-B14F-4D97-AF65-F5344CB8AC3E}">
-        <p14:creationId xmlns:p14="http://schemas.microsoft.com/office/powerpoint/2010/main" xmlns="" val="643549545"/>
+        <p14:creationId xmlns:p14="http://schemas.microsoft.com/office/powerpoint/2010/main" val="643549545"/>
       </p:ext>
     </p:extLst>
   </p:cSld>
@@ -18324,7 +18380,7 @@
             <p:ph idx="1"/>
             <p:extLst>
               <p:ext uri="{D42A27DB-BD31-4B8C-83A1-F6EECF244321}">
-                <p14:modId xmlns:p14="http://schemas.microsoft.com/office/powerpoint/2010/main" xmlns="" val="1184224690"/>
+                <p14:modId xmlns:p14="http://schemas.microsoft.com/office/powerpoint/2010/main" val="1184224690"/>
               </p:ext>
             </p:extLst>
           </p:nvPr>
@@ -18342,7 +18398,7 @@
     </p:spTree>
     <p:extLst>
       <p:ext uri="{BB962C8B-B14F-4D97-AF65-F5344CB8AC3E}">
-        <p14:creationId xmlns:p14="http://schemas.microsoft.com/office/powerpoint/2010/main" xmlns="" val="428867361"/>
+        <p14:creationId xmlns:p14="http://schemas.microsoft.com/office/powerpoint/2010/main" val="428867361"/>
       </p:ext>
     </p:extLst>
   </p:cSld>
@@ -20176,7 +20232,7 @@
                         </a:spcAft>
                       </a:pPr>
                       <a:r>
-                        <a:rPr lang="en-US" sz="800" b="1">
+                        <a:rPr lang="en-US" sz="800" b="1" dirty="0">
                           <a:solidFill>
                             <a:srgbClr val="000000"/>
                           </a:solidFill>
@@ -20186,7 +20242,7 @@
                         </a:rPr>
                         <a:t>Development</a:t>
                       </a:r>
-                      <a:endParaRPr lang="en-US" sz="1200">
+                      <a:endParaRPr lang="en-US" sz="1200" dirty="0">
                         <a:latin typeface="Arial"/>
                         <a:ea typeface="Calibri"/>
                         <a:cs typeface="Times New Roman"/>
@@ -23266,6 +23322,132 @@
             <p:ph type="title"/>
           </p:nvPr>
         </p:nvSpPr>
+        <p:spPr>
+          <a:xfrm>
+            <a:off x="962643" y="698760"/>
+            <a:ext cx="7024744" cy="1143000"/>
+          </a:xfrm>
+        </p:spPr>
+        <p:txBody>
+          <a:bodyPr>
+            <a:normAutofit fontScale="90000"/>
+          </a:bodyPr>
+          <a:lstStyle/>
+          <a:p>
+            <a:r>
+              <a:rPr lang="en-US" dirty="0" smtClean="0"/>
+              <a:t>Managing Documents and Code (</a:t>
+            </a:r>
+            <a:r>
+              <a:rPr lang="en-US" dirty="0" err="1" smtClean="0"/>
+              <a:t>svn</a:t>
+            </a:r>
+            <a:r>
+              <a:rPr lang="en-US" dirty="0" smtClean="0"/>
+              <a:t>)</a:t>
+            </a:r>
+            <a:endParaRPr lang="en-US" dirty="0"/>
+          </a:p>
+        </p:txBody>
+      </p:sp>
+      <p:sp>
+        <p:nvSpPr>
+          <p:cNvPr id="3" name="Content Placeholder 2"/>
+          <p:cNvSpPr>
+            <a:spLocks noGrp="1"/>
+          </p:cNvSpPr>
+          <p:nvPr>
+            <p:ph idx="1"/>
+          </p:nvPr>
+        </p:nvSpPr>
+        <p:spPr/>
+        <p:txBody>
+          <a:bodyPr/>
+          <a:lstStyle/>
+          <a:p>
+            <a:endParaRPr lang="en-US"/>
+          </a:p>
+        </p:txBody>
+      </p:sp>
+      <p:pic>
+        <p:nvPicPr>
+          <p:cNvPr id="40963" name="Picture 3" descr="C:\Users\Jonathan Reimels\Desktop\Screen Shot 2012-04-29 at 11.26.17 PM.png"/>
+          <p:cNvPicPr>
+            <a:picLocks noChangeAspect="1" noChangeArrowheads="1"/>
+          </p:cNvPicPr>
+          <p:nvPr/>
+        </p:nvPicPr>
+        <p:blipFill rotWithShape="1">
+          <a:blip r:embed="rId2" cstate="email">
+            <a:extLst>
+              <a:ext uri="{28A0092B-C50C-407E-A947-70E740481C1C}">
+                <a14:useLocalDpi xmlns:a14="http://schemas.microsoft.com/office/drawing/2010/main" val="0"/>
+              </a:ext>
+            </a:extLst>
+          </a:blip>
+          <a:srcRect l="6418" t="11975" r="7056" b="35110"/>
+          <a:stretch/>
+        </p:blipFill>
+        <p:spPr bwMode="auto">
+          <a:xfrm>
+            <a:off x="1213198" y="1841760"/>
+            <a:ext cx="6428574" cy="4418667"/>
+          </a:xfrm>
+          <a:prstGeom prst="rect">
+            <a:avLst/>
+          </a:prstGeom>
+          <a:noFill/>
+          <a:extLst>
+            <a:ext uri="{909E8E84-426E-40DD-AFC4-6F175D3DCCD1}">
+              <a14:hiddenFill xmlns:a14="http://schemas.microsoft.com/office/drawing/2010/main">
+                <a:solidFill>
+                  <a:srgbClr val="FFFFFF"/>
+                </a:solidFill>
+              </a14:hiddenFill>
+            </a:ext>
+          </a:extLst>
+        </p:spPr>
+      </p:pic>
+    </p:spTree>
+    <p:extLst>
+      <p:ext uri="{BB962C8B-B14F-4D97-AF65-F5344CB8AC3E}">
+        <p14:creationId xmlns:p14="http://schemas.microsoft.com/office/powerpoint/2010/main" val="1986630412"/>
+      </p:ext>
+    </p:extLst>
+  </p:cSld>
+  <p:clrMapOvr>
+    <a:masterClrMapping/>
+  </p:clrMapOvr>
+</p:sld>
+</file>
+
+<file path=ppt/slides/slide17.xml><?xml version="1.0" encoding="utf-8"?>
+<p:sld xmlns:a="http://schemas.openxmlformats.org/drawingml/2006/main" xmlns:r="http://schemas.openxmlformats.org/officeDocument/2006/relationships" xmlns:p="http://schemas.openxmlformats.org/presentationml/2006/main">
+  <p:cSld>
+    <p:spTree>
+      <p:nvGrpSpPr>
+        <p:cNvPr id="1" name=""/>
+        <p:cNvGrpSpPr/>
+        <p:nvPr/>
+      </p:nvGrpSpPr>
+      <p:grpSpPr>
+        <a:xfrm>
+          <a:off x="0" y="0"/>
+          <a:ext cx="0" cy="0"/>
+          <a:chOff x="0" y="0"/>
+          <a:chExt cx="0" cy="0"/>
+        </a:xfrm>
+      </p:grpSpPr>
+      <p:sp>
+        <p:nvSpPr>
+          <p:cNvPr id="2" name="Title 1"/>
+          <p:cNvSpPr>
+            <a:spLocks noGrp="1"/>
+          </p:cNvSpPr>
+          <p:nvPr>
+            <p:ph type="title"/>
+          </p:nvPr>
+        </p:nvSpPr>
         <p:spPr/>
         <p:txBody>
           <a:bodyPr/>
@@ -23389,7 +23571,7 @@
     </p:spTree>
     <p:extLst>
       <p:ext uri="{BB962C8B-B14F-4D97-AF65-F5344CB8AC3E}">
-        <p14:creationId xmlns:p14="http://schemas.microsoft.com/office/powerpoint/2010/main" xmlns="" val="2229789335"/>
+        <p14:creationId xmlns:p14="http://schemas.microsoft.com/office/powerpoint/2010/main" val="2229789335"/>
       </p:ext>
     </p:extLst>
   </p:cSld>
@@ -23399,7 +23581,7 @@
 </p:sld>
 </file>
 
-<file path=ppt/slides/slide17.xml><?xml version="1.0" encoding="utf-8"?>
+<file path=ppt/slides/slide18.xml><?xml version="1.0" encoding="utf-8"?>
 <p:sld xmlns:a="http://schemas.openxmlformats.org/drawingml/2006/main" xmlns:r="http://schemas.openxmlformats.org/officeDocument/2006/relationships" xmlns:p="http://schemas.openxmlformats.org/presentationml/2006/main">
   <p:cSld>
     <p:spTree>
@@ -23554,7 +23736,7 @@
     </p:spTree>
     <p:extLst>
       <p:ext uri="{BB962C8B-B14F-4D97-AF65-F5344CB8AC3E}">
-        <p14:creationId xmlns:p14="http://schemas.microsoft.com/office/powerpoint/2010/main" xmlns="" val="2295343860"/>
+        <p14:creationId xmlns:p14="http://schemas.microsoft.com/office/powerpoint/2010/main" val="2295343860"/>
       </p:ext>
     </p:extLst>
   </p:cSld>
@@ -23564,7 +23746,7 @@
 </p:sld>
 </file>
 
-<file path=ppt/slides/slide18.xml><?xml version="1.0" encoding="utf-8"?>
+<file path=ppt/slides/slide19.xml><?xml version="1.0" encoding="utf-8"?>
 <p:sld xmlns:a="http://schemas.openxmlformats.org/drawingml/2006/main" xmlns:r="http://schemas.openxmlformats.org/officeDocument/2006/relationships" xmlns:p="http://schemas.openxmlformats.org/presentationml/2006/main">
   <p:cSld>
     <p:spTree>
@@ -23643,182 +23825,6 @@
           </a:ln>
         </p:spPr>
       </p:pic>
-    </p:spTree>
-  </p:cSld>
-  <p:clrMapOvr>
-    <a:masterClrMapping/>
-  </p:clrMapOvr>
-</p:sld>
-</file>
-
-<file path=ppt/slides/slide19.xml><?xml version="1.0" encoding="utf-8"?>
-<p:sld xmlns:a="http://schemas.openxmlformats.org/drawingml/2006/main" xmlns:r="http://schemas.openxmlformats.org/officeDocument/2006/relationships" xmlns:p="http://schemas.openxmlformats.org/presentationml/2006/main">
-  <p:cSld>
-    <p:spTree>
-      <p:nvGrpSpPr>
-        <p:cNvPr id="1" name=""/>
-        <p:cNvGrpSpPr/>
-        <p:nvPr/>
-      </p:nvGrpSpPr>
-      <p:grpSpPr>
-        <a:xfrm>
-          <a:off x="0" y="0"/>
-          <a:ext cx="0" cy="0"/>
-          <a:chOff x="0" y="0"/>
-          <a:chExt cx="0" cy="0"/>
-        </a:xfrm>
-      </p:grpSpPr>
-      <p:sp>
-        <p:nvSpPr>
-          <p:cNvPr id="2" name="Title 1"/>
-          <p:cNvSpPr>
-            <a:spLocks noGrp="1"/>
-          </p:cNvSpPr>
-          <p:nvPr>
-            <p:ph type="title"/>
-          </p:nvPr>
-        </p:nvSpPr>
-        <p:spPr>
-          <a:xfrm>
-            <a:off x="796065" y="456164"/>
-            <a:ext cx="7024744" cy="1143000"/>
-          </a:xfrm>
-        </p:spPr>
-        <p:txBody>
-          <a:bodyPr>
-            <a:normAutofit/>
-          </a:bodyPr>
-          <a:lstStyle/>
-          <a:p>
-            <a:r>
-              <a:rPr lang="en-US" dirty="0" smtClean="0">
-                <a:solidFill>
-                  <a:schemeClr val="bg2">
-                    <a:lumMod val="75000"/>
-                  </a:schemeClr>
-                </a:solidFill>
-              </a:rPr>
-              <a:t>Software Quality</a:t>
-            </a:r>
-            <a:endParaRPr lang="en-US" dirty="0"/>
-          </a:p>
-        </p:txBody>
-      </p:sp>
-      <p:sp>
-        <p:nvSpPr>
-          <p:cNvPr id="3" name="Content Placeholder 2"/>
-          <p:cNvSpPr>
-            <a:spLocks noGrp="1"/>
-          </p:cNvSpPr>
-          <p:nvPr>
-            <p:ph idx="1"/>
-          </p:nvPr>
-        </p:nvSpPr>
-        <p:spPr>
-          <a:xfrm>
-            <a:off x="796065" y="1840523"/>
-            <a:ext cx="7679720" cy="4525108"/>
-          </a:xfrm>
-        </p:spPr>
-        <p:txBody>
-          <a:bodyPr>
-            <a:normAutofit/>
-          </a:bodyPr>
-          <a:lstStyle/>
-          <a:p>
-            <a:pPr algn="just">
-              <a:buSzPct val="45000"/>
-              <a:buFont typeface="StarSymbol"/>
-              <a:buChar char=""/>
-            </a:pPr>
-            <a:r>
-              <a:rPr lang="en-US" dirty="0"/>
-              <a:t>Each team member responsible for the quality of his/her work</a:t>
-            </a:r>
-          </a:p>
-          <a:p>
-            <a:pPr algn="just">
-              <a:buSzPct val="45000"/>
-              <a:buFont typeface="StarSymbol"/>
-              <a:buChar char=""/>
-            </a:pPr>
-            <a:endParaRPr lang="en-US" dirty="0"/>
-          </a:p>
-          <a:p>
-            <a:pPr>
-              <a:buSzPct val="45000"/>
-              <a:buFont typeface="StarSymbol"/>
-              <a:buChar char=""/>
-            </a:pPr>
-            <a:r>
-              <a:rPr lang="en-US" dirty="0"/>
-              <a:t> Each project artifact was inspected by at least 2 reviewers before </a:t>
-            </a:r>
-            <a:r>
-              <a:rPr lang="en-US" dirty="0" smtClean="0"/>
-              <a:t>submission</a:t>
-            </a:r>
-          </a:p>
-          <a:p>
-            <a:pPr>
-              <a:buSzPct val="45000"/>
-              <a:buFont typeface="StarSymbol"/>
-              <a:buChar char=""/>
-            </a:pPr>
-            <a:endParaRPr lang="en-US" dirty="0"/>
-          </a:p>
-          <a:p>
-            <a:pPr>
-              <a:buSzPct val="45000"/>
-              <a:buFont typeface="StarSymbol"/>
-              <a:buChar char=""/>
-            </a:pPr>
-            <a:r>
-              <a:rPr lang="en-US" dirty="0">
-                <a:ea typeface="Century Gothic"/>
-              </a:rPr>
-              <a:t> Set of coding </a:t>
-            </a:r>
-            <a:r>
-              <a:rPr lang="en-US" dirty="0" smtClean="0">
-                <a:ea typeface="Century Gothic"/>
-              </a:rPr>
-              <a:t>standards</a:t>
-            </a:r>
-          </a:p>
-          <a:p>
-            <a:pPr>
-              <a:buSzPct val="45000"/>
-              <a:buFont typeface="StarSymbol"/>
-              <a:buChar char=""/>
-            </a:pPr>
-            <a:endParaRPr lang="en-US" dirty="0"/>
-          </a:p>
-          <a:p>
-            <a:pPr>
-              <a:buSzPct val="45000"/>
-              <a:buFont typeface="StarSymbol"/>
-              <a:buChar char=""/>
-            </a:pPr>
-            <a:r>
-              <a:rPr lang="en-US" dirty="0">
-                <a:ea typeface="Century Gothic"/>
-              </a:rPr>
-              <a:t>Google code issue tracker used for issues</a:t>
-            </a:r>
-            <a:endParaRPr lang="en-US" dirty="0"/>
-          </a:p>
-          <a:p>
-            <a:endParaRPr lang="en-US" dirty="0"/>
-          </a:p>
-          <a:p>
-            <a:endParaRPr lang="en-US" dirty="0"/>
-          </a:p>
-          <a:p>
-            <a:endParaRPr lang="en-US" dirty="0"/>
-          </a:p>
-        </p:txBody>
-      </p:sp>
     </p:spTree>
   </p:cSld>
   <p:clrMapOvr>
@@ -23997,6 +24003,182 @@
           </a:xfrm>
         </p:spPr>
         <p:txBody>
+          <a:bodyPr>
+            <a:normAutofit/>
+          </a:bodyPr>
+          <a:lstStyle/>
+          <a:p>
+            <a:r>
+              <a:rPr lang="en-US" dirty="0" smtClean="0">
+                <a:solidFill>
+                  <a:schemeClr val="bg2">
+                    <a:lumMod val="75000"/>
+                  </a:schemeClr>
+                </a:solidFill>
+              </a:rPr>
+              <a:t>Software Quality</a:t>
+            </a:r>
+            <a:endParaRPr lang="en-US" dirty="0"/>
+          </a:p>
+        </p:txBody>
+      </p:sp>
+      <p:sp>
+        <p:nvSpPr>
+          <p:cNvPr id="3" name="Content Placeholder 2"/>
+          <p:cNvSpPr>
+            <a:spLocks noGrp="1"/>
+          </p:cNvSpPr>
+          <p:nvPr>
+            <p:ph idx="1"/>
+          </p:nvPr>
+        </p:nvSpPr>
+        <p:spPr>
+          <a:xfrm>
+            <a:off x="796065" y="1840523"/>
+            <a:ext cx="7679720" cy="4525108"/>
+          </a:xfrm>
+        </p:spPr>
+        <p:txBody>
+          <a:bodyPr>
+            <a:normAutofit/>
+          </a:bodyPr>
+          <a:lstStyle/>
+          <a:p>
+            <a:pPr algn="just">
+              <a:buSzPct val="45000"/>
+              <a:buFont typeface="StarSymbol"/>
+              <a:buChar char=""/>
+            </a:pPr>
+            <a:r>
+              <a:rPr lang="en-US" dirty="0"/>
+              <a:t>Each team member responsible for the quality of his/her work</a:t>
+            </a:r>
+          </a:p>
+          <a:p>
+            <a:pPr algn="just">
+              <a:buSzPct val="45000"/>
+              <a:buFont typeface="StarSymbol"/>
+              <a:buChar char=""/>
+            </a:pPr>
+            <a:endParaRPr lang="en-US" dirty="0"/>
+          </a:p>
+          <a:p>
+            <a:pPr>
+              <a:buSzPct val="45000"/>
+              <a:buFont typeface="StarSymbol"/>
+              <a:buChar char=""/>
+            </a:pPr>
+            <a:r>
+              <a:rPr lang="en-US" dirty="0"/>
+              <a:t> Each project artifact was inspected by at least 2 reviewers before </a:t>
+            </a:r>
+            <a:r>
+              <a:rPr lang="en-US" dirty="0" smtClean="0"/>
+              <a:t>submission</a:t>
+            </a:r>
+          </a:p>
+          <a:p>
+            <a:pPr>
+              <a:buSzPct val="45000"/>
+              <a:buFont typeface="StarSymbol"/>
+              <a:buChar char=""/>
+            </a:pPr>
+            <a:endParaRPr lang="en-US" dirty="0"/>
+          </a:p>
+          <a:p>
+            <a:pPr>
+              <a:buSzPct val="45000"/>
+              <a:buFont typeface="StarSymbol"/>
+              <a:buChar char=""/>
+            </a:pPr>
+            <a:r>
+              <a:rPr lang="en-US" dirty="0">
+                <a:ea typeface="Century Gothic"/>
+              </a:rPr>
+              <a:t> Set of coding </a:t>
+            </a:r>
+            <a:r>
+              <a:rPr lang="en-US" dirty="0" smtClean="0">
+                <a:ea typeface="Century Gothic"/>
+              </a:rPr>
+              <a:t>standards</a:t>
+            </a:r>
+          </a:p>
+          <a:p>
+            <a:pPr>
+              <a:buSzPct val="45000"/>
+              <a:buFont typeface="StarSymbol"/>
+              <a:buChar char=""/>
+            </a:pPr>
+            <a:endParaRPr lang="en-US" dirty="0"/>
+          </a:p>
+          <a:p>
+            <a:pPr>
+              <a:buSzPct val="45000"/>
+              <a:buFont typeface="StarSymbol"/>
+              <a:buChar char=""/>
+            </a:pPr>
+            <a:r>
+              <a:rPr lang="en-US" dirty="0">
+                <a:ea typeface="Century Gothic"/>
+              </a:rPr>
+              <a:t>Google code issue tracker used for issues</a:t>
+            </a:r>
+            <a:endParaRPr lang="en-US" dirty="0"/>
+          </a:p>
+          <a:p>
+            <a:endParaRPr lang="en-US" dirty="0"/>
+          </a:p>
+          <a:p>
+            <a:endParaRPr lang="en-US" dirty="0"/>
+          </a:p>
+          <a:p>
+            <a:endParaRPr lang="en-US" dirty="0"/>
+          </a:p>
+        </p:txBody>
+      </p:sp>
+    </p:spTree>
+  </p:cSld>
+  <p:clrMapOvr>
+    <a:masterClrMapping/>
+  </p:clrMapOvr>
+</p:sld>
+</file>
+
+<file path=ppt/slides/slide21.xml><?xml version="1.0" encoding="utf-8"?>
+<p:sld xmlns:a="http://schemas.openxmlformats.org/drawingml/2006/main" xmlns:r="http://schemas.openxmlformats.org/officeDocument/2006/relationships" xmlns:p="http://schemas.openxmlformats.org/presentationml/2006/main">
+  <p:cSld>
+    <p:spTree>
+      <p:nvGrpSpPr>
+        <p:cNvPr id="1" name=""/>
+        <p:cNvGrpSpPr/>
+        <p:nvPr/>
+      </p:nvGrpSpPr>
+      <p:grpSpPr>
+        <a:xfrm>
+          <a:off x="0" y="0"/>
+          <a:ext cx="0" cy="0"/>
+          <a:chOff x="0" y="0"/>
+          <a:chExt cx="0" cy="0"/>
+        </a:xfrm>
+      </p:grpSpPr>
+      <p:sp>
+        <p:nvSpPr>
+          <p:cNvPr id="2" name="Title 1"/>
+          <p:cNvSpPr>
+            <a:spLocks noGrp="1"/>
+          </p:cNvSpPr>
+          <p:nvPr>
+            <p:ph type="title"/>
+          </p:nvPr>
+        </p:nvSpPr>
+        <p:spPr>
+          <a:xfrm>
+            <a:off x="796065" y="456164"/>
+            <a:ext cx="7024744" cy="1143000"/>
+          </a:xfrm>
+        </p:spPr>
+        <p:txBody>
           <a:bodyPr/>
           <a:lstStyle/>
           <a:p>
@@ -24056,19 +24238,7 @@
               <a:rPr lang="en-US" dirty="0" smtClean="0">
                 <a:hlinkClick r:id="rId2"/>
               </a:rPr>
-              <a:t>http</a:t>
-            </a:r>
-            <a:r>
-              <a:rPr lang="en-US" dirty="0" smtClean="0">
-                <a:hlinkClick r:id="rId2"/>
-              </a:rPr>
-              <a:t>://</a:t>
-            </a:r>
-            <a:r>
-              <a:rPr lang="en-US" dirty="0" smtClean="0">
-                <a:hlinkClick r:id="rId2"/>
-              </a:rPr>
-              <a:t>code.google.com/p/cs679-b1-class project/issues/list</a:t>
+              <a:t>http://code.google.com/p/cs679-b1-class project/issues/list</a:t>
             </a:r>
             <a:endParaRPr lang="en-US" dirty="0" smtClean="0"/>
           </a:p>
@@ -24140,11 +24310,6 @@
               </a:rPr>
               <a:t>Criteria</a:t>
             </a:r>
-            <a:endParaRPr lang="en-US" sz="2400" dirty="0" smtClean="0">
-              <a:solidFill>
-                <a:schemeClr val="tx2"/>
-              </a:solidFill>
-            </a:endParaRPr>
           </a:p>
         </p:txBody>
       </p:sp>
@@ -24178,11 +24343,6 @@
               </a:rPr>
               <a:t>Example</a:t>
             </a:r>
-            <a:endParaRPr lang="en-US" sz="2400" dirty="0" smtClean="0">
-              <a:solidFill>
-                <a:schemeClr val="tx2"/>
-              </a:solidFill>
-            </a:endParaRPr>
           </a:p>
         </p:txBody>
       </p:sp>
@@ -24230,11 +24390,7 @@
             </a:pPr>
             <a:r>
               <a:rPr lang="en-US" dirty="0" smtClean="0"/>
-              <a:t> </a:t>
-            </a:r>
-            <a:r>
-              <a:rPr lang="en-US" dirty="0" smtClean="0"/>
-              <a:t>Type</a:t>
+              <a:t> Type</a:t>
             </a:r>
           </a:p>
           <a:p>
@@ -24247,11 +24403,7 @@
             </a:pPr>
             <a:r>
               <a:rPr lang="en-US" dirty="0" smtClean="0"/>
-              <a:t> </a:t>
-            </a:r>
-            <a:r>
-              <a:rPr lang="en-US" dirty="0" smtClean="0"/>
-              <a:t>Status</a:t>
+              <a:t> Status</a:t>
             </a:r>
           </a:p>
           <a:p>
@@ -24264,11 +24416,7 @@
             </a:pPr>
             <a:r>
               <a:rPr lang="en-US" dirty="0" smtClean="0"/>
-              <a:t> </a:t>
-            </a:r>
-            <a:r>
-              <a:rPr lang="en-US" dirty="0" smtClean="0"/>
-              <a:t>Priority</a:t>
+              <a:t> Priority</a:t>
             </a:r>
           </a:p>
           <a:p>
@@ -24281,11 +24429,7 @@
             </a:pPr>
             <a:r>
               <a:rPr lang="en-US" dirty="0" smtClean="0"/>
-              <a:t> </a:t>
-            </a:r>
-            <a:r>
-              <a:rPr lang="en-US" dirty="0" smtClean="0"/>
-              <a:t>Owner</a:t>
+              <a:t> Owner</a:t>
             </a:r>
           </a:p>
           <a:p>
@@ -24298,11 +24442,7 @@
             </a:pPr>
             <a:r>
               <a:rPr lang="en-US" dirty="0" smtClean="0"/>
-              <a:t> </a:t>
-            </a:r>
-            <a:r>
-              <a:rPr lang="en-US" dirty="0" smtClean="0"/>
-              <a:t>Summary</a:t>
+              <a:t> Summary</a:t>
             </a:r>
             <a:endParaRPr lang="en-US" dirty="0"/>
           </a:p>
@@ -24352,11 +24492,7 @@
             </a:pPr>
             <a:r>
               <a:rPr lang="en-US" dirty="0" smtClean="0"/>
-              <a:t> </a:t>
-            </a:r>
-            <a:r>
-              <a:rPr lang="en-US" dirty="0" smtClean="0"/>
-              <a:t>Type: Defect</a:t>
+              <a:t> Type: Defect</a:t>
             </a:r>
           </a:p>
           <a:p>
@@ -24369,11 +24505,7 @@
             </a:pPr>
             <a:r>
               <a:rPr lang="en-US" dirty="0" smtClean="0"/>
-              <a:t> </a:t>
-            </a:r>
-            <a:r>
-              <a:rPr lang="en-US" dirty="0" smtClean="0"/>
-              <a:t>Status: Accepted</a:t>
+              <a:t> Status: Accepted</a:t>
             </a:r>
           </a:p>
           <a:p>
@@ -24386,11 +24518,7 @@
             </a:pPr>
             <a:r>
               <a:rPr lang="en-US" dirty="0" smtClean="0"/>
-              <a:t> </a:t>
-            </a:r>
-            <a:r>
-              <a:rPr lang="en-US" dirty="0" smtClean="0"/>
-              <a:t>Priority: Critical</a:t>
+              <a:t> Priority: Critical</a:t>
             </a:r>
           </a:p>
           <a:p>
@@ -24403,11 +24531,7 @@
             </a:pPr>
             <a:r>
               <a:rPr lang="en-US" dirty="0" smtClean="0"/>
-              <a:t> </a:t>
-            </a:r>
-            <a:r>
-              <a:rPr lang="en-US" dirty="0" smtClean="0"/>
-              <a:t>Owner: </a:t>
+              <a:t> Owner: </a:t>
             </a:r>
             <a:r>
               <a:rPr lang="en-US" dirty="0" err="1" smtClean="0"/>
@@ -24422,11 +24546,7 @@
             </a:pPr>
             <a:r>
               <a:rPr lang="en-US" dirty="0" smtClean="0"/>
-              <a:t> </a:t>
-            </a:r>
-            <a:r>
-              <a:rPr lang="en-US" dirty="0" smtClean="0"/>
-              <a:t>Summary: Category on transactions are not loaded correctly</a:t>
+              <a:t> Summary: Category on transactions are not loaded correctly</a:t>
             </a:r>
             <a:endParaRPr lang="en-US" dirty="0"/>
           </a:p>
@@ -24440,7 +24560,123 @@
 </p:sld>
 </file>
 
-<file path=ppt/slides/slide21.xml><?xml version="1.0" encoding="utf-8"?>
+<file path=ppt/slides/slide22.xml><?xml version="1.0" encoding="utf-8"?>
+<p:sld xmlns:a="http://schemas.openxmlformats.org/drawingml/2006/main" xmlns:r="http://schemas.openxmlformats.org/officeDocument/2006/relationships" xmlns:p="http://schemas.openxmlformats.org/presentationml/2006/main">
+  <p:cSld>
+    <p:spTree>
+      <p:nvGrpSpPr>
+        <p:cNvPr id="1" name=""/>
+        <p:cNvGrpSpPr/>
+        <p:nvPr/>
+      </p:nvGrpSpPr>
+      <p:grpSpPr>
+        <a:xfrm>
+          <a:off x="0" y="0"/>
+          <a:ext cx="0" cy="0"/>
+          <a:chOff x="0" y="0"/>
+          <a:chExt cx="0" cy="0"/>
+        </a:xfrm>
+      </p:grpSpPr>
+      <p:sp>
+        <p:nvSpPr>
+          <p:cNvPr id="2" name="Title 1"/>
+          <p:cNvSpPr>
+            <a:spLocks noGrp="1"/>
+          </p:cNvSpPr>
+          <p:nvPr>
+            <p:ph type="title"/>
+          </p:nvPr>
+        </p:nvSpPr>
+        <p:spPr>
+          <a:xfrm>
+            <a:off x="924025" y="607786"/>
+            <a:ext cx="7024744" cy="1143000"/>
+          </a:xfrm>
+        </p:spPr>
+        <p:txBody>
+          <a:bodyPr/>
+          <a:lstStyle/>
+          <a:p>
+            <a:r>
+              <a:rPr lang="en-US" dirty="0" smtClean="0"/>
+              <a:t>Bug Tracking</a:t>
+            </a:r>
+            <a:endParaRPr lang="en-US" dirty="0"/>
+          </a:p>
+        </p:txBody>
+      </p:sp>
+      <p:sp>
+        <p:nvSpPr>
+          <p:cNvPr id="3" name="Content Placeholder 2"/>
+          <p:cNvSpPr>
+            <a:spLocks noGrp="1"/>
+          </p:cNvSpPr>
+          <p:nvPr>
+            <p:ph idx="1"/>
+          </p:nvPr>
+        </p:nvSpPr>
+        <p:spPr/>
+        <p:txBody>
+          <a:bodyPr/>
+          <a:lstStyle/>
+          <a:p>
+            <a:endParaRPr lang="en-US"/>
+          </a:p>
+        </p:txBody>
+      </p:sp>
+      <p:pic>
+        <p:nvPicPr>
+          <p:cNvPr id="39938" name="Picture 2" descr="C:\Users\Jonathan Reimels\Desktop\Screen Shot 2012-04-29 at 11.19.39 PM.png"/>
+          <p:cNvPicPr>
+            <a:picLocks noChangeAspect="1" noChangeArrowheads="1"/>
+          </p:cNvPicPr>
+          <p:nvPr/>
+        </p:nvPicPr>
+        <p:blipFill rotWithShape="1">
+          <a:blip r:embed="rId2" cstate="email">
+            <a:extLst>
+              <a:ext uri="{28A0092B-C50C-407E-A947-70E740481C1C}">
+                <a14:useLocalDpi xmlns:a14="http://schemas.microsoft.com/office/drawing/2010/main" val="0"/>
+              </a:ext>
+            </a:extLst>
+          </a:blip>
+          <a:srcRect l="4748" t="23778" r="12503" b="12350"/>
+          <a:stretch/>
+        </p:blipFill>
+        <p:spPr bwMode="auto">
+          <a:xfrm>
+            <a:off x="977340" y="2155778"/>
+            <a:ext cx="6971429" cy="4068801"/>
+          </a:xfrm>
+          <a:prstGeom prst="rect">
+            <a:avLst/>
+          </a:prstGeom>
+          <a:noFill/>
+          <a:extLst>
+            <a:ext uri="{909E8E84-426E-40DD-AFC4-6F175D3DCCD1}">
+              <a14:hiddenFill xmlns:a14="http://schemas.microsoft.com/office/drawing/2010/main">
+                <a:solidFill>
+                  <a:srgbClr val="FFFFFF"/>
+                </a:solidFill>
+              </a14:hiddenFill>
+            </a:ext>
+          </a:extLst>
+        </p:spPr>
+      </p:pic>
+    </p:spTree>
+    <p:extLst>
+      <p:ext uri="{BB962C8B-B14F-4D97-AF65-F5344CB8AC3E}">
+        <p14:creationId xmlns:p14="http://schemas.microsoft.com/office/powerpoint/2010/main" val="3699591201"/>
+      </p:ext>
+    </p:extLst>
+  </p:cSld>
+  <p:clrMapOvr>
+    <a:masterClrMapping/>
+  </p:clrMapOvr>
+</p:sld>
+</file>
+
+<file path=ppt/slides/slide23.xml><?xml version="1.0" encoding="utf-8"?>
 <p:sld xmlns:a="http://schemas.openxmlformats.org/drawingml/2006/main" xmlns:r="http://schemas.openxmlformats.org/officeDocument/2006/relationships" xmlns:p="http://schemas.openxmlformats.org/presentationml/2006/main">
   <p:cSld>
     <p:spTree>
@@ -24578,7 +24814,7 @@
 </p:sld>
 </file>
 
-<file path=ppt/slides/slide22.xml><?xml version="1.0" encoding="utf-8"?>
+<file path=ppt/slides/slide24.xml><?xml version="1.0" encoding="utf-8"?>
 <p:sld xmlns:a="http://schemas.openxmlformats.org/drawingml/2006/main" xmlns:r="http://schemas.openxmlformats.org/officeDocument/2006/relationships" xmlns:p="http://schemas.openxmlformats.org/presentationml/2006/main">
   <p:cSld>
     <p:spTree>
@@ -24660,7 +24896,7 @@
     </p:spTree>
     <p:extLst>
       <p:ext uri="{BB962C8B-B14F-4D97-AF65-F5344CB8AC3E}">
-        <p14:creationId xmlns:p14="http://schemas.microsoft.com/office/powerpoint/2010/main" xmlns="" val="3832736806"/>
+        <p14:creationId xmlns:p14="http://schemas.microsoft.com/office/powerpoint/2010/main" val="3832736806"/>
       </p:ext>
     </p:extLst>
   </p:cSld>
@@ -24677,7 +24913,7 @@
 </p:sld>
 </file>
 
-<file path=ppt/slides/slide23.xml><?xml version="1.0" encoding="utf-8"?>
+<file path=ppt/slides/slide25.xml><?xml version="1.0" encoding="utf-8"?>
 <p:sld xmlns:a="http://schemas.openxmlformats.org/drawingml/2006/main" xmlns:r="http://schemas.openxmlformats.org/officeDocument/2006/relationships" xmlns:p="http://schemas.openxmlformats.org/presentationml/2006/main">
   <p:cSld>
     <p:spTree>
@@ -24777,7 +25013,7 @@
     </p:spTree>
     <p:extLst>
       <p:ext uri="{BB962C8B-B14F-4D97-AF65-F5344CB8AC3E}">
-        <p14:creationId xmlns:p14="http://schemas.microsoft.com/office/powerpoint/2010/main" xmlns="" val="1092677546"/>
+        <p14:creationId xmlns:p14="http://schemas.microsoft.com/office/powerpoint/2010/main" val="1092677546"/>
       </p:ext>
     </p:extLst>
   </p:cSld>
@@ -24794,7 +25030,7 @@
 </p:sld>
 </file>
 
-<file path=ppt/slides/slide24.xml><?xml version="1.0" encoding="utf-8"?>
+<file path=ppt/slides/slide26.xml><?xml version="1.0" encoding="utf-8"?>
 <p:sld xmlns:a="http://schemas.openxmlformats.org/drawingml/2006/main" xmlns:r="http://schemas.openxmlformats.org/officeDocument/2006/relationships" xmlns:p="http://schemas.openxmlformats.org/presentationml/2006/main">
   <p:cSld>
     <p:spTree>
@@ -24960,7 +25196,7 @@
     </p:spTree>
     <p:extLst>
       <p:ext uri="{BB962C8B-B14F-4D97-AF65-F5344CB8AC3E}">
-        <p14:creationId xmlns:p14="http://schemas.microsoft.com/office/powerpoint/2010/main" xmlns="" val="3037995522"/>
+        <p14:creationId xmlns:p14="http://schemas.microsoft.com/office/powerpoint/2010/main" val="3037995522"/>
       </p:ext>
     </p:extLst>
   </p:cSld>
@@ -24977,7 +25213,7 @@
 </p:sld>
 </file>
 
-<file path=ppt/slides/slide25.xml><?xml version="1.0" encoding="utf-8"?>
+<file path=ppt/slides/slide27.xml><?xml version="1.0" encoding="utf-8"?>
 <p:sld xmlns:a="http://schemas.openxmlformats.org/drawingml/2006/main" xmlns:r="http://schemas.openxmlformats.org/officeDocument/2006/relationships" xmlns:p="http://schemas.openxmlformats.org/presentationml/2006/main">
   <p:cSld>
     <p:spTree>
@@ -25077,14 +25313,14 @@
           <a:effectLst/>
           <a:extLst>
             <a:ext uri="{909E8E84-426E-40DD-AFC4-6F175D3DCCD1}">
-              <a14:hiddenFill xmlns:a14="http://schemas.microsoft.com/office/drawing/2010/main" xmlns="">
+              <a14:hiddenFill xmlns:a14="http://schemas.microsoft.com/office/drawing/2010/main">
                 <a:solidFill>
                   <a:schemeClr val="accent1"/>
                 </a:solidFill>
               </a14:hiddenFill>
             </a:ext>
             <a:ext uri="{91240B29-F687-4F45-9708-019B960494DF}">
-              <a14:hiddenLine xmlns:a14="http://schemas.microsoft.com/office/drawing/2010/main" xmlns="" w="9525">
+              <a14:hiddenLine xmlns:a14="http://schemas.microsoft.com/office/drawing/2010/main" w="9525">
                 <a:solidFill>
                   <a:schemeClr val="tx1"/>
                 </a:solidFill>
@@ -25094,7 +25330,7 @@
               </a14:hiddenLine>
             </a:ext>
             <a:ext uri="{AF507438-7753-43E0-B8FC-AC1667EBCBE1}">
-              <a14:hiddenEffects xmlns:a14="http://schemas.microsoft.com/office/drawing/2010/main" xmlns="">
+              <a14:hiddenEffects xmlns:a14="http://schemas.microsoft.com/office/drawing/2010/main">
                 <a:effectLst>
                   <a:outerShdw dist="35921" dir="2700000" algn="ctr" rotWithShape="0">
                     <a:schemeClr val="bg2"/>
@@ -25126,7 +25362,7 @@
           <p:nvPr>
             <p:extLst>
               <p:ext uri="{D42A27DB-BD31-4B8C-83A1-F6EECF244321}">
-                <p14:modId xmlns:p14="http://schemas.microsoft.com/office/powerpoint/2010/main" xmlns="" val="99859930"/>
+                <p14:modId xmlns:p14="http://schemas.microsoft.com/office/powerpoint/2010/main" val="99859930"/>
               </p:ext>
             </p:extLst>
           </p:nvPr>
@@ -25137,518 +25373,66 @@
         </p:xfrm>
         <a:graphic>
           <a:graphicData uri="http://schemas.openxmlformats.org/presentationml/2006/ole">
-            <p:oleObj spid="_x0000_s36868" name="Visio" r:id="rId4" imgW="4580844" imgH="5596830" progId="">
-              <p:embed/>
-            </p:oleObj>
+            <mc:AlternateContent xmlns:mc="http://schemas.openxmlformats.org/markup-compatibility/2006">
+              <mc:Choice xmlns:v="urn:schemas-microsoft-com:vml" Requires="v">
+                <p:oleObj spid="_x0000_s36872" name="Visio" r:id="rId4" imgW="4580844" imgH="5596830" progId="">
+                  <p:embed/>
+                </p:oleObj>
+              </mc:Choice>
+              <mc:Fallback>
+                <p:oleObj name="Visio" r:id="rId4" imgW="4580844" imgH="5596830" progId="">
+                  <p:embed/>
+                  <p:pic>
+                    <p:nvPicPr>
+                      <p:cNvPr id="0" name="Picture 4"/>
+                      <p:cNvPicPr>
+                        <a:picLocks noChangeAspect="1" noChangeArrowheads="1"/>
+                      </p:cNvPicPr>
+                      <p:nvPr/>
+                    </p:nvPicPr>
+                    <p:blipFill>
+                      <a:blip r:embed="rId5">
+                        <a:extLst>
+                          <a:ext uri="{28A0092B-C50C-407E-A947-70E740481C1C}">
+                            <a14:useLocalDpi xmlns:a14="http://schemas.microsoft.com/office/drawing/2010/main" val="0"/>
+                          </a:ext>
+                        </a:extLst>
+                      </a:blip>
+                      <a:srcRect/>
+                      <a:stretch>
+                        <a:fillRect/>
+                      </a:stretch>
+                    </p:blipFill>
+                    <p:spPr bwMode="auto">
+                      <a:xfrm>
+                        <a:off x="4399912" y="1279872"/>
+                        <a:ext cx="4282558" cy="5235227"/>
+                      </a:xfrm>
+                      <a:prstGeom prst="rect">
+                        <a:avLst/>
+                      </a:prstGeom>
+                      <a:noFill/>
+                      <a:extLst>
+                        <a:ext uri="{909E8E84-426E-40DD-AFC4-6F175D3DCCD1}">
+                          <a14:hiddenFill xmlns:a14="http://schemas.microsoft.com/office/drawing/2010/main">
+                            <a:solidFill>
+                              <a:srgbClr val="FFFFFF"/>
+                            </a:solidFill>
+                          </a14:hiddenFill>
+                        </a:ext>
+                      </a:extLst>
+                    </p:spPr>
+                  </p:pic>
+                </p:oleObj>
+              </mc:Fallback>
+            </mc:AlternateContent>
           </a:graphicData>
         </a:graphic>
       </p:graphicFrame>
     </p:spTree>
     <p:extLst>
       <p:ext uri="{BB962C8B-B14F-4D97-AF65-F5344CB8AC3E}">
-        <p14:creationId xmlns:p14="http://schemas.microsoft.com/office/powerpoint/2010/main" xmlns="" val="224431329"/>
-      </p:ext>
-    </p:extLst>
-  </p:cSld>
-  <p:clrMapOvr>
-    <a:masterClrMapping/>
-  </p:clrMapOvr>
-  <p:timing>
-    <p:tnLst>
-      <p:par>
-        <p:cTn id="1" dur="indefinite" restart="never" nodeType="tmRoot"/>
-      </p:par>
-    </p:tnLst>
-  </p:timing>
-</p:sld>
-</file>
-
-<file path=ppt/slides/slide26.xml><?xml version="1.0" encoding="utf-8"?>
-<p:sld xmlns:a="http://schemas.openxmlformats.org/drawingml/2006/main" xmlns:r="http://schemas.openxmlformats.org/officeDocument/2006/relationships" xmlns:p="http://schemas.openxmlformats.org/presentationml/2006/main">
-  <p:cSld>
-    <p:spTree>
-      <p:nvGrpSpPr>
-        <p:cNvPr id="1" name=""/>
-        <p:cNvGrpSpPr/>
-        <p:nvPr/>
-      </p:nvGrpSpPr>
-      <p:grpSpPr>
-        <a:xfrm>
-          <a:off x="0" y="0"/>
-          <a:ext cx="0" cy="0"/>
-          <a:chOff x="0" y="0"/>
-          <a:chExt cx="0" cy="0"/>
-        </a:xfrm>
-      </p:grpSpPr>
-      <p:sp>
-        <p:nvSpPr>
-          <p:cNvPr id="2" name="Title 1"/>
-          <p:cNvSpPr>
-            <a:spLocks noGrp="1"/>
-          </p:cNvSpPr>
-          <p:nvPr>
-            <p:ph type="title"/>
-          </p:nvPr>
-        </p:nvSpPr>
-        <p:spPr>
-          <a:xfrm>
-            <a:off x="1043490" y="641291"/>
-            <a:ext cx="7024744" cy="638582"/>
-          </a:xfrm>
-        </p:spPr>
-        <p:txBody>
-          <a:bodyPr>
-            <a:normAutofit fontScale="90000"/>
-          </a:bodyPr>
-          <a:lstStyle/>
-          <a:p>
-            <a:r>
-              <a:rPr lang="en-US" dirty="0" smtClean="0"/>
-              <a:t>Human Interface Design</a:t>
-            </a:r>
-            <a:endParaRPr lang="en-US" dirty="0"/>
-          </a:p>
-        </p:txBody>
-      </p:sp>
-      <p:sp>
-        <p:nvSpPr>
-          <p:cNvPr id="3" name="Rectangle 2"/>
-          <p:cNvSpPr>
-            <a:spLocks noChangeArrowheads="1"/>
-          </p:cNvSpPr>
-          <p:nvPr/>
-        </p:nvSpPr>
-        <p:spPr bwMode="auto">
-          <a:xfrm>
-            <a:off x="0" y="0"/>
-            <a:ext cx="9144000" cy="0"/>
-          </a:xfrm>
-          <a:prstGeom prst="rect">
-            <a:avLst/>
-          </a:prstGeom>
-          <a:noFill/>
-          <a:ln>
-            <a:noFill/>
-          </a:ln>
-          <a:effectLst/>
-          <a:extLst>
-            <a:ext uri="{909E8E84-426E-40DD-AFC4-6F175D3DCCD1}">
-              <a14:hiddenFill xmlns:a14="http://schemas.microsoft.com/office/drawing/2010/main" xmlns="">
-                <a:solidFill>
-                  <a:schemeClr val="accent1"/>
-                </a:solidFill>
-              </a14:hiddenFill>
-            </a:ext>
-            <a:ext uri="{91240B29-F687-4F45-9708-019B960494DF}">
-              <a14:hiddenLine xmlns:a14="http://schemas.microsoft.com/office/drawing/2010/main" xmlns="" w="9525">
-                <a:solidFill>
-                  <a:schemeClr val="tx1"/>
-                </a:solidFill>
-                <a:miter lim="800000"/>
-                <a:headEnd/>
-                <a:tailEnd/>
-              </a14:hiddenLine>
-            </a:ext>
-            <a:ext uri="{AF507438-7753-43E0-B8FC-AC1667EBCBE1}">
-              <a14:hiddenEffects xmlns:a14="http://schemas.microsoft.com/office/drawing/2010/main" xmlns="">
-                <a:effectLst>
-                  <a:outerShdw dist="35921" dir="2700000" algn="ctr" rotWithShape="0">
-                    <a:schemeClr val="bg2"/>
-                  </a:outerShdw>
-                </a:effectLst>
-              </a14:hiddenEffects>
-            </a:ext>
-          </a:extLst>
-        </p:spPr>
-        <p:txBody>
-          <a:bodyPr vert="horz" wrap="none" lIns="91440" tIns="45720" rIns="91440" bIns="45720" numCol="1" anchor="ctr" anchorCtr="0" compatLnSpc="1">
-            <a:prstTxWarp prst="textNoShape">
-              <a:avLst/>
-            </a:prstTxWarp>
-            <a:spAutoFit/>
-          </a:bodyPr>
-          <a:lstStyle/>
-          <a:p>
-            <a:endParaRPr lang="en-US"/>
-          </a:p>
-        </p:txBody>
-      </p:sp>
-      <p:pic>
-        <p:nvPicPr>
-          <p:cNvPr id="6" name="Picture" descr="A description..."/>
-          <p:cNvPicPr/>
-          <p:nvPr/>
-        </p:nvPicPr>
-        <p:blipFill>
-          <a:blip r:embed="rId3" cstate="print"/>
-          <a:srcRect/>
-          <a:stretch>
-            <a:fillRect/>
-          </a:stretch>
-        </p:blipFill>
-        <p:spPr bwMode="auto">
-          <a:xfrm>
-            <a:off x="482600" y="1551710"/>
-            <a:ext cx="6851073" cy="4626436"/>
-          </a:xfrm>
-          <a:prstGeom prst="rect">
-            <a:avLst/>
-          </a:prstGeom>
-          <a:noFill/>
-          <a:ln w="9525">
-            <a:noFill/>
-            <a:miter lim="800000"/>
-            <a:headEnd/>
-            <a:tailEnd/>
-          </a:ln>
-        </p:spPr>
-      </p:pic>
-      <p:sp>
-        <p:nvSpPr>
-          <p:cNvPr id="5" name="Rectangle 2"/>
-          <p:cNvSpPr>
-            <a:spLocks noChangeArrowheads="1"/>
-          </p:cNvSpPr>
-          <p:nvPr/>
-        </p:nvSpPr>
-        <p:spPr bwMode="auto">
-          <a:xfrm>
-            <a:off x="0" y="0"/>
-            <a:ext cx="9144000" cy="0"/>
-          </a:xfrm>
-          <a:prstGeom prst="rect">
-            <a:avLst/>
-          </a:prstGeom>
-          <a:noFill/>
-          <a:ln>
-            <a:noFill/>
-          </a:ln>
-          <a:effectLst/>
-          <a:extLst>
-            <a:ext uri="{909E8E84-426E-40DD-AFC4-6F175D3DCCD1}">
-              <a14:hiddenFill xmlns:a14="http://schemas.microsoft.com/office/drawing/2010/main" xmlns="">
-                <a:solidFill>
-                  <a:schemeClr val="accent1"/>
-                </a:solidFill>
-              </a14:hiddenFill>
-            </a:ext>
-            <a:ext uri="{91240B29-F687-4F45-9708-019B960494DF}">
-              <a14:hiddenLine xmlns:a14="http://schemas.microsoft.com/office/drawing/2010/main" xmlns="" w="9525">
-                <a:solidFill>
-                  <a:schemeClr val="tx1"/>
-                </a:solidFill>
-                <a:miter lim="800000"/>
-                <a:headEnd/>
-                <a:tailEnd/>
-              </a14:hiddenLine>
-            </a:ext>
-            <a:ext uri="{AF507438-7753-43E0-B8FC-AC1667EBCBE1}">
-              <a14:hiddenEffects xmlns:a14="http://schemas.microsoft.com/office/drawing/2010/main" xmlns="">
-                <a:effectLst>
-                  <a:outerShdw dist="35921" dir="2700000" algn="ctr" rotWithShape="0">
-                    <a:schemeClr val="bg2"/>
-                  </a:outerShdw>
-                </a:effectLst>
-              </a14:hiddenEffects>
-            </a:ext>
-          </a:extLst>
-        </p:spPr>
-        <p:txBody>
-          <a:bodyPr vert="horz" wrap="none" lIns="91440" tIns="45720" rIns="91440" bIns="45720" numCol="1" anchor="ctr" anchorCtr="0" compatLnSpc="1">
-            <a:prstTxWarp prst="textNoShape">
-              <a:avLst/>
-            </a:prstTxWarp>
-            <a:spAutoFit/>
-          </a:bodyPr>
-          <a:lstStyle/>
-          <a:p>
-            <a:endParaRPr lang="en-US"/>
-          </a:p>
-        </p:txBody>
-      </p:sp>
-      <p:graphicFrame>
-        <p:nvGraphicFramePr>
-          <p:cNvPr id="8" name="Object 7"/>
-          <p:cNvGraphicFramePr>
-            <a:graphicFrameLocks noChangeAspect="1"/>
-          </p:cNvGraphicFramePr>
-          <p:nvPr>
-            <p:extLst>
-              <p:ext uri="{D42A27DB-BD31-4B8C-83A1-F6EECF244321}">
-                <p14:modId xmlns:p14="http://schemas.microsoft.com/office/powerpoint/2010/main" xmlns="" val="1552680796"/>
-              </p:ext>
-            </p:extLst>
-          </p:nvPr>
-        </p:nvGraphicFramePr>
-        <p:xfrm>
-          <a:off x="7213600" y="933016"/>
-          <a:ext cx="1447800" cy="5324475"/>
-        </p:xfrm>
-        <a:graphic>
-          <a:graphicData uri="http://schemas.openxmlformats.org/presentationml/2006/ole">
-            <p:oleObj spid="_x0000_s37892" name="Visio" r:id="rId4" imgW="1447108" imgH="5311032" progId="">
-              <p:embed/>
-            </p:oleObj>
-          </a:graphicData>
-        </a:graphic>
-      </p:graphicFrame>
-    </p:spTree>
-    <p:extLst>
-      <p:ext uri="{BB962C8B-B14F-4D97-AF65-F5344CB8AC3E}">
-        <p14:creationId xmlns:p14="http://schemas.microsoft.com/office/powerpoint/2010/main" xmlns="" val="2798939284"/>
-      </p:ext>
-    </p:extLst>
-  </p:cSld>
-  <p:clrMapOvr>
-    <a:masterClrMapping/>
-  </p:clrMapOvr>
-  <p:timing>
-    <p:tnLst>
-      <p:par>
-        <p:cTn id="1" dur="indefinite" restart="never" nodeType="tmRoot"/>
-      </p:par>
-    </p:tnLst>
-  </p:timing>
-</p:sld>
-</file>
-
-<file path=ppt/slides/slide27.xml><?xml version="1.0" encoding="utf-8"?>
-<p:sld xmlns:a="http://schemas.openxmlformats.org/drawingml/2006/main" xmlns:r="http://schemas.openxmlformats.org/officeDocument/2006/relationships" xmlns:p="http://schemas.openxmlformats.org/presentationml/2006/main">
-  <p:cSld>
-    <p:spTree>
-      <p:nvGrpSpPr>
-        <p:cNvPr id="1" name=""/>
-        <p:cNvGrpSpPr/>
-        <p:nvPr/>
-      </p:nvGrpSpPr>
-      <p:grpSpPr>
-        <a:xfrm>
-          <a:off x="0" y="0"/>
-          <a:ext cx="0" cy="0"/>
-          <a:chOff x="0" y="0"/>
-          <a:chExt cx="0" cy="0"/>
-        </a:xfrm>
-      </p:grpSpPr>
-      <p:sp>
-        <p:nvSpPr>
-          <p:cNvPr id="2" name="Title 1"/>
-          <p:cNvSpPr>
-            <a:spLocks noGrp="1"/>
-          </p:cNvSpPr>
-          <p:nvPr>
-            <p:ph type="title"/>
-          </p:nvPr>
-        </p:nvSpPr>
-        <p:spPr>
-          <a:xfrm>
-            <a:off x="1043490" y="641291"/>
-            <a:ext cx="7024744" cy="638582"/>
-          </a:xfrm>
-        </p:spPr>
-        <p:txBody>
-          <a:bodyPr>
-            <a:normAutofit fontScale="90000"/>
-          </a:bodyPr>
-          <a:lstStyle/>
-          <a:p>
-            <a:r>
-              <a:rPr lang="en-US" dirty="0" smtClean="0"/>
-              <a:t>Human Interface Design</a:t>
-            </a:r>
-            <a:endParaRPr lang="en-US" dirty="0"/>
-          </a:p>
-        </p:txBody>
-      </p:sp>
-      <p:sp>
-        <p:nvSpPr>
-          <p:cNvPr id="3" name="Rectangle 2"/>
-          <p:cNvSpPr>
-            <a:spLocks noChangeArrowheads="1"/>
-          </p:cNvSpPr>
-          <p:nvPr/>
-        </p:nvSpPr>
-        <p:spPr bwMode="auto">
-          <a:xfrm>
-            <a:off x="0" y="0"/>
-            <a:ext cx="9144000" cy="0"/>
-          </a:xfrm>
-          <a:prstGeom prst="rect">
-            <a:avLst/>
-          </a:prstGeom>
-          <a:noFill/>
-          <a:ln>
-            <a:noFill/>
-          </a:ln>
-          <a:effectLst/>
-          <a:extLst>
-            <a:ext uri="{909E8E84-426E-40DD-AFC4-6F175D3DCCD1}">
-              <a14:hiddenFill xmlns:a14="http://schemas.microsoft.com/office/drawing/2010/main" xmlns="">
-                <a:solidFill>
-                  <a:schemeClr val="accent1"/>
-                </a:solidFill>
-              </a14:hiddenFill>
-            </a:ext>
-            <a:ext uri="{91240B29-F687-4F45-9708-019B960494DF}">
-              <a14:hiddenLine xmlns:a14="http://schemas.microsoft.com/office/drawing/2010/main" xmlns="" w="9525">
-                <a:solidFill>
-                  <a:schemeClr val="tx1"/>
-                </a:solidFill>
-                <a:miter lim="800000"/>
-                <a:headEnd/>
-                <a:tailEnd/>
-              </a14:hiddenLine>
-            </a:ext>
-            <a:ext uri="{AF507438-7753-43E0-B8FC-AC1667EBCBE1}">
-              <a14:hiddenEffects xmlns:a14="http://schemas.microsoft.com/office/drawing/2010/main" xmlns="">
-                <a:effectLst>
-                  <a:outerShdw dist="35921" dir="2700000" algn="ctr" rotWithShape="0">
-                    <a:schemeClr val="bg2"/>
-                  </a:outerShdw>
-                </a:effectLst>
-              </a14:hiddenEffects>
-            </a:ext>
-          </a:extLst>
-        </p:spPr>
-        <p:txBody>
-          <a:bodyPr vert="horz" wrap="none" lIns="91440" tIns="45720" rIns="91440" bIns="45720" numCol="1" anchor="ctr" anchorCtr="0" compatLnSpc="1">
-            <a:prstTxWarp prst="textNoShape">
-              <a:avLst/>
-            </a:prstTxWarp>
-            <a:spAutoFit/>
-          </a:bodyPr>
-          <a:lstStyle/>
-          <a:p>
-            <a:endParaRPr lang="en-US"/>
-          </a:p>
-        </p:txBody>
-      </p:sp>
-      <p:sp>
-        <p:nvSpPr>
-          <p:cNvPr id="5" name="Rectangle 2"/>
-          <p:cNvSpPr>
-            <a:spLocks noChangeArrowheads="1"/>
-          </p:cNvSpPr>
-          <p:nvPr/>
-        </p:nvSpPr>
-        <p:spPr bwMode="auto">
-          <a:xfrm>
-            <a:off x="0" y="0"/>
-            <a:ext cx="9144000" cy="0"/>
-          </a:xfrm>
-          <a:prstGeom prst="rect">
-            <a:avLst/>
-          </a:prstGeom>
-          <a:noFill/>
-          <a:ln>
-            <a:noFill/>
-          </a:ln>
-          <a:effectLst/>
-          <a:extLst>
-            <a:ext uri="{909E8E84-426E-40DD-AFC4-6F175D3DCCD1}">
-              <a14:hiddenFill xmlns:a14="http://schemas.microsoft.com/office/drawing/2010/main" xmlns="">
-                <a:solidFill>
-                  <a:schemeClr val="accent1"/>
-                </a:solidFill>
-              </a14:hiddenFill>
-            </a:ext>
-            <a:ext uri="{91240B29-F687-4F45-9708-019B960494DF}">
-              <a14:hiddenLine xmlns:a14="http://schemas.microsoft.com/office/drawing/2010/main" xmlns="" w="9525">
-                <a:solidFill>
-                  <a:schemeClr val="tx1"/>
-                </a:solidFill>
-                <a:miter lim="800000"/>
-                <a:headEnd/>
-                <a:tailEnd/>
-              </a14:hiddenLine>
-            </a:ext>
-            <a:ext uri="{AF507438-7753-43E0-B8FC-AC1667EBCBE1}">
-              <a14:hiddenEffects xmlns:a14="http://schemas.microsoft.com/office/drawing/2010/main" xmlns="">
-                <a:effectLst>
-                  <a:outerShdw dist="35921" dir="2700000" algn="ctr" rotWithShape="0">
-                    <a:schemeClr val="bg2"/>
-                  </a:outerShdw>
-                </a:effectLst>
-              </a14:hiddenEffects>
-            </a:ext>
-          </a:extLst>
-        </p:spPr>
-        <p:txBody>
-          <a:bodyPr vert="horz" wrap="none" lIns="91440" tIns="45720" rIns="91440" bIns="45720" numCol="1" anchor="ctr" anchorCtr="0" compatLnSpc="1">
-            <a:prstTxWarp prst="textNoShape">
-              <a:avLst/>
-            </a:prstTxWarp>
-            <a:spAutoFit/>
-          </a:bodyPr>
-          <a:lstStyle/>
-          <a:p>
-            <a:endParaRPr lang="en-US"/>
-          </a:p>
-        </p:txBody>
-      </p:sp>
-      <p:pic>
-        <p:nvPicPr>
-          <p:cNvPr id="7" name="Picture" descr="A description..."/>
-          <p:cNvPicPr/>
-          <p:nvPr/>
-        </p:nvPicPr>
-        <p:blipFill>
-          <a:blip r:embed="rId2" cstate="print"/>
-          <a:srcRect/>
-          <a:stretch>
-            <a:fillRect/>
-          </a:stretch>
-        </p:blipFill>
-        <p:spPr bwMode="auto">
-          <a:xfrm>
-            <a:off x="602990" y="1175904"/>
-            <a:ext cx="5942965" cy="1790700"/>
-          </a:xfrm>
-          <a:prstGeom prst="rect">
-            <a:avLst/>
-          </a:prstGeom>
-          <a:noFill/>
-          <a:ln w="9525">
-            <a:noFill/>
-            <a:miter lim="800000"/>
-            <a:headEnd/>
-            <a:tailEnd/>
-          </a:ln>
-        </p:spPr>
-      </p:pic>
-      <p:pic>
-        <p:nvPicPr>
-          <p:cNvPr id="9" name="Picture" descr="A description..."/>
-          <p:cNvPicPr/>
-          <p:nvPr/>
-        </p:nvPicPr>
-        <p:blipFill>
-          <a:blip r:embed="rId3" cstate="print"/>
-          <a:srcRect/>
-          <a:stretch>
-            <a:fillRect/>
-          </a:stretch>
-        </p:blipFill>
-        <p:spPr bwMode="auto">
-          <a:xfrm>
-            <a:off x="2680854" y="2434012"/>
-            <a:ext cx="5943600" cy="4058920"/>
-          </a:xfrm>
-          <a:prstGeom prst="rect">
-            <a:avLst/>
-          </a:prstGeom>
-          <a:noFill/>
-          <a:ln w="9525">
-            <a:noFill/>
-            <a:miter lim="800000"/>
-            <a:headEnd/>
-            <a:tailEnd/>
-          </a:ln>
-        </p:spPr>
-      </p:pic>
-    </p:spTree>
-    <p:extLst>
-      <p:ext uri="{BB962C8B-B14F-4D97-AF65-F5344CB8AC3E}">
-        <p14:creationId xmlns:p14="http://schemas.microsoft.com/office/powerpoint/2010/main" xmlns="" val="792481554"/>
+        <p14:creationId xmlns:p14="http://schemas.microsoft.com/office/powerpoint/2010/main" val="224431329"/>
       </p:ext>
     </p:extLst>
   </p:cSld>
@@ -25735,14 +25519,14 @@
           <a:effectLst/>
           <a:extLst>
             <a:ext uri="{909E8E84-426E-40DD-AFC4-6F175D3DCCD1}">
-              <a14:hiddenFill xmlns:a14="http://schemas.microsoft.com/office/drawing/2010/main" xmlns="">
+              <a14:hiddenFill xmlns:a14="http://schemas.microsoft.com/office/drawing/2010/main">
                 <a:solidFill>
                   <a:schemeClr val="accent1"/>
                 </a:solidFill>
               </a14:hiddenFill>
             </a:ext>
             <a:ext uri="{91240B29-F687-4F45-9708-019B960494DF}">
-              <a14:hiddenLine xmlns:a14="http://schemas.microsoft.com/office/drawing/2010/main" xmlns="" w="9525">
+              <a14:hiddenLine xmlns:a14="http://schemas.microsoft.com/office/drawing/2010/main" w="9525">
                 <a:solidFill>
                   <a:schemeClr val="tx1"/>
                 </a:solidFill>
@@ -25752,70 +25536,7 @@
               </a14:hiddenLine>
             </a:ext>
             <a:ext uri="{AF507438-7753-43E0-B8FC-AC1667EBCBE1}">
-              <a14:hiddenEffects xmlns:a14="http://schemas.microsoft.com/office/drawing/2010/main" xmlns="">
-                <a:effectLst>
-                  <a:outerShdw dist="35921" dir="2700000" algn="ctr" rotWithShape="0">
-                    <a:schemeClr val="bg2"/>
-                  </a:outerShdw>
-                </a:effectLst>
-              </a14:hiddenEffects>
-            </a:ext>
-          </a:extLst>
-        </p:spPr>
-        <p:txBody>
-          <a:bodyPr vert="horz" wrap="none" lIns="91440" tIns="45720" rIns="91440" bIns="45720" numCol="1" anchor="ctr" anchorCtr="0" compatLnSpc="1">
-            <a:prstTxWarp prst="textNoShape">
-              <a:avLst/>
-            </a:prstTxWarp>
-            <a:spAutoFit/>
-          </a:bodyPr>
-          <a:lstStyle/>
-          <a:p>
-            <a:endParaRPr lang="en-US"/>
-          </a:p>
-        </p:txBody>
-      </p:sp>
-      <p:sp>
-        <p:nvSpPr>
-          <p:cNvPr id="5" name="Rectangle 2"/>
-          <p:cNvSpPr>
-            <a:spLocks noChangeArrowheads="1"/>
-          </p:cNvSpPr>
-          <p:nvPr/>
-        </p:nvSpPr>
-        <p:spPr bwMode="auto">
-          <a:xfrm>
-            <a:off x="0" y="0"/>
-            <a:ext cx="9144000" cy="0"/>
-          </a:xfrm>
-          <a:prstGeom prst="rect">
-            <a:avLst/>
-          </a:prstGeom>
-          <a:noFill/>
-          <a:ln>
-            <a:noFill/>
-          </a:ln>
-          <a:effectLst/>
-          <a:extLst>
-            <a:ext uri="{909E8E84-426E-40DD-AFC4-6F175D3DCCD1}">
-              <a14:hiddenFill xmlns:a14="http://schemas.microsoft.com/office/drawing/2010/main" xmlns="">
-                <a:solidFill>
-                  <a:schemeClr val="accent1"/>
-                </a:solidFill>
-              </a14:hiddenFill>
-            </a:ext>
-            <a:ext uri="{91240B29-F687-4F45-9708-019B960494DF}">
-              <a14:hiddenLine xmlns:a14="http://schemas.microsoft.com/office/drawing/2010/main" xmlns="" w="9525">
-                <a:solidFill>
-                  <a:schemeClr val="tx1"/>
-                </a:solidFill>
-                <a:miter lim="800000"/>
-                <a:headEnd/>
-                <a:tailEnd/>
-              </a14:hiddenLine>
-            </a:ext>
-            <a:ext uri="{AF507438-7753-43E0-B8FC-AC1667EBCBE1}">
-              <a14:hiddenEffects xmlns:a14="http://schemas.microsoft.com/office/drawing/2010/main" xmlns="">
+              <a14:hiddenEffects xmlns:a14="http://schemas.microsoft.com/office/drawing/2010/main">
                 <a:effectLst>
                   <a:outerShdw dist="35921" dir="2700000" algn="ctr" rotWithShape="0">
                     <a:schemeClr val="bg2"/>
@@ -25840,18 +25561,12 @@
       </p:sp>
       <p:pic>
         <p:nvPicPr>
-          <p:cNvPr id="8" name="Picture 7"/>
+          <p:cNvPr id="6" name="Picture" descr="A description..."/>
           <p:cNvPicPr/>
           <p:nvPr/>
         </p:nvPicPr>
         <p:blipFill>
-          <a:blip r:embed="rId3" cstate="email">
-            <a:extLst>
-              <a:ext uri="{28A0092B-C50C-407E-A947-70E740481C1C}">
-                <a14:useLocalDpi xmlns:a14="http://schemas.microsoft.com/office/drawing/2010/main" xmlns="" val="0"/>
-              </a:ext>
-            </a:extLst>
-          </a:blip>
+          <a:blip r:embed="rId3" cstate="print"/>
           <a:srcRect/>
           <a:stretch>
             <a:fillRect/>
@@ -25859,21 +25574,24 @@
         </p:blipFill>
         <p:spPr bwMode="auto">
           <a:xfrm>
-            <a:off x="477173" y="2419927"/>
-            <a:ext cx="4981518" cy="2767560"/>
+            <a:off x="482600" y="1551710"/>
+            <a:ext cx="6851073" cy="4626436"/>
           </a:xfrm>
           <a:prstGeom prst="rect">
             <a:avLst/>
           </a:prstGeom>
           <a:noFill/>
-          <a:ln>
+          <a:ln w="9525">
             <a:noFill/>
+            <a:miter lim="800000"/>
+            <a:headEnd/>
+            <a:tailEnd/>
           </a:ln>
         </p:spPr>
       </p:pic>
       <p:sp>
         <p:nvSpPr>
-          <p:cNvPr id="4" name="Rectangle 2"/>
+          <p:cNvPr id="5" name="Rectangle 2"/>
           <p:cNvSpPr>
             <a:spLocks noChangeArrowheads="1"/>
           </p:cNvSpPr>
@@ -25894,14 +25612,14 @@
           <a:effectLst/>
           <a:extLst>
             <a:ext uri="{909E8E84-426E-40DD-AFC4-6F175D3DCCD1}">
-              <a14:hiddenFill xmlns:a14="http://schemas.microsoft.com/office/drawing/2010/main" xmlns="">
+              <a14:hiddenFill xmlns:a14="http://schemas.microsoft.com/office/drawing/2010/main">
                 <a:solidFill>
                   <a:schemeClr val="accent1"/>
                 </a:solidFill>
               </a14:hiddenFill>
             </a:ext>
             <a:ext uri="{91240B29-F687-4F45-9708-019B960494DF}">
-              <a14:hiddenLine xmlns:a14="http://schemas.microsoft.com/office/drawing/2010/main" xmlns="" w="9525">
+              <a14:hiddenLine xmlns:a14="http://schemas.microsoft.com/office/drawing/2010/main" w="9525">
                 <a:solidFill>
                   <a:schemeClr val="tx1"/>
                 </a:solidFill>
@@ -25911,7 +25629,7 @@
               </a14:hiddenLine>
             </a:ext>
             <a:ext uri="{AF507438-7753-43E0-B8FC-AC1667EBCBE1}">
-              <a14:hiddenEffects xmlns:a14="http://schemas.microsoft.com/office/drawing/2010/main" xmlns="">
+              <a14:hiddenEffects xmlns:a14="http://schemas.microsoft.com/office/drawing/2010/main">
                 <a:effectLst>
                   <a:outerShdw dist="35921" dir="2700000" algn="ctr" rotWithShape="0">
                     <a:schemeClr val="bg2"/>
@@ -25936,34 +25654,84 @@
       </p:sp>
       <p:graphicFrame>
         <p:nvGraphicFramePr>
-          <p:cNvPr id="6" name="Object 5"/>
+          <p:cNvPr id="8" name="Object 7"/>
           <p:cNvGraphicFramePr>
             <a:graphicFrameLocks noChangeAspect="1"/>
           </p:cNvGraphicFramePr>
           <p:nvPr>
             <p:extLst>
               <p:ext uri="{D42A27DB-BD31-4B8C-83A1-F6EECF244321}">
-                <p14:modId xmlns:p14="http://schemas.microsoft.com/office/powerpoint/2010/main" xmlns="" val="3607041668"/>
+                <p14:modId xmlns:p14="http://schemas.microsoft.com/office/powerpoint/2010/main" val="1552680796"/>
               </p:ext>
             </p:extLst>
           </p:nvPr>
         </p:nvGraphicFramePr>
         <p:xfrm>
-          <a:off x="5458691" y="1279873"/>
-          <a:ext cx="3209925" cy="5086350"/>
+          <a:off x="7213600" y="933016"/>
+          <a:ext cx="1447800" cy="5324475"/>
         </p:xfrm>
         <a:graphic>
           <a:graphicData uri="http://schemas.openxmlformats.org/presentationml/2006/ole">
-            <p:oleObj spid="_x0000_s38916" name="Visio" r:id="rId4" imgW="3204214" imgH="5082432" progId="">
-              <p:embed/>
-            </p:oleObj>
+            <mc:AlternateContent xmlns:mc="http://schemas.openxmlformats.org/markup-compatibility/2006">
+              <mc:Choice xmlns:v="urn:schemas-microsoft-com:vml" Requires="v">
+                <p:oleObj spid="_x0000_s37896" name="Visio" r:id="rId4" imgW="1447108" imgH="5311032" progId="">
+                  <p:embed/>
+                </p:oleObj>
+              </mc:Choice>
+              <mc:Fallback>
+                <p:oleObj name="Visio" r:id="rId4" imgW="1447108" imgH="5311032" progId="">
+                  <p:embed/>
+                  <p:pic>
+                    <p:nvPicPr>
+                      <p:cNvPr id="0" name="Picture 4"/>
+                      <p:cNvPicPr>
+                        <a:picLocks noChangeAspect="1" noChangeArrowheads="1"/>
+                      </p:cNvPicPr>
+                      <p:nvPr/>
+                    </p:nvPicPr>
+                    <p:blipFill>
+                      <a:blip r:embed="rId5">
+                        <a:extLst>
+                          <a:ext uri="{28A0092B-C50C-407E-A947-70E740481C1C}">
+                            <a14:useLocalDpi xmlns:a14="http://schemas.microsoft.com/office/drawing/2010/main" val="0"/>
+                          </a:ext>
+                        </a:extLst>
+                      </a:blip>
+                      <a:srcRect/>
+                      <a:stretch>
+                        <a:fillRect/>
+                      </a:stretch>
+                    </p:blipFill>
+                    <p:spPr bwMode="auto">
+                      <a:xfrm>
+                        <a:off x="7213600" y="933016"/>
+                        <a:ext cx="1447800" cy="5324475"/>
+                      </a:xfrm>
+                      <a:prstGeom prst="rect">
+                        <a:avLst/>
+                      </a:prstGeom>
+                      <a:noFill/>
+                      <a:extLst>
+                        <a:ext uri="{909E8E84-426E-40DD-AFC4-6F175D3DCCD1}">
+                          <a14:hiddenFill xmlns:a14="http://schemas.microsoft.com/office/drawing/2010/main">
+                            <a:solidFill>
+                              <a:srgbClr val="FFFFFF"/>
+                            </a:solidFill>
+                          </a14:hiddenFill>
+                        </a:ext>
+                      </a:extLst>
+                    </p:spPr>
+                  </p:pic>
+                </p:oleObj>
+              </mc:Fallback>
+            </mc:AlternateContent>
           </a:graphicData>
         </a:graphic>
       </p:graphicFrame>
     </p:spTree>
     <p:extLst>
       <p:ext uri="{BB962C8B-B14F-4D97-AF65-F5344CB8AC3E}">
-        <p14:creationId xmlns:p14="http://schemas.microsoft.com/office/powerpoint/2010/main" xmlns="" val="2227559208"/>
+        <p14:creationId xmlns:p14="http://schemas.microsoft.com/office/powerpoint/2010/main" val="2798939284"/>
       </p:ext>
     </p:extLst>
   </p:cSld>
@@ -26050,14 +25818,14 @@
           <a:effectLst/>
           <a:extLst>
             <a:ext uri="{909E8E84-426E-40DD-AFC4-6F175D3DCCD1}">
-              <a14:hiddenFill xmlns:a14="http://schemas.microsoft.com/office/drawing/2010/main" xmlns="">
+              <a14:hiddenFill xmlns:a14="http://schemas.microsoft.com/office/drawing/2010/main">
                 <a:solidFill>
                   <a:schemeClr val="accent1"/>
                 </a:solidFill>
               </a14:hiddenFill>
             </a:ext>
             <a:ext uri="{91240B29-F687-4F45-9708-019B960494DF}">
-              <a14:hiddenLine xmlns:a14="http://schemas.microsoft.com/office/drawing/2010/main" xmlns="" w="9525">
+              <a14:hiddenLine xmlns:a14="http://schemas.microsoft.com/office/drawing/2010/main" w="9525">
                 <a:solidFill>
                   <a:schemeClr val="tx1"/>
                 </a:solidFill>
@@ -26067,7 +25835,7 @@
               </a14:hiddenLine>
             </a:ext>
             <a:ext uri="{AF507438-7753-43E0-B8FC-AC1667EBCBE1}">
-              <a14:hiddenEffects xmlns:a14="http://schemas.microsoft.com/office/drawing/2010/main" xmlns="">
+              <a14:hiddenEffects xmlns:a14="http://schemas.microsoft.com/office/drawing/2010/main">
                 <a:effectLst>
                   <a:outerShdw dist="35921" dir="2700000" algn="ctr" rotWithShape="0">
                     <a:schemeClr val="bg2"/>
@@ -26113,14 +25881,14 @@
           <a:effectLst/>
           <a:extLst>
             <a:ext uri="{909E8E84-426E-40DD-AFC4-6F175D3DCCD1}">
-              <a14:hiddenFill xmlns:a14="http://schemas.microsoft.com/office/drawing/2010/main" xmlns="">
+              <a14:hiddenFill xmlns:a14="http://schemas.microsoft.com/office/drawing/2010/main">
                 <a:solidFill>
                   <a:schemeClr val="accent1"/>
                 </a:solidFill>
               </a14:hiddenFill>
             </a:ext>
             <a:ext uri="{91240B29-F687-4F45-9708-019B960494DF}">
-              <a14:hiddenLine xmlns:a14="http://schemas.microsoft.com/office/drawing/2010/main" xmlns="" w="9525">
+              <a14:hiddenLine xmlns:a14="http://schemas.microsoft.com/office/drawing/2010/main" w="9525">
                 <a:solidFill>
                   <a:schemeClr val="tx1"/>
                 </a:solidFill>
@@ -26130,70 +25898,7 @@
               </a14:hiddenLine>
             </a:ext>
             <a:ext uri="{AF507438-7753-43E0-B8FC-AC1667EBCBE1}">
-              <a14:hiddenEffects xmlns:a14="http://schemas.microsoft.com/office/drawing/2010/main" xmlns="">
-                <a:effectLst>
-                  <a:outerShdw dist="35921" dir="2700000" algn="ctr" rotWithShape="0">
-                    <a:schemeClr val="bg2"/>
-                  </a:outerShdw>
-                </a:effectLst>
-              </a14:hiddenEffects>
-            </a:ext>
-          </a:extLst>
-        </p:spPr>
-        <p:txBody>
-          <a:bodyPr vert="horz" wrap="none" lIns="91440" tIns="45720" rIns="91440" bIns="45720" numCol="1" anchor="ctr" anchorCtr="0" compatLnSpc="1">
-            <a:prstTxWarp prst="textNoShape">
-              <a:avLst/>
-            </a:prstTxWarp>
-            <a:spAutoFit/>
-          </a:bodyPr>
-          <a:lstStyle/>
-          <a:p>
-            <a:endParaRPr lang="en-US"/>
-          </a:p>
-        </p:txBody>
-      </p:sp>
-      <p:sp>
-        <p:nvSpPr>
-          <p:cNvPr id="4" name="Rectangle 2"/>
-          <p:cNvSpPr>
-            <a:spLocks noChangeArrowheads="1"/>
-          </p:cNvSpPr>
-          <p:nvPr/>
-        </p:nvSpPr>
-        <p:spPr bwMode="auto">
-          <a:xfrm>
-            <a:off x="0" y="0"/>
-            <a:ext cx="9144000" cy="0"/>
-          </a:xfrm>
-          <a:prstGeom prst="rect">
-            <a:avLst/>
-          </a:prstGeom>
-          <a:noFill/>
-          <a:ln>
-            <a:noFill/>
-          </a:ln>
-          <a:effectLst/>
-          <a:extLst>
-            <a:ext uri="{909E8E84-426E-40DD-AFC4-6F175D3DCCD1}">
-              <a14:hiddenFill xmlns:a14="http://schemas.microsoft.com/office/drawing/2010/main" xmlns="">
-                <a:solidFill>
-                  <a:schemeClr val="accent1"/>
-                </a:solidFill>
-              </a14:hiddenFill>
-            </a:ext>
-            <a:ext uri="{91240B29-F687-4F45-9708-019B960494DF}">
-              <a14:hiddenLine xmlns:a14="http://schemas.microsoft.com/office/drawing/2010/main" xmlns="" w="9525">
-                <a:solidFill>
-                  <a:schemeClr val="tx1"/>
-                </a:solidFill>
-                <a:miter lim="800000"/>
-                <a:headEnd/>
-                <a:tailEnd/>
-              </a14:hiddenLine>
-            </a:ext>
-            <a:ext uri="{AF507438-7753-43E0-B8FC-AC1667EBCBE1}">
-              <a14:hiddenEffects xmlns:a14="http://schemas.microsoft.com/office/drawing/2010/main" xmlns="">
+              <a14:hiddenEffects xmlns:a14="http://schemas.microsoft.com/office/drawing/2010/main">
                 <a:effectLst>
                   <a:outerShdw dist="35921" dir="2700000" algn="ctr" rotWithShape="0">
                     <a:schemeClr val="bg2"/>
@@ -26218,7 +25923,7 @@
       </p:sp>
       <p:pic>
         <p:nvPicPr>
-          <p:cNvPr id="9" name="Picture" descr="A description..."/>
+          <p:cNvPr id="7" name="Picture" descr="A description..."/>
           <p:cNvPicPr/>
           <p:nvPr/>
         </p:nvPicPr>
@@ -26231,8 +25936,8 @@
         </p:blipFill>
         <p:spPr bwMode="auto">
           <a:xfrm>
-            <a:off x="593436" y="1749483"/>
-            <a:ext cx="5943600" cy="3802380"/>
+            <a:off x="602990" y="1175904"/>
+            <a:ext cx="5942965" cy="1790700"/>
           </a:xfrm>
           <a:prstGeom prst="rect">
             <a:avLst/>
@@ -26248,7 +25953,7 @@
       </p:pic>
       <p:pic>
         <p:nvPicPr>
-          <p:cNvPr id="10" name="Picture" descr="A description..."/>
+          <p:cNvPr id="9" name="Picture" descr="A description..."/>
           <p:cNvPicPr/>
           <p:nvPr/>
         </p:nvPicPr>
@@ -26261,8 +25966,8 @@
         </p:blipFill>
         <p:spPr bwMode="auto">
           <a:xfrm>
-            <a:off x="6059055" y="1279873"/>
-            <a:ext cx="2586182" cy="5182998"/>
+            <a:off x="2680854" y="2434012"/>
+            <a:ext cx="5943600" cy="4058920"/>
           </a:xfrm>
           <a:prstGeom prst="rect">
             <a:avLst/>
@@ -26279,7 +25984,7 @@
     </p:spTree>
     <p:extLst>
       <p:ext uri="{BB962C8B-B14F-4D97-AF65-F5344CB8AC3E}">
-        <p14:creationId xmlns:p14="http://schemas.microsoft.com/office/powerpoint/2010/main" xmlns="" val="273623958"/>
+        <p14:creationId xmlns:p14="http://schemas.microsoft.com/office/powerpoint/2010/main" val="792481554"/>
       </p:ext>
     </p:extLst>
   </p:cSld>
@@ -26454,22 +26159,21 @@
         </p:nvSpPr>
         <p:spPr>
           <a:xfrm>
-            <a:off x="840509" y="3079691"/>
-            <a:ext cx="7430925" cy="638582"/>
+            <a:off x="1043490" y="641291"/>
+            <a:ext cx="7024744" cy="638582"/>
           </a:xfrm>
         </p:spPr>
         <p:txBody>
           <a:bodyPr>
-            <a:noAutofit/>
+            <a:normAutofit fontScale="90000"/>
           </a:bodyPr>
           <a:lstStyle/>
           <a:p>
-            <a:pPr algn="ctr"/>
             <a:r>
-              <a:rPr lang="en-US" sz="7200" dirty="0" smtClean="0"/>
-              <a:t>Q &amp; A</a:t>
+              <a:rPr lang="en-US" dirty="0" smtClean="0"/>
+              <a:t>Human Interface Design</a:t>
             </a:r>
-            <a:endParaRPr lang="en-US" sz="7200" dirty="0"/>
+            <a:endParaRPr lang="en-US" dirty="0"/>
           </a:p>
         </p:txBody>
       </p:sp>
@@ -26496,14 +26200,14 @@
           <a:effectLst/>
           <a:extLst>
             <a:ext uri="{909E8E84-426E-40DD-AFC4-6F175D3DCCD1}">
-              <a14:hiddenFill xmlns:a14="http://schemas.microsoft.com/office/drawing/2010/main" xmlns="">
+              <a14:hiddenFill xmlns:a14="http://schemas.microsoft.com/office/drawing/2010/main">
                 <a:solidFill>
                   <a:schemeClr val="accent1"/>
                 </a:solidFill>
               </a14:hiddenFill>
             </a:ext>
             <a:ext uri="{91240B29-F687-4F45-9708-019B960494DF}">
-              <a14:hiddenLine xmlns:a14="http://schemas.microsoft.com/office/drawing/2010/main" xmlns="" w="9525">
+              <a14:hiddenLine xmlns:a14="http://schemas.microsoft.com/office/drawing/2010/main" w="9525">
                 <a:solidFill>
                   <a:schemeClr val="tx1"/>
                 </a:solidFill>
@@ -26513,7 +26217,7 @@
               </a14:hiddenLine>
             </a:ext>
             <a:ext uri="{AF507438-7753-43E0-B8FC-AC1667EBCBE1}">
-              <a14:hiddenEffects xmlns:a14="http://schemas.microsoft.com/office/drawing/2010/main" xmlns="">
+              <a14:hiddenEffects xmlns:a14="http://schemas.microsoft.com/office/drawing/2010/main">
                 <a:effectLst>
                   <a:outerShdw dist="35921" dir="2700000" algn="ctr" rotWithShape="0">
                     <a:schemeClr val="bg2"/>
@@ -26559,14 +26263,14 @@
           <a:effectLst/>
           <a:extLst>
             <a:ext uri="{909E8E84-426E-40DD-AFC4-6F175D3DCCD1}">
-              <a14:hiddenFill xmlns:a14="http://schemas.microsoft.com/office/drawing/2010/main" xmlns="">
+              <a14:hiddenFill xmlns:a14="http://schemas.microsoft.com/office/drawing/2010/main">
                 <a:solidFill>
                   <a:schemeClr val="accent1"/>
                 </a:solidFill>
               </a14:hiddenFill>
             </a:ext>
             <a:ext uri="{91240B29-F687-4F45-9708-019B960494DF}">
-              <a14:hiddenLine xmlns:a14="http://schemas.microsoft.com/office/drawing/2010/main" xmlns="" w="9525">
+              <a14:hiddenLine xmlns:a14="http://schemas.microsoft.com/office/drawing/2010/main" w="9525">
                 <a:solidFill>
                   <a:schemeClr val="tx1"/>
                 </a:solidFill>
@@ -26576,7 +26280,372 @@
               </a14:hiddenLine>
             </a:ext>
             <a:ext uri="{AF507438-7753-43E0-B8FC-AC1667EBCBE1}">
-              <a14:hiddenEffects xmlns:a14="http://schemas.microsoft.com/office/drawing/2010/main" xmlns="">
+              <a14:hiddenEffects xmlns:a14="http://schemas.microsoft.com/office/drawing/2010/main">
+                <a:effectLst>
+                  <a:outerShdw dist="35921" dir="2700000" algn="ctr" rotWithShape="0">
+                    <a:schemeClr val="bg2"/>
+                  </a:outerShdw>
+                </a:effectLst>
+              </a14:hiddenEffects>
+            </a:ext>
+          </a:extLst>
+        </p:spPr>
+        <p:txBody>
+          <a:bodyPr vert="horz" wrap="none" lIns="91440" tIns="45720" rIns="91440" bIns="45720" numCol="1" anchor="ctr" anchorCtr="0" compatLnSpc="1">
+            <a:prstTxWarp prst="textNoShape">
+              <a:avLst/>
+            </a:prstTxWarp>
+            <a:spAutoFit/>
+          </a:bodyPr>
+          <a:lstStyle/>
+          <a:p>
+            <a:endParaRPr lang="en-US"/>
+          </a:p>
+        </p:txBody>
+      </p:sp>
+      <p:pic>
+        <p:nvPicPr>
+          <p:cNvPr id="8" name="Picture 7"/>
+          <p:cNvPicPr/>
+          <p:nvPr/>
+        </p:nvPicPr>
+        <p:blipFill>
+          <a:blip r:embed="rId3" cstate="email">
+            <a:extLst>
+              <a:ext uri="{28A0092B-C50C-407E-A947-70E740481C1C}">
+                <a14:useLocalDpi xmlns:a14="http://schemas.microsoft.com/office/drawing/2010/main" val="0"/>
+              </a:ext>
+            </a:extLst>
+          </a:blip>
+          <a:srcRect/>
+          <a:stretch>
+            <a:fillRect/>
+          </a:stretch>
+        </p:blipFill>
+        <p:spPr bwMode="auto">
+          <a:xfrm>
+            <a:off x="477173" y="2419927"/>
+            <a:ext cx="4981518" cy="2767560"/>
+          </a:xfrm>
+          <a:prstGeom prst="rect">
+            <a:avLst/>
+          </a:prstGeom>
+          <a:noFill/>
+          <a:ln>
+            <a:noFill/>
+          </a:ln>
+        </p:spPr>
+      </p:pic>
+      <p:sp>
+        <p:nvSpPr>
+          <p:cNvPr id="4" name="Rectangle 2"/>
+          <p:cNvSpPr>
+            <a:spLocks noChangeArrowheads="1"/>
+          </p:cNvSpPr>
+          <p:nvPr/>
+        </p:nvSpPr>
+        <p:spPr bwMode="auto">
+          <a:xfrm>
+            <a:off x="0" y="0"/>
+            <a:ext cx="9144000" cy="0"/>
+          </a:xfrm>
+          <a:prstGeom prst="rect">
+            <a:avLst/>
+          </a:prstGeom>
+          <a:noFill/>
+          <a:ln>
+            <a:noFill/>
+          </a:ln>
+          <a:effectLst/>
+          <a:extLst>
+            <a:ext uri="{909E8E84-426E-40DD-AFC4-6F175D3DCCD1}">
+              <a14:hiddenFill xmlns:a14="http://schemas.microsoft.com/office/drawing/2010/main">
+                <a:solidFill>
+                  <a:schemeClr val="accent1"/>
+                </a:solidFill>
+              </a14:hiddenFill>
+            </a:ext>
+            <a:ext uri="{91240B29-F687-4F45-9708-019B960494DF}">
+              <a14:hiddenLine xmlns:a14="http://schemas.microsoft.com/office/drawing/2010/main" w="9525">
+                <a:solidFill>
+                  <a:schemeClr val="tx1"/>
+                </a:solidFill>
+                <a:miter lim="800000"/>
+                <a:headEnd/>
+                <a:tailEnd/>
+              </a14:hiddenLine>
+            </a:ext>
+            <a:ext uri="{AF507438-7753-43E0-B8FC-AC1667EBCBE1}">
+              <a14:hiddenEffects xmlns:a14="http://schemas.microsoft.com/office/drawing/2010/main">
+                <a:effectLst>
+                  <a:outerShdw dist="35921" dir="2700000" algn="ctr" rotWithShape="0">
+                    <a:schemeClr val="bg2"/>
+                  </a:outerShdw>
+                </a:effectLst>
+              </a14:hiddenEffects>
+            </a:ext>
+          </a:extLst>
+        </p:spPr>
+        <p:txBody>
+          <a:bodyPr vert="horz" wrap="none" lIns="91440" tIns="45720" rIns="91440" bIns="45720" numCol="1" anchor="ctr" anchorCtr="0" compatLnSpc="1">
+            <a:prstTxWarp prst="textNoShape">
+              <a:avLst/>
+            </a:prstTxWarp>
+            <a:spAutoFit/>
+          </a:bodyPr>
+          <a:lstStyle/>
+          <a:p>
+            <a:endParaRPr lang="en-US"/>
+          </a:p>
+        </p:txBody>
+      </p:sp>
+      <p:graphicFrame>
+        <p:nvGraphicFramePr>
+          <p:cNvPr id="6" name="Object 5"/>
+          <p:cNvGraphicFramePr>
+            <a:graphicFrameLocks noChangeAspect="1"/>
+          </p:cNvGraphicFramePr>
+          <p:nvPr>
+            <p:extLst>
+              <p:ext uri="{D42A27DB-BD31-4B8C-83A1-F6EECF244321}">
+                <p14:modId xmlns:p14="http://schemas.microsoft.com/office/powerpoint/2010/main" val="3607041668"/>
+              </p:ext>
+            </p:extLst>
+          </p:nvPr>
+        </p:nvGraphicFramePr>
+        <p:xfrm>
+          <a:off x="5458691" y="1279873"/>
+          <a:ext cx="3209925" cy="5086350"/>
+        </p:xfrm>
+        <a:graphic>
+          <a:graphicData uri="http://schemas.openxmlformats.org/presentationml/2006/ole">
+            <mc:AlternateContent xmlns:mc="http://schemas.openxmlformats.org/markup-compatibility/2006">
+              <mc:Choice xmlns:v="urn:schemas-microsoft-com:vml" Requires="v">
+                <p:oleObj spid="_x0000_s38920" name="Visio" r:id="rId4" imgW="3204214" imgH="5082432" progId="">
+                  <p:embed/>
+                </p:oleObj>
+              </mc:Choice>
+              <mc:Fallback>
+                <p:oleObj name="Visio" r:id="rId4" imgW="3204214" imgH="5082432" progId="">
+                  <p:embed/>
+                  <p:pic>
+                    <p:nvPicPr>
+                      <p:cNvPr id="0" name="Picture 4"/>
+                      <p:cNvPicPr>
+                        <a:picLocks noChangeAspect="1" noChangeArrowheads="1"/>
+                      </p:cNvPicPr>
+                      <p:nvPr/>
+                    </p:nvPicPr>
+                    <p:blipFill>
+                      <a:blip r:embed="rId5">
+                        <a:extLst>
+                          <a:ext uri="{28A0092B-C50C-407E-A947-70E740481C1C}">
+                            <a14:useLocalDpi xmlns:a14="http://schemas.microsoft.com/office/drawing/2010/main" val="0"/>
+                          </a:ext>
+                        </a:extLst>
+                      </a:blip>
+                      <a:srcRect/>
+                      <a:stretch>
+                        <a:fillRect/>
+                      </a:stretch>
+                    </p:blipFill>
+                    <p:spPr bwMode="auto">
+                      <a:xfrm>
+                        <a:off x="5458691" y="1279873"/>
+                        <a:ext cx="3209925" cy="5086350"/>
+                      </a:xfrm>
+                      <a:prstGeom prst="rect">
+                        <a:avLst/>
+                      </a:prstGeom>
+                      <a:noFill/>
+                      <a:extLst>
+                        <a:ext uri="{909E8E84-426E-40DD-AFC4-6F175D3DCCD1}">
+                          <a14:hiddenFill xmlns:a14="http://schemas.microsoft.com/office/drawing/2010/main">
+                            <a:solidFill>
+                              <a:srgbClr val="FFFFFF"/>
+                            </a:solidFill>
+                          </a14:hiddenFill>
+                        </a:ext>
+                      </a:extLst>
+                    </p:spPr>
+                  </p:pic>
+                </p:oleObj>
+              </mc:Fallback>
+            </mc:AlternateContent>
+          </a:graphicData>
+        </a:graphic>
+      </p:graphicFrame>
+    </p:spTree>
+    <p:extLst>
+      <p:ext uri="{BB962C8B-B14F-4D97-AF65-F5344CB8AC3E}">
+        <p14:creationId xmlns:p14="http://schemas.microsoft.com/office/powerpoint/2010/main" val="2227559208"/>
+      </p:ext>
+    </p:extLst>
+  </p:cSld>
+  <p:clrMapOvr>
+    <a:masterClrMapping/>
+  </p:clrMapOvr>
+  <p:timing>
+    <p:tnLst>
+      <p:par>
+        <p:cTn id="1" dur="indefinite" restart="never" nodeType="tmRoot"/>
+      </p:par>
+    </p:tnLst>
+  </p:timing>
+</p:sld>
+</file>
+
+<file path=ppt/slides/slide31.xml><?xml version="1.0" encoding="utf-8"?>
+<p:sld xmlns:a="http://schemas.openxmlformats.org/drawingml/2006/main" xmlns:r="http://schemas.openxmlformats.org/officeDocument/2006/relationships" xmlns:p="http://schemas.openxmlformats.org/presentationml/2006/main">
+  <p:cSld>
+    <p:spTree>
+      <p:nvGrpSpPr>
+        <p:cNvPr id="1" name=""/>
+        <p:cNvGrpSpPr/>
+        <p:nvPr/>
+      </p:nvGrpSpPr>
+      <p:grpSpPr>
+        <a:xfrm>
+          <a:off x="0" y="0"/>
+          <a:ext cx="0" cy="0"/>
+          <a:chOff x="0" y="0"/>
+          <a:chExt cx="0" cy="0"/>
+        </a:xfrm>
+      </p:grpSpPr>
+      <p:sp>
+        <p:nvSpPr>
+          <p:cNvPr id="2" name="Title 1"/>
+          <p:cNvSpPr>
+            <a:spLocks noGrp="1"/>
+          </p:cNvSpPr>
+          <p:nvPr>
+            <p:ph type="title"/>
+          </p:nvPr>
+        </p:nvSpPr>
+        <p:spPr>
+          <a:xfrm>
+            <a:off x="1043490" y="641291"/>
+            <a:ext cx="7024744" cy="638582"/>
+          </a:xfrm>
+        </p:spPr>
+        <p:txBody>
+          <a:bodyPr>
+            <a:normAutofit fontScale="90000"/>
+          </a:bodyPr>
+          <a:lstStyle/>
+          <a:p>
+            <a:r>
+              <a:rPr lang="en-US" dirty="0" smtClean="0"/>
+              <a:t>Human Interface Design</a:t>
+            </a:r>
+            <a:endParaRPr lang="en-US" dirty="0"/>
+          </a:p>
+        </p:txBody>
+      </p:sp>
+      <p:sp>
+        <p:nvSpPr>
+          <p:cNvPr id="3" name="Rectangle 2"/>
+          <p:cNvSpPr>
+            <a:spLocks noChangeArrowheads="1"/>
+          </p:cNvSpPr>
+          <p:nvPr/>
+        </p:nvSpPr>
+        <p:spPr bwMode="auto">
+          <a:xfrm>
+            <a:off x="0" y="0"/>
+            <a:ext cx="9144000" cy="0"/>
+          </a:xfrm>
+          <a:prstGeom prst="rect">
+            <a:avLst/>
+          </a:prstGeom>
+          <a:noFill/>
+          <a:ln>
+            <a:noFill/>
+          </a:ln>
+          <a:effectLst/>
+          <a:extLst>
+            <a:ext uri="{909E8E84-426E-40DD-AFC4-6F175D3DCCD1}">
+              <a14:hiddenFill xmlns:a14="http://schemas.microsoft.com/office/drawing/2010/main">
+                <a:solidFill>
+                  <a:schemeClr val="accent1"/>
+                </a:solidFill>
+              </a14:hiddenFill>
+            </a:ext>
+            <a:ext uri="{91240B29-F687-4F45-9708-019B960494DF}">
+              <a14:hiddenLine xmlns:a14="http://schemas.microsoft.com/office/drawing/2010/main" w="9525">
+                <a:solidFill>
+                  <a:schemeClr val="tx1"/>
+                </a:solidFill>
+                <a:miter lim="800000"/>
+                <a:headEnd/>
+                <a:tailEnd/>
+              </a14:hiddenLine>
+            </a:ext>
+            <a:ext uri="{AF507438-7753-43E0-B8FC-AC1667EBCBE1}">
+              <a14:hiddenEffects xmlns:a14="http://schemas.microsoft.com/office/drawing/2010/main">
+                <a:effectLst>
+                  <a:outerShdw dist="35921" dir="2700000" algn="ctr" rotWithShape="0">
+                    <a:schemeClr val="bg2"/>
+                  </a:outerShdw>
+                </a:effectLst>
+              </a14:hiddenEffects>
+            </a:ext>
+          </a:extLst>
+        </p:spPr>
+        <p:txBody>
+          <a:bodyPr vert="horz" wrap="none" lIns="91440" tIns="45720" rIns="91440" bIns="45720" numCol="1" anchor="ctr" anchorCtr="0" compatLnSpc="1">
+            <a:prstTxWarp prst="textNoShape">
+              <a:avLst/>
+            </a:prstTxWarp>
+            <a:spAutoFit/>
+          </a:bodyPr>
+          <a:lstStyle/>
+          <a:p>
+            <a:endParaRPr lang="en-US"/>
+          </a:p>
+        </p:txBody>
+      </p:sp>
+      <p:sp>
+        <p:nvSpPr>
+          <p:cNvPr id="5" name="Rectangle 2"/>
+          <p:cNvSpPr>
+            <a:spLocks noChangeArrowheads="1"/>
+          </p:cNvSpPr>
+          <p:nvPr/>
+        </p:nvSpPr>
+        <p:spPr bwMode="auto">
+          <a:xfrm>
+            <a:off x="0" y="0"/>
+            <a:ext cx="9144000" cy="0"/>
+          </a:xfrm>
+          <a:prstGeom prst="rect">
+            <a:avLst/>
+          </a:prstGeom>
+          <a:noFill/>
+          <a:ln>
+            <a:noFill/>
+          </a:ln>
+          <a:effectLst/>
+          <a:extLst>
+            <a:ext uri="{909E8E84-426E-40DD-AFC4-6F175D3DCCD1}">
+              <a14:hiddenFill xmlns:a14="http://schemas.microsoft.com/office/drawing/2010/main">
+                <a:solidFill>
+                  <a:schemeClr val="accent1"/>
+                </a:solidFill>
+              </a14:hiddenFill>
+            </a:ext>
+            <a:ext uri="{91240B29-F687-4F45-9708-019B960494DF}">
+              <a14:hiddenLine xmlns:a14="http://schemas.microsoft.com/office/drawing/2010/main" w="9525">
+                <a:solidFill>
+                  <a:schemeClr val="tx1"/>
+                </a:solidFill>
+                <a:miter lim="800000"/>
+                <a:headEnd/>
+                <a:tailEnd/>
+              </a14:hiddenLine>
+            </a:ext>
+            <a:ext uri="{AF507438-7753-43E0-B8FC-AC1667EBCBE1}">
+              <a14:hiddenEffects xmlns:a14="http://schemas.microsoft.com/office/drawing/2010/main">
                 <a:effectLst>
                   <a:outerShdw dist="35921" dir="2700000" algn="ctr" rotWithShape="0">
                     <a:schemeClr val="bg2"/>
@@ -26622,14 +26691,14 @@
           <a:effectLst/>
           <a:extLst>
             <a:ext uri="{909E8E84-426E-40DD-AFC4-6F175D3DCCD1}">
-              <a14:hiddenFill xmlns:a14="http://schemas.microsoft.com/office/drawing/2010/main" xmlns="">
+              <a14:hiddenFill xmlns:a14="http://schemas.microsoft.com/office/drawing/2010/main">
                 <a:solidFill>
                   <a:schemeClr val="accent1"/>
                 </a:solidFill>
               </a14:hiddenFill>
             </a:ext>
             <a:ext uri="{91240B29-F687-4F45-9708-019B960494DF}">
-              <a14:hiddenLine xmlns:a14="http://schemas.microsoft.com/office/drawing/2010/main" xmlns="" w="9525">
+              <a14:hiddenLine xmlns:a14="http://schemas.microsoft.com/office/drawing/2010/main" w="9525">
                 <a:solidFill>
                   <a:schemeClr val="tx1"/>
                 </a:solidFill>
@@ -26639,7 +26708,324 @@
               </a14:hiddenLine>
             </a:ext>
             <a:ext uri="{AF507438-7753-43E0-B8FC-AC1667EBCBE1}">
-              <a14:hiddenEffects xmlns:a14="http://schemas.microsoft.com/office/drawing/2010/main" xmlns="">
+              <a14:hiddenEffects xmlns:a14="http://schemas.microsoft.com/office/drawing/2010/main">
+                <a:effectLst>
+                  <a:outerShdw dist="35921" dir="2700000" algn="ctr" rotWithShape="0">
+                    <a:schemeClr val="bg2"/>
+                  </a:outerShdw>
+                </a:effectLst>
+              </a14:hiddenEffects>
+            </a:ext>
+          </a:extLst>
+        </p:spPr>
+        <p:txBody>
+          <a:bodyPr vert="horz" wrap="none" lIns="91440" tIns="45720" rIns="91440" bIns="45720" numCol="1" anchor="ctr" anchorCtr="0" compatLnSpc="1">
+            <a:prstTxWarp prst="textNoShape">
+              <a:avLst/>
+            </a:prstTxWarp>
+            <a:spAutoFit/>
+          </a:bodyPr>
+          <a:lstStyle/>
+          <a:p>
+            <a:endParaRPr lang="en-US"/>
+          </a:p>
+        </p:txBody>
+      </p:sp>
+      <p:pic>
+        <p:nvPicPr>
+          <p:cNvPr id="9" name="Picture" descr="A description..."/>
+          <p:cNvPicPr/>
+          <p:nvPr/>
+        </p:nvPicPr>
+        <p:blipFill>
+          <a:blip r:embed="rId2" cstate="print"/>
+          <a:srcRect/>
+          <a:stretch>
+            <a:fillRect/>
+          </a:stretch>
+        </p:blipFill>
+        <p:spPr bwMode="auto">
+          <a:xfrm>
+            <a:off x="593436" y="1749483"/>
+            <a:ext cx="5943600" cy="3802380"/>
+          </a:xfrm>
+          <a:prstGeom prst="rect">
+            <a:avLst/>
+          </a:prstGeom>
+          <a:noFill/>
+          <a:ln w="9525">
+            <a:noFill/>
+            <a:miter lim="800000"/>
+            <a:headEnd/>
+            <a:tailEnd/>
+          </a:ln>
+        </p:spPr>
+      </p:pic>
+      <p:pic>
+        <p:nvPicPr>
+          <p:cNvPr id="10" name="Picture" descr="A description..."/>
+          <p:cNvPicPr/>
+          <p:nvPr/>
+        </p:nvPicPr>
+        <p:blipFill>
+          <a:blip r:embed="rId3" cstate="print"/>
+          <a:srcRect/>
+          <a:stretch>
+            <a:fillRect/>
+          </a:stretch>
+        </p:blipFill>
+        <p:spPr bwMode="auto">
+          <a:xfrm>
+            <a:off x="6059055" y="1279873"/>
+            <a:ext cx="2586182" cy="5182998"/>
+          </a:xfrm>
+          <a:prstGeom prst="rect">
+            <a:avLst/>
+          </a:prstGeom>
+          <a:noFill/>
+          <a:ln w="9525">
+            <a:noFill/>
+            <a:miter lim="800000"/>
+            <a:headEnd/>
+            <a:tailEnd/>
+          </a:ln>
+        </p:spPr>
+      </p:pic>
+    </p:spTree>
+    <p:extLst>
+      <p:ext uri="{BB962C8B-B14F-4D97-AF65-F5344CB8AC3E}">
+        <p14:creationId xmlns:p14="http://schemas.microsoft.com/office/powerpoint/2010/main" val="273623958"/>
+      </p:ext>
+    </p:extLst>
+  </p:cSld>
+  <p:clrMapOvr>
+    <a:masterClrMapping/>
+  </p:clrMapOvr>
+  <p:timing>
+    <p:tnLst>
+      <p:par>
+        <p:cTn id="1" dur="indefinite" restart="never" nodeType="tmRoot"/>
+      </p:par>
+    </p:tnLst>
+  </p:timing>
+</p:sld>
+</file>
+
+<file path=ppt/slides/slide32.xml><?xml version="1.0" encoding="utf-8"?>
+<p:sld xmlns:a="http://schemas.openxmlformats.org/drawingml/2006/main" xmlns:r="http://schemas.openxmlformats.org/officeDocument/2006/relationships" xmlns:p="http://schemas.openxmlformats.org/presentationml/2006/main">
+  <p:cSld>
+    <p:spTree>
+      <p:nvGrpSpPr>
+        <p:cNvPr id="1" name=""/>
+        <p:cNvGrpSpPr/>
+        <p:nvPr/>
+      </p:nvGrpSpPr>
+      <p:grpSpPr>
+        <a:xfrm>
+          <a:off x="0" y="0"/>
+          <a:ext cx="0" cy="0"/>
+          <a:chOff x="0" y="0"/>
+          <a:chExt cx="0" cy="0"/>
+        </a:xfrm>
+      </p:grpSpPr>
+      <p:sp>
+        <p:nvSpPr>
+          <p:cNvPr id="2" name="Title 1"/>
+          <p:cNvSpPr>
+            <a:spLocks noGrp="1"/>
+          </p:cNvSpPr>
+          <p:nvPr>
+            <p:ph type="title"/>
+          </p:nvPr>
+        </p:nvSpPr>
+        <p:spPr>
+          <a:xfrm>
+            <a:off x="840509" y="3079691"/>
+            <a:ext cx="7430925" cy="638582"/>
+          </a:xfrm>
+        </p:spPr>
+        <p:txBody>
+          <a:bodyPr>
+            <a:noAutofit/>
+          </a:bodyPr>
+          <a:lstStyle/>
+          <a:p>
+            <a:pPr algn="ctr"/>
+            <a:r>
+              <a:rPr lang="en-US" sz="7200" dirty="0" smtClean="0"/>
+              <a:t>Q &amp; A</a:t>
+            </a:r>
+            <a:endParaRPr lang="en-US" sz="7200" dirty="0"/>
+          </a:p>
+        </p:txBody>
+      </p:sp>
+      <p:sp>
+        <p:nvSpPr>
+          <p:cNvPr id="3" name="Rectangle 2"/>
+          <p:cNvSpPr>
+            <a:spLocks noChangeArrowheads="1"/>
+          </p:cNvSpPr>
+          <p:nvPr/>
+        </p:nvSpPr>
+        <p:spPr bwMode="auto">
+          <a:xfrm>
+            <a:off x="0" y="0"/>
+            <a:ext cx="9144000" cy="0"/>
+          </a:xfrm>
+          <a:prstGeom prst="rect">
+            <a:avLst/>
+          </a:prstGeom>
+          <a:noFill/>
+          <a:ln>
+            <a:noFill/>
+          </a:ln>
+          <a:effectLst/>
+          <a:extLst>
+            <a:ext uri="{909E8E84-426E-40DD-AFC4-6F175D3DCCD1}">
+              <a14:hiddenFill xmlns:a14="http://schemas.microsoft.com/office/drawing/2010/main">
+                <a:solidFill>
+                  <a:schemeClr val="accent1"/>
+                </a:solidFill>
+              </a14:hiddenFill>
+            </a:ext>
+            <a:ext uri="{91240B29-F687-4F45-9708-019B960494DF}">
+              <a14:hiddenLine xmlns:a14="http://schemas.microsoft.com/office/drawing/2010/main" w="9525">
+                <a:solidFill>
+                  <a:schemeClr val="tx1"/>
+                </a:solidFill>
+                <a:miter lim="800000"/>
+                <a:headEnd/>
+                <a:tailEnd/>
+              </a14:hiddenLine>
+            </a:ext>
+            <a:ext uri="{AF507438-7753-43E0-B8FC-AC1667EBCBE1}">
+              <a14:hiddenEffects xmlns:a14="http://schemas.microsoft.com/office/drawing/2010/main">
+                <a:effectLst>
+                  <a:outerShdw dist="35921" dir="2700000" algn="ctr" rotWithShape="0">
+                    <a:schemeClr val="bg2"/>
+                  </a:outerShdw>
+                </a:effectLst>
+              </a14:hiddenEffects>
+            </a:ext>
+          </a:extLst>
+        </p:spPr>
+        <p:txBody>
+          <a:bodyPr vert="horz" wrap="none" lIns="91440" tIns="45720" rIns="91440" bIns="45720" numCol="1" anchor="ctr" anchorCtr="0" compatLnSpc="1">
+            <a:prstTxWarp prst="textNoShape">
+              <a:avLst/>
+            </a:prstTxWarp>
+            <a:spAutoFit/>
+          </a:bodyPr>
+          <a:lstStyle/>
+          <a:p>
+            <a:endParaRPr lang="en-US"/>
+          </a:p>
+        </p:txBody>
+      </p:sp>
+      <p:sp>
+        <p:nvSpPr>
+          <p:cNvPr id="5" name="Rectangle 2"/>
+          <p:cNvSpPr>
+            <a:spLocks noChangeArrowheads="1"/>
+          </p:cNvSpPr>
+          <p:nvPr/>
+        </p:nvSpPr>
+        <p:spPr bwMode="auto">
+          <a:xfrm>
+            <a:off x="0" y="0"/>
+            <a:ext cx="9144000" cy="0"/>
+          </a:xfrm>
+          <a:prstGeom prst="rect">
+            <a:avLst/>
+          </a:prstGeom>
+          <a:noFill/>
+          <a:ln>
+            <a:noFill/>
+          </a:ln>
+          <a:effectLst/>
+          <a:extLst>
+            <a:ext uri="{909E8E84-426E-40DD-AFC4-6F175D3DCCD1}">
+              <a14:hiddenFill xmlns:a14="http://schemas.microsoft.com/office/drawing/2010/main">
+                <a:solidFill>
+                  <a:schemeClr val="accent1"/>
+                </a:solidFill>
+              </a14:hiddenFill>
+            </a:ext>
+            <a:ext uri="{91240B29-F687-4F45-9708-019B960494DF}">
+              <a14:hiddenLine xmlns:a14="http://schemas.microsoft.com/office/drawing/2010/main" w="9525">
+                <a:solidFill>
+                  <a:schemeClr val="tx1"/>
+                </a:solidFill>
+                <a:miter lim="800000"/>
+                <a:headEnd/>
+                <a:tailEnd/>
+              </a14:hiddenLine>
+            </a:ext>
+            <a:ext uri="{AF507438-7753-43E0-B8FC-AC1667EBCBE1}">
+              <a14:hiddenEffects xmlns:a14="http://schemas.microsoft.com/office/drawing/2010/main">
+                <a:effectLst>
+                  <a:outerShdw dist="35921" dir="2700000" algn="ctr" rotWithShape="0">
+                    <a:schemeClr val="bg2"/>
+                  </a:outerShdw>
+                </a:effectLst>
+              </a14:hiddenEffects>
+            </a:ext>
+          </a:extLst>
+        </p:spPr>
+        <p:txBody>
+          <a:bodyPr vert="horz" wrap="none" lIns="91440" tIns="45720" rIns="91440" bIns="45720" numCol="1" anchor="ctr" anchorCtr="0" compatLnSpc="1">
+            <a:prstTxWarp prst="textNoShape">
+              <a:avLst/>
+            </a:prstTxWarp>
+            <a:spAutoFit/>
+          </a:bodyPr>
+          <a:lstStyle/>
+          <a:p>
+            <a:endParaRPr lang="en-US"/>
+          </a:p>
+        </p:txBody>
+      </p:sp>
+      <p:sp>
+        <p:nvSpPr>
+          <p:cNvPr id="4" name="Rectangle 2"/>
+          <p:cNvSpPr>
+            <a:spLocks noChangeArrowheads="1"/>
+          </p:cNvSpPr>
+          <p:nvPr/>
+        </p:nvSpPr>
+        <p:spPr bwMode="auto">
+          <a:xfrm>
+            <a:off x="0" y="0"/>
+            <a:ext cx="9144000" cy="0"/>
+          </a:xfrm>
+          <a:prstGeom prst="rect">
+            <a:avLst/>
+          </a:prstGeom>
+          <a:noFill/>
+          <a:ln>
+            <a:noFill/>
+          </a:ln>
+          <a:effectLst/>
+          <a:extLst>
+            <a:ext uri="{909E8E84-426E-40DD-AFC4-6F175D3DCCD1}">
+              <a14:hiddenFill xmlns:a14="http://schemas.microsoft.com/office/drawing/2010/main">
+                <a:solidFill>
+                  <a:schemeClr val="accent1"/>
+                </a:solidFill>
+              </a14:hiddenFill>
+            </a:ext>
+            <a:ext uri="{91240B29-F687-4F45-9708-019B960494DF}">
+              <a14:hiddenLine xmlns:a14="http://schemas.microsoft.com/office/drawing/2010/main" w="9525">
+                <a:solidFill>
+                  <a:schemeClr val="tx1"/>
+                </a:solidFill>
+                <a:miter lim="800000"/>
+                <a:headEnd/>
+                <a:tailEnd/>
+              </a14:hiddenLine>
+            </a:ext>
+            <a:ext uri="{AF507438-7753-43E0-B8FC-AC1667EBCBE1}">
+              <a14:hiddenEffects xmlns:a14="http://schemas.microsoft.com/office/drawing/2010/main">
                 <a:effectLst>
                   <a:outerShdw dist="35921" dir="2700000" algn="ctr" rotWithShape="0">
                     <a:schemeClr val="bg2"/>
@@ -26665,7 +27051,7 @@
     </p:spTree>
     <p:extLst>
       <p:ext uri="{BB962C8B-B14F-4D97-AF65-F5344CB8AC3E}">
-        <p14:creationId xmlns:p14="http://schemas.microsoft.com/office/powerpoint/2010/main" xmlns="" val="336984967"/>
+        <p14:creationId xmlns:p14="http://schemas.microsoft.com/office/powerpoint/2010/main" val="336984967"/>
       </p:ext>
     </p:extLst>
   </p:cSld>
@@ -26682,7 +27068,7 @@
 </p:sld>
 </file>
 
-<file path=ppt/slides/slide31.xml><?xml version="1.0" encoding="utf-8"?>
+<file path=ppt/slides/slide33.xml><?xml version="1.0" encoding="utf-8"?>
 <p:sld xmlns:a="http://schemas.openxmlformats.org/drawingml/2006/main" xmlns:r="http://schemas.openxmlformats.org/officeDocument/2006/relationships" xmlns:p="http://schemas.openxmlformats.org/presentationml/2006/main">
   <p:cSld>
     <p:spTree>
@@ -26778,7 +27164,7 @@
           <a:blip r:embed="rId3" cstate="print">
             <a:extLst>
               <a:ext uri="{28A0092B-C50C-407E-A947-70E740481C1C}">
-                <a14:useLocalDpi xmlns:a14="http://schemas.microsoft.com/office/drawing/2010/main" xmlns="" val="0"/>
+                <a14:useLocalDpi xmlns:a14="http://schemas.microsoft.com/office/drawing/2010/main" val="0"/>
               </a:ext>
             </a:extLst>
           </a:blip>
@@ -26798,7 +27184,7 @@
           <a:noFill/>
           <a:extLst>
             <a:ext uri="{909E8E84-426E-40DD-AFC4-6F175D3DCCD1}">
-              <a14:hiddenFill xmlns:a14="http://schemas.microsoft.com/office/drawing/2010/main" xmlns="">
+              <a14:hiddenFill xmlns:a14="http://schemas.microsoft.com/office/drawing/2010/main">
                 <a:solidFill>
                   <a:srgbClr val="FFFFFF"/>
                 </a:solidFill>
@@ -26810,7 +27196,7 @@
     </p:spTree>
     <p:extLst>
       <p:ext uri="{BB962C8B-B14F-4D97-AF65-F5344CB8AC3E}">
-        <p14:creationId xmlns:p14="http://schemas.microsoft.com/office/powerpoint/2010/main" xmlns="" val="3832736806"/>
+        <p14:creationId xmlns:p14="http://schemas.microsoft.com/office/powerpoint/2010/main" val="3832736806"/>
       </p:ext>
     </p:extLst>
   </p:cSld>

</xml_diff>

<commit_message>
Added Charts and Custom Mapping
</commit_message>
<xml_diff>
--- a/deliverables/final/Final Presentation.pptx
+++ b/deliverables/final/Final Presentation.pptx
@@ -5,7 +5,7 @@
     <p:sldMasterId id="2147483792" r:id="rId1"/>
   </p:sldMasterIdLst>
   <p:notesMasterIdLst>
-    <p:notesMasterId r:id="rId35"/>
+    <p:notesMasterId r:id="rId37"/>
   </p:notesMasterIdLst>
   <p:sldIdLst>
     <p:sldId id="256" r:id="rId2"/>
@@ -37,10 +37,12 @@
     <p:sldId id="286" r:id="rId28"/>
     <p:sldId id="287" r:id="rId29"/>
     <p:sldId id="288" r:id="rId30"/>
-    <p:sldId id="289" r:id="rId31"/>
-    <p:sldId id="282" r:id="rId32"/>
-    <p:sldId id="266" r:id="rId33"/>
-    <p:sldId id="259" r:id="rId34"/>
+    <p:sldId id="299" r:id="rId31"/>
+    <p:sldId id="300" r:id="rId32"/>
+    <p:sldId id="289" r:id="rId33"/>
+    <p:sldId id="282" r:id="rId34"/>
+    <p:sldId id="266" r:id="rId35"/>
+    <p:sldId id="259" r:id="rId36"/>
   </p:sldIdLst>
   <p:sldSz cx="9144000" cy="6858000" type="screen4x3"/>
   <p:notesSz cx="6858000" cy="9144000"/>
@@ -210,16 +212,16 @@
                 <c:formatCode>[hh]:mm:ss</c:formatCode>
                 <c:ptCount val="4"/>
                 <c:pt idx="0">
-                  <c:v>3.9756944444444402</c:v>
+                  <c:v>3.97569444444444</c:v>
                 </c:pt>
                 <c:pt idx="1">
-                  <c:v>5.9444444444444402</c:v>
+                  <c:v>5.94444444444444</c:v>
                 </c:pt>
                 <c:pt idx="2">
                   <c:v>3.46875</c:v>
                 </c:pt>
                 <c:pt idx="3">
-                  <c:v>4.6805555555555598</c:v>
+                  <c:v>4.680555555555558</c:v>
                 </c:pt>
               </c:numCache>
             </c:numRef>
@@ -272,16 +274,16 @@
                 <c:formatCode>[hh]:mm:ss</c:formatCode>
                 <c:ptCount val="4"/>
                 <c:pt idx="0">
-                  <c:v>5.5381944444444402</c:v>
+                  <c:v>5.53819444444444</c:v>
                 </c:pt>
                 <c:pt idx="1">
-                  <c:v>3.9270833333333299</c:v>
+                  <c:v>3.927083333333329</c:v>
                 </c:pt>
                 <c:pt idx="2">
                   <c:v>2.84375</c:v>
                 </c:pt>
                 <c:pt idx="3">
-                  <c:v>3.4826388888888902</c:v>
+                  <c:v>3.48263888888889</c:v>
                 </c:pt>
               </c:numCache>
             </c:numRef>
@@ -296,11 +298,11 @@
           <c:showBubbleSize val="0"/>
         </c:dLbls>
         <c:gapWidth val="100"/>
-        <c:axId val="127267200"/>
-        <c:axId val="127268736"/>
+        <c:axId val="2099387144"/>
+        <c:axId val="2099383816"/>
       </c:barChart>
       <c:catAx>
-        <c:axId val="127267200"/>
+        <c:axId val="2099387144"/>
         <c:scaling>
           <c:orientation val="minMax"/>
         </c:scaling>
@@ -316,15 +318,15 @@
             </a:solidFill>
           </a:ln>
         </c:spPr>
-        <c:crossAx val="127268736"/>
-        <c:crossesAt val="0"/>
+        <c:crossAx val="2099383816"/>
+        <c:crossesAt val="0.0"/>
         <c:auto val="1"/>
         <c:lblAlgn val="ctr"/>
         <c:lblOffset val="100"/>
         <c:noMultiLvlLbl val="0"/>
       </c:catAx>
       <c:valAx>
-        <c:axId val="127268736"/>
+        <c:axId val="2099383816"/>
         <c:scaling>
           <c:orientation val="minMax"/>
         </c:scaling>
@@ -350,8 +352,8 @@
             </a:solidFill>
           </a:ln>
         </c:spPr>
-        <c:crossAx val="127267200"/>
-        <c:crossesAt val="0"/>
+        <c:crossAx val="2099387144"/>
+        <c:crossesAt val="0.0"/>
         <c:crossBetween val="between"/>
       </c:valAx>
       <c:spPr>
@@ -450,10 +452,10 @@
                 <c:formatCode>General</c:formatCode>
                 <c:ptCount val="2"/>
                 <c:pt idx="0">
-                  <c:v>19.434027777777796</c:v>
+                  <c:v>19.43402777777779</c:v>
                 </c:pt>
                 <c:pt idx="1">
-                  <c:v>16.697916666666703</c:v>
+                  <c:v>16.69791666666671</c:v>
                 </c:pt>
               </c:numCache>
             </c:numRef>
@@ -577,7 +579,7 @@
           <a:p>
             <a:fld id="{1C1C5CF6-DD17-4F1F-ADC8-DFB45EB30005}" type="datetimeFigureOut">
               <a:rPr lang="en-US" smtClean="0"/>
-              <a:t>4/29/2012</a:t>
+              <a:t>4/30/12</a:t>
             </a:fld>
             <a:endParaRPr lang="en-US"/>
           </a:p>
@@ -3723,7 +3725,7 @@
             <a:fld id="{0A98AF03-7270-45C2-A683-C5E353EF01A5}" type="datetime4">
               <a:rPr lang="en-US" smtClean="0"/>
               <a:pPr/>
-              <a:t>April 29, 2012</a:t>
+              <a:t>April 30, 2012</a:t>
             </a:fld>
             <a:endParaRPr lang="en-US" dirty="0"/>
           </a:p>
@@ -4010,7 +4012,7 @@
             <a:fld id="{A2FB5AFD-D735-4504-A039-ADEBB6448D55}" type="datetime4">
               <a:rPr lang="en-US" smtClean="0"/>
               <a:pPr/>
-              <a:t>April 29, 2012</a:t>
+              <a:t>April 30, 2012</a:t>
             </a:fld>
             <a:endParaRPr lang="en-US" dirty="0"/>
           </a:p>
@@ -4187,7 +4189,7 @@
             <a:fld id="{AB5C8118-FB93-4E87-B380-0175F2FE2167}" type="datetime4">
               <a:rPr lang="en-US" smtClean="0"/>
               <a:pPr/>
-              <a:t>April 29, 2012</a:t>
+              <a:t>April 30, 2012</a:t>
             </a:fld>
             <a:endParaRPr lang="en-US" dirty="0"/>
           </a:p>
@@ -4354,7 +4356,7 @@
             <a:fld id="{05A93482-8E69-40F7-BCAD-5662A6CADB27}" type="datetime4">
               <a:rPr lang="en-US" smtClean="0"/>
               <a:pPr/>
-              <a:t>April 29, 2012</a:t>
+              <a:t>April 30, 2012</a:t>
             </a:fld>
             <a:endParaRPr lang="en-US" dirty="0"/>
           </a:p>
@@ -4597,7 +4599,7 @@
             <a:fld id="{FBB7EAE1-CAAC-4AEF-919E-158692B1E55E}" type="datetime4">
               <a:rPr lang="en-US" smtClean="0"/>
               <a:pPr/>
-              <a:t>April 29, 2012</a:t>
+              <a:t>April 30, 2012</a:t>
             </a:fld>
             <a:endParaRPr lang="en-US" dirty="0"/>
           </a:p>
@@ -4712,7 +4714,7 @@
             <a:fld id="{9525A706-D8F2-4D1A-855A-CADC92600C26}" type="datetime4">
               <a:rPr lang="en-US" smtClean="0"/>
               <a:pPr/>
-              <a:t>April 29, 2012</a:t>
+              <a:t>April 30, 2012</a:t>
             </a:fld>
             <a:endParaRPr lang="en-US" dirty="0"/>
           </a:p>
@@ -5253,7 +5255,7 @@
             <a:fld id="{99B4F123-1704-49AC-9D15-C4B1462B8014}" type="datetime4">
               <a:rPr lang="en-US" smtClean="0"/>
               <a:pPr/>
-              <a:t>April 29, 2012</a:t>
+              <a:t>April 30, 2012</a:t>
             </a:fld>
             <a:endParaRPr lang="en-US" dirty="0"/>
           </a:p>
@@ -5368,7 +5370,7 @@
             <a:fld id="{E3127EC2-47FB-48A1-8644-C8A81DDAA119}" type="datetime4">
               <a:rPr lang="en-US" smtClean="0"/>
               <a:pPr/>
-              <a:t>April 29, 2012</a:t>
+              <a:t>April 30, 2012</a:t>
             </a:fld>
             <a:endParaRPr lang="en-US" dirty="0"/>
           </a:p>
@@ -5460,7 +5462,7 @@
             <a:fld id="{AE3EC3ED-7435-49F9-84C8-03CCA2F8DEDB}" type="datetime4">
               <a:rPr lang="en-US" smtClean="0"/>
               <a:pPr/>
-              <a:t>April 29, 2012</a:t>
+              <a:t>April 30, 2012</a:t>
             </a:fld>
             <a:endParaRPr lang="en-US" dirty="0"/>
           </a:p>
@@ -8113,7 +8115,7 @@
             <a:fld id="{3FC49BF1-FCD3-4395-8FF6-0047AF66228E}" type="datetime4">
               <a:rPr lang="en-US" smtClean="0"/>
               <a:pPr/>
-              <a:t>April 29, 2012</a:t>
+              <a:t>April 30, 2012</a:t>
             </a:fld>
             <a:endParaRPr lang="en-US" dirty="0"/>
           </a:p>
@@ -11327,7 +11329,7 @@
             <a:fld id="{CA861222-2C8B-4501-BE87-6797EC025925}" type="datetime4">
               <a:rPr lang="en-US" smtClean="0"/>
               <a:pPr/>
-              <a:t>April 29, 2012</a:t>
+              <a:t>April 30, 2012</a:t>
             </a:fld>
             <a:endParaRPr lang="en-US" dirty="0"/>
           </a:p>
@@ -14151,7 +14153,7 @@
             <a:fld id="{16C01193-8287-4834-A286-6B880643E934}" type="datetime4">
               <a:rPr lang="en-US" smtClean="0"/>
               <a:pPr/>
-              <a:t>April 29, 2012</a:t>
+              <a:t>April 30, 2012</a:t>
             </a:fld>
             <a:endParaRPr lang="en-US" dirty="0"/>
           </a:p>
@@ -14756,7 +14758,7 @@
   <p:timing>
     <p:tnLst>
       <p:par>
-        <p:cTn id="1" dur="indefinite" restart="never" nodeType="tmRoot"/>
+        <p:cTn xmlns:p14="http://schemas.microsoft.com/office/powerpoint/2010/main" id="1" dur="indefinite" restart="never" nodeType="tmRoot"/>
       </p:par>
     </p:tnLst>
   </p:timing>
@@ -23398,7 +23400,7 @@
           </a:prstGeom>
           <a:noFill/>
           <a:extLst>
-            <a:ext uri="{909E8E84-426E-40DD-AFC4-6F175D3DCCD1}">
+            <a:ext uri="{909E8E84-426E-40dd-AFC4-6F175D3DCCD1}">
               <a14:hiddenFill xmlns:a14="http://schemas.microsoft.com/office/drawing/2010/main">
                 <a:solidFill>
                   <a:srgbClr val="FFFFFF"/>
@@ -24069,8 +24071,12 @@
               <a:buChar char=""/>
             </a:pPr>
             <a:r>
+              <a:rPr lang="en-US" dirty="0" smtClean="0"/>
+              <a:t>Each </a:t>
+            </a:r>
+            <a:r>
               <a:rPr lang="en-US" dirty="0"/>
-              <a:t> Each project artifact was inspected by at least 2 reviewers before </a:t>
+              <a:t>project artifact was inspected by at least 2 reviewers before </a:t>
             </a:r>
             <a:r>
               <a:rPr lang="en-US" dirty="0" smtClean="0"/>
@@ -24092,10 +24098,16 @@
               <a:buChar char=""/>
             </a:pPr>
             <a:r>
+              <a:rPr lang="en-US" dirty="0" smtClean="0">
+                <a:ea typeface="Century Gothic"/>
+              </a:rPr>
+              <a:t>Set </a:t>
+            </a:r>
+            <a:r>
               <a:rPr lang="en-US" dirty="0">
                 <a:ea typeface="Century Gothic"/>
               </a:rPr>
-              <a:t> Set of coding </a:t>
+              <a:t>of coding </a:t>
             </a:r>
             <a:r>
               <a:rPr lang="en-US" dirty="0" smtClean="0">
@@ -24653,7 +24665,7 @@
           </a:prstGeom>
           <a:noFill/>
           <a:extLst>
-            <a:ext uri="{909E8E84-426E-40DD-AFC4-6F175D3DCCD1}">
+            <a:ext uri="{909E8E84-426E-40dd-AFC4-6F175D3DCCD1}">
               <a14:hiddenFill xmlns:a14="http://schemas.microsoft.com/office/drawing/2010/main">
                 <a:solidFill>
                   <a:srgbClr val="FFFFFF"/>
@@ -24775,13 +24787,20 @@
               <a:buChar char=""/>
             </a:pPr>
             <a:r>
-              <a:rPr lang="en-US" dirty="0">
+              <a:rPr lang="en-US" dirty="0" smtClean="0">
                 <a:solidFill>
                   <a:srgbClr val="000000"/>
                 </a:solidFill>
               </a:rPr>
-              <a:t> Pair programming</a:t>
+              <a:t>Pair programming</a:t>
             </a:r>
+          </a:p>
+          <a:p>
+            <a:pPr>
+              <a:buSzPct val="45000"/>
+              <a:buFont typeface="StarSymbol"/>
+              <a:buChar char=""/>
+            </a:pPr>
             <a:endParaRPr lang="en-US" dirty="0"/>
           </a:p>
           <a:p>
@@ -24791,13 +24810,22 @@
               <a:buChar char=""/>
             </a:pPr>
             <a:r>
+              <a:rPr lang="en-US" dirty="0" smtClean="0">
+                <a:solidFill>
+                  <a:srgbClr val="000000"/>
+                </a:solidFill>
+                <a:ea typeface="Century Gothic"/>
+              </a:rPr>
+              <a:t>Unit </a:t>
+            </a:r>
+            <a:r>
               <a:rPr lang="en-US" dirty="0">
                 <a:solidFill>
                   <a:srgbClr val="000000"/>
                 </a:solidFill>
                 <a:ea typeface="Century Gothic"/>
               </a:rPr>
-              <a:t> Unit tests</a:t>
+              <a:t>tests</a:t>
             </a:r>
             <a:endParaRPr lang="en-US" dirty="0"/>
           </a:p>
@@ -24843,17 +24871,30 @@
         </p:nvSpPr>
         <p:spPr>
           <a:xfrm>
-            <a:off x="878237" y="456164"/>
+            <a:off x="878237" y="850692"/>
             <a:ext cx="7024744" cy="1143000"/>
           </a:xfrm>
         </p:spPr>
         <p:txBody>
-          <a:bodyPr/>
+          <a:bodyPr>
+            <a:normAutofit fontScale="90000"/>
+          </a:bodyPr>
           <a:lstStyle/>
           <a:p>
             <a:r>
               <a:rPr lang="en-US" dirty="0" smtClean="0"/>
-              <a:t>System Architecture</a:t>
+              <a:t>System </a:t>
+            </a:r>
+            <a:r>
+              <a:rPr lang="en-US" dirty="0" smtClean="0"/>
+              <a:t>Architecture</a:t>
+            </a:r>
+            <a:br>
+              <a:rPr lang="en-US" dirty="0" smtClean="0"/>
+            </a:br>
+            <a:r>
+              <a:rPr lang="en-US" dirty="0" smtClean="0"/>
+              <a:t>MVC with ORM Layer</a:t>
             </a:r>
             <a:endParaRPr lang="en-US" dirty="0"/>
           </a:p>
@@ -24861,37 +24902,22 @@
       </p:sp>
       <p:pic>
         <p:nvPicPr>
-          <p:cNvPr id="4" name="Picture" descr="A description..."/>
+          <p:cNvPr id="10" name="Content Placeholder 9"/>
           <p:cNvPicPr>
-            <a:picLocks noGrp="1"/>
+            <a:picLocks noGrp="1" noChangeAspect="1"/>
           </p:cNvPicPr>
           <p:nvPr>
             <p:ph idx="1"/>
           </p:nvPr>
         </p:nvPicPr>
         <p:blipFill>
-          <a:blip r:embed="rId3" cstate="print"/>
-          <a:srcRect/>
+          <a:blip r:embed="rId3"/>
+          <a:srcRect l="-3473" r="-3473"/>
           <a:stretch>
             <a:fillRect/>
           </a:stretch>
         </p:blipFill>
-        <p:spPr bwMode="auto">
-          <a:xfrm>
-            <a:off x="2764631" y="3316287"/>
-            <a:ext cx="3333750" cy="1524000"/>
-          </a:xfrm>
-          <a:prstGeom prst="rect">
-            <a:avLst/>
-          </a:prstGeom>
-          <a:noFill/>
-          <a:ln w="9525">
-            <a:noFill/>
-            <a:miter lim="800000"/>
-            <a:headEnd/>
-            <a:tailEnd/>
-          </a:ln>
-        </p:spPr>
+        <p:spPr/>
       </p:pic>
     </p:spTree>
     <p:extLst>
@@ -24906,7 +24932,7 @@
   <p:timing>
     <p:tnLst>
       <p:par>
-        <p:cTn id="1" dur="indefinite" restart="never" nodeType="tmRoot"/>
+        <p:cTn xmlns:p14="http://schemas.microsoft.com/office/powerpoint/2010/main" id="1" dur="indefinite" restart="never" nodeType="tmRoot"/>
       </p:par>
     </p:tnLst>
   </p:timing>
@@ -24975,13 +25001,16 @@
           </a:xfrm>
         </p:spPr>
         <p:txBody>
-          <a:bodyPr/>
+          <a:bodyPr>
+            <a:normAutofit fontScale="92500" lnSpcReduction="10000"/>
+          </a:bodyPr>
           <a:lstStyle/>
           <a:p>
             <a:r>
               <a:rPr lang="en-US" dirty="0" smtClean="0"/>
-              <a:t>Factory</a:t>
+              <a:t>Factory: All Application Objects (ORM Objects)</a:t>
             </a:r>
+            <a:endParaRPr lang="en-US" dirty="0" smtClean="0"/>
           </a:p>
           <a:p>
             <a:pPr>
@@ -24992,8 +25021,9 @@
           <a:p>
             <a:r>
               <a:rPr lang="en-US" dirty="0" smtClean="0"/>
-              <a:t>Singleton</a:t>
+              <a:t>Singleton: All Source Objects</a:t>
             </a:r>
+            <a:endParaRPr lang="en-US" dirty="0" smtClean="0"/>
           </a:p>
           <a:p>
             <a:pPr>
@@ -25004,7 +25034,23 @@
           <a:p>
             <a:r>
               <a:rPr lang="en-US" dirty="0" smtClean="0"/>
-              <a:t>Observer</a:t>
+              <a:t>Observer: Being use by </a:t>
+            </a:r>
+            <a:r>
+              <a:rPr lang="en-US" dirty="0" err="1" smtClean="0"/>
+              <a:t>javascript</a:t>
+            </a:r>
+            <a:r>
+              <a:rPr lang="en-US" dirty="0" smtClean="0"/>
+              <a:t> such as on click or on change events which activates an </a:t>
+            </a:r>
+            <a:r>
+              <a:rPr lang="en-US" dirty="0" err="1" smtClean="0"/>
+              <a:t>ajax</a:t>
+            </a:r>
+            <a:r>
+              <a:rPr lang="en-US" dirty="0" smtClean="0"/>
+              <a:t> call to perform a specific task.</a:t>
             </a:r>
             <a:endParaRPr lang="en-US" dirty="0"/>
           </a:p>
@@ -25023,7 +25069,7 @@
   <p:timing>
     <p:tnLst>
       <p:par>
-        <p:cTn id="1" dur="indefinite" restart="never" nodeType="tmRoot"/>
+        <p:cTn xmlns:p14="http://schemas.microsoft.com/office/powerpoint/2010/main" id="1" dur="indefinite" restart="never" nodeType="tmRoot"/>
       </p:par>
     </p:tnLst>
   </p:timing>
@@ -25206,7 +25252,7 @@
   <p:timing>
     <p:tnLst>
       <p:par>
-        <p:cTn id="1" dur="indefinite" restart="never" nodeType="tmRoot"/>
+        <p:cTn xmlns:p14="http://schemas.microsoft.com/office/powerpoint/2010/main" id="1" dur="indefinite" restart="never" nodeType="tmRoot"/>
       </p:par>
     </p:tnLst>
   </p:timing>
@@ -25312,14 +25358,14 @@
           </a:ln>
           <a:effectLst/>
           <a:extLst>
-            <a:ext uri="{909E8E84-426E-40DD-AFC4-6F175D3DCCD1}">
+            <a:ext uri="{909E8E84-426E-40dd-AFC4-6F175D3DCCD1}">
               <a14:hiddenFill xmlns:a14="http://schemas.microsoft.com/office/drawing/2010/main">
                 <a:solidFill>
                   <a:schemeClr val="accent1"/>
                 </a:solidFill>
               </a14:hiddenFill>
             </a:ext>
-            <a:ext uri="{91240B29-F687-4F45-9708-019B960494DF}">
+            <a:ext uri="{91240B29-F687-4f45-9708-019B960494DF}">
               <a14:hiddenLine xmlns:a14="http://schemas.microsoft.com/office/drawing/2010/main" w="9525">
                 <a:solidFill>
                   <a:schemeClr val="tx1"/>
@@ -25329,7 +25375,7 @@
                 <a:tailEnd/>
               </a14:hiddenLine>
             </a:ext>
-            <a:ext uri="{AF507438-7753-43E0-B8FC-AC1667EBCBE1}">
+            <a:ext uri="{AF507438-7753-43e0-B8FC-AC1667EBCBE1}">
               <a14:hiddenEffects xmlns:a14="http://schemas.microsoft.com/office/drawing/2010/main">
                 <a:effectLst>
                   <a:outerShdw dist="35921" dir="2700000" algn="ctr" rotWithShape="0">
@@ -25375,7 +25421,7 @@
           <a:graphicData uri="http://schemas.openxmlformats.org/presentationml/2006/ole">
             <mc:AlternateContent xmlns:mc="http://schemas.openxmlformats.org/markup-compatibility/2006">
               <mc:Choice xmlns:v="urn:schemas-microsoft-com:vml" Requires="v">
-                <p:oleObj spid="_x0000_s36872" name="Visio" r:id="rId4" imgW="4580844" imgH="5596830" progId="">
+                <p:oleObj spid="_x0000_s36875" name="Visio" r:id="rId4" imgW="4580844" imgH="5596830" progId="">
                   <p:embed/>
                 </p:oleObj>
               </mc:Choice>
@@ -25413,7 +25459,7 @@
                       </a:prstGeom>
                       <a:noFill/>
                       <a:extLst>
-                        <a:ext uri="{909E8E84-426E-40DD-AFC4-6F175D3DCCD1}">
+                        <a:ext uri="{909E8E84-426E-40dd-AFC4-6F175D3DCCD1}">
                           <a14:hiddenFill xmlns:a14="http://schemas.microsoft.com/office/drawing/2010/main">
                             <a:solidFill>
                               <a:srgbClr val="FFFFFF"/>
@@ -25442,7 +25488,7 @@
   <p:timing>
     <p:tnLst>
       <p:par>
-        <p:cTn id="1" dur="indefinite" restart="never" nodeType="tmRoot"/>
+        <p:cTn xmlns:p14="http://schemas.microsoft.com/office/powerpoint/2010/main" id="1" dur="indefinite" restart="never" nodeType="tmRoot"/>
       </p:par>
     </p:tnLst>
   </p:timing>
@@ -25518,14 +25564,14 @@
           </a:ln>
           <a:effectLst/>
           <a:extLst>
-            <a:ext uri="{909E8E84-426E-40DD-AFC4-6F175D3DCCD1}">
+            <a:ext uri="{909E8E84-426E-40dd-AFC4-6F175D3DCCD1}">
               <a14:hiddenFill xmlns:a14="http://schemas.microsoft.com/office/drawing/2010/main">
                 <a:solidFill>
                   <a:schemeClr val="accent1"/>
                 </a:solidFill>
               </a14:hiddenFill>
             </a:ext>
-            <a:ext uri="{91240B29-F687-4F45-9708-019B960494DF}">
+            <a:ext uri="{91240B29-F687-4f45-9708-019B960494DF}">
               <a14:hiddenLine xmlns:a14="http://schemas.microsoft.com/office/drawing/2010/main" w="9525">
                 <a:solidFill>
                   <a:schemeClr val="tx1"/>
@@ -25535,7 +25581,7 @@
                 <a:tailEnd/>
               </a14:hiddenLine>
             </a:ext>
-            <a:ext uri="{AF507438-7753-43E0-B8FC-AC1667EBCBE1}">
+            <a:ext uri="{AF507438-7753-43e0-B8FC-AC1667EBCBE1}">
               <a14:hiddenEffects xmlns:a14="http://schemas.microsoft.com/office/drawing/2010/main">
                 <a:effectLst>
                   <a:outerShdw dist="35921" dir="2700000" algn="ctr" rotWithShape="0">
@@ -25611,14 +25657,14 @@
           </a:ln>
           <a:effectLst/>
           <a:extLst>
-            <a:ext uri="{909E8E84-426E-40DD-AFC4-6F175D3DCCD1}">
+            <a:ext uri="{909E8E84-426E-40dd-AFC4-6F175D3DCCD1}">
               <a14:hiddenFill xmlns:a14="http://schemas.microsoft.com/office/drawing/2010/main">
                 <a:solidFill>
                   <a:schemeClr val="accent1"/>
                 </a:solidFill>
               </a14:hiddenFill>
             </a:ext>
-            <a:ext uri="{91240B29-F687-4F45-9708-019B960494DF}">
+            <a:ext uri="{91240B29-F687-4f45-9708-019B960494DF}">
               <a14:hiddenLine xmlns:a14="http://schemas.microsoft.com/office/drawing/2010/main" w="9525">
                 <a:solidFill>
                   <a:schemeClr val="tx1"/>
@@ -25628,7 +25674,7 @@
                 <a:tailEnd/>
               </a14:hiddenLine>
             </a:ext>
-            <a:ext uri="{AF507438-7753-43E0-B8FC-AC1667EBCBE1}">
+            <a:ext uri="{AF507438-7753-43e0-B8FC-AC1667EBCBE1}">
               <a14:hiddenEffects xmlns:a14="http://schemas.microsoft.com/office/drawing/2010/main">
                 <a:effectLst>
                   <a:outerShdw dist="35921" dir="2700000" algn="ctr" rotWithShape="0">
@@ -25674,7 +25720,7 @@
           <a:graphicData uri="http://schemas.openxmlformats.org/presentationml/2006/ole">
             <mc:AlternateContent xmlns:mc="http://schemas.openxmlformats.org/markup-compatibility/2006">
               <mc:Choice xmlns:v="urn:schemas-microsoft-com:vml" Requires="v">
-                <p:oleObj spid="_x0000_s37896" name="Visio" r:id="rId4" imgW="1447108" imgH="5311032" progId="">
+                <p:oleObj spid="_x0000_s37899" name="Visio" r:id="rId4" imgW="1447108" imgH="5311032" progId="">
                   <p:embed/>
                 </p:oleObj>
               </mc:Choice>
@@ -25712,7 +25758,7 @@
                       </a:prstGeom>
                       <a:noFill/>
                       <a:extLst>
-                        <a:ext uri="{909E8E84-426E-40DD-AFC4-6F175D3DCCD1}">
+                        <a:ext uri="{909E8E84-426E-40dd-AFC4-6F175D3DCCD1}">
                           <a14:hiddenFill xmlns:a14="http://schemas.microsoft.com/office/drawing/2010/main">
                             <a:solidFill>
                               <a:srgbClr val="FFFFFF"/>
@@ -25741,7 +25787,7 @@
   <p:timing>
     <p:tnLst>
       <p:par>
-        <p:cTn id="1" dur="indefinite" restart="never" nodeType="tmRoot"/>
+        <p:cTn xmlns:p14="http://schemas.microsoft.com/office/powerpoint/2010/main" id="1" dur="indefinite" restart="never" nodeType="tmRoot"/>
       </p:par>
     </p:tnLst>
   </p:timing>
@@ -25817,14 +25863,14 @@
           </a:ln>
           <a:effectLst/>
           <a:extLst>
-            <a:ext uri="{909E8E84-426E-40DD-AFC4-6F175D3DCCD1}">
+            <a:ext uri="{909E8E84-426E-40dd-AFC4-6F175D3DCCD1}">
               <a14:hiddenFill xmlns:a14="http://schemas.microsoft.com/office/drawing/2010/main">
                 <a:solidFill>
                   <a:schemeClr val="accent1"/>
                 </a:solidFill>
               </a14:hiddenFill>
             </a:ext>
-            <a:ext uri="{91240B29-F687-4F45-9708-019B960494DF}">
+            <a:ext uri="{91240B29-F687-4f45-9708-019B960494DF}">
               <a14:hiddenLine xmlns:a14="http://schemas.microsoft.com/office/drawing/2010/main" w="9525">
                 <a:solidFill>
                   <a:schemeClr val="tx1"/>
@@ -25834,7 +25880,7 @@
                 <a:tailEnd/>
               </a14:hiddenLine>
             </a:ext>
-            <a:ext uri="{AF507438-7753-43E0-B8FC-AC1667EBCBE1}">
+            <a:ext uri="{AF507438-7753-43e0-B8FC-AC1667EBCBE1}">
               <a14:hiddenEffects xmlns:a14="http://schemas.microsoft.com/office/drawing/2010/main">
                 <a:effectLst>
                   <a:outerShdw dist="35921" dir="2700000" algn="ctr" rotWithShape="0">
@@ -25880,14 +25926,14 @@
           </a:ln>
           <a:effectLst/>
           <a:extLst>
-            <a:ext uri="{909E8E84-426E-40DD-AFC4-6F175D3DCCD1}">
+            <a:ext uri="{909E8E84-426E-40dd-AFC4-6F175D3DCCD1}">
               <a14:hiddenFill xmlns:a14="http://schemas.microsoft.com/office/drawing/2010/main">
                 <a:solidFill>
                   <a:schemeClr val="accent1"/>
                 </a:solidFill>
               </a14:hiddenFill>
             </a:ext>
-            <a:ext uri="{91240B29-F687-4F45-9708-019B960494DF}">
+            <a:ext uri="{91240B29-F687-4f45-9708-019B960494DF}">
               <a14:hiddenLine xmlns:a14="http://schemas.microsoft.com/office/drawing/2010/main" w="9525">
                 <a:solidFill>
                   <a:schemeClr val="tx1"/>
@@ -25897,7 +25943,7 @@
                 <a:tailEnd/>
               </a14:hiddenLine>
             </a:ext>
-            <a:ext uri="{AF507438-7753-43E0-B8FC-AC1667EBCBE1}">
+            <a:ext uri="{AF507438-7753-43e0-B8FC-AC1667EBCBE1}">
               <a14:hiddenEffects xmlns:a14="http://schemas.microsoft.com/office/drawing/2010/main">
                 <a:effectLst>
                   <a:outerShdw dist="35921" dir="2700000" algn="ctr" rotWithShape="0">
@@ -25994,7 +26040,7 @@
   <p:timing>
     <p:tnLst>
       <p:par>
-        <p:cTn id="1" dur="indefinite" restart="never" nodeType="tmRoot"/>
+        <p:cTn xmlns:p14="http://schemas.microsoft.com/office/powerpoint/2010/main" id="1" dur="indefinite" restart="never" nodeType="tmRoot"/>
       </p:par>
     </p:tnLst>
   </p:timing>
@@ -26159,6 +26205,167 @@
         </p:nvSpPr>
         <p:spPr>
           <a:xfrm>
+            <a:off x="1043490" y="1027664"/>
+            <a:ext cx="7024744" cy="501131"/>
+          </a:xfrm>
+        </p:spPr>
+        <p:txBody>
+          <a:bodyPr>
+            <a:normAutofit fontScale="90000"/>
+          </a:bodyPr>
+          <a:lstStyle/>
+          <a:p>
+            <a:r>
+              <a:rPr lang="en-US" dirty="0"/>
+              <a:t>Human Interface Design</a:t>
+            </a:r>
+          </a:p>
+        </p:txBody>
+      </p:sp>
+      <p:pic>
+        <p:nvPicPr>
+          <p:cNvPr id="4" name="Content Placeholder 3"/>
+          <p:cNvPicPr>
+            <a:picLocks noGrp="1" noChangeAspect="1"/>
+          </p:cNvPicPr>
+          <p:nvPr>
+            <p:ph idx="1"/>
+          </p:nvPr>
+        </p:nvPicPr>
+        <p:blipFill>
+          <a:blip r:embed="rId2"/>
+          <a:srcRect l="-19066" r="-19066"/>
+          <a:stretch>
+            <a:fillRect/>
+          </a:stretch>
+        </p:blipFill>
+        <p:spPr>
+          <a:xfrm>
+            <a:off x="1042989" y="1528763"/>
+            <a:ext cx="5032156" cy="3195637"/>
+          </a:xfrm>
+        </p:spPr>
+      </p:pic>
+    </p:spTree>
+    <p:extLst>
+      <p:ext uri="{BB962C8B-B14F-4D97-AF65-F5344CB8AC3E}">
+        <p14:creationId xmlns:p14="http://schemas.microsoft.com/office/powerpoint/2010/main" val="302170737"/>
+      </p:ext>
+    </p:extLst>
+  </p:cSld>
+  <p:clrMapOvr>
+    <a:masterClrMapping/>
+  </p:clrMapOvr>
+</p:sld>
+</file>
+
+<file path=ppt/slides/slide31.xml><?xml version="1.0" encoding="utf-8"?>
+<p:sld xmlns:a="http://schemas.openxmlformats.org/drawingml/2006/main" xmlns:r="http://schemas.openxmlformats.org/officeDocument/2006/relationships" xmlns:p="http://schemas.openxmlformats.org/presentationml/2006/main">
+  <p:cSld>
+    <p:spTree>
+      <p:nvGrpSpPr>
+        <p:cNvPr id="1" name=""/>
+        <p:cNvGrpSpPr/>
+        <p:nvPr/>
+      </p:nvGrpSpPr>
+      <p:grpSpPr>
+        <a:xfrm>
+          <a:off x="0" y="0"/>
+          <a:ext cx="0" cy="0"/>
+          <a:chOff x="0" y="0"/>
+          <a:chExt cx="0" cy="0"/>
+        </a:xfrm>
+      </p:grpSpPr>
+      <p:pic>
+        <p:nvPicPr>
+          <p:cNvPr id="4" name="Content Placeholder 3"/>
+          <p:cNvPicPr>
+            <a:picLocks noGrp="1" noChangeAspect="1"/>
+          </p:cNvPicPr>
+          <p:nvPr>
+            <p:ph idx="1"/>
+          </p:nvPr>
+        </p:nvPicPr>
+        <p:blipFill>
+          <a:blip r:embed="rId2"/>
+          <a:srcRect l="2309" r="2309"/>
+          <a:stretch>
+            <a:fillRect/>
+          </a:stretch>
+        </p:blipFill>
+        <p:spPr/>
+      </p:pic>
+      <p:sp>
+        <p:nvSpPr>
+          <p:cNvPr id="6" name="Title 1"/>
+          <p:cNvSpPr>
+            <a:spLocks noGrp="1"/>
+          </p:cNvSpPr>
+          <p:nvPr>
+            <p:ph type="title"/>
+          </p:nvPr>
+        </p:nvSpPr>
+        <p:spPr>
+          <a:xfrm>
+            <a:off x="1043490" y="1027664"/>
+            <a:ext cx="7024744" cy="501131"/>
+          </a:xfrm>
+        </p:spPr>
+        <p:txBody>
+          <a:bodyPr>
+            <a:normAutofit fontScale="90000"/>
+          </a:bodyPr>
+          <a:lstStyle/>
+          <a:p>
+            <a:r>
+              <a:rPr lang="en-US" dirty="0"/>
+              <a:t>Human Interface Design</a:t>
+            </a:r>
+          </a:p>
+        </p:txBody>
+      </p:sp>
+    </p:spTree>
+    <p:extLst>
+      <p:ext uri="{BB962C8B-B14F-4D97-AF65-F5344CB8AC3E}">
+        <p14:creationId xmlns:p14="http://schemas.microsoft.com/office/powerpoint/2010/main" val="2750094236"/>
+      </p:ext>
+    </p:extLst>
+  </p:cSld>
+  <p:clrMapOvr>
+    <a:masterClrMapping/>
+  </p:clrMapOvr>
+</p:sld>
+</file>
+
+<file path=ppt/slides/slide32.xml><?xml version="1.0" encoding="utf-8"?>
+<p:sld xmlns:a="http://schemas.openxmlformats.org/drawingml/2006/main" xmlns:r="http://schemas.openxmlformats.org/officeDocument/2006/relationships" xmlns:p="http://schemas.openxmlformats.org/presentationml/2006/main">
+  <p:cSld>
+    <p:spTree>
+      <p:nvGrpSpPr>
+        <p:cNvPr id="1" name=""/>
+        <p:cNvGrpSpPr/>
+        <p:nvPr/>
+      </p:nvGrpSpPr>
+      <p:grpSpPr>
+        <a:xfrm>
+          <a:off x="0" y="0"/>
+          <a:ext cx="0" cy="0"/>
+          <a:chOff x="0" y="0"/>
+          <a:chExt cx="0" cy="0"/>
+        </a:xfrm>
+      </p:grpSpPr>
+      <p:sp>
+        <p:nvSpPr>
+          <p:cNvPr id="2" name="Title 1"/>
+          <p:cNvSpPr>
+            <a:spLocks noGrp="1"/>
+          </p:cNvSpPr>
+          <p:nvPr>
+            <p:ph type="title"/>
+          </p:nvPr>
+        </p:nvSpPr>
+        <p:spPr>
+          <a:xfrm>
             <a:off x="1043490" y="641291"/>
             <a:ext cx="7024744" cy="638582"/>
           </a:xfrm>
@@ -26199,14 +26406,14 @@
           </a:ln>
           <a:effectLst/>
           <a:extLst>
-            <a:ext uri="{909E8E84-426E-40DD-AFC4-6F175D3DCCD1}">
+            <a:ext uri="{909E8E84-426E-40dd-AFC4-6F175D3DCCD1}">
               <a14:hiddenFill xmlns:a14="http://schemas.microsoft.com/office/drawing/2010/main">
                 <a:solidFill>
                   <a:schemeClr val="accent1"/>
                 </a:solidFill>
               </a14:hiddenFill>
             </a:ext>
-            <a:ext uri="{91240B29-F687-4F45-9708-019B960494DF}">
+            <a:ext uri="{91240B29-F687-4f45-9708-019B960494DF}">
               <a14:hiddenLine xmlns:a14="http://schemas.microsoft.com/office/drawing/2010/main" w="9525">
                 <a:solidFill>
                   <a:schemeClr val="tx1"/>
@@ -26216,7 +26423,7 @@
                 <a:tailEnd/>
               </a14:hiddenLine>
             </a:ext>
-            <a:ext uri="{AF507438-7753-43E0-B8FC-AC1667EBCBE1}">
+            <a:ext uri="{AF507438-7753-43e0-B8FC-AC1667EBCBE1}">
               <a14:hiddenEffects xmlns:a14="http://schemas.microsoft.com/office/drawing/2010/main">
                 <a:effectLst>
                   <a:outerShdw dist="35921" dir="2700000" algn="ctr" rotWithShape="0">
@@ -26262,14 +26469,14 @@
           </a:ln>
           <a:effectLst/>
           <a:extLst>
-            <a:ext uri="{909E8E84-426E-40DD-AFC4-6F175D3DCCD1}">
+            <a:ext uri="{909E8E84-426E-40dd-AFC4-6F175D3DCCD1}">
               <a14:hiddenFill xmlns:a14="http://schemas.microsoft.com/office/drawing/2010/main">
                 <a:solidFill>
                   <a:schemeClr val="accent1"/>
                 </a:solidFill>
               </a14:hiddenFill>
             </a:ext>
-            <a:ext uri="{91240B29-F687-4F45-9708-019B960494DF}">
+            <a:ext uri="{91240B29-F687-4f45-9708-019B960494DF}">
               <a14:hiddenLine xmlns:a14="http://schemas.microsoft.com/office/drawing/2010/main" w="9525">
                 <a:solidFill>
                   <a:schemeClr val="tx1"/>
@@ -26279,7 +26486,7 @@
                 <a:tailEnd/>
               </a14:hiddenLine>
             </a:ext>
-            <a:ext uri="{AF507438-7753-43E0-B8FC-AC1667EBCBE1}">
+            <a:ext uri="{AF507438-7753-43e0-B8FC-AC1667EBCBE1}">
               <a14:hiddenEffects xmlns:a14="http://schemas.microsoft.com/office/drawing/2010/main">
                 <a:effectLst>
                   <a:outerShdw dist="35921" dir="2700000" algn="ctr" rotWithShape="0">
@@ -26358,14 +26565,14 @@
           </a:ln>
           <a:effectLst/>
           <a:extLst>
-            <a:ext uri="{909E8E84-426E-40DD-AFC4-6F175D3DCCD1}">
+            <a:ext uri="{909E8E84-426E-40dd-AFC4-6F175D3DCCD1}">
               <a14:hiddenFill xmlns:a14="http://schemas.microsoft.com/office/drawing/2010/main">
                 <a:solidFill>
                   <a:schemeClr val="accent1"/>
                 </a:solidFill>
               </a14:hiddenFill>
             </a:ext>
-            <a:ext uri="{91240B29-F687-4F45-9708-019B960494DF}">
+            <a:ext uri="{91240B29-F687-4f45-9708-019B960494DF}">
               <a14:hiddenLine xmlns:a14="http://schemas.microsoft.com/office/drawing/2010/main" w="9525">
                 <a:solidFill>
                   <a:schemeClr val="tx1"/>
@@ -26375,7 +26582,7 @@
                 <a:tailEnd/>
               </a14:hiddenLine>
             </a:ext>
-            <a:ext uri="{AF507438-7753-43E0-B8FC-AC1667EBCBE1}">
+            <a:ext uri="{AF507438-7753-43e0-B8FC-AC1667EBCBE1}">
               <a14:hiddenEffects xmlns:a14="http://schemas.microsoft.com/office/drawing/2010/main">
                 <a:effectLst>
                   <a:outerShdw dist="35921" dir="2700000" algn="ctr" rotWithShape="0">
@@ -26421,7 +26628,7 @@
           <a:graphicData uri="http://schemas.openxmlformats.org/presentationml/2006/ole">
             <mc:AlternateContent xmlns:mc="http://schemas.openxmlformats.org/markup-compatibility/2006">
               <mc:Choice xmlns:v="urn:schemas-microsoft-com:vml" Requires="v">
-                <p:oleObj spid="_x0000_s38920" name="Visio" r:id="rId4" imgW="3204214" imgH="5082432" progId="">
+                <p:oleObj spid="_x0000_s38923" name="Visio" r:id="rId4" imgW="3204214" imgH="5082432" progId="">
                   <p:embed/>
                 </p:oleObj>
               </mc:Choice>
@@ -26459,7 +26666,7 @@
                       </a:prstGeom>
                       <a:noFill/>
                       <a:extLst>
-                        <a:ext uri="{909E8E84-426E-40DD-AFC4-6F175D3DCCD1}">
+                        <a:ext uri="{909E8E84-426E-40dd-AFC4-6F175D3DCCD1}">
                           <a14:hiddenFill xmlns:a14="http://schemas.microsoft.com/office/drawing/2010/main">
                             <a:solidFill>
                               <a:srgbClr val="FFFFFF"/>
@@ -26488,14 +26695,14 @@
   <p:timing>
     <p:tnLst>
       <p:par>
-        <p:cTn id="1" dur="indefinite" restart="never" nodeType="tmRoot"/>
+        <p:cTn xmlns:p14="http://schemas.microsoft.com/office/powerpoint/2010/main" id="1" dur="indefinite" restart="never" nodeType="tmRoot"/>
       </p:par>
     </p:tnLst>
   </p:timing>
 </p:sld>
 </file>
 
-<file path=ppt/slides/slide31.xml><?xml version="1.0" encoding="utf-8"?>
+<file path=ppt/slides/slide33.xml><?xml version="1.0" encoding="utf-8"?>
 <p:sld xmlns:a="http://schemas.openxmlformats.org/drawingml/2006/main" xmlns:r="http://schemas.openxmlformats.org/officeDocument/2006/relationships" xmlns:p="http://schemas.openxmlformats.org/presentationml/2006/main">
   <p:cSld>
     <p:spTree>
@@ -26564,14 +26771,14 @@
           </a:ln>
           <a:effectLst/>
           <a:extLst>
-            <a:ext uri="{909E8E84-426E-40DD-AFC4-6F175D3DCCD1}">
+            <a:ext uri="{909E8E84-426E-40dd-AFC4-6F175D3DCCD1}">
               <a14:hiddenFill xmlns:a14="http://schemas.microsoft.com/office/drawing/2010/main">
                 <a:solidFill>
                   <a:schemeClr val="accent1"/>
                 </a:solidFill>
               </a14:hiddenFill>
             </a:ext>
-            <a:ext uri="{91240B29-F687-4F45-9708-019B960494DF}">
+            <a:ext uri="{91240B29-F687-4f45-9708-019B960494DF}">
               <a14:hiddenLine xmlns:a14="http://schemas.microsoft.com/office/drawing/2010/main" w="9525">
                 <a:solidFill>
                   <a:schemeClr val="tx1"/>
@@ -26581,7 +26788,7 @@
                 <a:tailEnd/>
               </a14:hiddenLine>
             </a:ext>
-            <a:ext uri="{AF507438-7753-43E0-B8FC-AC1667EBCBE1}">
+            <a:ext uri="{AF507438-7753-43e0-B8FC-AC1667EBCBE1}">
               <a14:hiddenEffects xmlns:a14="http://schemas.microsoft.com/office/drawing/2010/main">
                 <a:effectLst>
                   <a:outerShdw dist="35921" dir="2700000" algn="ctr" rotWithShape="0">
@@ -26627,14 +26834,14 @@
           </a:ln>
           <a:effectLst/>
           <a:extLst>
-            <a:ext uri="{909E8E84-426E-40DD-AFC4-6F175D3DCCD1}">
+            <a:ext uri="{909E8E84-426E-40dd-AFC4-6F175D3DCCD1}">
               <a14:hiddenFill xmlns:a14="http://schemas.microsoft.com/office/drawing/2010/main">
                 <a:solidFill>
                   <a:schemeClr val="accent1"/>
                 </a:solidFill>
               </a14:hiddenFill>
             </a:ext>
-            <a:ext uri="{91240B29-F687-4F45-9708-019B960494DF}">
+            <a:ext uri="{91240B29-F687-4f45-9708-019B960494DF}">
               <a14:hiddenLine xmlns:a14="http://schemas.microsoft.com/office/drawing/2010/main" w="9525">
                 <a:solidFill>
                   <a:schemeClr val="tx1"/>
@@ -26644,7 +26851,7 @@
                 <a:tailEnd/>
               </a14:hiddenLine>
             </a:ext>
-            <a:ext uri="{AF507438-7753-43E0-B8FC-AC1667EBCBE1}">
+            <a:ext uri="{AF507438-7753-43e0-B8FC-AC1667EBCBE1}">
               <a14:hiddenEffects xmlns:a14="http://schemas.microsoft.com/office/drawing/2010/main">
                 <a:effectLst>
                   <a:outerShdw dist="35921" dir="2700000" algn="ctr" rotWithShape="0">
@@ -26690,14 +26897,14 @@
           </a:ln>
           <a:effectLst/>
           <a:extLst>
-            <a:ext uri="{909E8E84-426E-40DD-AFC4-6F175D3DCCD1}">
+            <a:ext uri="{909E8E84-426E-40dd-AFC4-6F175D3DCCD1}">
               <a14:hiddenFill xmlns:a14="http://schemas.microsoft.com/office/drawing/2010/main">
                 <a:solidFill>
                   <a:schemeClr val="accent1"/>
                 </a:solidFill>
               </a14:hiddenFill>
             </a:ext>
-            <a:ext uri="{91240B29-F687-4F45-9708-019B960494DF}">
+            <a:ext uri="{91240B29-F687-4f45-9708-019B960494DF}">
               <a14:hiddenLine xmlns:a14="http://schemas.microsoft.com/office/drawing/2010/main" w="9525">
                 <a:solidFill>
                   <a:schemeClr val="tx1"/>
@@ -26707,7 +26914,7 @@
                 <a:tailEnd/>
               </a14:hiddenLine>
             </a:ext>
-            <a:ext uri="{AF507438-7753-43E0-B8FC-AC1667EBCBE1}">
+            <a:ext uri="{AF507438-7753-43e0-B8FC-AC1667EBCBE1}">
               <a14:hiddenEffects xmlns:a14="http://schemas.microsoft.com/office/drawing/2010/main">
                 <a:effectLst>
                   <a:outerShdw dist="35921" dir="2700000" algn="ctr" rotWithShape="0">
@@ -26804,14 +27011,14 @@
   <p:timing>
     <p:tnLst>
       <p:par>
-        <p:cTn id="1" dur="indefinite" restart="never" nodeType="tmRoot"/>
+        <p:cTn xmlns:p14="http://schemas.microsoft.com/office/powerpoint/2010/main" id="1" dur="indefinite" restart="never" nodeType="tmRoot"/>
       </p:par>
     </p:tnLst>
   </p:timing>
 </p:sld>
 </file>
 
-<file path=ppt/slides/slide32.xml><?xml version="1.0" encoding="utf-8"?>
+<file path=ppt/slides/slide34.xml><?xml version="1.0" encoding="utf-8"?>
 <p:sld xmlns:a="http://schemas.openxmlformats.org/drawingml/2006/main" xmlns:r="http://schemas.openxmlformats.org/officeDocument/2006/relationships" xmlns:p="http://schemas.openxmlformats.org/presentationml/2006/main">
   <p:cSld>
     <p:spTree>
@@ -26881,14 +27088,14 @@
           </a:ln>
           <a:effectLst/>
           <a:extLst>
-            <a:ext uri="{909E8E84-426E-40DD-AFC4-6F175D3DCCD1}">
+            <a:ext uri="{909E8E84-426E-40dd-AFC4-6F175D3DCCD1}">
               <a14:hiddenFill xmlns:a14="http://schemas.microsoft.com/office/drawing/2010/main">
                 <a:solidFill>
                   <a:schemeClr val="accent1"/>
                 </a:solidFill>
               </a14:hiddenFill>
             </a:ext>
-            <a:ext uri="{91240B29-F687-4F45-9708-019B960494DF}">
+            <a:ext uri="{91240B29-F687-4f45-9708-019B960494DF}">
               <a14:hiddenLine xmlns:a14="http://schemas.microsoft.com/office/drawing/2010/main" w="9525">
                 <a:solidFill>
                   <a:schemeClr val="tx1"/>
@@ -26898,7 +27105,7 @@
                 <a:tailEnd/>
               </a14:hiddenLine>
             </a:ext>
-            <a:ext uri="{AF507438-7753-43E0-B8FC-AC1667EBCBE1}">
+            <a:ext uri="{AF507438-7753-43e0-B8FC-AC1667EBCBE1}">
               <a14:hiddenEffects xmlns:a14="http://schemas.microsoft.com/office/drawing/2010/main">
                 <a:effectLst>
                   <a:outerShdw dist="35921" dir="2700000" algn="ctr" rotWithShape="0">
@@ -26944,14 +27151,14 @@
           </a:ln>
           <a:effectLst/>
           <a:extLst>
-            <a:ext uri="{909E8E84-426E-40DD-AFC4-6F175D3DCCD1}">
+            <a:ext uri="{909E8E84-426E-40dd-AFC4-6F175D3DCCD1}">
               <a14:hiddenFill xmlns:a14="http://schemas.microsoft.com/office/drawing/2010/main">
                 <a:solidFill>
                   <a:schemeClr val="accent1"/>
                 </a:solidFill>
               </a14:hiddenFill>
             </a:ext>
-            <a:ext uri="{91240B29-F687-4F45-9708-019B960494DF}">
+            <a:ext uri="{91240B29-F687-4f45-9708-019B960494DF}">
               <a14:hiddenLine xmlns:a14="http://schemas.microsoft.com/office/drawing/2010/main" w="9525">
                 <a:solidFill>
                   <a:schemeClr val="tx1"/>
@@ -26961,7 +27168,7 @@
                 <a:tailEnd/>
               </a14:hiddenLine>
             </a:ext>
-            <a:ext uri="{AF507438-7753-43E0-B8FC-AC1667EBCBE1}">
+            <a:ext uri="{AF507438-7753-43e0-B8FC-AC1667EBCBE1}">
               <a14:hiddenEffects xmlns:a14="http://schemas.microsoft.com/office/drawing/2010/main">
                 <a:effectLst>
                   <a:outerShdw dist="35921" dir="2700000" algn="ctr" rotWithShape="0">
@@ -27007,14 +27214,14 @@
           </a:ln>
           <a:effectLst/>
           <a:extLst>
-            <a:ext uri="{909E8E84-426E-40DD-AFC4-6F175D3DCCD1}">
+            <a:ext uri="{909E8E84-426E-40dd-AFC4-6F175D3DCCD1}">
               <a14:hiddenFill xmlns:a14="http://schemas.microsoft.com/office/drawing/2010/main">
                 <a:solidFill>
                   <a:schemeClr val="accent1"/>
                 </a:solidFill>
               </a14:hiddenFill>
             </a:ext>
-            <a:ext uri="{91240B29-F687-4F45-9708-019B960494DF}">
+            <a:ext uri="{91240B29-F687-4f45-9708-019B960494DF}">
               <a14:hiddenLine xmlns:a14="http://schemas.microsoft.com/office/drawing/2010/main" w="9525">
                 <a:solidFill>
                   <a:schemeClr val="tx1"/>
@@ -27024,7 +27231,7 @@
                 <a:tailEnd/>
               </a14:hiddenLine>
             </a:ext>
-            <a:ext uri="{AF507438-7753-43E0-B8FC-AC1667EBCBE1}">
+            <a:ext uri="{AF507438-7753-43e0-B8FC-AC1667EBCBE1}">
               <a14:hiddenEffects xmlns:a14="http://schemas.microsoft.com/office/drawing/2010/main">
                 <a:effectLst>
                   <a:outerShdw dist="35921" dir="2700000" algn="ctr" rotWithShape="0">
@@ -27061,14 +27268,14 @@
   <p:timing>
     <p:tnLst>
       <p:par>
-        <p:cTn id="1" dur="indefinite" restart="never" nodeType="tmRoot"/>
+        <p:cTn xmlns:p14="http://schemas.microsoft.com/office/powerpoint/2010/main" id="1" dur="indefinite" restart="never" nodeType="tmRoot"/>
       </p:par>
     </p:tnLst>
   </p:timing>
 </p:sld>
 </file>
 
-<file path=ppt/slides/slide33.xml><?xml version="1.0" encoding="utf-8"?>
+<file path=ppt/slides/slide35.xml><?xml version="1.0" encoding="utf-8"?>
 <p:sld xmlns:a="http://schemas.openxmlformats.org/drawingml/2006/main" xmlns:r="http://schemas.openxmlformats.org/officeDocument/2006/relationships" xmlns:p="http://schemas.openxmlformats.org/presentationml/2006/main">
   <p:cSld>
     <p:spTree>
@@ -27183,7 +27390,7 @@
           </a:prstGeom>
           <a:noFill/>
           <a:extLst>
-            <a:ext uri="{909E8E84-426E-40DD-AFC4-6F175D3DCCD1}">
+            <a:ext uri="{909E8E84-426E-40dd-AFC4-6F175D3DCCD1}">
               <a14:hiddenFill xmlns:a14="http://schemas.microsoft.com/office/drawing/2010/main">
                 <a:solidFill>
                   <a:srgbClr val="FFFFFF"/>
@@ -27206,7 +27413,7 @@
   <p:timing>
     <p:tnLst>
       <p:par>
-        <p:cTn id="1" dur="indefinite" restart="never" nodeType="tmRoot"/>
+        <p:cTn xmlns:p14="http://schemas.microsoft.com/office/powerpoint/2010/main" id="1" dur="indefinite" restart="never" nodeType="tmRoot"/>
       </p:par>
     </p:tnLst>
   </p:timing>

</xml_diff>